<commit_message>
GA example RDF + update img
</commit_message>
<xml_diff>
--- a/profiledesc/profiledesc-diagrams.pptx
+++ b/profiledesc/profiledesc-diagrams.pptx
@@ -8385,7 +8385,7 @@
         <p:spPr>
           <a:xfrm>
             <a:off x="200722" y="156117"/>
-            <a:ext cx="4714945" cy="369332"/>
+            <a:ext cx="3095912" cy="646331"/>
           </a:xfrm>
           <a:prstGeom prst="rect">
             <a:avLst/>
@@ -8400,17 +8400,23 @@
           <a:p>
             <a:r>
               <a:rPr lang="en-US" u="sng"/>
-              <a:t>Geoscience Australia profile of ISO19115-1:2014</a:t>
-            </a:r>
-          </a:p>
-        </p:txBody>
-      </p:sp>
-      <p:sp>
-        <p:nvSpPr>
-          <p:cNvPr id="3" name="Rounded Rectangle 2">
-            <a:extLst>
-              <a:ext uri="{FF2B5EF4-FFF2-40B4-BE49-F238E27FC236}">
-                <a16:creationId xmlns:a16="http://schemas.microsoft.com/office/drawing/2014/main" id="{36985D6F-F68F-4344-8D44-F1F7C3296165}"/>
+              <a:t>Geoscience Australia profile of </a:t>
+            </a:r>
+          </a:p>
+          <a:p>
+            <a:r>
+              <a:rPr lang="en-US" u="sng"/>
+              <a:t>ISO19115-1:2014</a:t>
+            </a:r>
+          </a:p>
+        </p:txBody>
+      </p:sp>
+      <p:sp>
+        <p:nvSpPr>
+          <p:cNvPr id="4" name="Rounded Rectangle 3">
+            <a:extLst>
+              <a:ext uri="{FF2B5EF4-FFF2-40B4-BE49-F238E27FC236}">
+                <a16:creationId xmlns:a16="http://schemas.microsoft.com/office/drawing/2014/main" id="{2241BF72-9682-B541-B66F-E14377A78CE7}"/>
               </a:ext>
             </a:extLst>
           </p:cNvPr>
@@ -8419,7 +8425,7 @@
         </p:nvSpPr>
         <p:spPr>
           <a:xfrm>
-            <a:off x="4266713" y="1073703"/>
+            <a:off x="5048568" y="457572"/>
             <a:ext cx="1248936" cy="657922"/>
           </a:xfrm>
           <a:prstGeom prst="roundRect">
@@ -8468,17 +8474,99 @@
                   <a:schemeClr val="tx1"/>
                 </a:solidFill>
               </a:rPr>
-              <a:t>GA Profile</a:t>
-            </a:r>
-          </a:p>
-        </p:txBody>
-      </p:sp>
-      <p:sp>
-        <p:nvSpPr>
-          <p:cNvPr id="4" name="Rounded Rectangle 3">
-            <a:extLst>
-              <a:ext uri="{FF2B5EF4-FFF2-40B4-BE49-F238E27FC236}">
-                <a16:creationId xmlns:a16="http://schemas.microsoft.com/office/drawing/2014/main" id="{2241BF72-9682-B541-B66F-E14377A78CE7}"/>
+              <a:t>ISO 19115-1:2014</a:t>
+            </a:r>
+          </a:p>
+        </p:txBody>
+      </p:sp>
+      <p:cxnSp>
+        <p:nvCxnSpPr>
+          <p:cNvPr id="5" name="Straight Arrow Connector 4">
+            <a:extLst>
+              <a:ext uri="{FF2B5EF4-FFF2-40B4-BE49-F238E27FC236}">
+                <a16:creationId xmlns:a16="http://schemas.microsoft.com/office/drawing/2014/main" id="{6DFE8740-3E2F-9A49-B58F-7F85D1399E22}"/>
+              </a:ext>
+            </a:extLst>
+          </p:cNvPr>
+          <p:cNvCxnSpPr>
+            <a:cxnSpLocks/>
+            <a:stCxn id="3" idx="1"/>
+            <a:endCxn id="4" idx="3"/>
+          </p:cNvCxnSpPr>
+          <p:nvPr/>
+        </p:nvCxnSpPr>
+        <p:spPr>
+          <a:xfrm flipH="1">
+            <a:off x="6297504" y="777928"/>
+            <a:ext cx="592872" cy="8605"/>
+          </a:xfrm>
+          <a:prstGeom prst="straightConnector1">
+            <a:avLst/>
+          </a:prstGeom>
+          <a:ln>
+            <a:solidFill>
+              <a:schemeClr val="tx1"/>
+            </a:solidFill>
+            <a:headEnd type="none" w="med" len="med"/>
+            <a:tailEnd type="arrow" w="med" len="med"/>
+          </a:ln>
+        </p:spPr>
+        <p:style>
+          <a:lnRef idx="1">
+            <a:schemeClr val="accent1"/>
+          </a:lnRef>
+          <a:fillRef idx="0">
+            <a:schemeClr val="accent1"/>
+          </a:fillRef>
+          <a:effectRef idx="0">
+            <a:schemeClr val="accent1"/>
+          </a:effectRef>
+          <a:fontRef idx="minor">
+            <a:schemeClr val="tx1"/>
+          </a:fontRef>
+        </p:style>
+      </p:cxnSp>
+      <p:sp>
+        <p:nvSpPr>
+          <p:cNvPr id="6" name="TextBox 5">
+            <a:extLst>
+              <a:ext uri="{FF2B5EF4-FFF2-40B4-BE49-F238E27FC236}">
+                <a16:creationId xmlns:a16="http://schemas.microsoft.com/office/drawing/2014/main" id="{BF47E62B-F721-104F-A4EF-FDAFEF951783}"/>
+              </a:ext>
+            </a:extLst>
+          </p:cNvPr>
+          <p:cNvSpPr txBox="1"/>
+          <p:nvPr/>
+        </p:nvSpPr>
+        <p:spPr>
+          <a:xfrm>
+            <a:off x="6228873" y="441361"/>
+            <a:ext cx="740011" cy="276999"/>
+          </a:xfrm>
+          <a:prstGeom prst="rect">
+            <a:avLst/>
+          </a:prstGeom>
+          <a:noFill/>
+        </p:spPr>
+        <p:txBody>
+          <a:bodyPr wrap="none" rtlCol="0">
+            <a:spAutoFit/>
+          </a:bodyPr>
+          <a:lstStyle/>
+          <a:p>
+            <a:r>
+              <a:rPr lang="en-US" sz="1200"/>
+              <a:t>profileOf</a:t>
+            </a:r>
+          </a:p>
+        </p:txBody>
+      </p:sp>
+      <p:sp>
+        <p:nvSpPr>
+          <p:cNvPr id="14" name="Rounded Rectangle 13">
+            <a:extLst>
+              <a:ext uri="{FF2B5EF4-FFF2-40B4-BE49-F238E27FC236}">
+                <a16:creationId xmlns:a16="http://schemas.microsoft.com/office/drawing/2014/main" id="{36A79965-6F63-894B-937A-E0FBA26C379D}"/>
               </a:ext>
             </a:extLst>
           </p:cNvPr>
@@ -8487,7 +8575,7 @@
         </p:nvSpPr>
         <p:spPr>
           <a:xfrm>
-            <a:off x="2274546" y="1077858"/>
+            <a:off x="5043629" y="3332654"/>
             <a:ext cx="1248936" cy="657922"/>
           </a:xfrm>
           <a:prstGeom prst="roundRect">
@@ -8536,99 +8624,17 @@
                   <a:schemeClr val="tx1"/>
                 </a:solidFill>
               </a:rPr>
-              <a:t>ISO 19115-1:2014</a:t>
-            </a:r>
-          </a:p>
-        </p:txBody>
-      </p:sp>
-      <p:cxnSp>
-        <p:nvCxnSpPr>
-          <p:cNvPr id="5" name="Straight Arrow Connector 4">
-            <a:extLst>
-              <a:ext uri="{FF2B5EF4-FFF2-40B4-BE49-F238E27FC236}">
-                <a16:creationId xmlns:a16="http://schemas.microsoft.com/office/drawing/2014/main" id="{6DFE8740-3E2F-9A49-B58F-7F85D1399E22}"/>
-              </a:ext>
-            </a:extLst>
-          </p:cNvPr>
-          <p:cNvCxnSpPr>
-            <a:cxnSpLocks/>
-            <a:stCxn id="3" idx="1"/>
-            <a:endCxn id="4" idx="3"/>
-          </p:cNvCxnSpPr>
-          <p:nvPr/>
-        </p:nvCxnSpPr>
-        <p:spPr>
-          <a:xfrm flipH="1">
-            <a:off x="3523482" y="1402664"/>
-            <a:ext cx="743231" cy="4155"/>
-          </a:xfrm>
-          <a:prstGeom prst="straightConnector1">
-            <a:avLst/>
-          </a:prstGeom>
-          <a:ln>
-            <a:solidFill>
-              <a:schemeClr val="tx1"/>
-            </a:solidFill>
-            <a:headEnd type="none" w="med" len="med"/>
-            <a:tailEnd type="arrow" w="med" len="med"/>
-          </a:ln>
-        </p:spPr>
-        <p:style>
-          <a:lnRef idx="1">
-            <a:schemeClr val="accent1"/>
-          </a:lnRef>
-          <a:fillRef idx="0">
-            <a:schemeClr val="accent1"/>
-          </a:fillRef>
-          <a:effectRef idx="0">
-            <a:schemeClr val="accent1"/>
-          </a:effectRef>
-          <a:fontRef idx="minor">
-            <a:schemeClr val="tx1"/>
-          </a:fontRef>
-        </p:style>
-      </p:cxnSp>
-      <p:sp>
-        <p:nvSpPr>
-          <p:cNvPr id="6" name="TextBox 5">
-            <a:extLst>
-              <a:ext uri="{FF2B5EF4-FFF2-40B4-BE49-F238E27FC236}">
-                <a16:creationId xmlns:a16="http://schemas.microsoft.com/office/drawing/2014/main" id="{BF47E62B-F721-104F-A4EF-FDAFEF951783}"/>
-              </a:ext>
-            </a:extLst>
-          </p:cNvPr>
-          <p:cNvSpPr txBox="1"/>
-          <p:nvPr/>
-        </p:nvSpPr>
-        <p:spPr>
-          <a:xfrm>
-            <a:off x="3526702" y="1052181"/>
-            <a:ext cx="740011" cy="276999"/>
-          </a:xfrm>
-          <a:prstGeom prst="rect">
-            <a:avLst/>
-          </a:prstGeom>
-          <a:noFill/>
-        </p:spPr>
-        <p:txBody>
-          <a:bodyPr wrap="none" rtlCol="0">
-            <a:spAutoFit/>
-          </a:bodyPr>
-          <a:lstStyle/>
-          <a:p>
-            <a:r>
-              <a:rPr lang="en-US" sz="1200"/>
-              <a:t>profileOf</a:t>
-            </a:r>
-          </a:p>
-        </p:txBody>
-      </p:sp>
-      <p:sp>
-        <p:nvSpPr>
-          <p:cNvPr id="14" name="Rounded Rectangle 13">
-            <a:extLst>
-              <a:ext uri="{FF2B5EF4-FFF2-40B4-BE49-F238E27FC236}">
-                <a16:creationId xmlns:a16="http://schemas.microsoft.com/office/drawing/2014/main" id="{36A79965-6F63-894B-937A-E0FBA26C379D}"/>
+              <a:t>Schematron Constraints</a:t>
+            </a:r>
+          </a:p>
+        </p:txBody>
+      </p:sp>
+      <p:sp>
+        <p:nvSpPr>
+          <p:cNvPr id="19" name="Rounded Rectangle 18">
+            <a:extLst>
+              <a:ext uri="{FF2B5EF4-FFF2-40B4-BE49-F238E27FC236}">
+                <a16:creationId xmlns:a16="http://schemas.microsoft.com/office/drawing/2014/main" id="{0DBBC97A-56A9-2147-8A93-0FF9239BE0B4}"/>
               </a:ext>
             </a:extLst>
           </p:cNvPr>
@@ -8637,7 +8643,7 @@
         </p:nvSpPr>
         <p:spPr>
           <a:xfrm>
-            <a:off x="3312350" y="3072057"/>
+            <a:off x="136768" y="6099234"/>
             <a:ext cx="1248936" cy="657922"/>
           </a:xfrm>
           <a:prstGeom prst="roundRect">
@@ -8686,17 +8692,78 @@
                   <a:schemeClr val="tx1"/>
                 </a:solidFill>
               </a:rPr>
-              <a:t>Schematron Constraints</a:t>
-            </a:r>
-          </a:p>
-        </p:txBody>
-      </p:sp>
-      <p:sp>
-        <p:nvSpPr>
-          <p:cNvPr id="15" name="TextBox 14">
-            <a:extLst>
-              <a:ext uri="{FF2B5EF4-FFF2-40B4-BE49-F238E27FC236}">
-                <a16:creationId xmlns:a16="http://schemas.microsoft.com/office/drawing/2014/main" id="{B8CC69FE-9ABD-E847-B011-CD6668103D34}"/>
+              <a:t>owl:Named</a:t>
+            </a:r>
+            <a:br>
+              <a:rPr lang="en-US" sz="1400">
+                <a:solidFill>
+                  <a:schemeClr val="tx1"/>
+                </a:solidFill>
+              </a:rPr>
+            </a:br>
+            <a:r>
+              <a:rPr lang="en-US" sz="1400">
+                <a:solidFill>
+                  <a:schemeClr val="tx1"/>
+                </a:solidFill>
+              </a:rPr>
+              <a:t>Individual</a:t>
+            </a:r>
+          </a:p>
+        </p:txBody>
+      </p:sp>
+      <p:cxnSp>
+        <p:nvCxnSpPr>
+          <p:cNvPr id="20" name="Straight Arrow Connector 19">
+            <a:extLst>
+              <a:ext uri="{FF2B5EF4-FFF2-40B4-BE49-F238E27FC236}">
+                <a16:creationId xmlns:a16="http://schemas.microsoft.com/office/drawing/2014/main" id="{7512585D-B6EC-4F4C-91B4-89E2864A98E9}"/>
+              </a:ext>
+            </a:extLst>
+          </p:cNvPr>
+          <p:cNvCxnSpPr>
+            <a:cxnSpLocks/>
+          </p:cNvCxnSpPr>
+          <p:nvPr/>
+        </p:nvCxnSpPr>
+        <p:spPr>
+          <a:xfrm flipV="1">
+            <a:off x="1619639" y="5409445"/>
+            <a:ext cx="0" cy="423748"/>
+          </a:xfrm>
+          <a:prstGeom prst="straightConnector1">
+            <a:avLst/>
+          </a:prstGeom>
+          <a:ln>
+            <a:solidFill>
+              <a:schemeClr val="tx1"/>
+            </a:solidFill>
+            <a:prstDash val="sysDot"/>
+            <a:headEnd type="none" w="med" len="med"/>
+            <a:tailEnd type="arrow" w="med" len="med"/>
+          </a:ln>
+        </p:spPr>
+        <p:style>
+          <a:lnRef idx="1">
+            <a:schemeClr val="accent1"/>
+          </a:lnRef>
+          <a:fillRef idx="0">
+            <a:schemeClr val="accent1"/>
+          </a:fillRef>
+          <a:effectRef idx="0">
+            <a:schemeClr val="accent1"/>
+          </a:effectRef>
+          <a:fontRef idx="minor">
+            <a:schemeClr val="tx1"/>
+          </a:fontRef>
+        </p:style>
+      </p:cxnSp>
+      <p:sp>
+        <p:nvSpPr>
+          <p:cNvPr id="21" name="TextBox 20">
+            <a:extLst>
+              <a:ext uri="{FF2B5EF4-FFF2-40B4-BE49-F238E27FC236}">
+                <a16:creationId xmlns:a16="http://schemas.microsoft.com/office/drawing/2014/main" id="{7587E3CD-2A78-464C-982F-B0CDBB231903}"/>
               </a:ext>
             </a:extLst>
           </p:cNvPr>
@@ -8705,13 +8772,15 @@
         </p:nvSpPr>
         <p:spPr>
           <a:xfrm>
-            <a:off x="5758157" y="2122994"/>
-            <a:ext cx="728597" cy="276999"/>
+            <a:off x="1655804" y="5482819"/>
+            <a:ext cx="681084" cy="276999"/>
           </a:xfrm>
           <a:prstGeom prst="rect">
             <a:avLst/>
           </a:prstGeom>
-          <a:noFill/>
+          <a:solidFill>
+            <a:schemeClr val="bg1"/>
+          </a:solidFill>
         </p:spPr>
         <p:txBody>
           <a:bodyPr wrap="none" rtlCol="0">
@@ -8721,17 +8790,100 @@
           <a:p>
             <a:r>
               <a:rPr lang="en-US" sz="1200"/>
-              <a:t>resource</a:t>
-            </a:r>
-          </a:p>
-        </p:txBody>
-      </p:sp>
-      <p:sp>
-        <p:nvSpPr>
-          <p:cNvPr id="19" name="Rounded Rectangle 18">
-            <a:extLst>
-              <a:ext uri="{FF2B5EF4-FFF2-40B4-BE49-F238E27FC236}">
-                <a16:creationId xmlns:a16="http://schemas.microsoft.com/office/drawing/2014/main" id="{0DBBC97A-56A9-2147-8A93-0FF9239BE0B4}"/>
+              <a:t>rdf:type</a:t>
+            </a:r>
+          </a:p>
+        </p:txBody>
+      </p:sp>
+      <p:cxnSp>
+        <p:nvCxnSpPr>
+          <p:cNvPr id="22" name="Straight Arrow Connector 21">
+            <a:extLst>
+              <a:ext uri="{FF2B5EF4-FFF2-40B4-BE49-F238E27FC236}">
+                <a16:creationId xmlns:a16="http://schemas.microsoft.com/office/drawing/2014/main" id="{2268D06C-F26C-A64D-8143-504FC111F4CA}"/>
+              </a:ext>
+            </a:extLst>
+          </p:cNvPr>
+          <p:cNvCxnSpPr>
+            <a:cxnSpLocks/>
+          </p:cNvCxnSpPr>
+          <p:nvPr/>
+        </p:nvCxnSpPr>
+        <p:spPr>
+          <a:xfrm flipV="1">
+            <a:off x="1613521" y="6201207"/>
+            <a:ext cx="0" cy="423747"/>
+          </a:xfrm>
+          <a:prstGeom prst="straightConnector1">
+            <a:avLst/>
+          </a:prstGeom>
+          <a:ln>
+            <a:solidFill>
+              <a:schemeClr val="tx1"/>
+            </a:solidFill>
+            <a:prstDash val="dash"/>
+            <a:headEnd type="none" w="med" len="med"/>
+            <a:tailEnd type="arrow" w="med" len="med"/>
+          </a:ln>
+        </p:spPr>
+        <p:style>
+          <a:lnRef idx="1">
+            <a:schemeClr val="accent1"/>
+          </a:lnRef>
+          <a:fillRef idx="0">
+            <a:schemeClr val="accent1"/>
+          </a:fillRef>
+          <a:effectRef idx="0">
+            <a:schemeClr val="accent1"/>
+          </a:effectRef>
+          <a:fontRef idx="minor">
+            <a:schemeClr val="tx1"/>
+          </a:fontRef>
+        </p:style>
+      </p:cxnSp>
+      <p:sp>
+        <p:nvSpPr>
+          <p:cNvPr id="23" name="TextBox 22">
+            <a:extLst>
+              <a:ext uri="{FF2B5EF4-FFF2-40B4-BE49-F238E27FC236}">
+                <a16:creationId xmlns:a16="http://schemas.microsoft.com/office/drawing/2014/main" id="{B01E5F8B-4954-304B-9CE9-977D273F9D7C}"/>
+              </a:ext>
+            </a:extLst>
+          </p:cNvPr>
+          <p:cNvSpPr txBox="1"/>
+          <p:nvPr/>
+        </p:nvSpPr>
+        <p:spPr>
+          <a:xfrm>
+            <a:off x="1655804" y="6274580"/>
+            <a:ext cx="1145506" cy="276999"/>
+          </a:xfrm>
+          <a:prstGeom prst="rect">
+            <a:avLst/>
+          </a:prstGeom>
+          <a:solidFill>
+            <a:schemeClr val="bg1"/>
+          </a:solidFill>
+        </p:spPr>
+        <p:txBody>
+          <a:bodyPr wrap="none" rtlCol="0">
+            <a:spAutoFit/>
+          </a:bodyPr>
+          <a:lstStyle/>
+          <a:p>
+            <a:r>
+              <a:rPr lang="en-US" sz="1200"/>
+              <a:t>rdfs:subClassOf</a:t>
+            </a:r>
+          </a:p>
+        </p:txBody>
+      </p:sp>
+      <p:sp>
+        <p:nvSpPr>
+          <p:cNvPr id="24" name="Rounded Rectangle 23">
+            <a:extLst>
+              <a:ext uri="{FF2B5EF4-FFF2-40B4-BE49-F238E27FC236}">
+                <a16:creationId xmlns:a16="http://schemas.microsoft.com/office/drawing/2014/main" id="{EB89BEF3-F0F6-B644-B1BA-E9CC24629756}"/>
               </a:ext>
             </a:extLst>
           </p:cNvPr>
@@ -8740,7 +8892,607 @@
         </p:nvSpPr>
         <p:spPr>
           <a:xfrm>
-            <a:off x="136768" y="6099234"/>
+            <a:off x="141488" y="5316919"/>
+            <a:ext cx="1248936" cy="657922"/>
+          </a:xfrm>
+          <a:prstGeom prst="roundRect">
+            <a:avLst/>
+          </a:prstGeom>
+          <a:noFill/>
+          <a:ln>
+            <a:solidFill>
+              <a:schemeClr val="tx1"/>
+            </a:solidFill>
+          </a:ln>
+        </p:spPr>
+        <p:style>
+          <a:lnRef idx="2">
+            <a:schemeClr val="accent1">
+              <a:shade val="50000"/>
+            </a:schemeClr>
+          </a:lnRef>
+          <a:fillRef idx="1">
+            <a:schemeClr val="accent1"/>
+          </a:fillRef>
+          <a:effectRef idx="0">
+            <a:schemeClr val="accent1"/>
+          </a:effectRef>
+          <a:fontRef idx="minor">
+            <a:schemeClr val="lt1"/>
+          </a:fontRef>
+        </p:style>
+        <p:txBody>
+          <a:bodyPr rtlCol="0" anchor="ctr"/>
+          <a:lstStyle/>
+          <a:p>
+            <a:pPr algn="ctr"/>
+            <a:r>
+              <a:rPr lang="en-US" sz="1400">
+                <a:solidFill>
+                  <a:schemeClr val="tx1"/>
+                </a:solidFill>
+              </a:rPr>
+              <a:t>owl:Thing</a:t>
+            </a:r>
+          </a:p>
+        </p:txBody>
+      </p:sp>
+      <p:cxnSp>
+        <p:nvCxnSpPr>
+          <p:cNvPr id="25" name="Straight Arrow Connector 24">
+            <a:extLst>
+              <a:ext uri="{FF2B5EF4-FFF2-40B4-BE49-F238E27FC236}">
+                <a16:creationId xmlns:a16="http://schemas.microsoft.com/office/drawing/2014/main" id="{F49D65FA-EAE2-4D43-9A96-62F70DDBABDD}"/>
+              </a:ext>
+            </a:extLst>
+          </p:cNvPr>
+          <p:cNvCxnSpPr>
+            <a:cxnSpLocks/>
+          </p:cNvCxnSpPr>
+          <p:nvPr/>
+        </p:nvCxnSpPr>
+        <p:spPr>
+          <a:xfrm flipV="1">
+            <a:off x="2548998" y="5409445"/>
+            <a:ext cx="0" cy="423748"/>
+          </a:xfrm>
+          <a:prstGeom prst="straightConnector1">
+            <a:avLst/>
+          </a:prstGeom>
+          <a:ln>
+            <a:solidFill>
+              <a:schemeClr val="tx1"/>
+            </a:solidFill>
+            <a:prstDash val="solid"/>
+            <a:headEnd type="none" w="med" len="med"/>
+            <a:tailEnd type="arrow" w="med" len="med"/>
+          </a:ln>
+        </p:spPr>
+        <p:style>
+          <a:lnRef idx="1">
+            <a:schemeClr val="accent1"/>
+          </a:lnRef>
+          <a:fillRef idx="0">
+            <a:schemeClr val="accent1"/>
+          </a:fillRef>
+          <a:effectRef idx="0">
+            <a:schemeClr val="accent1"/>
+          </a:effectRef>
+          <a:fontRef idx="minor">
+            <a:schemeClr val="tx1"/>
+          </a:fontRef>
+        </p:style>
+      </p:cxnSp>
+      <p:sp>
+        <p:nvSpPr>
+          <p:cNvPr id="26" name="TextBox 25">
+            <a:extLst>
+              <a:ext uri="{FF2B5EF4-FFF2-40B4-BE49-F238E27FC236}">
+                <a16:creationId xmlns:a16="http://schemas.microsoft.com/office/drawing/2014/main" id="{5C6EF860-7974-1F46-895F-F87094E84DAE}"/>
+              </a:ext>
+            </a:extLst>
+          </p:cNvPr>
+          <p:cNvSpPr txBox="1"/>
+          <p:nvPr/>
+        </p:nvSpPr>
+        <p:spPr>
+          <a:xfrm>
+            <a:off x="2585163" y="5482819"/>
+            <a:ext cx="727187" cy="276999"/>
+          </a:xfrm>
+          <a:prstGeom prst="rect">
+            <a:avLst/>
+          </a:prstGeom>
+          <a:solidFill>
+            <a:schemeClr val="bg1"/>
+          </a:solidFill>
+        </p:spPr>
+        <p:txBody>
+          <a:bodyPr wrap="none" rtlCol="0">
+            <a:spAutoFit/>
+          </a:bodyPr>
+          <a:lstStyle/>
+          <a:p>
+            <a:r>
+              <a:rPr lang="en-US" sz="1200"/>
+              <a:t>property</a:t>
+            </a:r>
+          </a:p>
+        </p:txBody>
+      </p:sp>
+      <p:sp>
+        <p:nvSpPr>
+          <p:cNvPr id="27" name="Rounded Rectangle 26">
+            <a:extLst>
+              <a:ext uri="{FF2B5EF4-FFF2-40B4-BE49-F238E27FC236}">
+                <a16:creationId xmlns:a16="http://schemas.microsoft.com/office/drawing/2014/main" id="{A243367D-4246-D34A-9575-3A0DE0F81FC1}"/>
+              </a:ext>
+            </a:extLst>
+          </p:cNvPr>
+          <p:cNvSpPr/>
+          <p:nvPr/>
+        </p:nvSpPr>
+        <p:spPr>
+          <a:xfrm>
+            <a:off x="6890376" y="6099234"/>
+            <a:ext cx="1248936" cy="657922"/>
+          </a:xfrm>
+          <a:prstGeom prst="roundRect">
+            <a:avLst/>
+          </a:prstGeom>
+          <a:noFill/>
+          <a:ln>
+            <a:solidFill>
+              <a:schemeClr val="tx1"/>
+            </a:solidFill>
+          </a:ln>
+        </p:spPr>
+        <p:style>
+          <a:lnRef idx="2">
+            <a:schemeClr val="accent1">
+              <a:shade val="50000"/>
+            </a:schemeClr>
+          </a:lnRef>
+          <a:fillRef idx="1">
+            <a:schemeClr val="accent1"/>
+          </a:fillRef>
+          <a:effectRef idx="0">
+            <a:schemeClr val="accent1"/>
+          </a:effectRef>
+          <a:fontRef idx="minor">
+            <a:schemeClr val="lt1"/>
+          </a:fontRef>
+        </p:style>
+        <p:txBody>
+          <a:bodyPr rtlCol="0" anchor="ctr"/>
+          <a:lstStyle/>
+          <a:p>
+            <a:pPr algn="ctr"/>
+            <a:r>
+              <a:rPr lang="en-US" sz="1200">
+                <a:solidFill>
+                  <a:schemeClr val="tx1"/>
+                </a:solidFill>
+              </a:rPr>
+              <a:t>Implementation Resource Descriptor</a:t>
+            </a:r>
+          </a:p>
+        </p:txBody>
+      </p:sp>
+      <p:sp>
+        <p:nvSpPr>
+          <p:cNvPr id="29" name="Rounded Rectangle 28">
+            <a:extLst>
+              <a:ext uri="{FF2B5EF4-FFF2-40B4-BE49-F238E27FC236}">
+                <a16:creationId xmlns:a16="http://schemas.microsoft.com/office/drawing/2014/main" id="{425C5C8D-4389-6645-A0C3-798E67FD943A}"/>
+              </a:ext>
+            </a:extLst>
+          </p:cNvPr>
+          <p:cNvSpPr/>
+          <p:nvPr/>
+        </p:nvSpPr>
+        <p:spPr>
+          <a:xfrm>
+            <a:off x="8750308" y="443302"/>
+            <a:ext cx="1248936" cy="657922"/>
+          </a:xfrm>
+          <a:prstGeom prst="roundRect">
+            <a:avLst/>
+          </a:prstGeom>
+          <a:noFill/>
+          <a:ln>
+            <a:solidFill>
+              <a:schemeClr val="tx1"/>
+            </a:solidFill>
+          </a:ln>
+        </p:spPr>
+        <p:style>
+          <a:lnRef idx="2">
+            <a:schemeClr val="accent1">
+              <a:shade val="50000"/>
+            </a:schemeClr>
+          </a:lnRef>
+          <a:fillRef idx="1">
+            <a:schemeClr val="accent1"/>
+          </a:fillRef>
+          <a:effectRef idx="0">
+            <a:schemeClr val="accent1"/>
+          </a:effectRef>
+          <a:fontRef idx="minor">
+            <a:schemeClr val="lt1"/>
+          </a:fontRef>
+        </p:style>
+        <p:txBody>
+          <a:bodyPr rtlCol="0" anchor="ctr"/>
+          <a:lstStyle/>
+          <a:p>
+            <a:pPr algn="ctr"/>
+            <a:r>
+              <a:rPr lang="en-US" sz="1400">
+                <a:solidFill>
+                  <a:schemeClr val="tx1"/>
+                </a:solidFill>
+              </a:rPr>
+              <a:t>Profile</a:t>
+            </a:r>
+          </a:p>
+        </p:txBody>
+      </p:sp>
+      <p:cxnSp>
+        <p:nvCxnSpPr>
+          <p:cNvPr id="32" name="Straight Arrow Connector 31">
+            <a:extLst>
+              <a:ext uri="{FF2B5EF4-FFF2-40B4-BE49-F238E27FC236}">
+                <a16:creationId xmlns:a16="http://schemas.microsoft.com/office/drawing/2014/main" id="{3D4E2C85-939F-C24B-B9E9-580CCCD98C70}"/>
+              </a:ext>
+            </a:extLst>
+          </p:cNvPr>
+          <p:cNvCxnSpPr>
+            <a:cxnSpLocks/>
+            <a:stCxn id="51" idx="0"/>
+            <a:endCxn id="33" idx="3"/>
+          </p:cNvCxnSpPr>
+          <p:nvPr/>
+        </p:nvCxnSpPr>
+        <p:spPr>
+          <a:xfrm flipH="1" flipV="1">
+            <a:off x="8144250" y="1697213"/>
+            <a:ext cx="1227216" cy="652250"/>
+          </a:xfrm>
+          <a:prstGeom prst="straightConnector1">
+            <a:avLst/>
+          </a:prstGeom>
+          <a:ln>
+            <a:solidFill>
+              <a:schemeClr val="tx1"/>
+            </a:solidFill>
+            <a:prstDash val="sysDot"/>
+            <a:headEnd type="none" w="med" len="med"/>
+            <a:tailEnd type="arrow" w="med" len="med"/>
+          </a:ln>
+        </p:spPr>
+        <p:style>
+          <a:lnRef idx="1">
+            <a:schemeClr val="accent1"/>
+          </a:lnRef>
+          <a:fillRef idx="0">
+            <a:schemeClr val="accent1"/>
+          </a:fillRef>
+          <a:effectRef idx="0">
+            <a:schemeClr val="accent1"/>
+          </a:effectRef>
+          <a:fontRef idx="minor">
+            <a:schemeClr val="tx1"/>
+          </a:fontRef>
+        </p:style>
+      </p:cxnSp>
+      <p:sp>
+        <p:nvSpPr>
+          <p:cNvPr id="33" name="Rounded Rectangle 32">
+            <a:extLst>
+              <a:ext uri="{FF2B5EF4-FFF2-40B4-BE49-F238E27FC236}">
+                <a16:creationId xmlns:a16="http://schemas.microsoft.com/office/drawing/2014/main" id="{1333CC4E-E62A-D14C-A9E7-3F0D35029DB8}"/>
+              </a:ext>
+            </a:extLst>
+          </p:cNvPr>
+          <p:cNvSpPr/>
+          <p:nvPr/>
+        </p:nvSpPr>
+        <p:spPr>
+          <a:xfrm>
+            <a:off x="6895314" y="1368252"/>
+            <a:ext cx="1248936" cy="657922"/>
+          </a:xfrm>
+          <a:prstGeom prst="roundRect">
+            <a:avLst/>
+          </a:prstGeom>
+          <a:noFill/>
+          <a:ln>
+            <a:solidFill>
+              <a:schemeClr val="tx1"/>
+            </a:solidFill>
+          </a:ln>
+        </p:spPr>
+        <p:style>
+          <a:lnRef idx="2">
+            <a:schemeClr val="accent1">
+              <a:shade val="50000"/>
+            </a:schemeClr>
+          </a:lnRef>
+          <a:fillRef idx="1">
+            <a:schemeClr val="accent1"/>
+          </a:fillRef>
+          <a:effectRef idx="0">
+            <a:schemeClr val="accent1"/>
+          </a:effectRef>
+          <a:fontRef idx="minor">
+            <a:schemeClr val="lt1"/>
+          </a:fontRef>
+        </p:style>
+        <p:txBody>
+          <a:bodyPr rtlCol="0" anchor="ctr"/>
+          <a:lstStyle/>
+          <a:p>
+            <a:pPr algn="ctr"/>
+            <a:r>
+              <a:rPr lang="en-US" sz="1200">
+                <a:solidFill>
+                  <a:schemeClr val="tx1"/>
+                </a:solidFill>
+              </a:rPr>
+              <a:t>dct:</a:t>
+            </a:r>
+            <a:br>
+              <a:rPr lang="en-US" sz="1200">
+                <a:solidFill>
+                  <a:schemeClr val="tx1"/>
+                </a:solidFill>
+              </a:rPr>
+            </a:br>
+            <a:r>
+              <a:rPr lang="en-US" sz="1200">
+                <a:solidFill>
+                  <a:schemeClr val="tx1"/>
+                </a:solidFill>
+              </a:rPr>
+              <a:t>MediaType</a:t>
+            </a:r>
+            <a:br>
+              <a:rPr lang="en-US" sz="1200">
+                <a:solidFill>
+                  <a:schemeClr val="tx1"/>
+                </a:solidFill>
+              </a:rPr>
+            </a:br>
+            <a:r>
+              <a:rPr lang="en-US" sz="1200">
+                <a:solidFill>
+                  <a:schemeClr val="tx1"/>
+                </a:solidFill>
+              </a:rPr>
+              <a:t>OrExtent</a:t>
+            </a:r>
+          </a:p>
+        </p:txBody>
+      </p:sp>
+      <p:cxnSp>
+        <p:nvCxnSpPr>
+          <p:cNvPr id="34" name="Straight Arrow Connector 33">
+            <a:extLst>
+              <a:ext uri="{FF2B5EF4-FFF2-40B4-BE49-F238E27FC236}">
+                <a16:creationId xmlns:a16="http://schemas.microsoft.com/office/drawing/2014/main" id="{E3C59595-DCD8-9746-9EC8-7249FE883BAA}"/>
+              </a:ext>
+            </a:extLst>
+          </p:cNvPr>
+          <p:cNvCxnSpPr>
+            <a:cxnSpLocks/>
+            <a:stCxn id="54" idx="0"/>
+            <a:endCxn id="33" idx="1"/>
+          </p:cNvCxnSpPr>
+          <p:nvPr/>
+        </p:nvCxnSpPr>
+        <p:spPr>
+          <a:xfrm flipV="1">
+            <a:off x="5668097" y="1697213"/>
+            <a:ext cx="1227217" cy="656588"/>
+          </a:xfrm>
+          <a:prstGeom prst="straightConnector1">
+            <a:avLst/>
+          </a:prstGeom>
+          <a:ln>
+            <a:solidFill>
+              <a:schemeClr val="tx1"/>
+            </a:solidFill>
+            <a:prstDash val="sysDot"/>
+            <a:headEnd type="none" w="med" len="med"/>
+            <a:tailEnd type="arrow" w="med" len="med"/>
+          </a:ln>
+        </p:spPr>
+        <p:style>
+          <a:lnRef idx="1">
+            <a:schemeClr val="accent1"/>
+          </a:lnRef>
+          <a:fillRef idx="0">
+            <a:schemeClr val="accent1"/>
+          </a:fillRef>
+          <a:effectRef idx="0">
+            <a:schemeClr val="accent1"/>
+          </a:effectRef>
+          <a:fontRef idx="minor">
+            <a:schemeClr val="tx1"/>
+          </a:fontRef>
+        </p:style>
+      </p:cxnSp>
+      <p:cxnSp>
+        <p:nvCxnSpPr>
+          <p:cNvPr id="36" name="Straight Arrow Connector 35">
+            <a:extLst>
+              <a:ext uri="{FF2B5EF4-FFF2-40B4-BE49-F238E27FC236}">
+                <a16:creationId xmlns:a16="http://schemas.microsoft.com/office/drawing/2014/main" id="{0D8723CE-7CB9-844E-8C94-3295BD70E5A9}"/>
+              </a:ext>
+            </a:extLst>
+          </p:cNvPr>
+          <p:cNvCxnSpPr>
+            <a:cxnSpLocks/>
+            <a:stCxn id="3" idx="3"/>
+            <a:endCxn id="29" idx="1"/>
+          </p:cNvCxnSpPr>
+          <p:nvPr/>
+        </p:nvCxnSpPr>
+        <p:spPr>
+          <a:xfrm flipV="1">
+            <a:off x="8139312" y="772263"/>
+            <a:ext cx="610996" cy="5665"/>
+          </a:xfrm>
+          <a:prstGeom prst="straightConnector1">
+            <a:avLst/>
+          </a:prstGeom>
+          <a:ln>
+            <a:solidFill>
+              <a:schemeClr val="tx1"/>
+            </a:solidFill>
+            <a:prstDash val="sysDot"/>
+            <a:headEnd type="none" w="med" len="med"/>
+            <a:tailEnd type="arrow" w="med" len="med"/>
+          </a:ln>
+        </p:spPr>
+        <p:style>
+          <a:lnRef idx="1">
+            <a:schemeClr val="accent1"/>
+          </a:lnRef>
+          <a:fillRef idx="0">
+            <a:schemeClr val="accent1"/>
+          </a:fillRef>
+          <a:effectRef idx="0">
+            <a:schemeClr val="accent1"/>
+          </a:effectRef>
+          <a:fontRef idx="minor">
+            <a:schemeClr val="tx1"/>
+          </a:fontRef>
+        </p:style>
+      </p:cxnSp>
+      <p:sp>
+        <p:nvSpPr>
+          <p:cNvPr id="45" name="Rounded Rectangle 44">
+            <a:extLst>
+              <a:ext uri="{FF2B5EF4-FFF2-40B4-BE49-F238E27FC236}">
+                <a16:creationId xmlns:a16="http://schemas.microsoft.com/office/drawing/2014/main" id="{C0315A97-6ADC-BA45-A88C-386B8EDC3112}"/>
+              </a:ext>
+            </a:extLst>
+          </p:cNvPr>
+          <p:cNvSpPr/>
+          <p:nvPr/>
+        </p:nvSpPr>
+        <p:spPr>
+          <a:xfrm>
+            <a:off x="5048568" y="1368252"/>
+            <a:ext cx="1248936" cy="657922"/>
+          </a:xfrm>
+          <a:prstGeom prst="roundRect">
+            <a:avLst/>
+          </a:prstGeom>
+          <a:noFill/>
+          <a:ln>
+            <a:solidFill>
+              <a:schemeClr val="tx1"/>
+            </a:solidFill>
+          </a:ln>
+        </p:spPr>
+        <p:style>
+          <a:lnRef idx="2">
+            <a:schemeClr val="accent1">
+              <a:shade val="50000"/>
+            </a:schemeClr>
+          </a:lnRef>
+          <a:fillRef idx="1">
+            <a:schemeClr val="accent1"/>
+          </a:fillRef>
+          <a:effectRef idx="0">
+            <a:schemeClr val="accent1"/>
+          </a:effectRef>
+          <a:fontRef idx="minor">
+            <a:schemeClr val="lt1"/>
+          </a:fontRef>
+        </p:style>
+        <p:txBody>
+          <a:bodyPr rtlCol="0" anchor="ctr"/>
+          <a:lstStyle/>
+          <a:p>
+            <a:pPr algn="ctr"/>
+            <a:r>
+              <a:rPr lang="en-US" sz="1400">
+                <a:solidFill>
+                  <a:schemeClr val="tx1"/>
+                </a:solidFill>
+              </a:rPr>
+              <a:t>Base Specification</a:t>
+            </a:r>
+          </a:p>
+        </p:txBody>
+      </p:sp>
+      <p:cxnSp>
+        <p:nvCxnSpPr>
+          <p:cNvPr id="46" name="Straight Arrow Connector 45">
+            <a:extLst>
+              <a:ext uri="{FF2B5EF4-FFF2-40B4-BE49-F238E27FC236}">
+                <a16:creationId xmlns:a16="http://schemas.microsoft.com/office/drawing/2014/main" id="{731D0C71-47BB-274F-ADAE-49054CA1F09E}"/>
+              </a:ext>
+            </a:extLst>
+          </p:cNvPr>
+          <p:cNvCxnSpPr>
+            <a:cxnSpLocks/>
+            <a:stCxn id="4" idx="2"/>
+            <a:endCxn id="45" idx="0"/>
+          </p:cNvCxnSpPr>
+          <p:nvPr/>
+        </p:nvCxnSpPr>
+        <p:spPr>
+          <a:xfrm>
+            <a:off x="5673036" y="1115494"/>
+            <a:ext cx="0" cy="252758"/>
+          </a:xfrm>
+          <a:prstGeom prst="straightConnector1">
+            <a:avLst/>
+          </a:prstGeom>
+          <a:ln>
+            <a:solidFill>
+              <a:schemeClr val="tx1"/>
+            </a:solidFill>
+            <a:prstDash val="sysDot"/>
+            <a:headEnd type="none" w="med" len="med"/>
+            <a:tailEnd type="arrow" w="med" len="med"/>
+          </a:ln>
+        </p:spPr>
+        <p:style>
+          <a:lnRef idx="1">
+            <a:schemeClr val="accent1"/>
+          </a:lnRef>
+          <a:fillRef idx="0">
+            <a:schemeClr val="accent1"/>
+          </a:fillRef>
+          <a:effectRef idx="0">
+            <a:schemeClr val="accent1"/>
+          </a:effectRef>
+          <a:fontRef idx="minor">
+            <a:schemeClr val="tx1"/>
+          </a:fontRef>
+        </p:style>
+      </p:cxnSp>
+      <p:sp>
+        <p:nvSpPr>
+          <p:cNvPr id="54" name="Rounded Rectangle 53">
+            <a:extLst>
+              <a:ext uri="{FF2B5EF4-FFF2-40B4-BE49-F238E27FC236}">
+                <a16:creationId xmlns:a16="http://schemas.microsoft.com/office/drawing/2014/main" id="{CEE9A0C5-AA11-0543-BDDE-50AB4475D797}"/>
+              </a:ext>
+            </a:extLst>
+          </p:cNvPr>
+          <p:cNvSpPr/>
+          <p:nvPr/>
+        </p:nvSpPr>
+        <p:spPr>
+          <a:xfrm>
+            <a:off x="5043629" y="2353801"/>
             <a:ext cx="1248936" cy="657922"/>
           </a:xfrm>
           <a:prstGeom prst="roundRect">
@@ -8789,78 +9541,17 @@
                   <a:schemeClr val="tx1"/>
                 </a:solidFill>
               </a:rPr>
-              <a:t>owl:Named</a:t>
-            </a:r>
-            <a:br>
-              <a:rPr lang="en-US" sz="1400">
-                <a:solidFill>
-                  <a:schemeClr val="tx1"/>
-                </a:solidFill>
-              </a:rPr>
-            </a:br>
-            <a:r>
-              <a:rPr lang="en-US" sz="1400">
-                <a:solidFill>
-                  <a:schemeClr val="tx1"/>
-                </a:solidFill>
-              </a:rPr>
-              <a:t>Individual</a:t>
-            </a:r>
-          </a:p>
-        </p:txBody>
-      </p:sp>
-      <p:cxnSp>
-        <p:nvCxnSpPr>
-          <p:cNvPr id="20" name="Straight Arrow Connector 19">
-            <a:extLst>
-              <a:ext uri="{FF2B5EF4-FFF2-40B4-BE49-F238E27FC236}">
-                <a16:creationId xmlns:a16="http://schemas.microsoft.com/office/drawing/2014/main" id="{7512585D-B6EC-4F4C-91B4-89E2864A98E9}"/>
-              </a:ext>
-            </a:extLst>
-          </p:cNvPr>
-          <p:cNvCxnSpPr>
-            <a:cxnSpLocks/>
-          </p:cNvCxnSpPr>
-          <p:nvPr/>
-        </p:nvCxnSpPr>
-        <p:spPr>
-          <a:xfrm flipV="1">
-            <a:off x="1619639" y="5409445"/>
-            <a:ext cx="0" cy="423748"/>
-          </a:xfrm>
-          <a:prstGeom prst="straightConnector1">
-            <a:avLst/>
-          </a:prstGeom>
-          <a:ln>
-            <a:solidFill>
-              <a:schemeClr val="tx1"/>
-            </a:solidFill>
-            <a:prstDash val="sysDot"/>
-            <a:headEnd type="none" w="med" len="med"/>
-            <a:tailEnd type="arrow" w="med" len="med"/>
-          </a:ln>
-        </p:spPr>
-        <p:style>
-          <a:lnRef idx="1">
-            <a:schemeClr val="accent1"/>
-          </a:lnRef>
-          <a:fillRef idx="0">
-            <a:schemeClr val="accent1"/>
-          </a:fillRef>
-          <a:effectRef idx="0">
-            <a:schemeClr val="accent1"/>
-          </a:effectRef>
-          <a:fontRef idx="minor">
-            <a:schemeClr val="tx1"/>
-          </a:fontRef>
-        </p:style>
-      </p:cxnSp>
-      <p:sp>
-        <p:nvSpPr>
-          <p:cNvPr id="21" name="TextBox 20">
-            <a:extLst>
-              <a:ext uri="{FF2B5EF4-FFF2-40B4-BE49-F238E27FC236}">
-                <a16:creationId xmlns:a16="http://schemas.microsoft.com/office/drawing/2014/main" id="{7587E3CD-2A78-464C-982F-B0CDBB231903}"/>
+              <a:t>XSD</a:t>
+            </a:r>
+          </a:p>
+        </p:txBody>
+      </p:sp>
+      <p:sp>
+        <p:nvSpPr>
+          <p:cNvPr id="55" name="TextBox 54">
+            <a:extLst>
+              <a:ext uri="{FF2B5EF4-FFF2-40B4-BE49-F238E27FC236}">
+                <a16:creationId xmlns:a16="http://schemas.microsoft.com/office/drawing/2014/main" id="{286F04A6-A053-6641-B4E7-E5E8F4CB8792}"/>
               </a:ext>
             </a:extLst>
           </p:cNvPr>
@@ -8869,15 +9560,13 @@
         </p:nvSpPr>
         <p:spPr>
           <a:xfrm>
-            <a:off x="1655804" y="5482819"/>
-            <a:ext cx="681084" cy="276999"/>
+            <a:off x="9349886" y="3062364"/>
+            <a:ext cx="609654" cy="276999"/>
           </a:xfrm>
           <a:prstGeom prst="rect">
             <a:avLst/>
           </a:prstGeom>
-          <a:solidFill>
-            <a:schemeClr val="bg1"/>
-          </a:solidFill>
+          <a:noFill/>
         </p:spPr>
         <p:txBody>
           <a:bodyPr wrap="none" rtlCol="0">
@@ -8887,29 +9576,31 @@
           <a:p>
             <a:r>
               <a:rPr lang="en-US" sz="1200"/>
-              <a:t>rdf:type</a:t>
+              <a:t>format</a:t>
             </a:r>
           </a:p>
         </p:txBody>
       </p:sp>
       <p:cxnSp>
         <p:nvCxnSpPr>
-          <p:cNvPr id="22" name="Straight Arrow Connector 21">
-            <a:extLst>
-              <a:ext uri="{FF2B5EF4-FFF2-40B4-BE49-F238E27FC236}">
-                <a16:creationId xmlns:a16="http://schemas.microsoft.com/office/drawing/2014/main" id="{2268D06C-F26C-A64D-8143-504FC111F4CA}"/>
+          <p:cNvPr id="56" name="Straight Arrow Connector 55">
+            <a:extLst>
+              <a:ext uri="{FF2B5EF4-FFF2-40B4-BE49-F238E27FC236}">
+                <a16:creationId xmlns:a16="http://schemas.microsoft.com/office/drawing/2014/main" id="{F174A50B-9DCB-8B46-A893-6B9CA50DC1D0}"/>
               </a:ext>
             </a:extLst>
           </p:cNvPr>
           <p:cNvCxnSpPr>
             <a:cxnSpLocks/>
+            <a:stCxn id="14" idx="0"/>
+            <a:endCxn id="54" idx="2"/>
           </p:cNvCxnSpPr>
           <p:nvPr/>
         </p:nvCxnSpPr>
         <p:spPr>
           <a:xfrm flipV="1">
-            <a:off x="1613521" y="6201207"/>
-            <a:ext cx="0" cy="423747"/>
+            <a:off x="5668097" y="3011723"/>
+            <a:ext cx="0" cy="320931"/>
           </a:xfrm>
           <a:prstGeom prst="straightConnector1">
             <a:avLst/>
@@ -8918,7 +9609,6 @@
             <a:solidFill>
               <a:schemeClr val="tx1"/>
             </a:solidFill>
-            <a:prstDash val="dash"/>
             <a:headEnd type="none" w="med" len="med"/>
             <a:tailEnd type="arrow" w="med" len="med"/>
           </a:ln>
@@ -8940,47 +9630,10 @@
       </p:cxnSp>
       <p:sp>
         <p:nvSpPr>
-          <p:cNvPr id="23" name="TextBox 22">
-            <a:extLst>
-              <a:ext uri="{FF2B5EF4-FFF2-40B4-BE49-F238E27FC236}">
-                <a16:creationId xmlns:a16="http://schemas.microsoft.com/office/drawing/2014/main" id="{B01E5F8B-4954-304B-9CE9-977D273F9D7C}"/>
-              </a:ext>
-            </a:extLst>
-          </p:cNvPr>
-          <p:cNvSpPr txBox="1"/>
-          <p:nvPr/>
-        </p:nvSpPr>
-        <p:spPr>
-          <a:xfrm>
-            <a:off x="1655804" y="6274580"/>
-            <a:ext cx="1145506" cy="276999"/>
-          </a:xfrm>
-          <a:prstGeom prst="rect">
-            <a:avLst/>
-          </a:prstGeom>
-          <a:solidFill>
-            <a:schemeClr val="bg1"/>
-          </a:solidFill>
-        </p:spPr>
-        <p:txBody>
-          <a:bodyPr wrap="none" rtlCol="0">
-            <a:spAutoFit/>
-          </a:bodyPr>
-          <a:lstStyle/>
-          <a:p>
-            <a:r>
-              <a:rPr lang="en-US" sz="1200"/>
-              <a:t>rdfs:subClassOf</a:t>
-            </a:r>
-          </a:p>
-        </p:txBody>
-      </p:sp>
-      <p:sp>
-        <p:nvSpPr>
-          <p:cNvPr id="24" name="Rounded Rectangle 23">
-            <a:extLst>
-              <a:ext uri="{FF2B5EF4-FFF2-40B4-BE49-F238E27FC236}">
-                <a16:creationId xmlns:a16="http://schemas.microsoft.com/office/drawing/2014/main" id="{EB89BEF3-F0F6-B644-B1BA-E9CC24629756}"/>
+          <p:cNvPr id="62" name="Rounded Rectangle 61">
+            <a:extLst>
+              <a:ext uri="{FF2B5EF4-FFF2-40B4-BE49-F238E27FC236}">
+                <a16:creationId xmlns:a16="http://schemas.microsoft.com/office/drawing/2014/main" id="{874B556A-DBC2-334C-BD10-1E36B2B758EF}"/>
               </a:ext>
             </a:extLst>
           </p:cNvPr>
@@ -8989,666 +9642,7 @@
         </p:nvSpPr>
         <p:spPr>
           <a:xfrm>
-            <a:off x="141488" y="5316919"/>
-            <a:ext cx="1248936" cy="657922"/>
-          </a:xfrm>
-          <a:prstGeom prst="roundRect">
-            <a:avLst/>
-          </a:prstGeom>
-          <a:noFill/>
-          <a:ln>
-            <a:solidFill>
-              <a:schemeClr val="tx1"/>
-            </a:solidFill>
-          </a:ln>
-        </p:spPr>
-        <p:style>
-          <a:lnRef idx="2">
-            <a:schemeClr val="accent1">
-              <a:shade val="50000"/>
-            </a:schemeClr>
-          </a:lnRef>
-          <a:fillRef idx="1">
-            <a:schemeClr val="accent1"/>
-          </a:fillRef>
-          <a:effectRef idx="0">
-            <a:schemeClr val="accent1"/>
-          </a:effectRef>
-          <a:fontRef idx="minor">
-            <a:schemeClr val="lt1"/>
-          </a:fontRef>
-        </p:style>
-        <p:txBody>
-          <a:bodyPr rtlCol="0" anchor="ctr"/>
-          <a:lstStyle/>
-          <a:p>
-            <a:pPr algn="ctr"/>
-            <a:r>
-              <a:rPr lang="en-US" sz="1400">
-                <a:solidFill>
-                  <a:schemeClr val="tx1"/>
-                </a:solidFill>
-              </a:rPr>
-              <a:t>owl:Thing</a:t>
-            </a:r>
-          </a:p>
-        </p:txBody>
-      </p:sp>
-      <p:cxnSp>
-        <p:nvCxnSpPr>
-          <p:cNvPr id="25" name="Straight Arrow Connector 24">
-            <a:extLst>
-              <a:ext uri="{FF2B5EF4-FFF2-40B4-BE49-F238E27FC236}">
-                <a16:creationId xmlns:a16="http://schemas.microsoft.com/office/drawing/2014/main" id="{F49D65FA-EAE2-4D43-9A96-62F70DDBABDD}"/>
-              </a:ext>
-            </a:extLst>
-          </p:cNvPr>
-          <p:cNvCxnSpPr>
-            <a:cxnSpLocks/>
-          </p:cNvCxnSpPr>
-          <p:nvPr/>
-        </p:nvCxnSpPr>
-        <p:spPr>
-          <a:xfrm flipV="1">
-            <a:off x="2548998" y="5409445"/>
-            <a:ext cx="0" cy="423748"/>
-          </a:xfrm>
-          <a:prstGeom prst="straightConnector1">
-            <a:avLst/>
-          </a:prstGeom>
-          <a:ln>
-            <a:solidFill>
-              <a:schemeClr val="tx1"/>
-            </a:solidFill>
-            <a:prstDash val="solid"/>
-            <a:headEnd type="none" w="med" len="med"/>
-            <a:tailEnd type="arrow" w="med" len="med"/>
-          </a:ln>
-        </p:spPr>
-        <p:style>
-          <a:lnRef idx="1">
-            <a:schemeClr val="accent1"/>
-          </a:lnRef>
-          <a:fillRef idx="0">
-            <a:schemeClr val="accent1"/>
-          </a:fillRef>
-          <a:effectRef idx="0">
-            <a:schemeClr val="accent1"/>
-          </a:effectRef>
-          <a:fontRef idx="minor">
-            <a:schemeClr val="tx1"/>
-          </a:fontRef>
-        </p:style>
-      </p:cxnSp>
-      <p:sp>
-        <p:nvSpPr>
-          <p:cNvPr id="26" name="TextBox 25">
-            <a:extLst>
-              <a:ext uri="{FF2B5EF4-FFF2-40B4-BE49-F238E27FC236}">
-                <a16:creationId xmlns:a16="http://schemas.microsoft.com/office/drawing/2014/main" id="{5C6EF860-7974-1F46-895F-F87094E84DAE}"/>
-              </a:ext>
-            </a:extLst>
-          </p:cNvPr>
-          <p:cNvSpPr txBox="1"/>
-          <p:nvPr/>
-        </p:nvSpPr>
-        <p:spPr>
-          <a:xfrm>
-            <a:off x="2585163" y="5482819"/>
-            <a:ext cx="727187" cy="276999"/>
-          </a:xfrm>
-          <a:prstGeom prst="rect">
-            <a:avLst/>
-          </a:prstGeom>
-          <a:solidFill>
-            <a:schemeClr val="bg1"/>
-          </a:solidFill>
-        </p:spPr>
-        <p:txBody>
-          <a:bodyPr wrap="none" rtlCol="0">
-            <a:spAutoFit/>
-          </a:bodyPr>
-          <a:lstStyle/>
-          <a:p>
-            <a:r>
-              <a:rPr lang="en-US" sz="1200"/>
-              <a:t>property</a:t>
-            </a:r>
-          </a:p>
-        </p:txBody>
-      </p:sp>
-      <p:sp>
-        <p:nvSpPr>
-          <p:cNvPr id="27" name="Rounded Rectangle 26">
-            <a:extLst>
-              <a:ext uri="{FF2B5EF4-FFF2-40B4-BE49-F238E27FC236}">
-                <a16:creationId xmlns:a16="http://schemas.microsoft.com/office/drawing/2014/main" id="{A243367D-4246-D34A-9575-3A0DE0F81FC1}"/>
-              </a:ext>
-            </a:extLst>
-          </p:cNvPr>
-          <p:cNvSpPr/>
-          <p:nvPr/>
-        </p:nvSpPr>
-        <p:spPr>
-          <a:xfrm>
-            <a:off x="4269502" y="2064092"/>
-            <a:ext cx="1248936" cy="657922"/>
-          </a:xfrm>
-          <a:prstGeom prst="roundRect">
-            <a:avLst/>
-          </a:prstGeom>
-          <a:noFill/>
-          <a:ln>
-            <a:solidFill>
-              <a:schemeClr val="tx1"/>
-            </a:solidFill>
-          </a:ln>
-        </p:spPr>
-        <p:style>
-          <a:lnRef idx="2">
-            <a:schemeClr val="accent1">
-              <a:shade val="50000"/>
-            </a:schemeClr>
-          </a:lnRef>
-          <a:fillRef idx="1">
-            <a:schemeClr val="accent1"/>
-          </a:fillRef>
-          <a:effectRef idx="0">
-            <a:schemeClr val="accent1"/>
-          </a:effectRef>
-          <a:fontRef idx="minor">
-            <a:schemeClr val="lt1"/>
-          </a:fontRef>
-        </p:style>
-        <p:txBody>
-          <a:bodyPr rtlCol="0" anchor="ctr"/>
-          <a:lstStyle/>
-          <a:p>
-            <a:pPr algn="ctr"/>
-            <a:r>
-              <a:rPr lang="en-US" sz="1200">
-                <a:solidFill>
-                  <a:schemeClr val="tx1"/>
-                </a:solidFill>
-              </a:rPr>
-              <a:t>Implementation Resource Descriptor</a:t>
-            </a:r>
-          </a:p>
-        </p:txBody>
-      </p:sp>
-      <p:sp>
-        <p:nvSpPr>
-          <p:cNvPr id="29" name="Rounded Rectangle 28">
-            <a:extLst>
-              <a:ext uri="{FF2B5EF4-FFF2-40B4-BE49-F238E27FC236}">
-                <a16:creationId xmlns:a16="http://schemas.microsoft.com/office/drawing/2014/main" id="{425C5C8D-4389-6645-A0C3-798E67FD943A}"/>
-              </a:ext>
-            </a:extLst>
-          </p:cNvPr>
-          <p:cNvSpPr/>
-          <p:nvPr/>
-        </p:nvSpPr>
-        <p:spPr>
-          <a:xfrm>
-            <a:off x="6295273" y="1073703"/>
-            <a:ext cx="1248936" cy="657922"/>
-          </a:xfrm>
-          <a:prstGeom prst="roundRect">
-            <a:avLst/>
-          </a:prstGeom>
-          <a:noFill/>
-          <a:ln>
-            <a:solidFill>
-              <a:schemeClr val="tx1"/>
-            </a:solidFill>
-          </a:ln>
-        </p:spPr>
-        <p:style>
-          <a:lnRef idx="2">
-            <a:schemeClr val="accent1">
-              <a:shade val="50000"/>
-            </a:schemeClr>
-          </a:lnRef>
-          <a:fillRef idx="1">
-            <a:schemeClr val="accent1"/>
-          </a:fillRef>
-          <a:effectRef idx="0">
-            <a:schemeClr val="accent1"/>
-          </a:effectRef>
-          <a:fontRef idx="minor">
-            <a:schemeClr val="lt1"/>
-          </a:fontRef>
-        </p:style>
-        <p:txBody>
-          <a:bodyPr rtlCol="0" anchor="ctr"/>
-          <a:lstStyle/>
-          <a:p>
-            <a:pPr algn="ctr"/>
-            <a:r>
-              <a:rPr lang="en-US" sz="1400">
-                <a:solidFill>
-                  <a:schemeClr val="tx1"/>
-                </a:solidFill>
-              </a:rPr>
-              <a:t>Profile</a:t>
-            </a:r>
-          </a:p>
-        </p:txBody>
-      </p:sp>
-      <p:sp>
-        <p:nvSpPr>
-          <p:cNvPr id="31" name="Rounded Rectangle 30">
-            <a:extLst>
-              <a:ext uri="{FF2B5EF4-FFF2-40B4-BE49-F238E27FC236}">
-                <a16:creationId xmlns:a16="http://schemas.microsoft.com/office/drawing/2014/main" id="{2675A3C2-16A3-7348-90E7-B84C6B456E80}"/>
-              </a:ext>
-            </a:extLst>
-          </p:cNvPr>
-          <p:cNvSpPr/>
-          <p:nvPr/>
-        </p:nvSpPr>
-        <p:spPr>
-          <a:xfrm>
-            <a:off x="4224633" y="5112349"/>
-            <a:ext cx="1248936" cy="657922"/>
-          </a:xfrm>
-          <a:prstGeom prst="roundRect">
-            <a:avLst/>
-          </a:prstGeom>
-          <a:noFill/>
-          <a:ln>
-            <a:solidFill>
-              <a:schemeClr val="tx1"/>
-            </a:solidFill>
-          </a:ln>
-        </p:spPr>
-        <p:style>
-          <a:lnRef idx="2">
-            <a:schemeClr val="accent1">
-              <a:shade val="50000"/>
-            </a:schemeClr>
-          </a:lnRef>
-          <a:fillRef idx="1">
-            <a:schemeClr val="accent1"/>
-          </a:fillRef>
-          <a:effectRef idx="0">
-            <a:schemeClr val="accent1"/>
-          </a:effectRef>
-          <a:fontRef idx="minor">
-            <a:schemeClr val="lt1"/>
-          </a:fontRef>
-        </p:style>
-        <p:txBody>
-          <a:bodyPr rtlCol="0" anchor="ctr"/>
-          <a:lstStyle/>
-          <a:p>
-            <a:pPr algn="ctr"/>
-            <a:r>
-              <a:rPr lang="en-US" sz="1400">
-                <a:solidFill>
-                  <a:schemeClr val="tx1"/>
-                </a:solidFill>
-              </a:rPr>
-              <a:t>skos:Concept</a:t>
-            </a:r>
-          </a:p>
-        </p:txBody>
-      </p:sp>
-      <p:cxnSp>
-        <p:nvCxnSpPr>
-          <p:cNvPr id="32" name="Straight Arrow Connector 31">
-            <a:extLst>
-              <a:ext uri="{FF2B5EF4-FFF2-40B4-BE49-F238E27FC236}">
-                <a16:creationId xmlns:a16="http://schemas.microsoft.com/office/drawing/2014/main" id="{3D4E2C85-939F-C24B-B9E9-580CCCD98C70}"/>
-              </a:ext>
-            </a:extLst>
-          </p:cNvPr>
-          <p:cNvCxnSpPr>
-            <a:cxnSpLocks/>
-            <a:stCxn id="42" idx="2"/>
-            <a:endCxn id="31" idx="0"/>
-          </p:cNvCxnSpPr>
-          <p:nvPr/>
-        </p:nvCxnSpPr>
-        <p:spPr>
-          <a:xfrm flipH="1">
-            <a:off x="4849101" y="4763340"/>
-            <a:ext cx="957774" cy="349009"/>
-          </a:xfrm>
-          <a:prstGeom prst="straightConnector1">
-            <a:avLst/>
-          </a:prstGeom>
-          <a:ln>
-            <a:solidFill>
-              <a:schemeClr val="tx1"/>
-            </a:solidFill>
-            <a:prstDash val="sysDot"/>
-            <a:headEnd type="none" w="med" len="med"/>
-            <a:tailEnd type="arrow" w="med" len="med"/>
-          </a:ln>
-        </p:spPr>
-        <p:style>
-          <a:lnRef idx="1">
-            <a:schemeClr val="accent1"/>
-          </a:lnRef>
-          <a:fillRef idx="0">
-            <a:schemeClr val="accent1"/>
-          </a:fillRef>
-          <a:effectRef idx="0">
-            <a:schemeClr val="accent1"/>
-          </a:effectRef>
-          <a:fontRef idx="minor">
-            <a:schemeClr val="tx1"/>
-          </a:fontRef>
-        </p:style>
-      </p:cxnSp>
-      <p:sp>
-        <p:nvSpPr>
-          <p:cNvPr id="33" name="Rounded Rectangle 32">
-            <a:extLst>
-              <a:ext uri="{FF2B5EF4-FFF2-40B4-BE49-F238E27FC236}">
-                <a16:creationId xmlns:a16="http://schemas.microsoft.com/office/drawing/2014/main" id="{1333CC4E-E62A-D14C-A9E7-3F0D35029DB8}"/>
-              </a:ext>
-            </a:extLst>
-          </p:cNvPr>
-          <p:cNvSpPr/>
-          <p:nvPr/>
-        </p:nvSpPr>
-        <p:spPr>
-          <a:xfrm>
-            <a:off x="4224633" y="6099234"/>
-            <a:ext cx="1248936" cy="657922"/>
-          </a:xfrm>
-          <a:prstGeom prst="roundRect">
-            <a:avLst/>
-          </a:prstGeom>
-          <a:noFill/>
-          <a:ln>
-            <a:solidFill>
-              <a:schemeClr val="tx1"/>
-            </a:solidFill>
-          </a:ln>
-        </p:spPr>
-        <p:style>
-          <a:lnRef idx="2">
-            <a:schemeClr val="accent1">
-              <a:shade val="50000"/>
-            </a:schemeClr>
-          </a:lnRef>
-          <a:fillRef idx="1">
-            <a:schemeClr val="accent1"/>
-          </a:fillRef>
-          <a:effectRef idx="0">
-            <a:schemeClr val="accent1"/>
-          </a:effectRef>
-          <a:fontRef idx="minor">
-            <a:schemeClr val="lt1"/>
-          </a:fontRef>
-        </p:style>
-        <p:txBody>
-          <a:bodyPr rtlCol="0" anchor="ctr"/>
-          <a:lstStyle/>
-          <a:p>
-            <a:pPr algn="ctr"/>
-            <a:r>
-              <a:rPr lang="en-US" sz="1200">
-                <a:solidFill>
-                  <a:schemeClr val="tx1"/>
-                </a:solidFill>
-              </a:rPr>
-              <a:t>dct:</a:t>
-            </a:r>
-            <a:br>
-              <a:rPr lang="en-US" sz="1200">
-                <a:solidFill>
-                  <a:schemeClr val="tx1"/>
-                </a:solidFill>
-              </a:rPr>
-            </a:br>
-            <a:r>
-              <a:rPr lang="en-US" sz="1200">
-                <a:solidFill>
-                  <a:schemeClr val="tx1"/>
-                </a:solidFill>
-              </a:rPr>
-              <a:t>MediaType</a:t>
-            </a:r>
-            <a:br>
-              <a:rPr lang="en-US" sz="1200">
-                <a:solidFill>
-                  <a:schemeClr val="tx1"/>
-                </a:solidFill>
-              </a:rPr>
-            </a:br>
-            <a:r>
-              <a:rPr lang="en-US" sz="1200">
-                <a:solidFill>
-                  <a:schemeClr val="tx1"/>
-                </a:solidFill>
-              </a:rPr>
-              <a:t>OrExtent</a:t>
-            </a:r>
-          </a:p>
-        </p:txBody>
-      </p:sp>
-      <p:cxnSp>
-        <p:nvCxnSpPr>
-          <p:cNvPr id="34" name="Straight Arrow Connector 33">
-            <a:extLst>
-              <a:ext uri="{FF2B5EF4-FFF2-40B4-BE49-F238E27FC236}">
-                <a16:creationId xmlns:a16="http://schemas.microsoft.com/office/drawing/2014/main" id="{E3C59595-DCD8-9746-9EC8-7249FE883BAA}"/>
-              </a:ext>
-            </a:extLst>
-          </p:cNvPr>
-          <p:cNvCxnSpPr>
-            <a:cxnSpLocks/>
-            <a:stCxn id="54" idx="2"/>
-            <a:endCxn id="33" idx="1"/>
-          </p:cNvCxnSpPr>
-          <p:nvPr/>
-        </p:nvCxnSpPr>
-        <p:spPr>
-          <a:xfrm>
-            <a:off x="2142697" y="3729979"/>
-            <a:ext cx="2081936" cy="2698216"/>
-          </a:xfrm>
-          <a:prstGeom prst="straightConnector1">
-            <a:avLst/>
-          </a:prstGeom>
-          <a:ln>
-            <a:solidFill>
-              <a:schemeClr val="tx1"/>
-            </a:solidFill>
-            <a:prstDash val="sysDot"/>
-            <a:headEnd type="none" w="med" len="med"/>
-            <a:tailEnd type="arrow" w="med" len="med"/>
-          </a:ln>
-        </p:spPr>
-        <p:style>
-          <a:lnRef idx="1">
-            <a:schemeClr val="accent1"/>
-          </a:lnRef>
-          <a:fillRef idx="0">
-            <a:schemeClr val="accent1"/>
-          </a:fillRef>
-          <a:effectRef idx="0">
-            <a:schemeClr val="accent1"/>
-          </a:effectRef>
-          <a:fontRef idx="minor">
-            <a:schemeClr val="tx1"/>
-          </a:fontRef>
-        </p:style>
-      </p:cxnSp>
-      <p:cxnSp>
-        <p:nvCxnSpPr>
-          <p:cNvPr id="36" name="Straight Arrow Connector 35">
-            <a:extLst>
-              <a:ext uri="{FF2B5EF4-FFF2-40B4-BE49-F238E27FC236}">
-                <a16:creationId xmlns:a16="http://schemas.microsoft.com/office/drawing/2014/main" id="{0D8723CE-7CB9-844E-8C94-3295BD70E5A9}"/>
-              </a:ext>
-            </a:extLst>
-          </p:cNvPr>
-          <p:cNvCxnSpPr>
-            <a:cxnSpLocks/>
-            <a:stCxn id="3" idx="3"/>
-            <a:endCxn id="29" idx="1"/>
-          </p:cNvCxnSpPr>
-          <p:nvPr/>
-        </p:nvCxnSpPr>
-        <p:spPr>
-          <a:xfrm>
-            <a:off x="5515649" y="1402664"/>
-            <a:ext cx="779624" cy="0"/>
-          </a:xfrm>
-          <a:prstGeom prst="straightConnector1">
-            <a:avLst/>
-          </a:prstGeom>
-          <a:ln>
-            <a:solidFill>
-              <a:schemeClr val="tx1"/>
-            </a:solidFill>
-            <a:prstDash val="sysDot"/>
-            <a:headEnd type="none" w="med" len="med"/>
-            <a:tailEnd type="arrow" w="med" len="med"/>
-          </a:ln>
-        </p:spPr>
-        <p:style>
-          <a:lnRef idx="1">
-            <a:schemeClr val="accent1"/>
-          </a:lnRef>
-          <a:fillRef idx="0">
-            <a:schemeClr val="accent1"/>
-          </a:fillRef>
-          <a:effectRef idx="0">
-            <a:schemeClr val="accent1"/>
-          </a:effectRef>
-          <a:fontRef idx="minor">
-            <a:schemeClr val="tx1"/>
-          </a:fontRef>
-        </p:style>
-      </p:cxnSp>
-      <p:sp>
-        <p:nvSpPr>
-          <p:cNvPr id="45" name="Rounded Rectangle 44">
-            <a:extLst>
-              <a:ext uri="{FF2B5EF4-FFF2-40B4-BE49-F238E27FC236}">
-                <a16:creationId xmlns:a16="http://schemas.microsoft.com/office/drawing/2014/main" id="{C0315A97-6ADC-BA45-A88C-386B8EDC3112}"/>
-              </a:ext>
-            </a:extLst>
-          </p:cNvPr>
-          <p:cNvSpPr/>
-          <p:nvPr/>
-        </p:nvSpPr>
-        <p:spPr>
-          <a:xfrm>
-            <a:off x="284186" y="1078507"/>
-            <a:ext cx="1248936" cy="657922"/>
-          </a:xfrm>
-          <a:prstGeom prst="roundRect">
-            <a:avLst/>
-          </a:prstGeom>
-          <a:noFill/>
-          <a:ln>
-            <a:solidFill>
-              <a:schemeClr val="tx1"/>
-            </a:solidFill>
-          </a:ln>
-        </p:spPr>
-        <p:style>
-          <a:lnRef idx="2">
-            <a:schemeClr val="accent1">
-              <a:shade val="50000"/>
-            </a:schemeClr>
-          </a:lnRef>
-          <a:fillRef idx="1">
-            <a:schemeClr val="accent1"/>
-          </a:fillRef>
-          <a:effectRef idx="0">
-            <a:schemeClr val="accent1"/>
-          </a:effectRef>
-          <a:fontRef idx="minor">
-            <a:schemeClr val="lt1"/>
-          </a:fontRef>
-        </p:style>
-        <p:txBody>
-          <a:bodyPr rtlCol="0" anchor="ctr"/>
-          <a:lstStyle/>
-          <a:p>
-            <a:pPr algn="ctr"/>
-            <a:r>
-              <a:rPr lang="en-US" sz="1400">
-                <a:solidFill>
-                  <a:schemeClr val="tx1"/>
-                </a:solidFill>
-              </a:rPr>
-              <a:t>Base Specification</a:t>
-            </a:r>
-          </a:p>
-        </p:txBody>
-      </p:sp>
-      <p:cxnSp>
-        <p:nvCxnSpPr>
-          <p:cNvPr id="46" name="Straight Arrow Connector 45">
-            <a:extLst>
-              <a:ext uri="{FF2B5EF4-FFF2-40B4-BE49-F238E27FC236}">
-                <a16:creationId xmlns:a16="http://schemas.microsoft.com/office/drawing/2014/main" id="{731D0C71-47BB-274F-ADAE-49054CA1F09E}"/>
-              </a:ext>
-            </a:extLst>
-          </p:cNvPr>
-          <p:cNvCxnSpPr>
-            <a:cxnSpLocks/>
-            <a:stCxn id="4" idx="1"/>
-            <a:endCxn id="45" idx="3"/>
-          </p:cNvCxnSpPr>
-          <p:nvPr/>
-        </p:nvCxnSpPr>
-        <p:spPr>
-          <a:xfrm flipH="1">
-            <a:off x="1533122" y="1406819"/>
-            <a:ext cx="741424" cy="649"/>
-          </a:xfrm>
-          <a:prstGeom prst="straightConnector1">
-            <a:avLst/>
-          </a:prstGeom>
-          <a:ln>
-            <a:solidFill>
-              <a:schemeClr val="tx1"/>
-            </a:solidFill>
-            <a:prstDash val="sysDot"/>
-            <a:headEnd type="none" w="med" len="med"/>
-            <a:tailEnd type="arrow" w="med" len="med"/>
-          </a:ln>
-        </p:spPr>
-        <p:style>
-          <a:lnRef idx="1">
-            <a:schemeClr val="accent1"/>
-          </a:lnRef>
-          <a:fillRef idx="0">
-            <a:schemeClr val="accent1"/>
-          </a:fillRef>
-          <a:effectRef idx="0">
-            <a:schemeClr val="accent1"/>
-          </a:effectRef>
-          <a:fontRef idx="minor">
-            <a:schemeClr val="tx1"/>
-          </a:fontRef>
-        </p:style>
-      </p:cxnSp>
-      <p:sp>
-        <p:nvSpPr>
-          <p:cNvPr id="54" name="Rounded Rectangle 53">
-            <a:extLst>
-              <a:ext uri="{FF2B5EF4-FFF2-40B4-BE49-F238E27FC236}">
-                <a16:creationId xmlns:a16="http://schemas.microsoft.com/office/drawing/2014/main" id="{CEE9A0C5-AA11-0543-BDDE-50AB4475D797}"/>
-              </a:ext>
-            </a:extLst>
-          </p:cNvPr>
-          <p:cNvSpPr/>
-          <p:nvPr/>
-        </p:nvSpPr>
-        <p:spPr>
-          <a:xfrm>
-            <a:off x="1518229" y="3072057"/>
+            <a:off x="5043629" y="4417348"/>
             <a:ext cx="1248936" cy="657922"/>
           </a:xfrm>
           <a:prstGeom prst="roundRect">
@@ -9697,66 +9691,31 @@
                   <a:schemeClr val="tx1"/>
                 </a:solidFill>
               </a:rPr>
-              <a:t>XSD</a:t>
-            </a:r>
-          </a:p>
-        </p:txBody>
-      </p:sp>
-      <p:sp>
-        <p:nvSpPr>
-          <p:cNvPr id="55" name="TextBox 54">
-            <a:extLst>
-              <a:ext uri="{FF2B5EF4-FFF2-40B4-BE49-F238E27FC236}">
-                <a16:creationId xmlns:a16="http://schemas.microsoft.com/office/drawing/2014/main" id="{286F04A6-A053-6641-B4E7-E5E8F4CB8792}"/>
-              </a:ext>
-            </a:extLst>
-          </p:cNvPr>
-          <p:cNvSpPr txBox="1"/>
-          <p:nvPr/>
-        </p:nvSpPr>
-        <p:spPr>
-          <a:xfrm>
-            <a:off x="2734930" y="3078370"/>
-            <a:ext cx="609654" cy="276999"/>
-          </a:xfrm>
-          <a:prstGeom prst="rect">
-            <a:avLst/>
-          </a:prstGeom>
-          <a:noFill/>
-        </p:spPr>
-        <p:txBody>
-          <a:bodyPr wrap="none" rtlCol="0">
-            <a:spAutoFit/>
-          </a:bodyPr>
-          <a:lstStyle/>
-          <a:p>
-            <a:r>
-              <a:rPr lang="en-US" sz="1200"/>
-              <a:t>format</a:t>
+              <a:t>Schematron Type</a:t>
             </a:r>
           </a:p>
         </p:txBody>
       </p:sp>
       <p:cxnSp>
         <p:nvCxnSpPr>
-          <p:cNvPr id="56" name="Straight Arrow Connector 55">
-            <a:extLst>
-              <a:ext uri="{FF2B5EF4-FFF2-40B4-BE49-F238E27FC236}">
-                <a16:creationId xmlns:a16="http://schemas.microsoft.com/office/drawing/2014/main" id="{F174A50B-9DCB-8B46-A893-6B9CA50DC1D0}"/>
+          <p:cNvPr id="64" name="Straight Arrow Connector 63">
+            <a:extLst>
+              <a:ext uri="{FF2B5EF4-FFF2-40B4-BE49-F238E27FC236}">
+                <a16:creationId xmlns:a16="http://schemas.microsoft.com/office/drawing/2014/main" id="{EDDD38FF-E8E2-8C40-9A6A-2B4002475477}"/>
               </a:ext>
             </a:extLst>
           </p:cNvPr>
           <p:cNvCxnSpPr>
             <a:cxnSpLocks/>
-            <a:stCxn id="14" idx="1"/>
-            <a:endCxn id="54" idx="3"/>
+            <a:stCxn id="14" idx="2"/>
+            <a:endCxn id="62" idx="0"/>
           </p:cNvCxnSpPr>
           <p:nvPr/>
         </p:nvCxnSpPr>
         <p:spPr>
-          <a:xfrm flipH="1">
-            <a:off x="2767165" y="3401018"/>
-            <a:ext cx="545185" cy="0"/>
+          <a:xfrm>
+            <a:off x="5668097" y="3990576"/>
+            <a:ext cx="0" cy="426772"/>
           </a:xfrm>
           <a:prstGeom prst="straightConnector1">
             <a:avLst/>
@@ -9786,10 +9745,10 @@
       </p:cxnSp>
       <p:sp>
         <p:nvSpPr>
-          <p:cNvPr id="62" name="Rounded Rectangle 61">
-            <a:extLst>
-              <a:ext uri="{FF2B5EF4-FFF2-40B4-BE49-F238E27FC236}">
-                <a16:creationId xmlns:a16="http://schemas.microsoft.com/office/drawing/2014/main" id="{874B556A-DBC2-334C-BD10-1E36B2B758EF}"/>
+          <p:cNvPr id="39" name="Rounded Rectangle 38">
+            <a:extLst>
+              <a:ext uri="{FF2B5EF4-FFF2-40B4-BE49-F238E27FC236}">
+                <a16:creationId xmlns:a16="http://schemas.microsoft.com/office/drawing/2014/main" id="{0E7EEAAC-5D88-F949-9026-FEBF46E47122}"/>
               </a:ext>
             </a:extLst>
           </p:cNvPr>
@@ -9798,7 +9757,7 @@
         </p:nvSpPr>
         <p:spPr>
           <a:xfrm>
-            <a:off x="3312350" y="4092203"/>
+            <a:off x="6895314" y="3330806"/>
             <a:ext cx="1248936" cy="657922"/>
           </a:xfrm>
           <a:prstGeom prst="roundRect">
@@ -9847,99 +9806,17 @@
                   <a:schemeClr val="tx1"/>
                 </a:solidFill>
               </a:rPr>
-              <a:t>Schematron Type</a:t>
-            </a:r>
-          </a:p>
-        </p:txBody>
-      </p:sp>
-      <p:sp>
-        <p:nvSpPr>
-          <p:cNvPr id="63" name="TextBox 62">
-            <a:extLst>
-              <a:ext uri="{FF2B5EF4-FFF2-40B4-BE49-F238E27FC236}">
-                <a16:creationId xmlns:a16="http://schemas.microsoft.com/office/drawing/2014/main" id="{B6061BE5-5290-A741-8926-D37C4BF55231}"/>
-              </a:ext>
-            </a:extLst>
-          </p:cNvPr>
-          <p:cNvSpPr txBox="1"/>
-          <p:nvPr/>
-        </p:nvSpPr>
-        <p:spPr>
-          <a:xfrm>
-            <a:off x="2913848" y="3795155"/>
-            <a:ext cx="1022972" cy="276999"/>
-          </a:xfrm>
-          <a:prstGeom prst="rect">
-            <a:avLst/>
-          </a:prstGeom>
-          <a:noFill/>
-        </p:spPr>
-        <p:txBody>
-          <a:bodyPr wrap="none" rtlCol="0">
-            <a:spAutoFit/>
-          </a:bodyPr>
-          <a:lstStyle/>
-          <a:p>
-            <a:r>
-              <a:rPr lang="en-US" sz="1200"/>
-              <a:t>resourceType</a:t>
-            </a:r>
-          </a:p>
-        </p:txBody>
-      </p:sp>
-      <p:cxnSp>
-        <p:nvCxnSpPr>
-          <p:cNvPr id="64" name="Straight Arrow Connector 63">
-            <a:extLst>
-              <a:ext uri="{FF2B5EF4-FFF2-40B4-BE49-F238E27FC236}">
-                <a16:creationId xmlns:a16="http://schemas.microsoft.com/office/drawing/2014/main" id="{EDDD38FF-E8E2-8C40-9A6A-2B4002475477}"/>
-              </a:ext>
-            </a:extLst>
-          </p:cNvPr>
-          <p:cNvCxnSpPr>
-            <a:cxnSpLocks/>
-            <a:stCxn id="14" idx="2"/>
-            <a:endCxn id="62" idx="0"/>
-          </p:cNvCxnSpPr>
-          <p:nvPr/>
-        </p:nvCxnSpPr>
-        <p:spPr>
-          <a:xfrm>
-            <a:off x="3936818" y="3729979"/>
-            <a:ext cx="0" cy="362224"/>
-          </a:xfrm>
-          <a:prstGeom prst="straightConnector1">
-            <a:avLst/>
-          </a:prstGeom>
-          <a:ln>
-            <a:solidFill>
-              <a:schemeClr val="tx1"/>
-            </a:solidFill>
-            <a:headEnd type="none" w="med" len="med"/>
-            <a:tailEnd type="arrow" w="med" len="med"/>
-          </a:ln>
-        </p:spPr>
-        <p:style>
-          <a:lnRef idx="1">
-            <a:schemeClr val="accent1"/>
-          </a:lnRef>
-          <a:fillRef idx="0">
-            <a:schemeClr val="accent1"/>
-          </a:fillRef>
-          <a:effectRef idx="0">
-            <a:schemeClr val="accent1"/>
-          </a:effectRef>
-          <a:fontRef idx="minor">
-            <a:schemeClr val="tx1"/>
-          </a:fontRef>
-        </p:style>
-      </p:cxnSp>
-      <p:sp>
-        <p:nvSpPr>
-          <p:cNvPr id="39" name="Rounded Rectangle 38">
-            <a:extLst>
-              <a:ext uri="{FF2B5EF4-FFF2-40B4-BE49-F238E27FC236}">
-                <a16:creationId xmlns:a16="http://schemas.microsoft.com/office/drawing/2014/main" id="{0E7EEAAC-5D88-F949-9026-FEBF46E47122}"/>
+              <a:t>Profile XML Schema</a:t>
+            </a:r>
+          </a:p>
+        </p:txBody>
+      </p:sp>
+      <p:sp>
+        <p:nvSpPr>
+          <p:cNvPr id="42" name="Rounded Rectangle 41">
+            <a:extLst>
+              <a:ext uri="{FF2B5EF4-FFF2-40B4-BE49-F238E27FC236}">
+                <a16:creationId xmlns:a16="http://schemas.microsoft.com/office/drawing/2014/main" id="{37C4916A-A5FC-1848-933C-0AFB80F259FC}"/>
               </a:ext>
             </a:extLst>
           </p:cNvPr>
@@ -9948,7 +9825,7 @@
         </p:nvSpPr>
         <p:spPr>
           <a:xfrm>
-            <a:off x="5185753" y="3072057"/>
+            <a:off x="6895314" y="4397299"/>
             <a:ext cx="1248936" cy="657922"/>
           </a:xfrm>
           <a:prstGeom prst="roundRect">
@@ -9997,17 +9874,17 @@
                   <a:schemeClr val="tx1"/>
                 </a:solidFill>
               </a:rPr>
-              <a:t>Profile Specification Document</a:t>
-            </a:r>
-          </a:p>
-        </p:txBody>
-      </p:sp>
-      <p:sp>
-        <p:nvSpPr>
-          <p:cNvPr id="42" name="Rounded Rectangle 41">
-            <a:extLst>
-              <a:ext uri="{FF2B5EF4-FFF2-40B4-BE49-F238E27FC236}">
-                <a16:creationId xmlns:a16="http://schemas.microsoft.com/office/drawing/2014/main" id="{37C4916A-A5FC-1848-933C-0AFB80F259FC}"/>
+              <a:t>XML Schema</a:t>
+            </a:r>
+          </a:p>
+        </p:txBody>
+      </p:sp>
+      <p:sp>
+        <p:nvSpPr>
+          <p:cNvPr id="57" name="Rounded Rectangle 56">
+            <a:extLst>
+              <a:ext uri="{FF2B5EF4-FFF2-40B4-BE49-F238E27FC236}">
+                <a16:creationId xmlns:a16="http://schemas.microsoft.com/office/drawing/2014/main" id="{66B49358-78D1-614C-9A2C-DB1D39C284FE}"/>
               </a:ext>
             </a:extLst>
           </p:cNvPr>
@@ -10016,7 +9893,7 @@
         </p:nvSpPr>
         <p:spPr>
           <a:xfrm>
-            <a:off x="5182407" y="4105418"/>
+            <a:off x="6895314" y="2352085"/>
             <a:ext cx="1248936" cy="657922"/>
           </a:xfrm>
           <a:prstGeom prst="roundRect">
@@ -10065,31 +9942,113 @@
                   <a:schemeClr val="tx1"/>
                 </a:solidFill>
               </a:rPr>
-              <a:t>Written Document Type</a:t>
+              <a:t>Schematron</a:t>
             </a:r>
           </a:p>
         </p:txBody>
       </p:sp>
       <p:cxnSp>
         <p:nvCxnSpPr>
-          <p:cNvPr id="43" name="Straight Arrow Connector 42">
-            <a:extLst>
-              <a:ext uri="{FF2B5EF4-FFF2-40B4-BE49-F238E27FC236}">
-                <a16:creationId xmlns:a16="http://schemas.microsoft.com/office/drawing/2014/main" id="{EDE1D8C9-467D-034C-8FEC-1FE1354F982C}"/>
+          <p:cNvPr id="58" name="Straight Arrow Connector 57">
+            <a:extLst>
+              <a:ext uri="{FF2B5EF4-FFF2-40B4-BE49-F238E27FC236}">
+                <a16:creationId xmlns:a16="http://schemas.microsoft.com/office/drawing/2014/main" id="{922D3BE8-5A40-C54F-97AE-F7C0FFF8F2D1}"/>
               </a:ext>
             </a:extLst>
           </p:cNvPr>
           <p:cNvCxnSpPr>
             <a:cxnSpLocks/>
-            <a:stCxn id="62" idx="2"/>
-            <a:endCxn id="31" idx="0"/>
+            <a:stCxn id="39" idx="0"/>
+            <a:endCxn id="57" idx="2"/>
           </p:cNvCxnSpPr>
           <p:nvPr/>
         </p:nvCxnSpPr>
         <p:spPr>
-          <a:xfrm>
-            <a:off x="3936818" y="4750125"/>
-            <a:ext cx="912283" cy="362224"/>
+          <a:xfrm flipV="1">
+            <a:off x="7519782" y="3010007"/>
+            <a:ext cx="0" cy="320799"/>
+          </a:xfrm>
+          <a:prstGeom prst="straightConnector1">
+            <a:avLst/>
+          </a:prstGeom>
+          <a:ln>
+            <a:solidFill>
+              <a:schemeClr val="tx1"/>
+            </a:solidFill>
+            <a:headEnd type="none" w="med" len="med"/>
+            <a:tailEnd type="arrow" w="med" len="med"/>
+          </a:ln>
+        </p:spPr>
+        <p:style>
+          <a:lnRef idx="1">
+            <a:schemeClr val="accent1"/>
+          </a:lnRef>
+          <a:fillRef idx="0">
+            <a:schemeClr val="accent1"/>
+          </a:fillRef>
+          <a:effectRef idx="0">
+            <a:schemeClr val="accent1"/>
+          </a:effectRef>
+          <a:fontRef idx="minor">
+            <a:schemeClr val="tx1"/>
+          </a:fontRef>
+        </p:style>
+      </p:cxnSp>
+      <p:sp>
+        <p:nvSpPr>
+          <p:cNvPr id="60" name="TextBox 59">
+            <a:extLst>
+              <a:ext uri="{FF2B5EF4-FFF2-40B4-BE49-F238E27FC236}">
+                <a16:creationId xmlns:a16="http://schemas.microsoft.com/office/drawing/2014/main" id="{D8F84038-AD14-8142-8B7A-BD140C4A584C}"/>
+              </a:ext>
+            </a:extLst>
+          </p:cNvPr>
+          <p:cNvSpPr txBox="1"/>
+          <p:nvPr/>
+        </p:nvSpPr>
+        <p:spPr>
+          <a:xfrm>
+            <a:off x="5629057" y="3051179"/>
+            <a:ext cx="609654" cy="276999"/>
+          </a:xfrm>
+          <a:prstGeom prst="rect">
+            <a:avLst/>
+          </a:prstGeom>
+          <a:noFill/>
+        </p:spPr>
+        <p:txBody>
+          <a:bodyPr wrap="none" rtlCol="0">
+            <a:spAutoFit/>
+          </a:bodyPr>
+          <a:lstStyle/>
+          <a:p>
+            <a:r>
+              <a:rPr lang="en-US" sz="1200"/>
+              <a:t>format</a:t>
+            </a:r>
+          </a:p>
+        </p:txBody>
+      </p:sp>
+      <p:cxnSp>
+        <p:nvCxnSpPr>
+          <p:cNvPr id="65" name="Straight Arrow Connector 64">
+            <a:extLst>
+              <a:ext uri="{FF2B5EF4-FFF2-40B4-BE49-F238E27FC236}">
+                <a16:creationId xmlns:a16="http://schemas.microsoft.com/office/drawing/2014/main" id="{0175D5D7-9203-6244-8D5C-2C0EB83BE2E8}"/>
+              </a:ext>
+            </a:extLst>
+          </p:cNvPr>
+          <p:cNvCxnSpPr>
+            <a:cxnSpLocks/>
+            <a:stCxn id="57" idx="0"/>
+            <a:endCxn id="33" idx="2"/>
+          </p:cNvCxnSpPr>
+          <p:nvPr/>
+        </p:nvCxnSpPr>
+        <p:spPr>
+          <a:xfrm flipV="1">
+            <a:off x="7519782" y="2026174"/>
+            <a:ext cx="0" cy="325911"/>
           </a:xfrm>
           <a:prstGeom prst="straightConnector1">
             <a:avLst/>
@@ -10120,27 +10079,125 @@
       </p:cxnSp>
       <p:cxnSp>
         <p:nvCxnSpPr>
-          <p:cNvPr id="47" name="Straight Arrow Connector 46">
-            <a:extLst>
-              <a:ext uri="{FF2B5EF4-FFF2-40B4-BE49-F238E27FC236}">
-                <a16:creationId xmlns:a16="http://schemas.microsoft.com/office/drawing/2014/main" id="{5EE08285-78B3-3143-B9E3-BB97BCF389AE}"/>
+          <p:cNvPr id="66" name="Straight Arrow Connector 65">
+            <a:extLst>
+              <a:ext uri="{FF2B5EF4-FFF2-40B4-BE49-F238E27FC236}">
+                <a16:creationId xmlns:a16="http://schemas.microsoft.com/office/drawing/2014/main" id="{65909EBF-A6AB-DF44-870F-0033AB7FD6EC}"/>
               </a:ext>
             </a:extLst>
           </p:cNvPr>
           <p:cNvCxnSpPr>
             <a:cxnSpLocks/>
-            <a:stCxn id="14" idx="0"/>
-            <a:endCxn id="27" idx="2"/>
+            <a:stCxn id="39" idx="2"/>
+            <a:endCxn id="42" idx="0"/>
           </p:cNvCxnSpPr>
           <p:nvPr/>
         </p:nvCxnSpPr>
         <p:spPr>
-          <a:xfrm flipV="1">
-            <a:off x="3936818" y="2722014"/>
-            <a:ext cx="957152" cy="350043"/>
+          <a:xfrm>
+            <a:off x="7519782" y="3988728"/>
+            <a:ext cx="0" cy="408571"/>
           </a:xfrm>
           <a:prstGeom prst="straightConnector1">
             <a:avLst/>
+          </a:prstGeom>
+          <a:ln>
+            <a:solidFill>
+              <a:schemeClr val="tx1"/>
+            </a:solidFill>
+            <a:headEnd type="none" w="med" len="med"/>
+            <a:tailEnd type="arrow" w="med" len="med"/>
+          </a:ln>
+        </p:spPr>
+        <p:style>
+          <a:lnRef idx="1">
+            <a:schemeClr val="accent1"/>
+          </a:lnRef>
+          <a:fillRef idx="0">
+            <a:schemeClr val="accent1"/>
+          </a:fillRef>
+          <a:effectRef idx="0">
+            <a:schemeClr val="accent1"/>
+          </a:effectRef>
+          <a:fontRef idx="minor">
+            <a:schemeClr val="tx1"/>
+          </a:fontRef>
+        </p:style>
+      </p:cxnSp>
+      <p:cxnSp>
+        <p:nvCxnSpPr>
+          <p:cNvPr id="72" name="Curved Connector 71">
+            <a:extLst>
+              <a:ext uri="{FF2B5EF4-FFF2-40B4-BE49-F238E27FC236}">
+                <a16:creationId xmlns:a16="http://schemas.microsoft.com/office/drawing/2014/main" id="{987BF8B6-FCAC-4E4B-9A26-19D8FA697B85}"/>
+              </a:ext>
+            </a:extLst>
+          </p:cNvPr>
+          <p:cNvCxnSpPr>
+            <a:cxnSpLocks/>
+            <a:stCxn id="3" idx="1"/>
+            <a:endCxn id="39" idx="1"/>
+          </p:cNvCxnSpPr>
+          <p:nvPr/>
+        </p:nvCxnSpPr>
+        <p:spPr>
+          <a:xfrm rot="10800000" flipH="1" flipV="1">
+            <a:off x="6890376" y="777927"/>
+            <a:ext cx="4938" cy="2881839"/>
+          </a:xfrm>
+          <a:prstGeom prst="curvedConnector3">
+            <a:avLst>
+              <a:gd name="adj1" fmla="val -4629405"/>
+            </a:avLst>
+          </a:prstGeom>
+          <a:ln>
+            <a:solidFill>
+              <a:schemeClr val="tx1"/>
+            </a:solidFill>
+            <a:headEnd type="none" w="med" len="med"/>
+            <a:tailEnd type="arrow" w="med" len="med"/>
+          </a:ln>
+        </p:spPr>
+        <p:style>
+          <a:lnRef idx="1">
+            <a:schemeClr val="accent1"/>
+          </a:lnRef>
+          <a:fillRef idx="0">
+            <a:schemeClr val="accent1"/>
+          </a:fillRef>
+          <a:effectRef idx="0">
+            <a:schemeClr val="accent1"/>
+          </a:effectRef>
+          <a:fontRef idx="minor">
+            <a:schemeClr val="tx1"/>
+          </a:fontRef>
+        </p:style>
+      </p:cxnSp>
+      <p:cxnSp>
+        <p:nvCxnSpPr>
+          <p:cNvPr id="75" name="Curved Connector 74">
+            <a:extLst>
+              <a:ext uri="{FF2B5EF4-FFF2-40B4-BE49-F238E27FC236}">
+                <a16:creationId xmlns:a16="http://schemas.microsoft.com/office/drawing/2014/main" id="{AE4D90F0-667F-104D-905C-1D15F671833A}"/>
+              </a:ext>
+            </a:extLst>
+          </p:cNvPr>
+          <p:cNvCxnSpPr>
+            <a:cxnSpLocks/>
+            <a:stCxn id="48" idx="3"/>
+            <a:endCxn id="27" idx="3"/>
+          </p:cNvCxnSpPr>
+          <p:nvPr/>
+        </p:nvCxnSpPr>
+        <p:spPr>
+          <a:xfrm flipH="1">
+            <a:off x="8139312" y="3667928"/>
+            <a:ext cx="1856623" cy="2760267"/>
+          </a:xfrm>
+          <a:prstGeom prst="curvedConnector3">
+            <a:avLst>
+              <a:gd name="adj1" fmla="val -12313"/>
+            </a:avLst>
           </a:prstGeom>
           <a:ln>
             <a:solidFill>
@@ -10166,60 +10223,12 @@
           </a:fontRef>
         </p:style>
       </p:cxnSp>
-      <p:cxnSp>
-        <p:nvCxnSpPr>
-          <p:cNvPr id="50" name="Straight Arrow Connector 49">
-            <a:extLst>
-              <a:ext uri="{FF2B5EF4-FFF2-40B4-BE49-F238E27FC236}">
-                <a16:creationId xmlns:a16="http://schemas.microsoft.com/office/drawing/2014/main" id="{E6CFC4C6-0545-2046-AB22-FFDA6710157D}"/>
-              </a:ext>
-            </a:extLst>
-          </p:cNvPr>
-          <p:cNvCxnSpPr>
-            <a:cxnSpLocks/>
-            <a:stCxn id="39" idx="0"/>
-            <a:endCxn id="27" idx="2"/>
-          </p:cNvCxnSpPr>
-          <p:nvPr/>
-        </p:nvCxnSpPr>
-        <p:spPr>
-          <a:xfrm flipH="1" flipV="1">
-            <a:off x="4893970" y="2722014"/>
-            <a:ext cx="916251" cy="350043"/>
-          </a:xfrm>
-          <a:prstGeom prst="straightConnector1">
-            <a:avLst/>
-          </a:prstGeom>
-          <a:ln>
-            <a:solidFill>
-              <a:schemeClr val="tx1"/>
-            </a:solidFill>
-            <a:prstDash val="sysDot"/>
-            <a:headEnd type="none" w="med" len="med"/>
-            <a:tailEnd type="arrow" w="med" len="med"/>
-          </a:ln>
-        </p:spPr>
-        <p:style>
-          <a:lnRef idx="1">
-            <a:schemeClr val="accent1"/>
-          </a:lnRef>
-          <a:fillRef idx="0">
-            <a:schemeClr val="accent1"/>
-          </a:fillRef>
-          <a:effectRef idx="0">
-            <a:schemeClr val="accent1"/>
-          </a:effectRef>
-          <a:fontRef idx="minor">
-            <a:schemeClr val="tx1"/>
-          </a:fontRef>
-        </p:style>
-      </p:cxnSp>
-      <p:sp>
-        <p:nvSpPr>
-          <p:cNvPr id="57" name="Rounded Rectangle 56">
-            <a:extLst>
-              <a:ext uri="{FF2B5EF4-FFF2-40B4-BE49-F238E27FC236}">
-                <a16:creationId xmlns:a16="http://schemas.microsoft.com/office/drawing/2014/main" id="{66B49358-78D1-614C-9A2C-DB1D39C284FE}"/>
+      <p:sp>
+        <p:nvSpPr>
+          <p:cNvPr id="48" name="Rounded Rectangle 47">
+            <a:extLst>
+              <a:ext uri="{FF2B5EF4-FFF2-40B4-BE49-F238E27FC236}">
+                <a16:creationId xmlns:a16="http://schemas.microsoft.com/office/drawing/2014/main" id="{BF0E65E1-132E-7D46-BF9A-95F2C77147F8}"/>
               </a:ext>
             </a:extLst>
           </p:cNvPr>
@@ -10228,7 +10237,7 @@
         </p:nvSpPr>
         <p:spPr>
           <a:xfrm>
-            <a:off x="6969221" y="3070209"/>
+            <a:off x="8746999" y="3338967"/>
             <a:ext cx="1248936" cy="657922"/>
           </a:xfrm>
           <a:prstGeom prst="roundRect">
@@ -10277,39 +10286,609 @@
                   <a:schemeClr val="tx1"/>
                 </a:solidFill>
               </a:rPr>
-              <a:t>PDF</a:t>
+              <a:t>Profile Specification Web Page</a:t>
+            </a:r>
+          </a:p>
+        </p:txBody>
+      </p:sp>
+      <p:sp>
+        <p:nvSpPr>
+          <p:cNvPr id="49" name="Rounded Rectangle 48">
+            <a:extLst>
+              <a:ext uri="{FF2B5EF4-FFF2-40B4-BE49-F238E27FC236}">
+                <a16:creationId xmlns:a16="http://schemas.microsoft.com/office/drawing/2014/main" id="{F3942113-30D8-3649-BF57-15F8163C4C21}"/>
+              </a:ext>
+            </a:extLst>
+          </p:cNvPr>
+          <p:cNvSpPr/>
+          <p:nvPr/>
+        </p:nvSpPr>
+        <p:spPr>
+          <a:xfrm>
+            <a:off x="8746999" y="4397299"/>
+            <a:ext cx="1248936" cy="657922"/>
+          </a:xfrm>
+          <a:prstGeom prst="roundRect">
+            <a:avLst/>
+          </a:prstGeom>
+          <a:pattFill prst="pct30">
+            <a:fgClr>
+              <a:schemeClr val="bg1">
+                <a:lumMod val="85000"/>
+              </a:schemeClr>
+            </a:fgClr>
+            <a:bgClr>
+              <a:schemeClr val="bg1"/>
+            </a:bgClr>
+          </a:pattFill>
+          <a:ln>
+            <a:solidFill>
+              <a:schemeClr val="tx1"/>
+            </a:solidFill>
+          </a:ln>
+        </p:spPr>
+        <p:style>
+          <a:lnRef idx="2">
+            <a:schemeClr val="accent1">
+              <a:shade val="50000"/>
+            </a:schemeClr>
+          </a:lnRef>
+          <a:fillRef idx="1">
+            <a:schemeClr val="accent1"/>
+          </a:fillRef>
+          <a:effectRef idx="0">
+            <a:schemeClr val="accent1"/>
+          </a:effectRef>
+          <a:fontRef idx="minor">
+            <a:schemeClr val="lt1"/>
+          </a:fontRef>
+        </p:style>
+        <p:txBody>
+          <a:bodyPr rtlCol="0" anchor="ctr"/>
+          <a:lstStyle/>
+          <a:p>
+            <a:pPr algn="ctr"/>
+            <a:r>
+              <a:rPr lang="en-US" sz="1400">
+                <a:solidFill>
+                  <a:schemeClr val="tx1"/>
+                </a:solidFill>
+              </a:rPr>
+              <a:t>Web Page Type</a:t>
+            </a:r>
+          </a:p>
+        </p:txBody>
+      </p:sp>
+      <p:sp>
+        <p:nvSpPr>
+          <p:cNvPr id="51" name="Rounded Rectangle 50">
+            <a:extLst>
+              <a:ext uri="{FF2B5EF4-FFF2-40B4-BE49-F238E27FC236}">
+                <a16:creationId xmlns:a16="http://schemas.microsoft.com/office/drawing/2014/main" id="{10504500-0897-C74D-9153-539FB6B65AC8}"/>
+              </a:ext>
+            </a:extLst>
+          </p:cNvPr>
+          <p:cNvSpPr/>
+          <p:nvPr/>
+        </p:nvSpPr>
+        <p:spPr>
+          <a:xfrm>
+            <a:off x="8746998" y="2349463"/>
+            <a:ext cx="1248936" cy="657922"/>
+          </a:xfrm>
+          <a:prstGeom prst="roundRect">
+            <a:avLst/>
+          </a:prstGeom>
+          <a:pattFill prst="pct30">
+            <a:fgClr>
+              <a:schemeClr val="bg1">
+                <a:lumMod val="85000"/>
+              </a:schemeClr>
+            </a:fgClr>
+            <a:bgClr>
+              <a:schemeClr val="bg1"/>
+            </a:bgClr>
+          </a:pattFill>
+          <a:ln>
+            <a:solidFill>
+              <a:schemeClr val="tx1"/>
+            </a:solidFill>
+          </a:ln>
+        </p:spPr>
+        <p:style>
+          <a:lnRef idx="2">
+            <a:schemeClr val="accent1">
+              <a:shade val="50000"/>
+            </a:schemeClr>
+          </a:lnRef>
+          <a:fillRef idx="1">
+            <a:schemeClr val="accent1"/>
+          </a:fillRef>
+          <a:effectRef idx="0">
+            <a:schemeClr val="accent1"/>
+          </a:effectRef>
+          <a:fontRef idx="minor">
+            <a:schemeClr val="lt1"/>
+          </a:fontRef>
+        </p:style>
+        <p:txBody>
+          <a:bodyPr rtlCol="0" anchor="ctr"/>
+          <a:lstStyle/>
+          <a:p>
+            <a:pPr algn="ctr"/>
+            <a:r>
+              <a:rPr lang="en-US" sz="1400">
+                <a:solidFill>
+                  <a:schemeClr val="tx1"/>
+                </a:solidFill>
+              </a:rPr>
+              <a:t>HTML</a:t>
             </a:r>
           </a:p>
         </p:txBody>
       </p:sp>
       <p:cxnSp>
         <p:nvCxnSpPr>
-          <p:cNvPr id="58" name="Straight Arrow Connector 57">
-            <a:extLst>
-              <a:ext uri="{FF2B5EF4-FFF2-40B4-BE49-F238E27FC236}">
-                <a16:creationId xmlns:a16="http://schemas.microsoft.com/office/drawing/2014/main" id="{922D3BE8-5A40-C54F-97AE-F7C0FFF8F2D1}"/>
+          <p:cNvPr id="52" name="Straight Arrow Connector 51">
+            <a:extLst>
+              <a:ext uri="{FF2B5EF4-FFF2-40B4-BE49-F238E27FC236}">
+                <a16:creationId xmlns:a16="http://schemas.microsoft.com/office/drawing/2014/main" id="{FF7E0FE0-61F2-1D41-92F8-02B5D3365B21}"/>
+              </a:ext>
+            </a:extLst>
+          </p:cNvPr>
+          <p:cNvCxnSpPr>
+            <a:cxnSpLocks/>
+            <a:stCxn id="48" idx="0"/>
+            <a:endCxn id="51" idx="2"/>
+          </p:cNvCxnSpPr>
+          <p:nvPr/>
+        </p:nvCxnSpPr>
+        <p:spPr>
+          <a:xfrm flipH="1" flipV="1">
+            <a:off x="9371466" y="3007385"/>
+            <a:ext cx="1" cy="331582"/>
+          </a:xfrm>
+          <a:prstGeom prst="straightConnector1">
+            <a:avLst/>
+          </a:prstGeom>
+          <a:ln>
+            <a:solidFill>
+              <a:schemeClr val="tx1"/>
+            </a:solidFill>
+            <a:headEnd type="none" w="med" len="med"/>
+            <a:tailEnd type="arrow" w="med" len="med"/>
+          </a:ln>
+        </p:spPr>
+        <p:style>
+          <a:lnRef idx="1">
+            <a:schemeClr val="accent1"/>
+          </a:lnRef>
+          <a:fillRef idx="0">
+            <a:schemeClr val="accent1"/>
+          </a:fillRef>
+          <a:effectRef idx="0">
+            <a:schemeClr val="accent1"/>
+          </a:effectRef>
+          <a:fontRef idx="minor">
+            <a:schemeClr val="tx1"/>
+          </a:fontRef>
+        </p:style>
+      </p:cxnSp>
+      <p:sp>
+        <p:nvSpPr>
+          <p:cNvPr id="53" name="TextBox 52">
+            <a:extLst>
+              <a:ext uri="{FF2B5EF4-FFF2-40B4-BE49-F238E27FC236}">
+                <a16:creationId xmlns:a16="http://schemas.microsoft.com/office/drawing/2014/main" id="{BB04A72A-3290-9242-BC57-B5B415567109}"/>
+              </a:ext>
+            </a:extLst>
+          </p:cNvPr>
+          <p:cNvSpPr txBox="1"/>
+          <p:nvPr/>
+        </p:nvSpPr>
+        <p:spPr>
+          <a:xfrm>
+            <a:off x="7498202" y="3043171"/>
+            <a:ext cx="609654" cy="276999"/>
+          </a:xfrm>
+          <a:prstGeom prst="rect">
+            <a:avLst/>
+          </a:prstGeom>
+          <a:noFill/>
+        </p:spPr>
+        <p:txBody>
+          <a:bodyPr wrap="none" rtlCol="0">
+            <a:spAutoFit/>
+          </a:bodyPr>
+          <a:lstStyle/>
+          <a:p>
+            <a:r>
+              <a:rPr lang="en-US" sz="1200"/>
+              <a:t>format</a:t>
+            </a:r>
+          </a:p>
+        </p:txBody>
+      </p:sp>
+      <p:cxnSp>
+        <p:nvCxnSpPr>
+          <p:cNvPr id="61" name="Straight Arrow Connector 60">
+            <a:extLst>
+              <a:ext uri="{FF2B5EF4-FFF2-40B4-BE49-F238E27FC236}">
+                <a16:creationId xmlns:a16="http://schemas.microsoft.com/office/drawing/2014/main" id="{C9AA568A-9D7A-BD4C-A828-648982FD501E}"/>
+              </a:ext>
+            </a:extLst>
+          </p:cNvPr>
+          <p:cNvCxnSpPr>
+            <a:cxnSpLocks/>
+            <a:stCxn id="48" idx="2"/>
+            <a:endCxn id="49" idx="0"/>
+          </p:cNvCxnSpPr>
+          <p:nvPr/>
+        </p:nvCxnSpPr>
+        <p:spPr>
+          <a:xfrm>
+            <a:off x="9371467" y="3996889"/>
+            <a:ext cx="0" cy="400410"/>
+          </a:xfrm>
+          <a:prstGeom prst="straightConnector1">
+            <a:avLst/>
+          </a:prstGeom>
+          <a:ln>
+            <a:solidFill>
+              <a:schemeClr val="tx1"/>
+            </a:solidFill>
+            <a:headEnd type="none" w="med" len="med"/>
+            <a:tailEnd type="arrow" w="med" len="med"/>
+          </a:ln>
+        </p:spPr>
+        <p:style>
+          <a:lnRef idx="1">
+            <a:schemeClr val="accent1"/>
+          </a:lnRef>
+          <a:fillRef idx="0">
+            <a:schemeClr val="accent1"/>
+          </a:fillRef>
+          <a:effectRef idx="0">
+            <a:schemeClr val="accent1"/>
+          </a:effectRef>
+          <a:fontRef idx="minor">
+            <a:schemeClr val="tx1"/>
+          </a:fontRef>
+        </p:style>
+      </p:cxnSp>
+      <p:cxnSp>
+        <p:nvCxnSpPr>
+          <p:cNvPr id="68" name="Curved Connector 67">
+            <a:extLst>
+              <a:ext uri="{FF2B5EF4-FFF2-40B4-BE49-F238E27FC236}">
+                <a16:creationId xmlns:a16="http://schemas.microsoft.com/office/drawing/2014/main" id="{3B61E6C8-DE22-F84D-A323-74CF2E8E4DF1}"/>
+              </a:ext>
+            </a:extLst>
+          </p:cNvPr>
+          <p:cNvCxnSpPr>
+            <a:cxnSpLocks/>
+            <a:stCxn id="3" idx="3"/>
+            <a:endCxn id="48" idx="1"/>
+          </p:cNvCxnSpPr>
+          <p:nvPr/>
+        </p:nvCxnSpPr>
+        <p:spPr>
+          <a:xfrm>
+            <a:off x="8139312" y="777928"/>
+            <a:ext cx="607687" cy="2890000"/>
+          </a:xfrm>
+          <a:prstGeom prst="curvedConnector3">
+            <a:avLst>
+              <a:gd name="adj1" fmla="val 50000"/>
+            </a:avLst>
+          </a:prstGeom>
+          <a:ln>
+            <a:solidFill>
+              <a:schemeClr val="tx1"/>
+            </a:solidFill>
+            <a:headEnd type="none" w="med" len="med"/>
+            <a:tailEnd type="arrow" w="med" len="med"/>
+          </a:ln>
+        </p:spPr>
+        <p:style>
+          <a:lnRef idx="1">
+            <a:schemeClr val="accent1"/>
+          </a:lnRef>
+          <a:fillRef idx="0">
+            <a:schemeClr val="accent1"/>
+          </a:fillRef>
+          <a:effectRef idx="0">
+            <a:schemeClr val="accent1"/>
+          </a:effectRef>
+          <a:fontRef idx="minor">
+            <a:schemeClr val="tx1"/>
+          </a:fontRef>
+        </p:style>
+      </p:cxnSp>
+      <p:sp>
+        <p:nvSpPr>
+          <p:cNvPr id="116" name="Rounded Rectangle 115">
+            <a:extLst>
+              <a:ext uri="{FF2B5EF4-FFF2-40B4-BE49-F238E27FC236}">
+                <a16:creationId xmlns:a16="http://schemas.microsoft.com/office/drawing/2014/main" id="{04A06FF6-EC71-D049-863B-52938E516C2A}"/>
+              </a:ext>
+            </a:extLst>
+          </p:cNvPr>
+          <p:cNvSpPr/>
+          <p:nvPr/>
+        </p:nvSpPr>
+        <p:spPr>
+          <a:xfrm>
+            <a:off x="6890376" y="5256062"/>
+            <a:ext cx="1248936" cy="657922"/>
+          </a:xfrm>
+          <a:prstGeom prst="roundRect">
+            <a:avLst/>
+          </a:prstGeom>
+          <a:noFill/>
+          <a:ln>
+            <a:solidFill>
+              <a:schemeClr val="tx1"/>
+            </a:solidFill>
+          </a:ln>
+        </p:spPr>
+        <p:style>
+          <a:lnRef idx="2">
+            <a:schemeClr val="accent1">
+              <a:shade val="50000"/>
+            </a:schemeClr>
+          </a:lnRef>
+          <a:fillRef idx="1">
+            <a:schemeClr val="accent1"/>
+          </a:fillRef>
+          <a:effectRef idx="0">
+            <a:schemeClr val="accent1"/>
+          </a:effectRef>
+          <a:fontRef idx="minor">
+            <a:schemeClr val="lt1"/>
+          </a:fontRef>
+        </p:style>
+        <p:txBody>
+          <a:bodyPr rtlCol="0" anchor="ctr"/>
+          <a:lstStyle/>
+          <a:p>
+            <a:pPr algn="ctr"/>
+            <a:r>
+              <a:rPr lang="en-US" sz="1200">
+                <a:solidFill>
+                  <a:schemeClr val="tx1"/>
+                </a:solidFill>
+              </a:rPr>
+              <a:t>Implementation Resource Type</a:t>
+            </a:r>
+          </a:p>
+        </p:txBody>
+      </p:sp>
+      <p:cxnSp>
+        <p:nvCxnSpPr>
+          <p:cNvPr id="117" name="Straight Arrow Connector 116">
+            <a:extLst>
+              <a:ext uri="{FF2B5EF4-FFF2-40B4-BE49-F238E27FC236}">
+                <a16:creationId xmlns:a16="http://schemas.microsoft.com/office/drawing/2014/main" id="{E81CB235-31DC-8747-A3DC-FD08D1347F32}"/>
+              </a:ext>
+            </a:extLst>
+          </p:cNvPr>
+          <p:cNvCxnSpPr>
+            <a:cxnSpLocks/>
+            <a:stCxn id="42" idx="2"/>
+            <a:endCxn id="116" idx="0"/>
+          </p:cNvCxnSpPr>
+          <p:nvPr/>
+        </p:nvCxnSpPr>
+        <p:spPr>
+          <a:xfrm flipH="1">
+            <a:off x="7514844" y="5055221"/>
+            <a:ext cx="4938" cy="200841"/>
+          </a:xfrm>
+          <a:prstGeom prst="straightConnector1">
+            <a:avLst/>
+          </a:prstGeom>
+          <a:ln>
+            <a:solidFill>
+              <a:schemeClr val="tx1"/>
+            </a:solidFill>
+            <a:prstDash val="sysDot"/>
+            <a:headEnd type="none" w="med" len="med"/>
+            <a:tailEnd type="arrow" w="med" len="med"/>
+          </a:ln>
+        </p:spPr>
+        <p:style>
+          <a:lnRef idx="1">
+            <a:schemeClr val="accent1"/>
+          </a:lnRef>
+          <a:fillRef idx="0">
+            <a:schemeClr val="accent1"/>
+          </a:fillRef>
+          <a:effectRef idx="0">
+            <a:schemeClr val="accent1"/>
+          </a:effectRef>
+          <a:fontRef idx="minor">
+            <a:schemeClr val="tx1"/>
+          </a:fontRef>
+        </p:style>
+      </p:cxnSp>
+      <p:cxnSp>
+        <p:nvCxnSpPr>
+          <p:cNvPr id="120" name="Straight Arrow Connector 119">
+            <a:extLst>
+              <a:ext uri="{FF2B5EF4-FFF2-40B4-BE49-F238E27FC236}">
+                <a16:creationId xmlns:a16="http://schemas.microsoft.com/office/drawing/2014/main" id="{F579F5B1-0F2F-5E4F-8CDF-7A89221A583D}"/>
+              </a:ext>
+            </a:extLst>
+          </p:cNvPr>
+          <p:cNvCxnSpPr>
+            <a:cxnSpLocks/>
+            <a:stCxn id="49" idx="2"/>
+            <a:endCxn id="116" idx="3"/>
+          </p:cNvCxnSpPr>
+          <p:nvPr/>
+        </p:nvCxnSpPr>
+        <p:spPr>
+          <a:xfrm flipH="1">
+            <a:off x="8139312" y="5055221"/>
+            <a:ext cx="1232155" cy="529802"/>
+          </a:xfrm>
+          <a:prstGeom prst="straightConnector1">
+            <a:avLst/>
+          </a:prstGeom>
+          <a:ln>
+            <a:solidFill>
+              <a:schemeClr val="tx1"/>
+            </a:solidFill>
+            <a:prstDash val="sysDot"/>
+            <a:headEnd type="none" w="med" len="med"/>
+            <a:tailEnd type="arrow" w="med" len="med"/>
+          </a:ln>
+        </p:spPr>
+        <p:style>
+          <a:lnRef idx="1">
+            <a:schemeClr val="accent1"/>
+          </a:lnRef>
+          <a:fillRef idx="0">
+            <a:schemeClr val="accent1"/>
+          </a:fillRef>
+          <a:effectRef idx="0">
+            <a:schemeClr val="accent1"/>
+          </a:effectRef>
+          <a:fontRef idx="minor">
+            <a:schemeClr val="tx1"/>
+          </a:fontRef>
+        </p:style>
+      </p:cxnSp>
+      <p:cxnSp>
+        <p:nvCxnSpPr>
+          <p:cNvPr id="123" name="Straight Arrow Connector 122">
+            <a:extLst>
+              <a:ext uri="{FF2B5EF4-FFF2-40B4-BE49-F238E27FC236}">
+                <a16:creationId xmlns:a16="http://schemas.microsoft.com/office/drawing/2014/main" id="{90058F66-3A79-6045-9E2F-A7D87AD37364}"/>
+              </a:ext>
+            </a:extLst>
+          </p:cNvPr>
+          <p:cNvCxnSpPr>
+            <a:cxnSpLocks/>
+            <a:stCxn id="62" idx="2"/>
+            <a:endCxn id="116" idx="1"/>
+          </p:cNvCxnSpPr>
+          <p:nvPr/>
+        </p:nvCxnSpPr>
+        <p:spPr>
+          <a:xfrm>
+            <a:off x="5668097" y="5075270"/>
+            <a:ext cx="1222279" cy="509753"/>
+          </a:xfrm>
+          <a:prstGeom prst="straightConnector1">
+            <a:avLst/>
+          </a:prstGeom>
+          <a:ln>
+            <a:solidFill>
+              <a:schemeClr val="tx1"/>
+            </a:solidFill>
+            <a:prstDash val="sysDot"/>
+            <a:headEnd type="none" w="med" len="med"/>
+            <a:tailEnd type="arrow" w="med" len="med"/>
+          </a:ln>
+        </p:spPr>
+        <p:style>
+          <a:lnRef idx="1">
+            <a:schemeClr val="accent1"/>
+          </a:lnRef>
+          <a:fillRef idx="0">
+            <a:schemeClr val="accent1"/>
+          </a:fillRef>
+          <a:effectRef idx="0">
+            <a:schemeClr val="accent1"/>
+          </a:effectRef>
+          <a:fontRef idx="minor">
+            <a:schemeClr val="tx1"/>
+          </a:fontRef>
+        </p:style>
+      </p:cxnSp>
+      <p:cxnSp>
+        <p:nvCxnSpPr>
+          <p:cNvPr id="130" name="Curved Connector 129">
+            <a:extLst>
+              <a:ext uri="{FF2B5EF4-FFF2-40B4-BE49-F238E27FC236}">
+                <a16:creationId xmlns:a16="http://schemas.microsoft.com/office/drawing/2014/main" id="{3A7A66B0-CDBB-A942-9C78-CF172B348E3D}"/>
+              </a:ext>
+            </a:extLst>
+          </p:cNvPr>
+          <p:cNvCxnSpPr>
+            <a:cxnSpLocks/>
+            <a:stCxn id="14" idx="1"/>
+            <a:endCxn id="27" idx="1"/>
+          </p:cNvCxnSpPr>
+          <p:nvPr/>
+        </p:nvCxnSpPr>
+        <p:spPr>
+          <a:xfrm rot="10800000" flipH="1" flipV="1">
+            <a:off x="5043628" y="3661615"/>
+            <a:ext cx="1846747" cy="2766580"/>
+          </a:xfrm>
+          <a:prstGeom prst="curvedConnector3">
+            <a:avLst>
+              <a:gd name="adj1" fmla="val -12379"/>
+            </a:avLst>
+          </a:prstGeom>
+          <a:ln>
+            <a:solidFill>
+              <a:schemeClr val="tx1"/>
+            </a:solidFill>
+            <a:prstDash val="sysDot"/>
+            <a:headEnd type="none" w="med" len="med"/>
+            <a:tailEnd type="arrow" w="med" len="med"/>
+          </a:ln>
+        </p:spPr>
+        <p:style>
+          <a:lnRef idx="1">
+            <a:schemeClr val="accent1"/>
+          </a:lnRef>
+          <a:fillRef idx="0">
+            <a:schemeClr val="accent1"/>
+          </a:fillRef>
+          <a:effectRef idx="0">
+            <a:schemeClr val="accent1"/>
+          </a:effectRef>
+          <a:fontRef idx="minor">
+            <a:schemeClr val="tx1"/>
+          </a:fontRef>
+        </p:style>
+      </p:cxnSp>
+      <p:cxnSp>
+        <p:nvCxnSpPr>
+          <p:cNvPr id="133" name="Curved Connector 132">
+            <a:extLst>
+              <a:ext uri="{FF2B5EF4-FFF2-40B4-BE49-F238E27FC236}">
+                <a16:creationId xmlns:a16="http://schemas.microsoft.com/office/drawing/2014/main" id="{D47EC085-E124-AD46-A428-423E795AB8FF}"/>
               </a:ext>
             </a:extLst>
           </p:cNvPr>
           <p:cNvCxnSpPr>
             <a:cxnSpLocks/>
             <a:stCxn id="39" idx="3"/>
-            <a:endCxn id="57" idx="1"/>
+            <a:endCxn id="27" idx="3"/>
           </p:cNvCxnSpPr>
           <p:nvPr/>
         </p:nvCxnSpPr>
         <p:spPr>
-          <a:xfrm flipV="1">
-            <a:off x="6434689" y="3399170"/>
-            <a:ext cx="534532" cy="1848"/>
-          </a:xfrm>
-          <a:prstGeom prst="straightConnector1">
-            <a:avLst/>
-          </a:prstGeom>
-          <a:ln>
-            <a:solidFill>
-              <a:schemeClr val="tx1"/>
-            </a:solidFill>
+          <a:xfrm flipH="1">
+            <a:off x="8139312" y="3659767"/>
+            <a:ext cx="4938" cy="2768428"/>
+          </a:xfrm>
+          <a:prstGeom prst="curvedConnector3">
+            <a:avLst>
+              <a:gd name="adj1" fmla="val -4629405"/>
+            </a:avLst>
+          </a:prstGeom>
+          <a:ln>
+            <a:solidFill>
+              <a:schemeClr val="tx1"/>
+            </a:solidFill>
+            <a:prstDash val="sysDot"/>
             <a:headEnd type="none" w="med" len="med"/>
             <a:tailEnd type="arrow" w="med" len="med"/>
           </a:ln>
@@ -10331,10 +10910,10 @@
       </p:cxnSp>
       <p:sp>
         <p:nvSpPr>
-          <p:cNvPr id="60" name="TextBox 59">
-            <a:extLst>
-              <a:ext uri="{FF2B5EF4-FFF2-40B4-BE49-F238E27FC236}">
-                <a16:creationId xmlns:a16="http://schemas.microsoft.com/office/drawing/2014/main" id="{D8F84038-AD14-8142-8B7A-BD140C4A584C}"/>
+          <p:cNvPr id="63" name="TextBox 62">
+            <a:extLst>
+              <a:ext uri="{FF2B5EF4-FFF2-40B4-BE49-F238E27FC236}">
+                <a16:creationId xmlns:a16="http://schemas.microsoft.com/office/drawing/2014/main" id="{B6061BE5-5290-A741-8926-D37C4BF55231}"/>
               </a:ext>
             </a:extLst>
           </p:cNvPr>
@@ -10343,13 +10922,15 @@
         </p:nvSpPr>
         <p:spPr>
           <a:xfrm>
-            <a:off x="6417269" y="3070209"/>
-            <a:ext cx="609654" cy="276999"/>
+            <a:off x="7004601" y="4035536"/>
+            <a:ext cx="1022972" cy="276999"/>
           </a:xfrm>
           <a:prstGeom prst="rect">
             <a:avLst/>
           </a:prstGeom>
-          <a:noFill/>
+          <a:solidFill>
+            <a:schemeClr val="bg1"/>
+          </a:solidFill>
         </p:spPr>
         <p:txBody>
           <a:bodyPr wrap="none" rtlCol="0">
@@ -10359,106 +10940,11 @@
           <a:p>
             <a:r>
               <a:rPr lang="en-US" sz="1200"/>
-              <a:t>format</a:t>
-            </a:r>
-          </a:p>
-        </p:txBody>
-      </p:sp>
-      <p:cxnSp>
-        <p:nvCxnSpPr>
-          <p:cNvPr id="65" name="Straight Arrow Connector 64">
-            <a:extLst>
-              <a:ext uri="{FF2B5EF4-FFF2-40B4-BE49-F238E27FC236}">
-                <a16:creationId xmlns:a16="http://schemas.microsoft.com/office/drawing/2014/main" id="{0175D5D7-9203-6244-8D5C-2C0EB83BE2E8}"/>
-              </a:ext>
-            </a:extLst>
-          </p:cNvPr>
-          <p:cNvCxnSpPr>
-            <a:cxnSpLocks/>
-            <a:stCxn id="57" idx="2"/>
-            <a:endCxn id="33" idx="3"/>
-          </p:cNvCxnSpPr>
-          <p:nvPr/>
-        </p:nvCxnSpPr>
-        <p:spPr>
-          <a:xfrm flipH="1">
-            <a:off x="5473569" y="3728131"/>
-            <a:ext cx="2120120" cy="2700064"/>
-          </a:xfrm>
-          <a:prstGeom prst="straightConnector1">
-            <a:avLst/>
-          </a:prstGeom>
-          <a:ln>
-            <a:solidFill>
-              <a:schemeClr val="tx1"/>
-            </a:solidFill>
-            <a:prstDash val="sysDot"/>
-            <a:headEnd type="none" w="med" len="med"/>
-            <a:tailEnd type="arrow" w="med" len="med"/>
-          </a:ln>
-        </p:spPr>
-        <p:style>
-          <a:lnRef idx="1">
-            <a:schemeClr val="accent1"/>
-          </a:lnRef>
-          <a:fillRef idx="0">
-            <a:schemeClr val="accent1"/>
-          </a:fillRef>
-          <a:effectRef idx="0">
-            <a:schemeClr val="accent1"/>
-          </a:effectRef>
-          <a:fontRef idx="minor">
-            <a:schemeClr val="tx1"/>
-          </a:fontRef>
-        </p:style>
-      </p:cxnSp>
-      <p:cxnSp>
-        <p:nvCxnSpPr>
-          <p:cNvPr id="66" name="Straight Arrow Connector 65">
-            <a:extLst>
-              <a:ext uri="{FF2B5EF4-FFF2-40B4-BE49-F238E27FC236}">
-                <a16:creationId xmlns:a16="http://schemas.microsoft.com/office/drawing/2014/main" id="{65909EBF-A6AB-DF44-870F-0033AB7FD6EC}"/>
-              </a:ext>
-            </a:extLst>
-          </p:cNvPr>
-          <p:cNvCxnSpPr>
-            <a:cxnSpLocks/>
-            <a:stCxn id="39" idx="2"/>
-            <a:endCxn id="42" idx="0"/>
-          </p:cNvCxnSpPr>
-          <p:nvPr/>
-        </p:nvCxnSpPr>
-        <p:spPr>
-          <a:xfrm flipH="1">
-            <a:off x="5806875" y="3729979"/>
-            <a:ext cx="3346" cy="375439"/>
-          </a:xfrm>
-          <a:prstGeom prst="straightConnector1">
-            <a:avLst/>
-          </a:prstGeom>
-          <a:ln>
-            <a:solidFill>
-              <a:schemeClr val="tx1"/>
-            </a:solidFill>
-            <a:headEnd type="none" w="med" len="med"/>
-            <a:tailEnd type="arrow" w="med" len="med"/>
-          </a:ln>
-        </p:spPr>
-        <p:style>
-          <a:lnRef idx="1">
-            <a:schemeClr val="accent1"/>
-          </a:lnRef>
-          <a:fillRef idx="0">
-            <a:schemeClr val="accent1"/>
-          </a:fillRef>
-          <a:effectRef idx="0">
-            <a:schemeClr val="accent1"/>
-          </a:effectRef>
-          <a:fontRef idx="minor">
-            <a:schemeClr val="tx1"/>
-          </a:fontRef>
-        </p:style>
-      </p:cxnSp>
+              <a:t>resourceType</a:t>
+            </a:r>
+          </a:p>
+        </p:txBody>
+      </p:sp>
       <p:sp>
         <p:nvSpPr>
           <p:cNvPr id="69" name="TextBox 68">
@@ -10473,13 +10959,15 @@
         </p:nvSpPr>
         <p:spPr>
           <a:xfrm>
-            <a:off x="5806874" y="3772591"/>
+            <a:off x="5156611" y="4042899"/>
             <a:ext cx="1022972" cy="276999"/>
           </a:xfrm>
           <a:prstGeom prst="rect">
             <a:avLst/>
           </a:prstGeom>
-          <a:noFill/>
+          <a:solidFill>
+            <a:schemeClr val="bg1"/>
+          </a:solidFill>
         </p:spPr>
         <p:txBody>
           <a:bodyPr wrap="none" rtlCol="0">
@@ -10494,29 +10982,68 @@
           </a:p>
         </p:txBody>
       </p:sp>
+      <p:sp>
+        <p:nvSpPr>
+          <p:cNvPr id="67" name="TextBox 66">
+            <a:extLst>
+              <a:ext uri="{FF2B5EF4-FFF2-40B4-BE49-F238E27FC236}">
+                <a16:creationId xmlns:a16="http://schemas.microsoft.com/office/drawing/2014/main" id="{841909B9-34DD-E344-BFB8-345914D265D6}"/>
+              </a:ext>
+            </a:extLst>
+          </p:cNvPr>
+          <p:cNvSpPr txBox="1"/>
+          <p:nvPr/>
+        </p:nvSpPr>
+        <p:spPr>
+          <a:xfrm>
+            <a:off x="8859980" y="4032141"/>
+            <a:ext cx="1022972" cy="276999"/>
+          </a:xfrm>
+          <a:prstGeom prst="rect">
+            <a:avLst/>
+          </a:prstGeom>
+          <a:solidFill>
+            <a:schemeClr val="bg1"/>
+          </a:solidFill>
+        </p:spPr>
+        <p:txBody>
+          <a:bodyPr wrap="none" rtlCol="0">
+            <a:spAutoFit/>
+          </a:bodyPr>
+          <a:lstStyle/>
+          <a:p>
+            <a:r>
+              <a:rPr lang="en-US" sz="1200"/>
+              <a:t>resourceType</a:t>
+            </a:r>
+          </a:p>
+        </p:txBody>
+      </p:sp>
       <p:cxnSp>
         <p:nvCxnSpPr>
-          <p:cNvPr id="72" name="Curved Connector 71">
-            <a:extLst>
-              <a:ext uri="{FF2B5EF4-FFF2-40B4-BE49-F238E27FC236}">
-                <a16:creationId xmlns:a16="http://schemas.microsoft.com/office/drawing/2014/main" id="{987BF8B6-FCAC-4E4B-9A26-19D8FA697B85}"/>
+          <p:cNvPr id="147" name="Curved Connector 146">
+            <a:extLst>
+              <a:ext uri="{FF2B5EF4-FFF2-40B4-BE49-F238E27FC236}">
+                <a16:creationId xmlns:a16="http://schemas.microsoft.com/office/drawing/2014/main" id="{DBB28A78-59E5-8A4D-B7B2-692A97992E7E}"/>
               </a:ext>
             </a:extLst>
           </p:cNvPr>
           <p:cNvCxnSpPr>
             <a:cxnSpLocks/>
             <a:stCxn id="3" idx="1"/>
-            <a:endCxn id="14" idx="0"/>
+            <a:endCxn id="14" idx="3"/>
           </p:cNvCxnSpPr>
           <p:nvPr/>
         </p:nvCxnSpPr>
         <p:spPr>
           <a:xfrm rot="10800000" flipV="1">
-            <a:off x="3936819" y="1402663"/>
-            <a:ext cx="329895" cy="1669393"/>
-          </a:xfrm>
-          <a:prstGeom prst="curvedConnector2">
-            <a:avLst/>
+            <a:off x="6292566" y="777927"/>
+            <a:ext cx="597811" cy="2883687"/>
+          </a:xfrm>
+          <a:prstGeom prst="curvedConnector3">
+            <a:avLst>
+              <a:gd name="adj1" fmla="val 37404"/>
+            </a:avLst>
           </a:prstGeom>
           <a:ln>
             <a:solidFill>
@@ -10541,59 +11068,12 @@
           </a:fontRef>
         </p:style>
       </p:cxnSp>
-      <p:cxnSp>
-        <p:nvCxnSpPr>
-          <p:cNvPr id="75" name="Curved Connector 74">
-            <a:extLst>
-              <a:ext uri="{FF2B5EF4-FFF2-40B4-BE49-F238E27FC236}">
-                <a16:creationId xmlns:a16="http://schemas.microsoft.com/office/drawing/2014/main" id="{AE4D90F0-667F-104D-905C-1D15F671833A}"/>
-              </a:ext>
-            </a:extLst>
-          </p:cNvPr>
-          <p:cNvCxnSpPr>
-            <a:cxnSpLocks/>
-            <a:stCxn id="3" idx="3"/>
-            <a:endCxn id="39" idx="0"/>
-          </p:cNvCxnSpPr>
-          <p:nvPr/>
-        </p:nvCxnSpPr>
-        <p:spPr>
-          <a:xfrm>
-            <a:off x="5515649" y="1402664"/>
-            <a:ext cx="294572" cy="1669393"/>
-          </a:xfrm>
-          <a:prstGeom prst="curvedConnector2">
-            <a:avLst/>
-          </a:prstGeom>
-          <a:ln>
-            <a:solidFill>
-              <a:schemeClr val="tx1"/>
-            </a:solidFill>
-            <a:headEnd type="none" w="med" len="med"/>
-            <a:tailEnd type="arrow" w="med" len="med"/>
-          </a:ln>
-        </p:spPr>
-        <p:style>
-          <a:lnRef idx="1">
-            <a:schemeClr val="accent1"/>
-          </a:lnRef>
-          <a:fillRef idx="0">
-            <a:schemeClr val="accent1"/>
-          </a:fillRef>
-          <a:effectRef idx="0">
-            <a:schemeClr val="accent1"/>
-          </a:effectRef>
-          <a:fontRef idx="minor">
-            <a:schemeClr val="tx1"/>
-          </a:fontRef>
-        </p:style>
-      </p:cxnSp>
-      <p:sp>
-        <p:nvSpPr>
-          <p:cNvPr id="106" name="TextBox 105">
-            <a:extLst>
-              <a:ext uri="{FF2B5EF4-FFF2-40B4-BE49-F238E27FC236}">
-                <a16:creationId xmlns:a16="http://schemas.microsoft.com/office/drawing/2014/main" id="{B9C17BCB-D0D5-A443-BD68-AEECC2B22A0B}"/>
+      <p:sp>
+        <p:nvSpPr>
+          <p:cNvPr id="15" name="TextBox 14">
+            <a:extLst>
+              <a:ext uri="{FF2B5EF4-FFF2-40B4-BE49-F238E27FC236}">
+                <a16:creationId xmlns:a16="http://schemas.microsoft.com/office/drawing/2014/main" id="{B8CC69FE-9ABD-E847-B011-CD6668103D34}"/>
               </a:ext>
             </a:extLst>
           </p:cNvPr>
@@ -10602,13 +11082,15 @@
         </p:nvSpPr>
         <p:spPr>
           <a:xfrm>
-            <a:off x="3205434" y="2117784"/>
+            <a:off x="6368773" y="1071204"/>
             <a:ext cx="728597" cy="276999"/>
           </a:xfrm>
           <a:prstGeom prst="rect">
             <a:avLst/>
           </a:prstGeom>
-          <a:noFill/>
+          <a:solidFill>
+            <a:schemeClr val="bg1"/>
+          </a:solidFill>
         </p:spPr>
         <p:txBody>
           <a:bodyPr wrap="none" rtlCol="0">
@@ -10619,6 +11101,111 @@
             <a:r>
               <a:rPr lang="en-US" sz="1200"/>
               <a:t>resource</a:t>
+            </a:r>
+          </a:p>
+        </p:txBody>
+      </p:sp>
+      <p:sp>
+        <p:nvSpPr>
+          <p:cNvPr id="73" name="TextBox 72">
+            <a:extLst>
+              <a:ext uri="{FF2B5EF4-FFF2-40B4-BE49-F238E27FC236}">
+                <a16:creationId xmlns:a16="http://schemas.microsoft.com/office/drawing/2014/main" id="{35242E26-5E8A-AF48-9165-2B0498D760D7}"/>
+              </a:ext>
+            </a:extLst>
+          </p:cNvPr>
+          <p:cNvSpPr txBox="1"/>
+          <p:nvPr/>
+        </p:nvSpPr>
+        <p:spPr>
+          <a:xfrm>
+            <a:off x="8035906" y="1101620"/>
+            <a:ext cx="728597" cy="276999"/>
+          </a:xfrm>
+          <a:prstGeom prst="rect">
+            <a:avLst/>
+          </a:prstGeom>
+          <a:solidFill>
+            <a:schemeClr val="bg1"/>
+          </a:solidFill>
+        </p:spPr>
+        <p:txBody>
+          <a:bodyPr wrap="none" rtlCol="0">
+            <a:spAutoFit/>
+          </a:bodyPr>
+          <a:lstStyle/>
+          <a:p>
+            <a:r>
+              <a:rPr lang="en-US" sz="1200"/>
+              <a:t>resource</a:t>
+            </a:r>
+          </a:p>
+        </p:txBody>
+      </p:sp>
+      <p:sp>
+        <p:nvSpPr>
+          <p:cNvPr id="3" name="Rounded Rectangle 2">
+            <a:extLst>
+              <a:ext uri="{FF2B5EF4-FFF2-40B4-BE49-F238E27FC236}">
+                <a16:creationId xmlns:a16="http://schemas.microsoft.com/office/drawing/2014/main" id="{36985D6F-F68F-4344-8D44-F1F7C3296165}"/>
+              </a:ext>
+            </a:extLst>
+          </p:cNvPr>
+          <p:cNvSpPr/>
+          <p:nvPr/>
+        </p:nvSpPr>
+        <p:spPr>
+          <a:xfrm>
+            <a:off x="6890376" y="448967"/>
+            <a:ext cx="1248936" cy="657922"/>
+          </a:xfrm>
+          <a:prstGeom prst="roundRect">
+            <a:avLst/>
+          </a:prstGeom>
+          <a:pattFill prst="pct30">
+            <a:fgClr>
+              <a:schemeClr val="bg1">
+                <a:lumMod val="85000"/>
+              </a:schemeClr>
+            </a:fgClr>
+            <a:bgClr>
+              <a:schemeClr val="bg1"/>
+            </a:bgClr>
+          </a:pattFill>
+          <a:ln>
+            <a:solidFill>
+              <a:schemeClr val="tx1"/>
+            </a:solidFill>
+          </a:ln>
+        </p:spPr>
+        <p:style>
+          <a:lnRef idx="2">
+            <a:schemeClr val="accent1">
+              <a:shade val="50000"/>
+            </a:schemeClr>
+          </a:lnRef>
+          <a:fillRef idx="1">
+            <a:schemeClr val="accent1"/>
+          </a:fillRef>
+          <a:effectRef idx="0">
+            <a:schemeClr val="accent1"/>
+          </a:effectRef>
+          <a:fontRef idx="minor">
+            <a:schemeClr val="lt1"/>
+          </a:fontRef>
+        </p:style>
+        <p:txBody>
+          <a:bodyPr rtlCol="0" anchor="ctr"/>
+          <a:lstStyle/>
+          <a:p>
+            <a:pPr algn="ctr"/>
+            <a:r>
+              <a:rPr lang="en-US" sz="1400">
+                <a:solidFill>
+                  <a:schemeClr val="tx1"/>
+                </a:solidFill>
+              </a:rPr>
+              <a:t>GA Profile</a:t>
             </a:r>
           </a:p>
         </p:txBody>

</xml_diff>

<commit_message>
updated ont diagram - prof:resource
</commit_message>
<xml_diff>
--- a/profiledesc/profiledesc-diagrams.pptx
+++ b/profiledesc/profiledesc-diagrams.pptx
@@ -263,7 +263,7 @@
           <a:lstStyle/>
           <a:p>
             <a:fld id="{7E83BB5F-FC7B-E342-A7CB-8A5E9A913100}" type="datetimeFigureOut">
-              <a:t>4/11/18</a:t>
+              <a:t>4/12/18</a:t>
             </a:fld>
             <a:endParaRPr lang="en-US"/>
           </a:p>
@@ -459,7 +459,7 @@
           <a:lstStyle/>
           <a:p>
             <a:fld id="{7E83BB5F-FC7B-E342-A7CB-8A5E9A913100}" type="datetimeFigureOut">
-              <a:t>4/11/18</a:t>
+              <a:t>4/12/18</a:t>
             </a:fld>
             <a:endParaRPr lang="en-US"/>
           </a:p>
@@ -665,7 +665,7 @@
           <a:lstStyle/>
           <a:p>
             <a:fld id="{7E83BB5F-FC7B-E342-A7CB-8A5E9A913100}" type="datetimeFigureOut">
-              <a:t>4/11/18</a:t>
+              <a:t>4/12/18</a:t>
             </a:fld>
             <a:endParaRPr lang="en-US"/>
           </a:p>
@@ -861,7 +861,7 @@
           <a:lstStyle/>
           <a:p>
             <a:fld id="{7E83BB5F-FC7B-E342-A7CB-8A5E9A913100}" type="datetimeFigureOut">
-              <a:t>4/11/18</a:t>
+              <a:t>4/12/18</a:t>
             </a:fld>
             <a:endParaRPr lang="en-US"/>
           </a:p>
@@ -1134,7 +1134,7 @@
           <a:lstStyle/>
           <a:p>
             <a:fld id="{7E83BB5F-FC7B-E342-A7CB-8A5E9A913100}" type="datetimeFigureOut">
-              <a:t>4/11/18</a:t>
+              <a:t>4/12/18</a:t>
             </a:fld>
             <a:endParaRPr lang="en-US"/>
           </a:p>
@@ -1397,7 +1397,7 @@
           <a:lstStyle/>
           <a:p>
             <a:fld id="{7E83BB5F-FC7B-E342-A7CB-8A5E9A913100}" type="datetimeFigureOut">
-              <a:t>4/11/18</a:t>
+              <a:t>4/12/18</a:t>
             </a:fld>
             <a:endParaRPr lang="en-US"/>
           </a:p>
@@ -1807,7 +1807,7 @@
           <a:lstStyle/>
           <a:p>
             <a:fld id="{7E83BB5F-FC7B-E342-A7CB-8A5E9A913100}" type="datetimeFigureOut">
-              <a:t>4/11/18</a:t>
+              <a:t>4/12/18</a:t>
             </a:fld>
             <a:endParaRPr lang="en-US"/>
           </a:p>
@@ -1946,7 +1946,7 @@
           <a:lstStyle/>
           <a:p>
             <a:fld id="{7E83BB5F-FC7B-E342-A7CB-8A5E9A913100}" type="datetimeFigureOut">
-              <a:t>4/11/18</a:t>
+              <a:t>4/12/18</a:t>
             </a:fld>
             <a:endParaRPr lang="en-US"/>
           </a:p>
@@ -2057,7 +2057,7 @@
           <a:lstStyle/>
           <a:p>
             <a:fld id="{7E83BB5F-FC7B-E342-A7CB-8A5E9A913100}" type="datetimeFigureOut">
-              <a:t>4/11/18</a:t>
+              <a:t>4/12/18</a:t>
             </a:fld>
             <a:endParaRPr lang="en-US"/>
           </a:p>
@@ -2366,7 +2366,7 @@
           <a:lstStyle/>
           <a:p>
             <a:fld id="{7E83BB5F-FC7B-E342-A7CB-8A5E9A913100}" type="datetimeFigureOut">
-              <a:t>4/11/18</a:t>
+              <a:t>4/12/18</a:t>
             </a:fld>
             <a:endParaRPr lang="en-US"/>
           </a:p>
@@ -2652,7 +2652,7 @@
           <a:lstStyle/>
           <a:p>
             <a:fld id="{7E83BB5F-FC7B-E342-A7CB-8A5E9A913100}" type="datetimeFigureOut">
-              <a:t>4/11/18</a:t>
+              <a:t>4/12/18</a:t>
             </a:fld>
             <a:endParaRPr lang="en-US"/>
           </a:p>
@@ -2891,7 +2891,7 @@
           </a:lstStyle>
           <a:p>
             <a:fld id="{7E83BB5F-FC7B-E342-A7CB-8A5E9A913100}" type="datetimeFigureOut">
-              <a:t>4/11/18</a:t>
+              <a:t>4/12/18</a:t>
             </a:fld>
             <a:endParaRPr lang="en-US"/>
           </a:p>
@@ -4776,6 +4776,91 @@
           </a:p>
         </p:txBody>
       </p:sp>
+      <p:cxnSp>
+        <p:nvCxnSpPr>
+          <p:cNvPr id="32" name="Curved Connector 31">
+            <a:extLst>
+              <a:ext uri="{FF2B5EF4-FFF2-40B4-BE49-F238E27FC236}">
+                <a16:creationId xmlns:a16="http://schemas.microsoft.com/office/drawing/2014/main" id="{AF5BB75F-BF34-714F-933A-F464250E119A}"/>
+              </a:ext>
+            </a:extLst>
+          </p:cNvPr>
+          <p:cNvCxnSpPr>
+            <a:cxnSpLocks/>
+            <a:endCxn id="38" idx="1"/>
+          </p:cNvCxnSpPr>
+          <p:nvPr/>
+        </p:nvCxnSpPr>
+        <p:spPr>
+          <a:xfrm>
+            <a:off x="5321809" y="4617791"/>
+            <a:ext cx="1487979" cy="886441"/>
+          </a:xfrm>
+          <a:prstGeom prst="curvedConnector3">
+            <a:avLst>
+              <a:gd name="adj1" fmla="val 50000"/>
+            </a:avLst>
+          </a:prstGeom>
+          <a:ln>
+            <a:solidFill>
+              <a:schemeClr val="tx1"/>
+            </a:solidFill>
+            <a:headEnd type="none" w="med" len="med"/>
+            <a:tailEnd type="arrow" w="med" len="med"/>
+          </a:ln>
+        </p:spPr>
+        <p:style>
+          <a:lnRef idx="1">
+            <a:schemeClr val="accent1"/>
+          </a:lnRef>
+          <a:fillRef idx="0">
+            <a:schemeClr val="accent1"/>
+          </a:fillRef>
+          <a:effectRef idx="0">
+            <a:schemeClr val="accent1"/>
+          </a:effectRef>
+          <a:fontRef idx="minor">
+            <a:schemeClr val="tx1"/>
+          </a:fontRef>
+        </p:style>
+      </p:cxnSp>
+      <p:sp>
+        <p:nvSpPr>
+          <p:cNvPr id="36" name="TextBox 35">
+            <a:extLst>
+              <a:ext uri="{FF2B5EF4-FFF2-40B4-BE49-F238E27FC236}">
+                <a16:creationId xmlns:a16="http://schemas.microsoft.com/office/drawing/2014/main" id="{2439A7AD-5BC1-1140-9CFD-EB5B337D12EB}"/>
+              </a:ext>
+            </a:extLst>
+          </p:cNvPr>
+          <p:cNvSpPr txBox="1"/>
+          <p:nvPr/>
+        </p:nvSpPr>
+        <p:spPr>
+          <a:xfrm>
+            <a:off x="5692128" y="5098284"/>
+            <a:ext cx="728597" cy="276999"/>
+          </a:xfrm>
+          <a:prstGeom prst="rect">
+            <a:avLst/>
+          </a:prstGeom>
+          <a:solidFill>
+            <a:schemeClr val="bg1"/>
+          </a:solidFill>
+        </p:spPr>
+        <p:txBody>
+          <a:bodyPr wrap="none" rtlCol="0">
+            <a:spAutoFit/>
+          </a:bodyPr>
+          <a:lstStyle/>
+          <a:p>
+            <a:r>
+              <a:rPr lang="en-US" sz="1200"/>
+              <a:t>resuorce</a:t>
+            </a:r>
+          </a:p>
+        </p:txBody>
+      </p:sp>
     </p:spTree>
     <p:extLst>
       <p:ext uri="{BB962C8B-B14F-4D97-AF65-F5344CB8AC3E}">

</xml_diff>

<commit_message>
resourceType -> conformsTo & ImpleDescType -> ImpleDescRole in all diags
</commit_message>
<xml_diff>
--- a/profiledesc/profiledesc-diagrams.pptx
+++ b/profiledesc/profiledesc-diagrams.pptx
@@ -10,7 +10,6 @@
     <p:sldId id="259" r:id="rId4"/>
     <p:sldId id="262" r:id="rId5"/>
     <p:sldId id="260" r:id="rId6"/>
-    <p:sldId id="261" r:id="rId7"/>
   </p:sldIdLst>
   <p:sldSz cx="12192000" cy="6858000"/>
   <p:notesSz cx="6858000" cy="9144000"/>
@@ -263,7 +262,7 @@
           <a:lstStyle/>
           <a:p>
             <a:fld id="{7E83BB5F-FC7B-E342-A7CB-8A5E9A913100}" type="datetimeFigureOut">
-              <a:t>4/12/18</a:t>
+              <a:t>4/17/18</a:t>
             </a:fld>
             <a:endParaRPr lang="en-US"/>
           </a:p>
@@ -459,7 +458,7 @@
           <a:lstStyle/>
           <a:p>
             <a:fld id="{7E83BB5F-FC7B-E342-A7CB-8A5E9A913100}" type="datetimeFigureOut">
-              <a:t>4/12/18</a:t>
+              <a:t>4/17/18</a:t>
             </a:fld>
             <a:endParaRPr lang="en-US"/>
           </a:p>
@@ -665,7 +664,7 @@
           <a:lstStyle/>
           <a:p>
             <a:fld id="{7E83BB5F-FC7B-E342-A7CB-8A5E9A913100}" type="datetimeFigureOut">
-              <a:t>4/12/18</a:t>
+              <a:t>4/17/18</a:t>
             </a:fld>
             <a:endParaRPr lang="en-US"/>
           </a:p>
@@ -861,7 +860,7 @@
           <a:lstStyle/>
           <a:p>
             <a:fld id="{7E83BB5F-FC7B-E342-A7CB-8A5E9A913100}" type="datetimeFigureOut">
-              <a:t>4/12/18</a:t>
+              <a:t>4/17/18</a:t>
             </a:fld>
             <a:endParaRPr lang="en-US"/>
           </a:p>
@@ -1134,7 +1133,7 @@
           <a:lstStyle/>
           <a:p>
             <a:fld id="{7E83BB5F-FC7B-E342-A7CB-8A5E9A913100}" type="datetimeFigureOut">
-              <a:t>4/12/18</a:t>
+              <a:t>4/17/18</a:t>
             </a:fld>
             <a:endParaRPr lang="en-US"/>
           </a:p>
@@ -1397,7 +1396,7 @@
           <a:lstStyle/>
           <a:p>
             <a:fld id="{7E83BB5F-FC7B-E342-A7CB-8A5E9A913100}" type="datetimeFigureOut">
-              <a:t>4/12/18</a:t>
+              <a:t>4/17/18</a:t>
             </a:fld>
             <a:endParaRPr lang="en-US"/>
           </a:p>
@@ -1807,7 +1806,7 @@
           <a:lstStyle/>
           <a:p>
             <a:fld id="{7E83BB5F-FC7B-E342-A7CB-8A5E9A913100}" type="datetimeFigureOut">
-              <a:t>4/12/18</a:t>
+              <a:t>4/17/18</a:t>
             </a:fld>
             <a:endParaRPr lang="en-US"/>
           </a:p>
@@ -1946,7 +1945,7 @@
           <a:lstStyle/>
           <a:p>
             <a:fld id="{7E83BB5F-FC7B-E342-A7CB-8A5E9A913100}" type="datetimeFigureOut">
-              <a:t>4/12/18</a:t>
+              <a:t>4/17/18</a:t>
             </a:fld>
             <a:endParaRPr lang="en-US"/>
           </a:p>
@@ -2057,7 +2056,7 @@
           <a:lstStyle/>
           <a:p>
             <a:fld id="{7E83BB5F-FC7B-E342-A7CB-8A5E9A913100}" type="datetimeFigureOut">
-              <a:t>4/12/18</a:t>
+              <a:t>4/17/18</a:t>
             </a:fld>
             <a:endParaRPr lang="en-US"/>
           </a:p>
@@ -2366,7 +2365,7 @@
           <a:lstStyle/>
           <a:p>
             <a:fld id="{7E83BB5F-FC7B-E342-A7CB-8A5E9A913100}" type="datetimeFigureOut">
-              <a:t>4/12/18</a:t>
+              <a:t>4/17/18</a:t>
             </a:fld>
             <a:endParaRPr lang="en-US"/>
           </a:p>
@@ -2652,7 +2651,7 @@
           <a:lstStyle/>
           <a:p>
             <a:fld id="{7E83BB5F-FC7B-E342-A7CB-8A5E9A913100}" type="datetimeFigureOut">
-              <a:t>4/12/18</a:t>
+              <a:t>4/17/18</a:t>
             </a:fld>
             <a:endParaRPr lang="en-US"/>
           </a:p>
@@ -2891,7 +2890,7 @@
           </a:lstStyle>
           <a:p>
             <a:fld id="{7E83BB5F-FC7B-E342-A7CB-8A5E9A913100}" type="datetimeFigureOut">
-              <a:t>4/12/18</a:t>
+              <a:t>4/17/18</a:t>
             </a:fld>
             <a:endParaRPr lang="en-US"/>
           </a:p>
@@ -3354,14 +3353,14 @@
           <p:cNvCxnSpPr>
             <a:cxnSpLocks/>
             <a:stCxn id="38" idx="0"/>
-            <a:endCxn id="176" idx="1"/>
+            <a:endCxn id="39" idx="2"/>
           </p:cNvCxnSpPr>
           <p:nvPr/>
         </p:nvCxnSpPr>
         <p:spPr>
-          <a:xfrm flipV="1">
-            <a:off x="7434256" y="4455504"/>
-            <a:ext cx="1869069" cy="719767"/>
+          <a:xfrm flipH="1" flipV="1">
+            <a:off x="7757577" y="4489713"/>
+            <a:ext cx="1150932" cy="1487733"/>
           </a:xfrm>
           <a:prstGeom prst="straightConnector1">
             <a:avLst/>
@@ -3403,7 +3402,7 @@
         </p:nvSpPr>
         <p:spPr>
           <a:xfrm>
-            <a:off x="6202636" y="4821285"/>
+            <a:off x="9086840" y="5687718"/>
             <a:ext cx="1231619" cy="276999"/>
           </a:xfrm>
           <a:prstGeom prst="rect">
@@ -3437,14 +3436,15 @@
           </p:cNvPr>
           <p:cNvCxnSpPr>
             <a:cxnSpLocks/>
+            <a:stCxn id="20" idx="2"/>
             <a:endCxn id="43" idx="0"/>
           </p:cNvCxnSpPr>
           <p:nvPr/>
         </p:nvCxnSpPr>
         <p:spPr>
           <a:xfrm>
-            <a:off x="4811300" y="4776485"/>
-            <a:ext cx="0" cy="520574"/>
+            <a:off x="6177401" y="5578660"/>
+            <a:ext cx="0" cy="398786"/>
           </a:xfrm>
           <a:prstGeom prst="straightConnector1">
             <a:avLst/>
@@ -3472,65 +3472,6 @@
           </a:fontRef>
         </p:style>
       </p:cxnSp>
-      <p:sp>
-        <p:nvSpPr>
-          <p:cNvPr id="38" name="Rounded Rectangle 37">
-            <a:extLst>
-              <a:ext uri="{FF2B5EF4-FFF2-40B4-BE49-F238E27FC236}">
-                <a16:creationId xmlns:a16="http://schemas.microsoft.com/office/drawing/2014/main" id="{CCC82891-D0BF-D146-AEBF-E5C054C9F416}"/>
-              </a:ext>
-            </a:extLst>
-          </p:cNvPr>
-          <p:cNvSpPr/>
-          <p:nvPr/>
-        </p:nvSpPr>
-        <p:spPr>
-          <a:xfrm>
-            <a:off x="6809788" y="5175271"/>
-            <a:ext cx="1248936" cy="657922"/>
-          </a:xfrm>
-          <a:prstGeom prst="roundRect">
-            <a:avLst/>
-          </a:prstGeom>
-          <a:noFill/>
-          <a:ln>
-            <a:solidFill>
-              <a:schemeClr val="tx1"/>
-            </a:solidFill>
-          </a:ln>
-        </p:spPr>
-        <p:style>
-          <a:lnRef idx="2">
-            <a:schemeClr val="accent1">
-              <a:shade val="50000"/>
-            </a:schemeClr>
-          </a:lnRef>
-          <a:fillRef idx="1">
-            <a:schemeClr val="accent1"/>
-          </a:fillRef>
-          <a:effectRef idx="0">
-            <a:schemeClr val="accent1"/>
-          </a:effectRef>
-          <a:fontRef idx="minor">
-            <a:schemeClr val="lt1"/>
-          </a:fontRef>
-        </p:style>
-        <p:txBody>
-          <a:bodyPr rtlCol="0" anchor="ctr"/>
-          <a:lstStyle/>
-          <a:p>
-            <a:pPr algn="ctr"/>
-            <a:r>
-              <a:rPr lang="en-US" sz="1200">
-                <a:solidFill>
-                  <a:schemeClr val="tx1"/>
-                </a:solidFill>
-              </a:rPr>
-              <a:t>Implementation Resource Descriptor</a:t>
-            </a:r>
-          </a:p>
-        </p:txBody>
-      </p:sp>
       <p:cxnSp>
         <p:nvCxnSpPr>
           <p:cNvPr id="40" name="Straight Arrow Connector 39">
@@ -3549,7 +3490,7 @@
         </p:nvCxnSpPr>
         <p:spPr>
           <a:xfrm>
-            <a:off x="3505351" y="4442779"/>
+            <a:off x="4979604" y="5244954"/>
             <a:ext cx="573329" cy="4745"/>
           </a:xfrm>
           <a:prstGeom prst="straightConnector1">
@@ -3593,8 +3534,8 @@
         </p:nvSpPr>
         <p:spPr>
           <a:xfrm>
-            <a:off x="8074075" y="4617791"/>
-            <a:ext cx="1209562" cy="276999"/>
+            <a:off x="7469625" y="4980680"/>
+            <a:ext cx="1122615" cy="276999"/>
           </a:xfrm>
           <a:prstGeom prst="rect">
             <a:avLst/>
@@ -3611,7 +3552,7 @@
           <a:p>
             <a:r>
               <a:rPr lang="en-US" sz="1200"/>
-              <a:t>resourceRole [1]</a:t>
+              <a:t>conformsTo [1]</a:t>
             </a:r>
           </a:p>
         </p:txBody>
@@ -3630,7 +3571,7 @@
         </p:nvSpPr>
         <p:spPr>
           <a:xfrm>
-            <a:off x="3304406" y="4727644"/>
+            <a:off x="4778659" y="5529819"/>
             <a:ext cx="946798" cy="276999"/>
           </a:xfrm>
           <a:prstGeom prst="rect">
@@ -3667,7 +3608,7 @@
         </p:nvSpPr>
         <p:spPr>
           <a:xfrm>
-            <a:off x="4782879" y="4898272"/>
+            <a:off x="6257132" y="5700447"/>
             <a:ext cx="538930" cy="276999"/>
           </a:xfrm>
           <a:prstGeom prst="rect">
@@ -3706,7 +3647,7 @@
         </p:nvCxnSpPr>
         <p:spPr>
           <a:xfrm rot="16200000" flipH="1">
-            <a:off x="3789643" y="3862979"/>
+            <a:off x="5263896" y="4665154"/>
             <a:ext cx="4745" cy="1822265"/>
           </a:xfrm>
           <a:prstGeom prst="curvedConnector3">
@@ -3751,7 +3692,7 @@
         </p:nvSpPr>
         <p:spPr>
           <a:xfrm>
-            <a:off x="4186832" y="5297059"/>
+            <a:off x="5552933" y="5977446"/>
             <a:ext cx="1248936" cy="657922"/>
           </a:xfrm>
           <a:prstGeom prst="roundRect">
@@ -3810,7 +3751,7 @@
         </p:nvSpPr>
         <p:spPr>
           <a:xfrm>
-            <a:off x="6809788" y="4111402"/>
+            <a:off x="8730178" y="4924043"/>
             <a:ext cx="1248936" cy="657922"/>
           </a:xfrm>
           <a:prstGeom prst="roundRect">
@@ -3899,7 +3840,7 @@
         </p:nvSpPr>
         <p:spPr>
           <a:xfrm>
-            <a:off x="2256415" y="4113818"/>
+            <a:off x="3730668" y="4915993"/>
             <a:ext cx="1248936" cy="657922"/>
           </a:xfrm>
           <a:prstGeom prst="roundRect">
@@ -3958,7 +3899,7 @@
         </p:nvSpPr>
         <p:spPr>
           <a:xfrm>
-            <a:off x="4078680" y="4118563"/>
+            <a:off x="5552933" y="4920738"/>
             <a:ext cx="1248936" cy="657922"/>
           </a:xfrm>
           <a:prstGeom prst="roundRect">
@@ -4015,19 +3956,18 @@
           <p:cNvCxnSpPr>
             <a:cxnSpLocks/>
             <a:stCxn id="20" idx="0"/>
-            <a:endCxn id="20" idx="3"/>
           </p:cNvCxnSpPr>
           <p:nvPr/>
         </p:nvCxnSpPr>
         <p:spPr>
-          <a:xfrm rot="16200000" flipH="1">
-            <a:off x="4850901" y="3970809"/>
-            <a:ext cx="328961" cy="624468"/>
+          <a:xfrm rot="16200000" flipH="1" flipV="1">
+            <a:off x="5779912" y="4687951"/>
+            <a:ext cx="164703" cy="630275"/>
           </a:xfrm>
           <a:prstGeom prst="curvedConnector4">
             <a:avLst>
-              <a:gd name="adj1" fmla="val -69492"/>
-              <a:gd name="adj2" fmla="val 136607"/>
+              <a:gd name="adj1" fmla="val -238525"/>
+              <a:gd name="adj2" fmla="val 136270"/>
             </a:avLst>
           </a:prstGeom>
           <a:ln>
@@ -4067,7 +4007,7 @@
         </p:nvSpPr>
         <p:spPr>
           <a:xfrm>
-            <a:off x="4311890" y="3569492"/>
+            <a:off x="4786603" y="4278288"/>
             <a:ext cx="1639231" cy="276999"/>
           </a:xfrm>
           <a:prstGeom prst="rect">
@@ -4102,7 +4042,7 @@
         </p:nvSpPr>
         <p:spPr>
           <a:xfrm>
-            <a:off x="9303325" y="4126543"/>
+            <a:off x="10777578" y="4928718"/>
             <a:ext cx="1248936" cy="657922"/>
           </a:xfrm>
           <a:prstGeom prst="roundRect">
@@ -4165,8 +4105,8 @@
         </p:nvCxnSpPr>
         <p:spPr>
           <a:xfrm flipV="1">
-            <a:off x="7434256" y="4769324"/>
-            <a:ext cx="0" cy="405947"/>
+            <a:off x="8908509" y="5581965"/>
+            <a:ext cx="446137" cy="395481"/>
           </a:xfrm>
           <a:prstGeom prst="straightConnector1">
             <a:avLst/>
@@ -4208,7 +4148,7 @@
         </p:nvSpPr>
         <p:spPr>
           <a:xfrm>
-            <a:off x="9283637" y="5833193"/>
+            <a:off x="10777578" y="5977446"/>
             <a:ext cx="1248936" cy="657922"/>
           </a:xfrm>
           <a:prstGeom prst="roundRect">
@@ -4248,7 +4188,7 @@
                   <a:schemeClr val="tx1"/>
                 </a:solidFill>
               </a:rPr>
-              <a:t>Implementation Resource Type</a:t>
+              <a:t>Implementation Resource Role</a:t>
             </a:r>
           </a:p>
         </p:txBody>
@@ -4265,17 +4205,19 @@
           <p:cNvCxnSpPr>
             <a:cxnSpLocks/>
             <a:stCxn id="38" idx="3"/>
-            <a:endCxn id="176" idx="2"/>
+            <a:endCxn id="176" idx="1"/>
           </p:cNvCxnSpPr>
           <p:nvPr/>
         </p:nvCxnSpPr>
         <p:spPr>
           <a:xfrm flipV="1">
-            <a:off x="8058724" y="4784465"/>
-            <a:ext cx="1869069" cy="719767"/>
-          </a:xfrm>
-          <a:prstGeom prst="curvedConnector2">
-            <a:avLst/>
+            <a:off x="9532977" y="5257679"/>
+            <a:ext cx="1244601" cy="1048728"/>
+          </a:xfrm>
+          <a:prstGeom prst="curvedConnector3">
+            <a:avLst>
+              <a:gd name="adj1" fmla="val 72473"/>
+            </a:avLst>
           </a:prstGeom>
           <a:ln>
             <a:solidFill>
@@ -4314,8 +4256,8 @@
         </p:nvSpPr>
         <p:spPr>
           <a:xfrm>
-            <a:off x="8287749" y="5232876"/>
-            <a:ext cx="1229760" cy="276999"/>
+            <a:off x="9484138" y="5982868"/>
+            <a:ext cx="1209562" cy="276999"/>
           </a:xfrm>
           <a:prstGeom prst="rect">
             <a:avLst/>
@@ -4332,7 +4274,7 @@
           <a:p>
             <a:r>
               <a:rPr lang="en-US" sz="1200"/>
-              <a:t>resourceType [1]</a:t>
+              <a:t>resourceRole [1]</a:t>
             </a:r>
           </a:p>
         </p:txBody>
@@ -4355,8 +4297,8 @@
         </p:nvCxnSpPr>
         <p:spPr>
           <a:xfrm flipV="1">
-            <a:off x="9908105" y="4784465"/>
-            <a:ext cx="19688" cy="1048728"/>
+            <a:off x="11402046" y="5586640"/>
+            <a:ext cx="0" cy="390806"/>
           </a:xfrm>
           <a:prstGeom prst="straightConnector1">
             <a:avLst/>
@@ -4399,7 +4341,7 @@
         </p:nvSpPr>
         <p:spPr>
           <a:xfrm>
-            <a:off x="136768" y="6099234"/>
+            <a:off x="127066" y="5514727"/>
             <a:ext cx="1248936" cy="657922"/>
           </a:xfrm>
           <a:prstGeom prst="roundRect">
@@ -4484,7 +4426,7 @@
         </p:nvCxnSpPr>
         <p:spPr>
           <a:xfrm flipV="1">
-            <a:off x="1619639" y="5409445"/>
+            <a:off x="1609937" y="4824938"/>
             <a:ext cx="0" cy="423748"/>
           </a:xfrm>
           <a:prstGeom prst="straightConnector1">
@@ -4528,7 +4470,7 @@
         </p:nvSpPr>
         <p:spPr>
           <a:xfrm>
-            <a:off x="1655804" y="5482819"/>
+            <a:off x="1646102" y="4898312"/>
             <a:ext cx="681084" cy="276999"/>
           </a:xfrm>
           <a:prstGeom prst="rect">
@@ -4567,7 +4509,7 @@
         </p:nvCxnSpPr>
         <p:spPr>
           <a:xfrm flipV="1">
-            <a:off x="1613521" y="6201207"/>
+            <a:off x="1603819" y="5616700"/>
             <a:ext cx="0" cy="423747"/>
           </a:xfrm>
           <a:prstGeom prst="straightConnector1">
@@ -4611,7 +4553,7 @@
         </p:nvSpPr>
         <p:spPr>
           <a:xfrm>
-            <a:off x="1655804" y="6274580"/>
+            <a:off x="1646102" y="5690073"/>
             <a:ext cx="1145506" cy="276999"/>
           </a:xfrm>
           <a:prstGeom prst="rect">
@@ -4648,7 +4590,7 @@
         </p:nvSpPr>
         <p:spPr>
           <a:xfrm>
-            <a:off x="141488" y="5316919"/>
+            <a:off x="131786" y="4732412"/>
             <a:ext cx="1248936" cy="657922"/>
           </a:xfrm>
           <a:prstGeom prst="roundRect">
@@ -4709,7 +4651,7 @@
         </p:nvCxnSpPr>
         <p:spPr>
           <a:xfrm flipV="1">
-            <a:off x="2548998" y="5409445"/>
+            <a:off x="2539296" y="4824938"/>
             <a:ext cx="0" cy="423748"/>
           </a:xfrm>
           <a:prstGeom prst="straightConnector1">
@@ -4753,7 +4695,7 @@
         </p:nvSpPr>
         <p:spPr>
           <a:xfrm>
-            <a:off x="2585163" y="5482819"/>
+            <a:off x="2575461" y="4898312"/>
             <a:ext cx="727187" cy="276999"/>
           </a:xfrm>
           <a:prstGeom prst="rect">
@@ -4793,7 +4735,7 @@
         </p:nvCxnSpPr>
         <p:spPr>
           <a:xfrm>
-            <a:off x="5321809" y="4617791"/>
+            <a:off x="6796062" y="5419966"/>
             <a:ext cx="1487979" cy="886441"/>
           </a:xfrm>
           <a:prstGeom prst="curvedConnector3">
@@ -4838,7 +4780,7 @@
         </p:nvSpPr>
         <p:spPr>
           <a:xfrm>
-            <a:off x="5692128" y="5098284"/>
+            <a:off x="7166381" y="5900459"/>
             <a:ext cx="728597" cy="276999"/>
           </a:xfrm>
           <a:prstGeom prst="rect">
@@ -4857,6 +4799,207 @@
             <a:r>
               <a:rPr lang="en-US" sz="1200"/>
               <a:t>resource</a:t>
+            </a:r>
+          </a:p>
+        </p:txBody>
+      </p:sp>
+      <p:sp>
+        <p:nvSpPr>
+          <p:cNvPr id="39" name="Rounded Rectangle 38">
+            <a:extLst>
+              <a:ext uri="{FF2B5EF4-FFF2-40B4-BE49-F238E27FC236}">
+                <a16:creationId xmlns:a16="http://schemas.microsoft.com/office/drawing/2014/main" id="{DD6EDC67-B5DE-AC46-A07F-F822D9D62C38}"/>
+              </a:ext>
+            </a:extLst>
+          </p:cNvPr>
+          <p:cNvSpPr/>
+          <p:nvPr/>
+        </p:nvSpPr>
+        <p:spPr>
+          <a:xfrm>
+            <a:off x="7133109" y="3831791"/>
+            <a:ext cx="1248936" cy="657922"/>
+          </a:xfrm>
+          <a:prstGeom prst="roundRect">
+            <a:avLst/>
+          </a:prstGeom>
+          <a:noFill/>
+          <a:ln>
+            <a:solidFill>
+              <a:schemeClr val="tx1"/>
+            </a:solidFill>
+          </a:ln>
+        </p:spPr>
+        <p:style>
+          <a:lnRef idx="2">
+            <a:schemeClr val="accent1">
+              <a:shade val="50000"/>
+            </a:schemeClr>
+          </a:lnRef>
+          <a:fillRef idx="1">
+            <a:schemeClr val="accent1"/>
+          </a:fillRef>
+          <a:effectRef idx="0">
+            <a:schemeClr val="accent1"/>
+          </a:effectRef>
+          <a:fontRef idx="minor">
+            <a:schemeClr val="lt1"/>
+          </a:fontRef>
+        </p:style>
+        <p:txBody>
+          <a:bodyPr rtlCol="0" anchor="ctr"/>
+          <a:lstStyle/>
+          <a:p>
+            <a:pPr algn="ctr"/>
+            <a:r>
+              <a:rPr lang="en-US" sz="1400">
+                <a:solidFill>
+                  <a:schemeClr val="tx1"/>
+                </a:solidFill>
+              </a:rPr>
+              <a:t>dct:Standard</a:t>
+            </a:r>
+          </a:p>
+        </p:txBody>
+      </p:sp>
+      <p:cxnSp>
+        <p:nvCxnSpPr>
+          <p:cNvPr id="41" name="Straight Arrow Connector 40">
+            <a:extLst>
+              <a:ext uri="{FF2B5EF4-FFF2-40B4-BE49-F238E27FC236}">
+                <a16:creationId xmlns:a16="http://schemas.microsoft.com/office/drawing/2014/main" id="{0DCAE6EE-1481-C94A-B7BB-0AB671CC2589}"/>
+              </a:ext>
+            </a:extLst>
+          </p:cNvPr>
+          <p:cNvCxnSpPr>
+            <a:cxnSpLocks/>
+            <a:stCxn id="20" idx="3"/>
+            <a:endCxn id="39" idx="2"/>
+          </p:cNvCxnSpPr>
+          <p:nvPr/>
+        </p:nvCxnSpPr>
+        <p:spPr>
+          <a:xfrm flipV="1">
+            <a:off x="6801869" y="4489713"/>
+            <a:ext cx="955708" cy="759986"/>
+          </a:xfrm>
+          <a:prstGeom prst="straightConnector1">
+            <a:avLst/>
+          </a:prstGeom>
+          <a:ln>
+            <a:solidFill>
+              <a:schemeClr val="tx1"/>
+            </a:solidFill>
+            <a:prstDash val="dash"/>
+            <a:headEnd type="none" w="med" len="med"/>
+            <a:tailEnd type="arrow" w="med" len="med"/>
+          </a:ln>
+        </p:spPr>
+        <p:style>
+          <a:lnRef idx="1">
+            <a:schemeClr val="accent1"/>
+          </a:lnRef>
+          <a:fillRef idx="0">
+            <a:schemeClr val="accent1"/>
+          </a:fillRef>
+          <a:effectRef idx="0">
+            <a:schemeClr val="accent1"/>
+          </a:effectRef>
+          <a:fontRef idx="minor">
+            <a:schemeClr val="tx1"/>
+          </a:fontRef>
+        </p:style>
+      </p:cxnSp>
+      <p:sp>
+        <p:nvSpPr>
+          <p:cNvPr id="38" name="Rounded Rectangle 37">
+            <a:extLst>
+              <a:ext uri="{FF2B5EF4-FFF2-40B4-BE49-F238E27FC236}">
+                <a16:creationId xmlns:a16="http://schemas.microsoft.com/office/drawing/2014/main" id="{CCC82891-D0BF-D146-AEBF-E5C054C9F416}"/>
+              </a:ext>
+            </a:extLst>
+          </p:cNvPr>
+          <p:cNvSpPr/>
+          <p:nvPr/>
+        </p:nvSpPr>
+        <p:spPr>
+          <a:xfrm>
+            <a:off x="8284041" y="5977446"/>
+            <a:ext cx="1248936" cy="657922"/>
+          </a:xfrm>
+          <a:prstGeom prst="roundRect">
+            <a:avLst/>
+          </a:prstGeom>
+          <a:noFill/>
+          <a:ln>
+            <a:solidFill>
+              <a:schemeClr val="tx1"/>
+            </a:solidFill>
+          </a:ln>
+        </p:spPr>
+        <p:style>
+          <a:lnRef idx="2">
+            <a:schemeClr val="accent1">
+              <a:shade val="50000"/>
+            </a:schemeClr>
+          </a:lnRef>
+          <a:fillRef idx="1">
+            <a:schemeClr val="accent1"/>
+          </a:fillRef>
+          <a:effectRef idx="0">
+            <a:schemeClr val="accent1"/>
+          </a:effectRef>
+          <a:fontRef idx="minor">
+            <a:schemeClr val="lt1"/>
+          </a:fontRef>
+        </p:style>
+        <p:txBody>
+          <a:bodyPr rtlCol="0" anchor="ctr"/>
+          <a:lstStyle/>
+          <a:p>
+            <a:pPr algn="ctr"/>
+            <a:r>
+              <a:rPr lang="en-US" sz="1200">
+                <a:solidFill>
+                  <a:schemeClr val="tx1"/>
+                </a:solidFill>
+              </a:rPr>
+              <a:t>Implementation Resource Descriptor</a:t>
+            </a:r>
+          </a:p>
+        </p:txBody>
+      </p:sp>
+      <p:sp>
+        <p:nvSpPr>
+          <p:cNvPr id="48" name="TextBox 47">
+            <a:extLst>
+              <a:ext uri="{FF2B5EF4-FFF2-40B4-BE49-F238E27FC236}">
+                <a16:creationId xmlns:a16="http://schemas.microsoft.com/office/drawing/2014/main" id="{BB232CB9-2245-A443-8CFB-F5E91477C0A1}"/>
+              </a:ext>
+            </a:extLst>
+          </p:cNvPr>
+          <p:cNvSpPr txBox="1"/>
+          <p:nvPr/>
+        </p:nvSpPr>
+        <p:spPr>
+          <a:xfrm>
+            <a:off x="1019293" y="4321143"/>
+            <a:ext cx="1090683" cy="307777"/>
+          </a:xfrm>
+          <a:prstGeom prst="rect">
+            <a:avLst/>
+          </a:prstGeom>
+          <a:noFill/>
+        </p:spPr>
+        <p:txBody>
+          <a:bodyPr wrap="none" rtlCol="0">
+            <a:spAutoFit/>
+          </a:bodyPr>
+          <a:lstStyle/>
+          <a:p>
+            <a:r>
+              <a:rPr lang="en-US" sz="1400" u="sng"/>
+              <a:t>Element Key</a:t>
             </a:r>
           </a:p>
         </p:txBody>
@@ -4980,7 +5123,7 @@
                   <a:schemeClr val="tx1"/>
                 </a:solidFill>
               </a:rPr>
-              <a:t>Implementation Resource Type</a:t>
+              <a:t>Implementation Resource Role</a:t>
             </a:r>
           </a:p>
         </p:txBody>
@@ -7290,112 +7433,6 @@
       </p:cxnSp>
       <p:sp>
         <p:nvSpPr>
-          <p:cNvPr id="31" name="Rounded Rectangle 30">
-            <a:extLst>
-              <a:ext uri="{FF2B5EF4-FFF2-40B4-BE49-F238E27FC236}">
-                <a16:creationId xmlns:a16="http://schemas.microsoft.com/office/drawing/2014/main" id="{2675A3C2-16A3-7348-90E7-B84C6B456E80}"/>
-              </a:ext>
-            </a:extLst>
-          </p:cNvPr>
-          <p:cNvSpPr/>
-          <p:nvPr/>
-        </p:nvSpPr>
-        <p:spPr>
-          <a:xfrm>
-            <a:off x="3722840" y="6095653"/>
-            <a:ext cx="1248936" cy="657922"/>
-          </a:xfrm>
-          <a:prstGeom prst="roundRect">
-            <a:avLst/>
-          </a:prstGeom>
-          <a:noFill/>
-          <a:ln>
-            <a:solidFill>
-              <a:schemeClr val="tx1"/>
-            </a:solidFill>
-          </a:ln>
-        </p:spPr>
-        <p:style>
-          <a:lnRef idx="2">
-            <a:schemeClr val="accent1">
-              <a:shade val="50000"/>
-            </a:schemeClr>
-          </a:lnRef>
-          <a:fillRef idx="1">
-            <a:schemeClr val="accent1"/>
-          </a:fillRef>
-          <a:effectRef idx="0">
-            <a:schemeClr val="accent1"/>
-          </a:effectRef>
-          <a:fontRef idx="minor">
-            <a:schemeClr val="lt1"/>
-          </a:fontRef>
-        </p:style>
-        <p:txBody>
-          <a:bodyPr rtlCol="0" anchor="ctr"/>
-          <a:lstStyle/>
-          <a:p>
-            <a:pPr algn="ctr"/>
-            <a:r>
-              <a:rPr lang="en-US" sz="1200">
-                <a:solidFill>
-                  <a:schemeClr val="tx1"/>
-                </a:solidFill>
-              </a:rPr>
-              <a:t>Implementation Resource Type</a:t>
-            </a:r>
-          </a:p>
-        </p:txBody>
-      </p:sp>
-      <p:cxnSp>
-        <p:nvCxnSpPr>
-          <p:cNvPr id="32" name="Straight Arrow Connector 31">
-            <a:extLst>
-              <a:ext uri="{FF2B5EF4-FFF2-40B4-BE49-F238E27FC236}">
-                <a16:creationId xmlns:a16="http://schemas.microsoft.com/office/drawing/2014/main" id="{3D4E2C85-939F-C24B-B9E9-580CCCD98C70}"/>
-              </a:ext>
-            </a:extLst>
-          </p:cNvPr>
-          <p:cNvCxnSpPr>
-            <a:cxnSpLocks/>
-            <a:endCxn id="31" idx="0"/>
-          </p:cNvCxnSpPr>
-          <p:nvPr/>
-        </p:nvCxnSpPr>
-        <p:spPr>
-          <a:xfrm>
-            <a:off x="4347308" y="5746644"/>
-            <a:ext cx="0" cy="349009"/>
-          </a:xfrm>
-          <a:prstGeom prst="straightConnector1">
-            <a:avLst/>
-          </a:prstGeom>
-          <a:ln>
-            <a:solidFill>
-              <a:schemeClr val="tx1"/>
-            </a:solidFill>
-            <a:prstDash val="sysDot"/>
-            <a:headEnd type="none" w="med" len="med"/>
-            <a:tailEnd type="arrow" w="med" len="med"/>
-          </a:ln>
-        </p:spPr>
-        <p:style>
-          <a:lnRef idx="1">
-            <a:schemeClr val="accent1"/>
-          </a:lnRef>
-          <a:fillRef idx="0">
-            <a:schemeClr val="accent1"/>
-          </a:fillRef>
-          <a:effectRef idx="0">
-            <a:schemeClr val="accent1"/>
-          </a:effectRef>
-          <a:fontRef idx="minor">
-            <a:schemeClr val="tx1"/>
-          </a:fontRef>
-        </p:style>
-      </p:cxnSp>
-      <p:sp>
-        <p:nvSpPr>
           <p:cNvPr id="33" name="Rounded Rectangle 32">
             <a:extLst>
               <a:ext uri="{FF2B5EF4-FFF2-40B4-BE49-F238E27FC236}">
@@ -7962,7 +7999,7 @@
                   <a:schemeClr val="tx1"/>
                 </a:solidFill>
               </a:rPr>
-              <a:t>OWL Type</a:t>
+              <a:t>OWL</a:t>
             </a:r>
           </a:p>
         </p:txBody>
@@ -7982,7 +8019,7 @@
         <p:spPr>
           <a:xfrm>
             <a:off x="3355952" y="4778459"/>
-            <a:ext cx="1022972" cy="276999"/>
+            <a:ext cx="915828" cy="276999"/>
           </a:xfrm>
           <a:prstGeom prst="rect">
             <a:avLst/>
@@ -7997,7 +8034,7 @@
           <a:p>
             <a:r>
               <a:rPr lang="en-US" sz="1200"/>
-              <a:t>resourceType</a:t>
+              <a:t>conformsTo</a:t>
             </a:r>
           </a:p>
         </p:txBody>
@@ -8772,7 +8809,7 @@
         </p:nvSpPr>
         <p:spPr>
           <a:xfrm>
-            <a:off x="6890376" y="6099234"/>
+            <a:off x="6890376" y="5463792"/>
             <a:ext cx="1248936" cy="657922"/>
           </a:xfrm>
           <a:prstGeom prst="roundRect">
@@ -9429,7 +9466,7 @@
                   <a:schemeClr val="tx1"/>
                 </a:solidFill>
               </a:rPr>
-              <a:t>Schematron Type</a:t>
+              <a:t>Schematron</a:t>
             </a:r>
           </a:p>
         </p:txBody>
@@ -9929,7 +9966,7 @@
         <p:spPr>
           <a:xfrm flipH="1">
             <a:off x="8139312" y="3667928"/>
-            <a:ext cx="1856623" cy="2760267"/>
+            <a:ext cx="1856623" cy="2124825"/>
           </a:xfrm>
           <a:prstGeom prst="curvedConnector3">
             <a:avLst>
@@ -10091,7 +10128,22 @@
                   <a:schemeClr val="tx1"/>
                 </a:solidFill>
               </a:rPr>
-              <a:t>Web Page Type</a:t>
+              <a:t>HTML 5 </a:t>
+            </a:r>
+            <a:br>
+              <a:rPr lang="en-US" sz="1400">
+                <a:solidFill>
+                  <a:schemeClr val="tx1"/>
+                </a:solidFill>
+              </a:rPr>
+            </a:br>
+            <a:r>
+              <a:rPr lang="en-US" sz="1400">
+                <a:solidFill>
+                  <a:schemeClr val="tx1"/>
+                </a:solidFill>
+              </a:rPr>
+              <a:t>(Web Page)</a:t>
             </a:r>
           </a:p>
         </p:txBody>
@@ -10342,209 +10394,6 @@
           </a:fontRef>
         </p:style>
       </p:cxnSp>
-      <p:sp>
-        <p:nvSpPr>
-          <p:cNvPr id="116" name="Rounded Rectangle 115">
-            <a:extLst>
-              <a:ext uri="{FF2B5EF4-FFF2-40B4-BE49-F238E27FC236}">
-                <a16:creationId xmlns:a16="http://schemas.microsoft.com/office/drawing/2014/main" id="{04A06FF6-EC71-D049-863B-52938E516C2A}"/>
-              </a:ext>
-            </a:extLst>
-          </p:cNvPr>
-          <p:cNvSpPr/>
-          <p:nvPr/>
-        </p:nvSpPr>
-        <p:spPr>
-          <a:xfrm>
-            <a:off x="6890376" y="5256062"/>
-            <a:ext cx="1248936" cy="657922"/>
-          </a:xfrm>
-          <a:prstGeom prst="roundRect">
-            <a:avLst/>
-          </a:prstGeom>
-          <a:noFill/>
-          <a:ln>
-            <a:solidFill>
-              <a:schemeClr val="tx1"/>
-            </a:solidFill>
-          </a:ln>
-        </p:spPr>
-        <p:style>
-          <a:lnRef idx="2">
-            <a:schemeClr val="accent1">
-              <a:shade val="50000"/>
-            </a:schemeClr>
-          </a:lnRef>
-          <a:fillRef idx="1">
-            <a:schemeClr val="accent1"/>
-          </a:fillRef>
-          <a:effectRef idx="0">
-            <a:schemeClr val="accent1"/>
-          </a:effectRef>
-          <a:fontRef idx="minor">
-            <a:schemeClr val="lt1"/>
-          </a:fontRef>
-        </p:style>
-        <p:txBody>
-          <a:bodyPr rtlCol="0" anchor="ctr"/>
-          <a:lstStyle/>
-          <a:p>
-            <a:pPr algn="ctr"/>
-            <a:r>
-              <a:rPr lang="en-US" sz="1200">
-                <a:solidFill>
-                  <a:schemeClr val="tx1"/>
-                </a:solidFill>
-              </a:rPr>
-              <a:t>Implementation Resource Type</a:t>
-            </a:r>
-          </a:p>
-        </p:txBody>
-      </p:sp>
-      <p:cxnSp>
-        <p:nvCxnSpPr>
-          <p:cNvPr id="117" name="Straight Arrow Connector 116">
-            <a:extLst>
-              <a:ext uri="{FF2B5EF4-FFF2-40B4-BE49-F238E27FC236}">
-                <a16:creationId xmlns:a16="http://schemas.microsoft.com/office/drawing/2014/main" id="{E81CB235-31DC-8747-A3DC-FD08D1347F32}"/>
-              </a:ext>
-            </a:extLst>
-          </p:cNvPr>
-          <p:cNvCxnSpPr>
-            <a:cxnSpLocks/>
-            <a:stCxn id="42" idx="2"/>
-            <a:endCxn id="116" idx="0"/>
-          </p:cNvCxnSpPr>
-          <p:nvPr/>
-        </p:nvCxnSpPr>
-        <p:spPr>
-          <a:xfrm flipH="1">
-            <a:off x="7514844" y="5055221"/>
-            <a:ext cx="4938" cy="200841"/>
-          </a:xfrm>
-          <a:prstGeom prst="straightConnector1">
-            <a:avLst/>
-          </a:prstGeom>
-          <a:ln>
-            <a:solidFill>
-              <a:schemeClr val="tx1"/>
-            </a:solidFill>
-            <a:prstDash val="sysDot"/>
-            <a:headEnd type="none" w="med" len="med"/>
-            <a:tailEnd type="arrow" w="med" len="med"/>
-          </a:ln>
-        </p:spPr>
-        <p:style>
-          <a:lnRef idx="1">
-            <a:schemeClr val="accent1"/>
-          </a:lnRef>
-          <a:fillRef idx="0">
-            <a:schemeClr val="accent1"/>
-          </a:fillRef>
-          <a:effectRef idx="0">
-            <a:schemeClr val="accent1"/>
-          </a:effectRef>
-          <a:fontRef idx="minor">
-            <a:schemeClr val="tx1"/>
-          </a:fontRef>
-        </p:style>
-      </p:cxnSp>
-      <p:cxnSp>
-        <p:nvCxnSpPr>
-          <p:cNvPr id="120" name="Straight Arrow Connector 119">
-            <a:extLst>
-              <a:ext uri="{FF2B5EF4-FFF2-40B4-BE49-F238E27FC236}">
-                <a16:creationId xmlns:a16="http://schemas.microsoft.com/office/drawing/2014/main" id="{F579F5B1-0F2F-5E4F-8CDF-7A89221A583D}"/>
-              </a:ext>
-            </a:extLst>
-          </p:cNvPr>
-          <p:cNvCxnSpPr>
-            <a:cxnSpLocks/>
-            <a:stCxn id="49" idx="2"/>
-            <a:endCxn id="116" idx="3"/>
-          </p:cNvCxnSpPr>
-          <p:nvPr/>
-        </p:nvCxnSpPr>
-        <p:spPr>
-          <a:xfrm flipH="1">
-            <a:off x="8139312" y="5055221"/>
-            <a:ext cx="1232155" cy="529802"/>
-          </a:xfrm>
-          <a:prstGeom prst="straightConnector1">
-            <a:avLst/>
-          </a:prstGeom>
-          <a:ln>
-            <a:solidFill>
-              <a:schemeClr val="tx1"/>
-            </a:solidFill>
-            <a:prstDash val="sysDot"/>
-            <a:headEnd type="none" w="med" len="med"/>
-            <a:tailEnd type="arrow" w="med" len="med"/>
-          </a:ln>
-        </p:spPr>
-        <p:style>
-          <a:lnRef idx="1">
-            <a:schemeClr val="accent1"/>
-          </a:lnRef>
-          <a:fillRef idx="0">
-            <a:schemeClr val="accent1"/>
-          </a:fillRef>
-          <a:effectRef idx="0">
-            <a:schemeClr val="accent1"/>
-          </a:effectRef>
-          <a:fontRef idx="minor">
-            <a:schemeClr val="tx1"/>
-          </a:fontRef>
-        </p:style>
-      </p:cxnSp>
-      <p:cxnSp>
-        <p:nvCxnSpPr>
-          <p:cNvPr id="123" name="Straight Arrow Connector 122">
-            <a:extLst>
-              <a:ext uri="{FF2B5EF4-FFF2-40B4-BE49-F238E27FC236}">
-                <a16:creationId xmlns:a16="http://schemas.microsoft.com/office/drawing/2014/main" id="{90058F66-3A79-6045-9E2F-A7D87AD37364}"/>
-              </a:ext>
-            </a:extLst>
-          </p:cNvPr>
-          <p:cNvCxnSpPr>
-            <a:cxnSpLocks/>
-            <a:stCxn id="62" idx="2"/>
-            <a:endCxn id="116" idx="1"/>
-          </p:cNvCxnSpPr>
-          <p:nvPr/>
-        </p:nvCxnSpPr>
-        <p:spPr>
-          <a:xfrm>
-            <a:off x="5668097" y="5075270"/>
-            <a:ext cx="1222279" cy="509753"/>
-          </a:xfrm>
-          <a:prstGeom prst="straightConnector1">
-            <a:avLst/>
-          </a:prstGeom>
-          <a:ln>
-            <a:solidFill>
-              <a:schemeClr val="tx1"/>
-            </a:solidFill>
-            <a:prstDash val="sysDot"/>
-            <a:headEnd type="none" w="med" len="med"/>
-            <a:tailEnd type="arrow" w="med" len="med"/>
-          </a:ln>
-        </p:spPr>
-        <p:style>
-          <a:lnRef idx="1">
-            <a:schemeClr val="accent1"/>
-          </a:lnRef>
-          <a:fillRef idx="0">
-            <a:schemeClr val="accent1"/>
-          </a:fillRef>
-          <a:effectRef idx="0">
-            <a:schemeClr val="accent1"/>
-          </a:effectRef>
-          <a:fontRef idx="minor">
-            <a:schemeClr val="tx1"/>
-          </a:fontRef>
-        </p:style>
-      </p:cxnSp>
       <p:cxnSp>
         <p:nvCxnSpPr>
           <p:cNvPr id="130" name="Curved Connector 129">
@@ -10564,7 +10413,7 @@
         <p:spPr>
           <a:xfrm rot="10800000" flipH="1" flipV="1">
             <a:off x="5043628" y="3661615"/>
-            <a:ext cx="1846747" cy="2766580"/>
+            <a:ext cx="1846747" cy="2131138"/>
           </a:xfrm>
           <a:prstGeom prst="curvedConnector3">
             <a:avLst>
@@ -10614,7 +10463,7 @@
         <p:spPr>
           <a:xfrm flipH="1">
             <a:off x="8139312" y="3659767"/>
-            <a:ext cx="4938" cy="2768428"/>
+            <a:ext cx="4938" cy="2132986"/>
           </a:xfrm>
           <a:prstGeom prst="curvedConnector3">
             <a:avLst>
@@ -10660,7 +10509,7 @@
         <p:spPr>
           <a:xfrm>
             <a:off x="7004601" y="4035536"/>
-            <a:ext cx="1022972" cy="276999"/>
+            <a:ext cx="915828" cy="276999"/>
           </a:xfrm>
           <a:prstGeom prst="rect">
             <a:avLst/>
@@ -10677,7 +10526,7 @@
           <a:p>
             <a:r>
               <a:rPr lang="en-US" sz="1200"/>
-              <a:t>resourceType</a:t>
+              <a:t>conformsTo</a:t>
             </a:r>
           </a:p>
         </p:txBody>
@@ -10697,7 +10546,7 @@
         <p:spPr>
           <a:xfrm>
             <a:off x="5156611" y="4042899"/>
-            <a:ext cx="1022972" cy="276999"/>
+            <a:ext cx="915828" cy="276999"/>
           </a:xfrm>
           <a:prstGeom prst="rect">
             <a:avLst/>
@@ -10714,7 +10563,7 @@
           <a:p>
             <a:r>
               <a:rPr lang="en-US" sz="1200"/>
-              <a:t>resourceType</a:t>
+              <a:t>conformsTo</a:t>
             </a:r>
           </a:p>
         </p:txBody>
@@ -10734,7 +10583,7 @@
         <p:spPr>
           <a:xfrm>
             <a:off x="8859980" y="4032141"/>
-            <a:ext cx="1022972" cy="276999"/>
+            <a:ext cx="915828" cy="276999"/>
           </a:xfrm>
           <a:prstGeom prst="rect">
             <a:avLst/>
@@ -10751,7 +10600,7 @@
           <a:p>
             <a:r>
               <a:rPr lang="en-US" sz="1200"/>
-              <a:t>resourceType</a:t>
+              <a:t>conformsTo</a:t>
             </a:r>
           </a:p>
         </p:txBody>
@@ -11069,7 +10918,7 @@
                   <a:schemeClr val="tx1"/>
                 </a:solidFill>
               </a:rPr>
-              <a:t>Implementation Resource Type</a:t>
+              <a:t>Implementation Resource Role</a:t>
             </a:r>
           </a:p>
         </p:txBody>
@@ -11417,7 +11266,7 @@
         </p:nvSpPr>
         <p:spPr>
           <a:xfrm>
-            <a:off x="3191942" y="6099234"/>
+            <a:off x="3191942" y="5463792"/>
             <a:ext cx="1248936" cy="657922"/>
           </a:xfrm>
           <a:prstGeom prst="roundRect">
@@ -11489,12 +11338,12 @@
         </p:nvCxnSpPr>
         <p:spPr>
           <a:xfrm rot="16200000" flipV="1">
-            <a:off x="1793771" y="4076595"/>
-            <a:ext cx="3420810" cy="624468"/>
+            <a:off x="2111492" y="3758874"/>
+            <a:ext cx="2785368" cy="624468"/>
           </a:xfrm>
           <a:prstGeom prst="bentConnector4">
             <a:avLst>
-              <a:gd name="adj1" fmla="val 45192"/>
+              <a:gd name="adj1" fmla="val 44095"/>
               <a:gd name="adj2" fmla="val 136607"/>
             </a:avLst>
           </a:prstGeom>
@@ -11540,11 +11389,11 @@
         <p:spPr>
           <a:xfrm rot="10800000" flipV="1">
             <a:off x="4440878" y="3659767"/>
-            <a:ext cx="2454436" cy="2768428"/>
+            <a:ext cx="2454436" cy="2132986"/>
           </a:xfrm>
           <a:prstGeom prst="bentConnector3">
             <a:avLst>
-              <a:gd name="adj1" fmla="val 13346"/>
+              <a:gd name="adj1" fmla="val 13622"/>
             </a:avLst>
           </a:prstGeom>
           <a:ln>
@@ -11584,7 +11433,7 @@
         </p:nvSpPr>
         <p:spPr>
           <a:xfrm>
-            <a:off x="4532365" y="6135428"/>
+            <a:off x="4553099" y="5463792"/>
             <a:ext cx="1002775" cy="276999"/>
           </a:xfrm>
           <a:prstGeom prst="rect">
@@ -14495,7 +14344,7 @@
                   <a:schemeClr val="tx1"/>
                 </a:solidFill>
               </a:rPr>
-              <a:t>Implementation Resource Type</a:t>
+              <a:t>Implementation Resource Role</a:t>
             </a:r>
           </a:p>
         </p:txBody>
@@ -15063,7 +14912,7 @@
         <p:spPr>
           <a:xfrm>
             <a:off x="3297602" y="4105279"/>
-            <a:ext cx="1022972" cy="276999"/>
+            <a:ext cx="915828" cy="276999"/>
           </a:xfrm>
           <a:prstGeom prst="rect">
             <a:avLst/>
@@ -15078,7 +14927,7 @@
           <a:p>
             <a:r>
               <a:rPr lang="en-US" sz="1200"/>
-              <a:t>resourceType</a:t>
+              <a:t>conformsTo</a:t>
             </a:r>
           </a:p>
         </p:txBody>
@@ -15167,2168 +15016,6 @@
     <p:extLst>
       <p:ext uri="{BB962C8B-B14F-4D97-AF65-F5344CB8AC3E}">
         <p14:creationId xmlns:p14="http://schemas.microsoft.com/office/powerpoint/2010/main" val="3562835180"/>
-      </p:ext>
-    </p:extLst>
-  </p:cSld>
-  <p:clrMapOvr>
-    <a:masterClrMapping/>
-  </p:clrMapOvr>
-</p:sld>
-</file>
-
-<file path=ppt/slides/slide6.xml><?xml version="1.0" encoding="utf-8"?>
-<p:sld xmlns:a="http://schemas.openxmlformats.org/drawingml/2006/main" xmlns:r="http://schemas.openxmlformats.org/officeDocument/2006/relationships" xmlns:p="http://schemas.openxmlformats.org/presentationml/2006/main">
-  <p:cSld>
-    <p:spTree>
-      <p:nvGrpSpPr>
-        <p:cNvPr id="1" name=""/>
-        <p:cNvGrpSpPr/>
-        <p:nvPr/>
-      </p:nvGrpSpPr>
-      <p:grpSpPr>
-        <a:xfrm>
-          <a:off x="0" y="0"/>
-          <a:ext cx="0" cy="0"/>
-          <a:chOff x="0" y="0"/>
-          <a:chExt cx="0" cy="0"/>
-        </a:xfrm>
-      </p:grpSpPr>
-      <p:sp>
-        <p:nvSpPr>
-          <p:cNvPr id="2" name="TextBox 1">
-            <a:extLst>
-              <a:ext uri="{FF2B5EF4-FFF2-40B4-BE49-F238E27FC236}">
-                <a16:creationId xmlns:a16="http://schemas.microsoft.com/office/drawing/2014/main" id="{83BA414C-DCB0-3640-8724-6378CC0BA2FA}"/>
-              </a:ext>
-            </a:extLst>
-          </p:cNvPr>
-          <p:cNvSpPr txBox="1"/>
-          <p:nvPr/>
-        </p:nvSpPr>
-        <p:spPr>
-          <a:xfrm>
-            <a:off x="200722" y="156117"/>
-            <a:ext cx="6292941" cy="369332"/>
-          </a:xfrm>
-          <a:prstGeom prst="rect">
-            <a:avLst/>
-          </a:prstGeom>
-          <a:noFill/>
-        </p:spPr>
-        <p:txBody>
-          <a:bodyPr wrap="none" rtlCol="0">
-            <a:spAutoFit/>
-          </a:bodyPr>
-          <a:lstStyle/>
-          <a:p>
-            <a:r>
-              <a:rPr lang="en-US" u="sng"/>
-              <a:t>Energy Use Data Model Profiling an Australian profile of DCAT 1.1</a:t>
-            </a:r>
-          </a:p>
-        </p:txBody>
-      </p:sp>
-      <p:sp>
-        <p:nvSpPr>
-          <p:cNvPr id="3" name="Rounded Rectangle 2">
-            <a:extLst>
-              <a:ext uri="{FF2B5EF4-FFF2-40B4-BE49-F238E27FC236}">
-                <a16:creationId xmlns:a16="http://schemas.microsoft.com/office/drawing/2014/main" id="{36985D6F-F68F-4344-8D44-F1F7C3296165}"/>
-              </a:ext>
-            </a:extLst>
-          </p:cNvPr>
-          <p:cNvSpPr/>
-          <p:nvPr/>
-        </p:nvSpPr>
-        <p:spPr>
-          <a:xfrm>
-            <a:off x="5585183" y="3057460"/>
-            <a:ext cx="1248936" cy="657922"/>
-          </a:xfrm>
-          <a:prstGeom prst="roundRect">
-            <a:avLst/>
-          </a:prstGeom>
-          <a:pattFill prst="pct30">
-            <a:fgClr>
-              <a:schemeClr val="bg1">
-                <a:lumMod val="85000"/>
-              </a:schemeClr>
-            </a:fgClr>
-            <a:bgClr>
-              <a:schemeClr val="bg1"/>
-            </a:bgClr>
-          </a:pattFill>
-          <a:ln>
-            <a:solidFill>
-              <a:schemeClr val="tx1"/>
-            </a:solidFill>
-          </a:ln>
-        </p:spPr>
-        <p:style>
-          <a:lnRef idx="2">
-            <a:schemeClr val="accent1">
-              <a:shade val="50000"/>
-            </a:schemeClr>
-          </a:lnRef>
-          <a:fillRef idx="1">
-            <a:schemeClr val="accent1"/>
-          </a:fillRef>
-          <a:effectRef idx="0">
-            <a:schemeClr val="accent1"/>
-          </a:effectRef>
-          <a:fontRef idx="minor">
-            <a:schemeClr val="lt1"/>
-          </a:fontRef>
-        </p:style>
-        <p:txBody>
-          <a:bodyPr rtlCol="0" anchor="ctr"/>
-          <a:lstStyle/>
-          <a:p>
-            <a:pPr algn="ctr"/>
-            <a:r>
-              <a:rPr lang="en-US" sz="1400">
-                <a:solidFill>
-                  <a:schemeClr val="tx1"/>
-                </a:solidFill>
-              </a:rPr>
-              <a:t>OzDCAT</a:t>
-            </a:r>
-          </a:p>
-        </p:txBody>
-      </p:sp>
-      <p:sp>
-        <p:nvSpPr>
-          <p:cNvPr id="4" name="Rounded Rectangle 3">
-            <a:extLst>
-              <a:ext uri="{FF2B5EF4-FFF2-40B4-BE49-F238E27FC236}">
-                <a16:creationId xmlns:a16="http://schemas.microsoft.com/office/drawing/2014/main" id="{2241BF72-9682-B541-B66F-E14377A78CE7}"/>
-              </a:ext>
-            </a:extLst>
-          </p:cNvPr>
-          <p:cNvSpPr/>
-          <p:nvPr/>
-        </p:nvSpPr>
-        <p:spPr>
-          <a:xfrm>
-            <a:off x="5585183" y="2050119"/>
-            <a:ext cx="1248936" cy="657922"/>
-          </a:xfrm>
-          <a:prstGeom prst="roundRect">
-            <a:avLst/>
-          </a:prstGeom>
-          <a:pattFill prst="pct30">
-            <a:fgClr>
-              <a:schemeClr val="bg1">
-                <a:lumMod val="85000"/>
-              </a:schemeClr>
-            </a:fgClr>
-            <a:bgClr>
-              <a:schemeClr val="bg1"/>
-            </a:bgClr>
-          </a:pattFill>
-          <a:ln>
-            <a:solidFill>
-              <a:schemeClr val="tx1"/>
-            </a:solidFill>
-          </a:ln>
-        </p:spPr>
-        <p:style>
-          <a:lnRef idx="2">
-            <a:schemeClr val="accent1">
-              <a:shade val="50000"/>
-            </a:schemeClr>
-          </a:lnRef>
-          <a:fillRef idx="1">
-            <a:schemeClr val="accent1"/>
-          </a:fillRef>
-          <a:effectRef idx="0">
-            <a:schemeClr val="accent1"/>
-          </a:effectRef>
-          <a:fontRef idx="minor">
-            <a:schemeClr val="lt1"/>
-          </a:fontRef>
-        </p:style>
-        <p:txBody>
-          <a:bodyPr rtlCol="0" anchor="ctr"/>
-          <a:lstStyle/>
-          <a:p>
-            <a:pPr algn="ctr"/>
-            <a:r>
-              <a:rPr lang="en-US" sz="1400">
-                <a:solidFill>
-                  <a:schemeClr val="tx1"/>
-                </a:solidFill>
-              </a:rPr>
-              <a:t>DCAT 1.1</a:t>
-            </a:r>
-          </a:p>
-        </p:txBody>
-      </p:sp>
-      <p:cxnSp>
-        <p:nvCxnSpPr>
-          <p:cNvPr id="5" name="Straight Arrow Connector 4">
-            <a:extLst>
-              <a:ext uri="{FF2B5EF4-FFF2-40B4-BE49-F238E27FC236}">
-                <a16:creationId xmlns:a16="http://schemas.microsoft.com/office/drawing/2014/main" id="{6DFE8740-3E2F-9A49-B58F-7F85D1399E22}"/>
-              </a:ext>
-            </a:extLst>
-          </p:cNvPr>
-          <p:cNvCxnSpPr>
-            <a:cxnSpLocks/>
-            <a:stCxn id="3" idx="0"/>
-            <a:endCxn id="4" idx="2"/>
-          </p:cNvCxnSpPr>
-          <p:nvPr/>
-        </p:nvCxnSpPr>
-        <p:spPr>
-          <a:xfrm flipV="1">
-            <a:off x="6209651" y="2708041"/>
-            <a:ext cx="0" cy="349419"/>
-          </a:xfrm>
-          <a:prstGeom prst="straightConnector1">
-            <a:avLst/>
-          </a:prstGeom>
-          <a:ln>
-            <a:solidFill>
-              <a:schemeClr val="tx1"/>
-            </a:solidFill>
-            <a:headEnd type="none" w="med" len="med"/>
-            <a:tailEnd type="arrow" w="med" len="med"/>
-          </a:ln>
-        </p:spPr>
-        <p:style>
-          <a:lnRef idx="1">
-            <a:schemeClr val="accent1"/>
-          </a:lnRef>
-          <a:fillRef idx="0">
-            <a:schemeClr val="accent1"/>
-          </a:fillRef>
-          <a:effectRef idx="0">
-            <a:schemeClr val="accent1"/>
-          </a:effectRef>
-          <a:fontRef idx="minor">
-            <a:schemeClr val="tx1"/>
-          </a:fontRef>
-        </p:style>
-      </p:cxnSp>
-      <p:sp>
-        <p:nvSpPr>
-          <p:cNvPr id="6" name="TextBox 5">
-            <a:extLst>
-              <a:ext uri="{FF2B5EF4-FFF2-40B4-BE49-F238E27FC236}">
-                <a16:creationId xmlns:a16="http://schemas.microsoft.com/office/drawing/2014/main" id="{BF47E62B-F721-104F-A4EF-FDAFEF951783}"/>
-              </a:ext>
-            </a:extLst>
-          </p:cNvPr>
-          <p:cNvSpPr txBox="1"/>
-          <p:nvPr/>
-        </p:nvSpPr>
-        <p:spPr>
-          <a:xfrm>
-            <a:off x="6212613" y="2729552"/>
-            <a:ext cx="740011" cy="276999"/>
-          </a:xfrm>
-          <a:prstGeom prst="rect">
-            <a:avLst/>
-          </a:prstGeom>
-          <a:noFill/>
-        </p:spPr>
-        <p:txBody>
-          <a:bodyPr wrap="none" rtlCol="0">
-            <a:spAutoFit/>
-          </a:bodyPr>
-          <a:lstStyle/>
-          <a:p>
-            <a:r>
-              <a:rPr lang="en-US" sz="1200"/>
-              <a:t>profileOf</a:t>
-            </a:r>
-          </a:p>
-        </p:txBody>
-      </p:sp>
-      <p:sp>
-        <p:nvSpPr>
-          <p:cNvPr id="9" name="Rounded Rectangle 8">
-            <a:extLst>
-              <a:ext uri="{FF2B5EF4-FFF2-40B4-BE49-F238E27FC236}">
-                <a16:creationId xmlns:a16="http://schemas.microsoft.com/office/drawing/2014/main" id="{AE8BEE7C-A2AE-CD4B-95AD-F8EA3306B540}"/>
-              </a:ext>
-            </a:extLst>
-          </p:cNvPr>
-          <p:cNvSpPr/>
-          <p:nvPr/>
-        </p:nvSpPr>
-        <p:spPr>
-          <a:xfrm>
-            <a:off x="5588147" y="4064801"/>
-            <a:ext cx="1248936" cy="657922"/>
-          </a:xfrm>
-          <a:prstGeom prst="roundRect">
-            <a:avLst/>
-          </a:prstGeom>
-          <a:pattFill prst="pct30">
-            <a:fgClr>
-              <a:schemeClr val="bg1">
-                <a:lumMod val="85000"/>
-              </a:schemeClr>
-            </a:fgClr>
-            <a:bgClr>
-              <a:schemeClr val="bg1"/>
-            </a:bgClr>
-          </a:pattFill>
-          <a:ln>
-            <a:solidFill>
-              <a:schemeClr val="tx1"/>
-            </a:solidFill>
-          </a:ln>
-        </p:spPr>
-        <p:style>
-          <a:lnRef idx="2">
-            <a:schemeClr val="accent1">
-              <a:shade val="50000"/>
-            </a:schemeClr>
-          </a:lnRef>
-          <a:fillRef idx="1">
-            <a:schemeClr val="accent1"/>
-          </a:fillRef>
-          <a:effectRef idx="0">
-            <a:schemeClr val="accent1"/>
-          </a:effectRef>
-          <a:fontRef idx="minor">
-            <a:schemeClr val="lt1"/>
-          </a:fontRef>
-        </p:style>
-        <p:txBody>
-          <a:bodyPr rtlCol="0" anchor="ctr"/>
-          <a:lstStyle/>
-          <a:p>
-            <a:pPr algn="ctr"/>
-            <a:r>
-              <a:rPr lang="en-US" sz="1400">
-                <a:solidFill>
-                  <a:schemeClr val="tx1"/>
-                </a:solidFill>
-              </a:rPr>
-              <a:t>EUDM Profile</a:t>
-            </a:r>
-          </a:p>
-        </p:txBody>
-      </p:sp>
-      <p:cxnSp>
-        <p:nvCxnSpPr>
-          <p:cNvPr id="10" name="Straight Arrow Connector 9">
-            <a:extLst>
-              <a:ext uri="{FF2B5EF4-FFF2-40B4-BE49-F238E27FC236}">
-                <a16:creationId xmlns:a16="http://schemas.microsoft.com/office/drawing/2014/main" id="{9FA8862B-B992-144F-B955-49FCA7BBB44B}"/>
-              </a:ext>
-            </a:extLst>
-          </p:cNvPr>
-          <p:cNvCxnSpPr>
-            <a:cxnSpLocks/>
-            <a:stCxn id="9" idx="0"/>
-            <a:endCxn id="3" idx="2"/>
-          </p:cNvCxnSpPr>
-          <p:nvPr/>
-        </p:nvCxnSpPr>
-        <p:spPr>
-          <a:xfrm flipH="1" flipV="1">
-            <a:off x="6209651" y="3715382"/>
-            <a:ext cx="2964" cy="349419"/>
-          </a:xfrm>
-          <a:prstGeom prst="straightConnector1">
-            <a:avLst/>
-          </a:prstGeom>
-          <a:ln>
-            <a:solidFill>
-              <a:schemeClr val="tx1"/>
-            </a:solidFill>
-            <a:headEnd type="none" w="med" len="med"/>
-            <a:tailEnd type="arrow" w="med" len="med"/>
-          </a:ln>
-        </p:spPr>
-        <p:style>
-          <a:lnRef idx="1">
-            <a:schemeClr val="accent1"/>
-          </a:lnRef>
-          <a:fillRef idx="0">
-            <a:schemeClr val="accent1"/>
-          </a:fillRef>
-          <a:effectRef idx="0">
-            <a:schemeClr val="accent1"/>
-          </a:effectRef>
-          <a:fontRef idx="minor">
-            <a:schemeClr val="tx1"/>
-          </a:fontRef>
-        </p:style>
-      </p:cxnSp>
-      <p:sp>
-        <p:nvSpPr>
-          <p:cNvPr id="11" name="TextBox 10">
-            <a:extLst>
-              <a:ext uri="{FF2B5EF4-FFF2-40B4-BE49-F238E27FC236}">
-                <a16:creationId xmlns:a16="http://schemas.microsoft.com/office/drawing/2014/main" id="{DE50B389-6492-8C4A-9A80-3F885CC92EB1}"/>
-              </a:ext>
-            </a:extLst>
-          </p:cNvPr>
-          <p:cNvSpPr txBox="1"/>
-          <p:nvPr/>
-        </p:nvSpPr>
-        <p:spPr>
-          <a:xfrm>
-            <a:off x="6212615" y="3712030"/>
-            <a:ext cx="740011" cy="276999"/>
-          </a:xfrm>
-          <a:prstGeom prst="rect">
-            <a:avLst/>
-          </a:prstGeom>
-          <a:noFill/>
-        </p:spPr>
-        <p:txBody>
-          <a:bodyPr wrap="none" rtlCol="0">
-            <a:spAutoFit/>
-          </a:bodyPr>
-          <a:lstStyle/>
-          <a:p>
-            <a:r>
-              <a:rPr lang="en-US" sz="1200"/>
-              <a:t>profileOf</a:t>
-            </a:r>
-          </a:p>
-        </p:txBody>
-      </p:sp>
-      <p:sp>
-        <p:nvSpPr>
-          <p:cNvPr id="14" name="Rounded Rectangle 13">
-            <a:extLst>
-              <a:ext uri="{FF2B5EF4-FFF2-40B4-BE49-F238E27FC236}">
-                <a16:creationId xmlns:a16="http://schemas.microsoft.com/office/drawing/2014/main" id="{36A79965-6F63-894B-937A-E0FBA26C379D}"/>
-              </a:ext>
-            </a:extLst>
-          </p:cNvPr>
-          <p:cNvSpPr/>
-          <p:nvPr/>
-        </p:nvSpPr>
-        <p:spPr>
-          <a:xfrm>
-            <a:off x="3714743" y="4064696"/>
-            <a:ext cx="1248936" cy="657922"/>
-          </a:xfrm>
-          <a:prstGeom prst="roundRect">
-            <a:avLst/>
-          </a:prstGeom>
-          <a:pattFill prst="pct30">
-            <a:fgClr>
-              <a:schemeClr val="bg1">
-                <a:lumMod val="85000"/>
-              </a:schemeClr>
-            </a:fgClr>
-            <a:bgClr>
-              <a:schemeClr val="bg1"/>
-            </a:bgClr>
-          </a:pattFill>
-          <a:ln>
-            <a:solidFill>
-              <a:schemeClr val="tx1"/>
-            </a:solidFill>
-          </a:ln>
-        </p:spPr>
-        <p:style>
-          <a:lnRef idx="2">
-            <a:schemeClr val="accent1">
-              <a:shade val="50000"/>
-            </a:schemeClr>
-          </a:lnRef>
-          <a:fillRef idx="1">
-            <a:schemeClr val="accent1"/>
-          </a:fillRef>
-          <a:effectRef idx="0">
-            <a:schemeClr val="accent1"/>
-          </a:effectRef>
-          <a:fontRef idx="minor">
-            <a:schemeClr val="lt1"/>
-          </a:fontRef>
-        </p:style>
-        <p:txBody>
-          <a:bodyPr rtlCol="0" anchor="ctr"/>
-          <a:lstStyle/>
-          <a:p>
-            <a:pPr algn="ctr"/>
-            <a:r>
-              <a:rPr lang="en-US" sz="1400">
-                <a:solidFill>
-                  <a:schemeClr val="tx1"/>
-                </a:solidFill>
-              </a:rPr>
-              <a:t>EDUM SHACL Constraints</a:t>
-            </a:r>
-          </a:p>
-        </p:txBody>
-      </p:sp>
-      <p:sp>
-        <p:nvSpPr>
-          <p:cNvPr id="15" name="TextBox 14">
-            <a:extLst>
-              <a:ext uri="{FF2B5EF4-FFF2-40B4-BE49-F238E27FC236}">
-                <a16:creationId xmlns:a16="http://schemas.microsoft.com/office/drawing/2014/main" id="{B8CC69FE-9ABD-E847-B011-CD6668103D34}"/>
-              </a:ext>
-            </a:extLst>
-          </p:cNvPr>
-          <p:cNvSpPr txBox="1"/>
-          <p:nvPr/>
-        </p:nvSpPr>
-        <p:spPr>
-          <a:xfrm>
-            <a:off x="4926306" y="4007708"/>
-            <a:ext cx="728597" cy="276999"/>
-          </a:xfrm>
-          <a:prstGeom prst="rect">
-            <a:avLst/>
-          </a:prstGeom>
-          <a:noFill/>
-        </p:spPr>
-        <p:txBody>
-          <a:bodyPr wrap="none" rtlCol="0">
-            <a:spAutoFit/>
-          </a:bodyPr>
-          <a:lstStyle/>
-          <a:p>
-            <a:r>
-              <a:rPr lang="en-US" sz="1200"/>
-              <a:t>resource</a:t>
-            </a:r>
-          </a:p>
-        </p:txBody>
-      </p:sp>
-      <p:cxnSp>
-        <p:nvCxnSpPr>
-          <p:cNvPr id="16" name="Straight Arrow Connector 15">
-            <a:extLst>
-              <a:ext uri="{FF2B5EF4-FFF2-40B4-BE49-F238E27FC236}">
-                <a16:creationId xmlns:a16="http://schemas.microsoft.com/office/drawing/2014/main" id="{59A169CD-84F7-904A-8BA5-D6B2B30194EB}"/>
-              </a:ext>
-            </a:extLst>
-          </p:cNvPr>
-          <p:cNvCxnSpPr>
-            <a:cxnSpLocks/>
-            <a:stCxn id="9" idx="1"/>
-            <a:endCxn id="14" idx="3"/>
-          </p:cNvCxnSpPr>
-          <p:nvPr/>
-        </p:nvCxnSpPr>
-        <p:spPr>
-          <a:xfrm flipH="1" flipV="1">
-            <a:off x="4963679" y="4393657"/>
-            <a:ext cx="624468" cy="105"/>
-          </a:xfrm>
-          <a:prstGeom prst="straightConnector1">
-            <a:avLst/>
-          </a:prstGeom>
-          <a:ln>
-            <a:solidFill>
-              <a:schemeClr val="tx1"/>
-            </a:solidFill>
-            <a:headEnd type="none" w="med" len="med"/>
-            <a:tailEnd type="arrow" w="med" len="med"/>
-          </a:ln>
-        </p:spPr>
-        <p:style>
-          <a:lnRef idx="1">
-            <a:schemeClr val="accent1"/>
-          </a:lnRef>
-          <a:fillRef idx="0">
-            <a:schemeClr val="accent1"/>
-          </a:fillRef>
-          <a:effectRef idx="0">
-            <a:schemeClr val="accent1"/>
-          </a:effectRef>
-          <a:fontRef idx="minor">
-            <a:schemeClr val="tx1"/>
-          </a:fontRef>
-        </p:style>
-      </p:cxnSp>
-      <p:sp>
-        <p:nvSpPr>
-          <p:cNvPr id="17" name="Rounded Rectangle 16">
-            <a:extLst>
-              <a:ext uri="{FF2B5EF4-FFF2-40B4-BE49-F238E27FC236}">
-                <a16:creationId xmlns:a16="http://schemas.microsoft.com/office/drawing/2014/main" id="{0068370B-A152-9948-B10E-7F0AFB1022E5}"/>
-              </a:ext>
-            </a:extLst>
-          </p:cNvPr>
-          <p:cNvSpPr/>
-          <p:nvPr/>
-        </p:nvSpPr>
-        <p:spPr>
-          <a:xfrm>
-            <a:off x="5585183" y="1042778"/>
-            <a:ext cx="1248936" cy="657922"/>
-          </a:xfrm>
-          <a:prstGeom prst="roundRect">
-            <a:avLst/>
-          </a:prstGeom>
-          <a:pattFill prst="pct30">
-            <a:fgClr>
-              <a:schemeClr val="bg1">
-                <a:lumMod val="85000"/>
-              </a:schemeClr>
-            </a:fgClr>
-            <a:bgClr>
-              <a:schemeClr val="bg1"/>
-            </a:bgClr>
-          </a:pattFill>
-          <a:ln>
-            <a:solidFill>
-              <a:schemeClr val="tx1"/>
-            </a:solidFill>
-          </a:ln>
-        </p:spPr>
-        <p:style>
-          <a:lnRef idx="2">
-            <a:schemeClr val="accent1">
-              <a:shade val="50000"/>
-            </a:schemeClr>
-          </a:lnRef>
-          <a:fillRef idx="1">
-            <a:schemeClr val="accent1"/>
-          </a:fillRef>
-          <a:effectRef idx="0">
-            <a:schemeClr val="accent1"/>
-          </a:effectRef>
-          <a:fontRef idx="minor">
-            <a:schemeClr val="lt1"/>
-          </a:fontRef>
-        </p:style>
-        <p:txBody>
-          <a:bodyPr rtlCol="0" anchor="ctr"/>
-          <a:lstStyle/>
-          <a:p>
-            <a:pPr algn="ctr"/>
-            <a:r>
-              <a:rPr lang="en-US" sz="1400">
-                <a:solidFill>
-                  <a:schemeClr val="tx1"/>
-                </a:solidFill>
-              </a:rPr>
-              <a:t>DCAT</a:t>
-            </a:r>
-          </a:p>
-        </p:txBody>
-      </p:sp>
-      <p:cxnSp>
-        <p:nvCxnSpPr>
-          <p:cNvPr id="18" name="Straight Arrow Connector 17">
-            <a:extLst>
-              <a:ext uri="{FF2B5EF4-FFF2-40B4-BE49-F238E27FC236}">
-                <a16:creationId xmlns:a16="http://schemas.microsoft.com/office/drawing/2014/main" id="{DE5CF2FF-CB8F-3045-9D46-74A3C49E5579}"/>
-              </a:ext>
-            </a:extLst>
-          </p:cNvPr>
-          <p:cNvCxnSpPr>
-            <a:cxnSpLocks/>
-            <a:stCxn id="4" idx="0"/>
-            <a:endCxn id="17" idx="2"/>
-          </p:cNvCxnSpPr>
-          <p:nvPr/>
-        </p:nvCxnSpPr>
-        <p:spPr>
-          <a:xfrm flipV="1">
-            <a:off x="6209651" y="1700700"/>
-            <a:ext cx="0" cy="349419"/>
-          </a:xfrm>
-          <a:prstGeom prst="straightConnector1">
-            <a:avLst/>
-          </a:prstGeom>
-          <a:ln>
-            <a:solidFill>
-              <a:schemeClr val="tx1"/>
-            </a:solidFill>
-            <a:headEnd type="none" w="med" len="med"/>
-            <a:tailEnd type="arrow" w="med" len="med"/>
-          </a:ln>
-        </p:spPr>
-        <p:style>
-          <a:lnRef idx="1">
-            <a:schemeClr val="accent1"/>
-          </a:lnRef>
-          <a:fillRef idx="0">
-            <a:schemeClr val="accent1"/>
-          </a:fillRef>
-          <a:effectRef idx="0">
-            <a:schemeClr val="accent1"/>
-          </a:effectRef>
-          <a:fontRef idx="minor">
-            <a:schemeClr val="tx1"/>
-          </a:fontRef>
-        </p:style>
-      </p:cxnSp>
-      <p:sp>
-        <p:nvSpPr>
-          <p:cNvPr id="19" name="TextBox 18">
-            <a:extLst>
-              <a:ext uri="{FF2B5EF4-FFF2-40B4-BE49-F238E27FC236}">
-                <a16:creationId xmlns:a16="http://schemas.microsoft.com/office/drawing/2014/main" id="{38511617-E548-D64D-A7A2-2F9E5B44E73C}"/>
-              </a:ext>
-            </a:extLst>
-          </p:cNvPr>
-          <p:cNvSpPr txBox="1"/>
-          <p:nvPr/>
-        </p:nvSpPr>
-        <p:spPr>
-          <a:xfrm>
-            <a:off x="6209651" y="1740651"/>
-            <a:ext cx="740011" cy="276999"/>
-          </a:xfrm>
-          <a:prstGeom prst="rect">
-            <a:avLst/>
-          </a:prstGeom>
-          <a:noFill/>
-        </p:spPr>
-        <p:txBody>
-          <a:bodyPr wrap="none" rtlCol="0">
-            <a:spAutoFit/>
-          </a:bodyPr>
-          <a:lstStyle/>
-          <a:p>
-            <a:r>
-              <a:rPr lang="en-US" sz="1200"/>
-              <a:t>profileOf</a:t>
-            </a:r>
-          </a:p>
-        </p:txBody>
-      </p:sp>
-      <p:sp>
-        <p:nvSpPr>
-          <p:cNvPr id="27" name="Rounded Rectangle 26">
-            <a:extLst>
-              <a:ext uri="{FF2B5EF4-FFF2-40B4-BE49-F238E27FC236}">
-                <a16:creationId xmlns:a16="http://schemas.microsoft.com/office/drawing/2014/main" id="{587251A7-7CA4-2744-82D1-2B67F7471570}"/>
-              </a:ext>
-            </a:extLst>
-          </p:cNvPr>
-          <p:cNvSpPr/>
-          <p:nvPr/>
-        </p:nvSpPr>
-        <p:spPr>
-          <a:xfrm>
-            <a:off x="3714742" y="5080484"/>
-            <a:ext cx="1248936" cy="657922"/>
-          </a:xfrm>
-          <a:prstGeom prst="roundRect">
-            <a:avLst/>
-          </a:prstGeom>
-          <a:pattFill prst="pct30">
-            <a:fgClr>
-              <a:schemeClr val="bg1">
-                <a:lumMod val="85000"/>
-              </a:schemeClr>
-            </a:fgClr>
-            <a:bgClr>
-              <a:schemeClr val="bg1"/>
-            </a:bgClr>
-          </a:pattFill>
-          <a:ln>
-            <a:solidFill>
-              <a:schemeClr val="tx1"/>
-            </a:solidFill>
-          </a:ln>
-        </p:spPr>
-        <p:style>
-          <a:lnRef idx="2">
-            <a:schemeClr val="accent1">
-              <a:shade val="50000"/>
-            </a:schemeClr>
-          </a:lnRef>
-          <a:fillRef idx="1">
-            <a:schemeClr val="accent1"/>
-          </a:fillRef>
-          <a:effectRef idx="0">
-            <a:schemeClr val="accent1"/>
-          </a:effectRef>
-          <a:fontRef idx="minor">
-            <a:schemeClr val="lt1"/>
-          </a:fontRef>
-        </p:style>
-        <p:txBody>
-          <a:bodyPr rtlCol="0" anchor="ctr"/>
-          <a:lstStyle/>
-          <a:p>
-            <a:pPr algn="ctr"/>
-            <a:r>
-              <a:rPr lang="en-US" sz="1400">
-                <a:solidFill>
-                  <a:schemeClr val="tx1"/>
-                </a:solidFill>
-              </a:rPr>
-              <a:t>SHACL Type</a:t>
-            </a:r>
-          </a:p>
-        </p:txBody>
-      </p:sp>
-      <p:sp>
-        <p:nvSpPr>
-          <p:cNvPr id="28" name="TextBox 27">
-            <a:extLst>
-              <a:ext uri="{FF2B5EF4-FFF2-40B4-BE49-F238E27FC236}">
-                <a16:creationId xmlns:a16="http://schemas.microsoft.com/office/drawing/2014/main" id="{A85CE0BC-E338-A641-8E12-710519FC758E}"/>
-              </a:ext>
-            </a:extLst>
-          </p:cNvPr>
-          <p:cNvSpPr txBox="1"/>
-          <p:nvPr/>
-        </p:nvSpPr>
-        <p:spPr>
-          <a:xfrm>
-            <a:off x="3269479" y="4779606"/>
-            <a:ext cx="1022972" cy="276999"/>
-          </a:xfrm>
-          <a:prstGeom prst="rect">
-            <a:avLst/>
-          </a:prstGeom>
-          <a:noFill/>
-        </p:spPr>
-        <p:txBody>
-          <a:bodyPr wrap="none" rtlCol="0">
-            <a:spAutoFit/>
-          </a:bodyPr>
-          <a:lstStyle/>
-          <a:p>
-            <a:r>
-              <a:rPr lang="en-US" sz="1200"/>
-              <a:t>resourceType</a:t>
-            </a:r>
-          </a:p>
-        </p:txBody>
-      </p:sp>
-      <p:cxnSp>
-        <p:nvCxnSpPr>
-          <p:cNvPr id="29" name="Straight Arrow Connector 28">
-            <a:extLst>
-              <a:ext uri="{FF2B5EF4-FFF2-40B4-BE49-F238E27FC236}">
-                <a16:creationId xmlns:a16="http://schemas.microsoft.com/office/drawing/2014/main" id="{01DBF2DC-41DD-2A44-B770-32E5FFF1B0D3}"/>
-              </a:ext>
-            </a:extLst>
-          </p:cNvPr>
-          <p:cNvCxnSpPr>
-            <a:cxnSpLocks/>
-            <a:stCxn id="14" idx="2"/>
-            <a:endCxn id="27" idx="0"/>
-          </p:cNvCxnSpPr>
-          <p:nvPr/>
-        </p:nvCxnSpPr>
-        <p:spPr>
-          <a:xfrm flipH="1">
-            <a:off x="4339210" y="4722618"/>
-            <a:ext cx="1" cy="357866"/>
-          </a:xfrm>
-          <a:prstGeom prst="straightConnector1">
-            <a:avLst/>
-          </a:prstGeom>
-          <a:ln>
-            <a:solidFill>
-              <a:schemeClr val="tx1"/>
-            </a:solidFill>
-            <a:headEnd type="none" w="med" len="med"/>
-            <a:tailEnd type="arrow" w="med" len="med"/>
-          </a:ln>
-        </p:spPr>
-        <p:style>
-          <a:lnRef idx="1">
-            <a:schemeClr val="accent1"/>
-          </a:lnRef>
-          <a:fillRef idx="0">
-            <a:schemeClr val="accent1"/>
-          </a:fillRef>
-          <a:effectRef idx="0">
-            <a:schemeClr val="accent1"/>
-          </a:effectRef>
-          <a:fontRef idx="minor">
-            <a:schemeClr val="tx1"/>
-          </a:fontRef>
-        </p:style>
-      </p:cxnSp>
-      <p:sp>
-        <p:nvSpPr>
-          <p:cNvPr id="38" name="Rounded Rectangle 37">
-            <a:extLst>
-              <a:ext uri="{FF2B5EF4-FFF2-40B4-BE49-F238E27FC236}">
-                <a16:creationId xmlns:a16="http://schemas.microsoft.com/office/drawing/2014/main" id="{8810FB1D-3F81-B94C-8EE5-688796DDBB92}"/>
-              </a:ext>
-            </a:extLst>
-          </p:cNvPr>
-          <p:cNvSpPr/>
-          <p:nvPr/>
-        </p:nvSpPr>
-        <p:spPr>
-          <a:xfrm>
-            <a:off x="3711778" y="3048908"/>
-            <a:ext cx="1248936" cy="657922"/>
-          </a:xfrm>
-          <a:prstGeom prst="roundRect">
-            <a:avLst/>
-          </a:prstGeom>
-          <a:noFill/>
-          <a:ln>
-            <a:solidFill>
-              <a:schemeClr val="tx1"/>
-            </a:solidFill>
-          </a:ln>
-        </p:spPr>
-        <p:style>
-          <a:lnRef idx="2">
-            <a:schemeClr val="accent1">
-              <a:shade val="50000"/>
-            </a:schemeClr>
-          </a:lnRef>
-          <a:fillRef idx="1">
-            <a:schemeClr val="accent1"/>
-          </a:fillRef>
-          <a:effectRef idx="0">
-            <a:schemeClr val="accent1"/>
-          </a:effectRef>
-          <a:fontRef idx="minor">
-            <a:schemeClr val="lt1"/>
-          </a:fontRef>
-        </p:style>
-        <p:txBody>
-          <a:bodyPr rtlCol="0" anchor="ctr"/>
-          <a:lstStyle/>
-          <a:p>
-            <a:pPr algn="ctr"/>
-            <a:r>
-              <a:rPr lang="en-US" sz="1200">
-                <a:solidFill>
-                  <a:schemeClr val="tx1"/>
-                </a:solidFill>
-              </a:rPr>
-              <a:t>Implementation Resource Descriptor</a:t>
-            </a:r>
-          </a:p>
-        </p:txBody>
-      </p:sp>
-      <p:cxnSp>
-        <p:nvCxnSpPr>
-          <p:cNvPr id="39" name="Straight Arrow Connector 38">
-            <a:extLst>
-              <a:ext uri="{FF2B5EF4-FFF2-40B4-BE49-F238E27FC236}">
-                <a16:creationId xmlns:a16="http://schemas.microsoft.com/office/drawing/2014/main" id="{3F63DADC-7E8C-A842-A90E-E1757739D887}"/>
-              </a:ext>
-            </a:extLst>
-          </p:cNvPr>
-          <p:cNvCxnSpPr>
-            <a:cxnSpLocks/>
-            <a:stCxn id="14" idx="0"/>
-            <a:endCxn id="38" idx="2"/>
-          </p:cNvCxnSpPr>
-          <p:nvPr/>
-        </p:nvCxnSpPr>
-        <p:spPr>
-          <a:xfrm flipH="1" flipV="1">
-            <a:off x="4336246" y="3706830"/>
-            <a:ext cx="2965" cy="357866"/>
-          </a:xfrm>
-          <a:prstGeom prst="straightConnector1">
-            <a:avLst/>
-          </a:prstGeom>
-          <a:ln>
-            <a:solidFill>
-              <a:schemeClr val="tx1"/>
-            </a:solidFill>
-            <a:prstDash val="sysDot"/>
-            <a:headEnd type="none" w="med" len="med"/>
-            <a:tailEnd type="arrow" w="med" len="med"/>
-          </a:ln>
-        </p:spPr>
-        <p:style>
-          <a:lnRef idx="1">
-            <a:schemeClr val="accent1"/>
-          </a:lnRef>
-          <a:fillRef idx="0">
-            <a:schemeClr val="accent1"/>
-          </a:fillRef>
-          <a:effectRef idx="0">
-            <a:schemeClr val="accent1"/>
-          </a:effectRef>
-          <a:fontRef idx="minor">
-            <a:schemeClr val="tx1"/>
-          </a:fontRef>
-        </p:style>
-      </p:cxnSp>
-      <p:sp>
-        <p:nvSpPr>
-          <p:cNvPr id="42" name="Rounded Rectangle 41">
-            <a:extLst>
-              <a:ext uri="{FF2B5EF4-FFF2-40B4-BE49-F238E27FC236}">
-                <a16:creationId xmlns:a16="http://schemas.microsoft.com/office/drawing/2014/main" id="{CA285027-48BC-664D-BC57-516A35809D36}"/>
-              </a:ext>
-            </a:extLst>
-          </p:cNvPr>
-          <p:cNvSpPr/>
-          <p:nvPr/>
-        </p:nvSpPr>
-        <p:spPr>
-          <a:xfrm>
-            <a:off x="7746728" y="2553789"/>
-            <a:ext cx="1248936" cy="657922"/>
-          </a:xfrm>
-          <a:prstGeom prst="roundRect">
-            <a:avLst/>
-          </a:prstGeom>
-          <a:noFill/>
-          <a:ln>
-            <a:solidFill>
-              <a:schemeClr val="tx1"/>
-            </a:solidFill>
-          </a:ln>
-        </p:spPr>
-        <p:style>
-          <a:lnRef idx="2">
-            <a:schemeClr val="accent1">
-              <a:shade val="50000"/>
-            </a:schemeClr>
-          </a:lnRef>
-          <a:fillRef idx="1">
-            <a:schemeClr val="accent1"/>
-          </a:fillRef>
-          <a:effectRef idx="0">
-            <a:schemeClr val="accent1"/>
-          </a:effectRef>
-          <a:fontRef idx="minor">
-            <a:schemeClr val="lt1"/>
-          </a:fontRef>
-        </p:style>
-        <p:txBody>
-          <a:bodyPr rtlCol="0" anchor="ctr"/>
-          <a:lstStyle/>
-          <a:p>
-            <a:pPr algn="ctr"/>
-            <a:r>
-              <a:rPr lang="en-US" sz="1400">
-                <a:solidFill>
-                  <a:schemeClr val="tx1"/>
-                </a:solidFill>
-              </a:rPr>
-              <a:t>Profile</a:t>
-            </a:r>
-          </a:p>
-        </p:txBody>
-      </p:sp>
-      <p:cxnSp>
-        <p:nvCxnSpPr>
-          <p:cNvPr id="43" name="Straight Arrow Connector 42">
-            <a:extLst>
-              <a:ext uri="{FF2B5EF4-FFF2-40B4-BE49-F238E27FC236}">
-                <a16:creationId xmlns:a16="http://schemas.microsoft.com/office/drawing/2014/main" id="{B0A56AA7-8C7C-9A4D-A1FA-4319A3F1F4B2}"/>
-              </a:ext>
-            </a:extLst>
-          </p:cNvPr>
-          <p:cNvCxnSpPr>
-            <a:cxnSpLocks/>
-            <a:stCxn id="4" idx="3"/>
-            <a:endCxn id="42" idx="1"/>
-          </p:cNvCxnSpPr>
-          <p:nvPr/>
-        </p:nvCxnSpPr>
-        <p:spPr>
-          <a:xfrm>
-            <a:off x="6834119" y="2379080"/>
-            <a:ext cx="912609" cy="503670"/>
-          </a:xfrm>
-          <a:prstGeom prst="straightConnector1">
-            <a:avLst/>
-          </a:prstGeom>
-          <a:ln>
-            <a:solidFill>
-              <a:schemeClr val="tx1"/>
-            </a:solidFill>
-            <a:prstDash val="sysDot"/>
-            <a:headEnd type="none" w="med" len="med"/>
-            <a:tailEnd type="arrow" w="med" len="med"/>
-          </a:ln>
-        </p:spPr>
-        <p:style>
-          <a:lnRef idx="1">
-            <a:schemeClr val="accent1"/>
-          </a:lnRef>
-          <a:fillRef idx="0">
-            <a:schemeClr val="accent1"/>
-          </a:fillRef>
-          <a:effectRef idx="0">
-            <a:schemeClr val="accent1"/>
-          </a:effectRef>
-          <a:fontRef idx="minor">
-            <a:schemeClr val="tx1"/>
-          </a:fontRef>
-        </p:style>
-      </p:cxnSp>
-      <p:cxnSp>
-        <p:nvCxnSpPr>
-          <p:cNvPr id="46" name="Straight Arrow Connector 45">
-            <a:extLst>
-              <a:ext uri="{FF2B5EF4-FFF2-40B4-BE49-F238E27FC236}">
-                <a16:creationId xmlns:a16="http://schemas.microsoft.com/office/drawing/2014/main" id="{5C6B8E0D-F109-F941-BB01-3AFCA8CE87FD}"/>
-              </a:ext>
-            </a:extLst>
-          </p:cNvPr>
-          <p:cNvCxnSpPr>
-            <a:cxnSpLocks/>
-            <a:stCxn id="17" idx="3"/>
-            <a:endCxn id="42" idx="1"/>
-          </p:cNvCxnSpPr>
-          <p:nvPr/>
-        </p:nvCxnSpPr>
-        <p:spPr>
-          <a:xfrm>
-            <a:off x="6834119" y="1371739"/>
-            <a:ext cx="912609" cy="1511011"/>
-          </a:xfrm>
-          <a:prstGeom prst="straightConnector1">
-            <a:avLst/>
-          </a:prstGeom>
-          <a:ln>
-            <a:solidFill>
-              <a:schemeClr val="tx1"/>
-            </a:solidFill>
-            <a:prstDash val="sysDot"/>
-            <a:headEnd type="none" w="med" len="med"/>
-            <a:tailEnd type="arrow" w="med" len="med"/>
-          </a:ln>
-        </p:spPr>
-        <p:style>
-          <a:lnRef idx="1">
-            <a:schemeClr val="accent1"/>
-          </a:lnRef>
-          <a:fillRef idx="0">
-            <a:schemeClr val="accent1"/>
-          </a:fillRef>
-          <a:effectRef idx="0">
-            <a:schemeClr val="accent1"/>
-          </a:effectRef>
-          <a:fontRef idx="minor">
-            <a:schemeClr val="tx1"/>
-          </a:fontRef>
-        </p:style>
-      </p:cxnSp>
-      <p:cxnSp>
-        <p:nvCxnSpPr>
-          <p:cNvPr id="49" name="Straight Arrow Connector 48">
-            <a:extLst>
-              <a:ext uri="{FF2B5EF4-FFF2-40B4-BE49-F238E27FC236}">
-                <a16:creationId xmlns:a16="http://schemas.microsoft.com/office/drawing/2014/main" id="{54FECB1F-9F7E-EF46-9D80-7F9E6F8B058D}"/>
-              </a:ext>
-            </a:extLst>
-          </p:cNvPr>
-          <p:cNvCxnSpPr>
-            <a:cxnSpLocks/>
-            <a:stCxn id="3" idx="3"/>
-            <a:endCxn id="42" idx="1"/>
-          </p:cNvCxnSpPr>
-          <p:nvPr/>
-        </p:nvCxnSpPr>
-        <p:spPr>
-          <a:xfrm flipV="1">
-            <a:off x="6834119" y="2882750"/>
-            <a:ext cx="912609" cy="503671"/>
-          </a:xfrm>
-          <a:prstGeom prst="straightConnector1">
-            <a:avLst/>
-          </a:prstGeom>
-          <a:ln>
-            <a:solidFill>
-              <a:schemeClr val="tx1"/>
-            </a:solidFill>
-            <a:prstDash val="sysDot"/>
-            <a:headEnd type="none" w="med" len="med"/>
-            <a:tailEnd type="arrow" w="med" len="med"/>
-          </a:ln>
-        </p:spPr>
-        <p:style>
-          <a:lnRef idx="1">
-            <a:schemeClr val="accent1"/>
-          </a:lnRef>
-          <a:fillRef idx="0">
-            <a:schemeClr val="accent1"/>
-          </a:fillRef>
-          <a:effectRef idx="0">
-            <a:schemeClr val="accent1"/>
-          </a:effectRef>
-          <a:fontRef idx="minor">
-            <a:schemeClr val="tx1"/>
-          </a:fontRef>
-        </p:style>
-      </p:cxnSp>
-      <p:cxnSp>
-        <p:nvCxnSpPr>
-          <p:cNvPr id="52" name="Straight Arrow Connector 51">
-            <a:extLst>
-              <a:ext uri="{FF2B5EF4-FFF2-40B4-BE49-F238E27FC236}">
-                <a16:creationId xmlns:a16="http://schemas.microsoft.com/office/drawing/2014/main" id="{E380CDC6-BE87-694A-B33D-6DAFDF8ADA86}"/>
-              </a:ext>
-            </a:extLst>
-          </p:cNvPr>
-          <p:cNvCxnSpPr>
-            <a:cxnSpLocks/>
-            <a:stCxn id="9" idx="3"/>
-            <a:endCxn id="42" idx="1"/>
-          </p:cNvCxnSpPr>
-          <p:nvPr/>
-        </p:nvCxnSpPr>
-        <p:spPr>
-          <a:xfrm flipV="1">
-            <a:off x="6837083" y="2882750"/>
-            <a:ext cx="909645" cy="1511012"/>
-          </a:xfrm>
-          <a:prstGeom prst="straightConnector1">
-            <a:avLst/>
-          </a:prstGeom>
-          <a:ln>
-            <a:solidFill>
-              <a:schemeClr val="tx1"/>
-            </a:solidFill>
-            <a:prstDash val="sysDot"/>
-            <a:headEnd type="none" w="med" len="med"/>
-            <a:tailEnd type="arrow" w="med" len="med"/>
-          </a:ln>
-        </p:spPr>
-        <p:style>
-          <a:lnRef idx="1">
-            <a:schemeClr val="accent1"/>
-          </a:lnRef>
-          <a:fillRef idx="0">
-            <a:schemeClr val="accent1"/>
-          </a:fillRef>
-          <a:effectRef idx="0">
-            <a:schemeClr val="accent1"/>
-          </a:effectRef>
-          <a:fontRef idx="minor">
-            <a:schemeClr val="tx1"/>
-          </a:fontRef>
-        </p:style>
-      </p:cxnSp>
-      <p:sp>
-        <p:nvSpPr>
-          <p:cNvPr id="59" name="Rounded Rectangle 58">
-            <a:extLst>
-              <a:ext uri="{FF2B5EF4-FFF2-40B4-BE49-F238E27FC236}">
-                <a16:creationId xmlns:a16="http://schemas.microsoft.com/office/drawing/2014/main" id="{8729507C-4BF5-564A-BA43-D2D915A89293}"/>
-              </a:ext>
-            </a:extLst>
-          </p:cNvPr>
-          <p:cNvSpPr/>
-          <p:nvPr/>
-        </p:nvSpPr>
-        <p:spPr>
-          <a:xfrm>
-            <a:off x="1841339" y="4069723"/>
-            <a:ext cx="1248936" cy="657922"/>
-          </a:xfrm>
-          <a:prstGeom prst="roundRect">
-            <a:avLst/>
-          </a:prstGeom>
-          <a:pattFill prst="pct30">
-            <a:fgClr>
-              <a:schemeClr val="bg1">
-                <a:lumMod val="85000"/>
-              </a:schemeClr>
-            </a:fgClr>
-            <a:bgClr>
-              <a:schemeClr val="bg1"/>
-            </a:bgClr>
-          </a:pattFill>
-          <a:ln>
-            <a:solidFill>
-              <a:schemeClr val="tx1"/>
-            </a:solidFill>
-          </a:ln>
-        </p:spPr>
-        <p:style>
-          <a:lnRef idx="2">
-            <a:schemeClr val="accent1">
-              <a:shade val="50000"/>
-            </a:schemeClr>
-          </a:lnRef>
-          <a:fillRef idx="1">
-            <a:schemeClr val="accent1"/>
-          </a:fillRef>
-          <a:effectRef idx="0">
-            <a:schemeClr val="accent1"/>
-          </a:effectRef>
-          <a:fontRef idx="minor">
-            <a:schemeClr val="lt1"/>
-          </a:fontRef>
-        </p:style>
-        <p:txBody>
-          <a:bodyPr rtlCol="0" anchor="ctr"/>
-          <a:lstStyle/>
-          <a:p>
-            <a:pPr algn="ctr"/>
-            <a:r>
-              <a:rPr lang="en-US" sz="1400">
-                <a:solidFill>
-                  <a:schemeClr val="tx1"/>
-                </a:solidFill>
-              </a:rPr>
-              <a:t>text/turtle</a:t>
-            </a:r>
-          </a:p>
-        </p:txBody>
-      </p:sp>
-      <p:sp>
-        <p:nvSpPr>
-          <p:cNvPr id="60" name="TextBox 59">
-            <a:extLst>
-              <a:ext uri="{FF2B5EF4-FFF2-40B4-BE49-F238E27FC236}">
-                <a16:creationId xmlns:a16="http://schemas.microsoft.com/office/drawing/2014/main" id="{1DC2AECD-C57A-6342-A7A8-3378E6E314CF}"/>
-              </a:ext>
-            </a:extLst>
-          </p:cNvPr>
-          <p:cNvSpPr txBox="1"/>
-          <p:nvPr/>
-        </p:nvSpPr>
-        <p:spPr>
-          <a:xfrm>
-            <a:off x="3081708" y="4075554"/>
-            <a:ext cx="609654" cy="276999"/>
-          </a:xfrm>
-          <a:prstGeom prst="rect">
-            <a:avLst/>
-          </a:prstGeom>
-          <a:noFill/>
-        </p:spPr>
-        <p:txBody>
-          <a:bodyPr wrap="none" rtlCol="0">
-            <a:spAutoFit/>
-          </a:bodyPr>
-          <a:lstStyle/>
-          <a:p>
-            <a:r>
-              <a:rPr lang="en-US" sz="1200"/>
-              <a:t>format</a:t>
-            </a:r>
-          </a:p>
-        </p:txBody>
-      </p:sp>
-      <p:cxnSp>
-        <p:nvCxnSpPr>
-          <p:cNvPr id="61" name="Straight Arrow Connector 60">
-            <a:extLst>
-              <a:ext uri="{FF2B5EF4-FFF2-40B4-BE49-F238E27FC236}">
-                <a16:creationId xmlns:a16="http://schemas.microsoft.com/office/drawing/2014/main" id="{57DFF0D6-9358-864D-B53E-F79449A5D797}"/>
-              </a:ext>
-            </a:extLst>
-          </p:cNvPr>
-          <p:cNvCxnSpPr>
-            <a:cxnSpLocks/>
-            <a:stCxn id="14" idx="1"/>
-            <a:endCxn id="59" idx="3"/>
-          </p:cNvCxnSpPr>
-          <p:nvPr/>
-        </p:nvCxnSpPr>
-        <p:spPr>
-          <a:xfrm flipH="1">
-            <a:off x="3090275" y="4393657"/>
-            <a:ext cx="624468" cy="5027"/>
-          </a:xfrm>
-          <a:prstGeom prst="straightConnector1">
-            <a:avLst/>
-          </a:prstGeom>
-          <a:ln>
-            <a:solidFill>
-              <a:schemeClr val="tx1"/>
-            </a:solidFill>
-            <a:headEnd type="none" w="med" len="med"/>
-            <a:tailEnd type="arrow" w="med" len="med"/>
-          </a:ln>
-        </p:spPr>
-        <p:style>
-          <a:lnRef idx="1">
-            <a:schemeClr val="accent1"/>
-          </a:lnRef>
-          <a:fillRef idx="0">
-            <a:schemeClr val="accent1"/>
-          </a:fillRef>
-          <a:effectRef idx="0">
-            <a:schemeClr val="accent1"/>
-          </a:effectRef>
-          <a:fontRef idx="minor">
-            <a:schemeClr val="tx1"/>
-          </a:fontRef>
-        </p:style>
-      </p:cxnSp>
-      <p:sp>
-        <p:nvSpPr>
-          <p:cNvPr id="64" name="Rounded Rectangle 63">
-            <a:extLst>
-              <a:ext uri="{FF2B5EF4-FFF2-40B4-BE49-F238E27FC236}">
-                <a16:creationId xmlns:a16="http://schemas.microsoft.com/office/drawing/2014/main" id="{202A055C-CB21-5743-882F-5AA94E4F5933}"/>
-              </a:ext>
-            </a:extLst>
-          </p:cNvPr>
-          <p:cNvSpPr/>
-          <p:nvPr/>
-        </p:nvSpPr>
-        <p:spPr>
-          <a:xfrm>
-            <a:off x="3711778" y="6070826"/>
-            <a:ext cx="1248936" cy="657922"/>
-          </a:xfrm>
-          <a:prstGeom prst="roundRect">
-            <a:avLst/>
-          </a:prstGeom>
-          <a:noFill/>
-          <a:ln>
-            <a:solidFill>
-              <a:schemeClr val="tx1"/>
-            </a:solidFill>
-          </a:ln>
-        </p:spPr>
-        <p:style>
-          <a:lnRef idx="2">
-            <a:schemeClr val="accent1">
-              <a:shade val="50000"/>
-            </a:schemeClr>
-          </a:lnRef>
-          <a:fillRef idx="1">
-            <a:schemeClr val="accent1"/>
-          </a:fillRef>
-          <a:effectRef idx="0">
-            <a:schemeClr val="accent1"/>
-          </a:effectRef>
-          <a:fontRef idx="minor">
-            <a:schemeClr val="lt1"/>
-          </a:fontRef>
-        </p:style>
-        <p:txBody>
-          <a:bodyPr rtlCol="0" anchor="ctr"/>
-          <a:lstStyle/>
-          <a:p>
-            <a:pPr algn="ctr"/>
-            <a:r>
-              <a:rPr lang="en-US" sz="1200">
-                <a:solidFill>
-                  <a:schemeClr val="tx1"/>
-                </a:solidFill>
-              </a:rPr>
-              <a:t>Implementation Resource Type</a:t>
-            </a:r>
-          </a:p>
-        </p:txBody>
-      </p:sp>
-      <p:cxnSp>
-        <p:nvCxnSpPr>
-          <p:cNvPr id="65" name="Straight Arrow Connector 64">
-            <a:extLst>
-              <a:ext uri="{FF2B5EF4-FFF2-40B4-BE49-F238E27FC236}">
-                <a16:creationId xmlns:a16="http://schemas.microsoft.com/office/drawing/2014/main" id="{8765C6B3-DAE2-3E45-960D-AD1152789881}"/>
-              </a:ext>
-            </a:extLst>
-          </p:cNvPr>
-          <p:cNvCxnSpPr>
-            <a:cxnSpLocks/>
-            <a:stCxn id="27" idx="2"/>
-            <a:endCxn id="64" idx="0"/>
-          </p:cNvCxnSpPr>
-          <p:nvPr/>
-        </p:nvCxnSpPr>
-        <p:spPr>
-          <a:xfrm flipH="1">
-            <a:off x="4336246" y="5738406"/>
-            <a:ext cx="2964" cy="332420"/>
-          </a:xfrm>
-          <a:prstGeom prst="straightConnector1">
-            <a:avLst/>
-          </a:prstGeom>
-          <a:ln>
-            <a:solidFill>
-              <a:schemeClr val="tx1"/>
-            </a:solidFill>
-            <a:prstDash val="sysDot"/>
-            <a:headEnd type="none" w="med" len="med"/>
-            <a:tailEnd type="arrow" w="med" len="med"/>
-          </a:ln>
-        </p:spPr>
-        <p:style>
-          <a:lnRef idx="1">
-            <a:schemeClr val="accent1"/>
-          </a:lnRef>
-          <a:fillRef idx="0">
-            <a:schemeClr val="accent1"/>
-          </a:fillRef>
-          <a:effectRef idx="0">
-            <a:schemeClr val="accent1"/>
-          </a:effectRef>
-          <a:fontRef idx="minor">
-            <a:schemeClr val="tx1"/>
-          </a:fontRef>
-        </p:style>
-      </p:cxnSp>
-      <p:sp>
-        <p:nvSpPr>
-          <p:cNvPr id="68" name="Rounded Rectangle 67">
-            <a:extLst>
-              <a:ext uri="{FF2B5EF4-FFF2-40B4-BE49-F238E27FC236}">
-                <a16:creationId xmlns:a16="http://schemas.microsoft.com/office/drawing/2014/main" id="{558A0ED2-4543-5240-BBD6-BE61501F5F0A}"/>
-              </a:ext>
-            </a:extLst>
-          </p:cNvPr>
-          <p:cNvSpPr/>
-          <p:nvPr/>
-        </p:nvSpPr>
-        <p:spPr>
-          <a:xfrm>
-            <a:off x="1842436" y="3047803"/>
-            <a:ext cx="1248936" cy="657922"/>
-          </a:xfrm>
-          <a:prstGeom prst="roundRect">
-            <a:avLst/>
-          </a:prstGeom>
-          <a:noFill/>
-          <a:ln>
-            <a:solidFill>
-              <a:schemeClr val="tx1"/>
-            </a:solidFill>
-          </a:ln>
-        </p:spPr>
-        <p:style>
-          <a:lnRef idx="2">
-            <a:schemeClr val="accent1">
-              <a:shade val="50000"/>
-            </a:schemeClr>
-          </a:lnRef>
-          <a:fillRef idx="1">
-            <a:schemeClr val="accent1"/>
-          </a:fillRef>
-          <a:effectRef idx="0">
-            <a:schemeClr val="accent1"/>
-          </a:effectRef>
-          <a:fontRef idx="minor">
-            <a:schemeClr val="lt1"/>
-          </a:fontRef>
-        </p:style>
-        <p:txBody>
-          <a:bodyPr rtlCol="0" anchor="ctr"/>
-          <a:lstStyle/>
-          <a:p>
-            <a:pPr algn="ctr"/>
-            <a:r>
-              <a:rPr lang="en-US" sz="1200">
-                <a:solidFill>
-                  <a:schemeClr val="tx1"/>
-                </a:solidFill>
-              </a:rPr>
-              <a:t>dct:</a:t>
-            </a:r>
-            <a:br>
-              <a:rPr lang="en-US" sz="1200">
-                <a:solidFill>
-                  <a:schemeClr val="tx1"/>
-                </a:solidFill>
-              </a:rPr>
-            </a:br>
-            <a:r>
-              <a:rPr lang="en-US" sz="1200">
-                <a:solidFill>
-                  <a:schemeClr val="tx1"/>
-                </a:solidFill>
-              </a:rPr>
-              <a:t>MediaType</a:t>
-            </a:r>
-            <a:br>
-              <a:rPr lang="en-US" sz="1200">
-                <a:solidFill>
-                  <a:schemeClr val="tx1"/>
-                </a:solidFill>
-              </a:rPr>
-            </a:br>
-            <a:r>
-              <a:rPr lang="en-US" sz="1200">
-                <a:solidFill>
-                  <a:schemeClr val="tx1"/>
-                </a:solidFill>
-              </a:rPr>
-              <a:t>OrExtent</a:t>
-            </a:r>
-          </a:p>
-        </p:txBody>
-      </p:sp>
-      <p:cxnSp>
-        <p:nvCxnSpPr>
-          <p:cNvPr id="69" name="Straight Arrow Connector 68">
-            <a:extLst>
-              <a:ext uri="{FF2B5EF4-FFF2-40B4-BE49-F238E27FC236}">
-                <a16:creationId xmlns:a16="http://schemas.microsoft.com/office/drawing/2014/main" id="{189A9B69-137B-B448-A2C7-772C0E480B1B}"/>
-              </a:ext>
-            </a:extLst>
-          </p:cNvPr>
-          <p:cNvCxnSpPr>
-            <a:cxnSpLocks/>
-            <a:stCxn id="59" idx="0"/>
-            <a:endCxn id="68" idx="2"/>
-          </p:cNvCxnSpPr>
-          <p:nvPr/>
-        </p:nvCxnSpPr>
-        <p:spPr>
-          <a:xfrm flipV="1">
-            <a:off x="2465807" y="3705725"/>
-            <a:ext cx="1097" cy="363998"/>
-          </a:xfrm>
-          <a:prstGeom prst="straightConnector1">
-            <a:avLst/>
-          </a:prstGeom>
-          <a:ln>
-            <a:solidFill>
-              <a:schemeClr val="tx1"/>
-            </a:solidFill>
-            <a:prstDash val="sysDot"/>
-            <a:headEnd type="none" w="med" len="med"/>
-            <a:tailEnd type="arrow" w="med" len="med"/>
-          </a:ln>
-        </p:spPr>
-        <p:style>
-          <a:lnRef idx="1">
-            <a:schemeClr val="accent1"/>
-          </a:lnRef>
-          <a:fillRef idx="0">
-            <a:schemeClr val="accent1"/>
-          </a:fillRef>
-          <a:effectRef idx="0">
-            <a:schemeClr val="accent1"/>
-          </a:effectRef>
-          <a:fontRef idx="minor">
-            <a:schemeClr val="tx1"/>
-          </a:fontRef>
-        </p:style>
-      </p:cxnSp>
-      <p:sp>
-        <p:nvSpPr>
-          <p:cNvPr id="54" name="Rounded Rectangle 53">
-            <a:extLst>
-              <a:ext uri="{FF2B5EF4-FFF2-40B4-BE49-F238E27FC236}">
-                <a16:creationId xmlns:a16="http://schemas.microsoft.com/office/drawing/2014/main" id="{CFD7C012-C8E2-A248-8C06-8A1B7C3D94CE}"/>
-              </a:ext>
-            </a:extLst>
-          </p:cNvPr>
-          <p:cNvSpPr/>
-          <p:nvPr/>
-        </p:nvSpPr>
-        <p:spPr>
-          <a:xfrm>
-            <a:off x="3711778" y="1042778"/>
-            <a:ext cx="1248936" cy="657922"/>
-          </a:xfrm>
-          <a:prstGeom prst="roundRect">
-            <a:avLst/>
-          </a:prstGeom>
-          <a:noFill/>
-          <a:ln>
-            <a:solidFill>
-              <a:schemeClr val="tx1"/>
-            </a:solidFill>
-          </a:ln>
-        </p:spPr>
-        <p:style>
-          <a:lnRef idx="2">
-            <a:schemeClr val="accent1">
-              <a:shade val="50000"/>
-            </a:schemeClr>
-          </a:lnRef>
-          <a:fillRef idx="1">
-            <a:schemeClr val="accent1"/>
-          </a:fillRef>
-          <a:effectRef idx="0">
-            <a:schemeClr val="accent1"/>
-          </a:effectRef>
-          <a:fontRef idx="minor">
-            <a:schemeClr val="lt1"/>
-          </a:fontRef>
-        </p:style>
-        <p:txBody>
-          <a:bodyPr rtlCol="0" anchor="ctr"/>
-          <a:lstStyle/>
-          <a:p>
-            <a:pPr algn="ctr"/>
-            <a:r>
-              <a:rPr lang="en-US" sz="1400">
-                <a:solidFill>
-                  <a:schemeClr val="tx1"/>
-                </a:solidFill>
-              </a:rPr>
-              <a:t>Base Specification</a:t>
-            </a:r>
-          </a:p>
-        </p:txBody>
-      </p:sp>
-      <p:cxnSp>
-        <p:nvCxnSpPr>
-          <p:cNvPr id="56" name="Straight Arrow Connector 55">
-            <a:extLst>
-              <a:ext uri="{FF2B5EF4-FFF2-40B4-BE49-F238E27FC236}">
-                <a16:creationId xmlns:a16="http://schemas.microsoft.com/office/drawing/2014/main" id="{BD46F09A-550D-9E42-9E54-EB6D31C8C3E9}"/>
-              </a:ext>
-            </a:extLst>
-          </p:cNvPr>
-          <p:cNvCxnSpPr>
-            <a:cxnSpLocks/>
-            <a:stCxn id="17" idx="1"/>
-            <a:endCxn id="54" idx="3"/>
-          </p:cNvCxnSpPr>
-          <p:nvPr/>
-        </p:nvCxnSpPr>
-        <p:spPr>
-          <a:xfrm flipH="1">
-            <a:off x="4960714" y="1371739"/>
-            <a:ext cx="624469" cy="0"/>
-          </a:xfrm>
-          <a:prstGeom prst="straightConnector1">
-            <a:avLst/>
-          </a:prstGeom>
-          <a:ln>
-            <a:solidFill>
-              <a:schemeClr val="tx1"/>
-            </a:solidFill>
-            <a:prstDash val="sysDot"/>
-            <a:headEnd type="none" w="med" len="med"/>
-            <a:tailEnd type="arrow" w="med" len="med"/>
-          </a:ln>
-        </p:spPr>
-        <p:style>
-          <a:lnRef idx="1">
-            <a:schemeClr val="accent1"/>
-          </a:lnRef>
-          <a:fillRef idx="0">
-            <a:schemeClr val="accent1"/>
-          </a:fillRef>
-          <a:effectRef idx="0">
-            <a:schemeClr val="accent1"/>
-          </a:effectRef>
-          <a:fontRef idx="minor">
-            <a:schemeClr val="tx1"/>
-          </a:fontRef>
-        </p:style>
-      </p:cxnSp>
-      <p:sp>
-        <p:nvSpPr>
-          <p:cNvPr id="44" name="Rounded Rectangle 43">
-            <a:extLst>
-              <a:ext uri="{FF2B5EF4-FFF2-40B4-BE49-F238E27FC236}">
-                <a16:creationId xmlns:a16="http://schemas.microsoft.com/office/drawing/2014/main" id="{142205B0-9896-2C41-8B71-F3A7823A2F59}"/>
-              </a:ext>
-            </a:extLst>
-          </p:cNvPr>
-          <p:cNvSpPr/>
-          <p:nvPr/>
-        </p:nvSpPr>
-        <p:spPr>
-          <a:xfrm>
-            <a:off x="206690" y="2380079"/>
-            <a:ext cx="1248936" cy="657922"/>
-          </a:xfrm>
-          <a:prstGeom prst="roundRect">
-            <a:avLst/>
-          </a:prstGeom>
-          <a:pattFill prst="pct30">
-            <a:fgClr>
-              <a:schemeClr val="bg1">
-                <a:lumMod val="85000"/>
-              </a:schemeClr>
-            </a:fgClr>
-            <a:bgClr>
-              <a:schemeClr val="bg1"/>
-            </a:bgClr>
-          </a:pattFill>
-          <a:ln>
-            <a:solidFill>
-              <a:schemeClr val="tx1"/>
-            </a:solidFill>
-          </a:ln>
-        </p:spPr>
-        <p:style>
-          <a:lnRef idx="2">
-            <a:schemeClr val="accent1">
-              <a:shade val="50000"/>
-            </a:schemeClr>
-          </a:lnRef>
-          <a:fillRef idx="1">
-            <a:schemeClr val="accent1"/>
-          </a:fillRef>
-          <a:effectRef idx="0">
-            <a:schemeClr val="accent1"/>
-          </a:effectRef>
-          <a:fontRef idx="minor">
-            <a:schemeClr val="lt1"/>
-          </a:fontRef>
-        </p:style>
-        <p:txBody>
-          <a:bodyPr rtlCol="0" anchor="ctr"/>
-          <a:lstStyle/>
-          <a:p>
-            <a:pPr algn="ctr"/>
-            <a:r>
-              <a:rPr lang="en-US" sz="1400">
-                <a:solidFill>
-                  <a:schemeClr val="tx1"/>
-                </a:solidFill>
-              </a:rPr>
-              <a:t>owl:Named</a:t>
-            </a:r>
-            <a:br>
-              <a:rPr lang="en-US" sz="1400">
-                <a:solidFill>
-                  <a:schemeClr val="tx1"/>
-                </a:solidFill>
-              </a:rPr>
-            </a:br>
-            <a:r>
-              <a:rPr lang="en-US" sz="1400">
-                <a:solidFill>
-                  <a:schemeClr val="tx1"/>
-                </a:solidFill>
-              </a:rPr>
-              <a:t>Individual</a:t>
-            </a:r>
-          </a:p>
-        </p:txBody>
-      </p:sp>
-      <p:cxnSp>
-        <p:nvCxnSpPr>
-          <p:cNvPr id="45" name="Straight Arrow Connector 44">
-            <a:extLst>
-              <a:ext uri="{FF2B5EF4-FFF2-40B4-BE49-F238E27FC236}">
-                <a16:creationId xmlns:a16="http://schemas.microsoft.com/office/drawing/2014/main" id="{D148B9FF-6FB9-A840-B29C-B3D9FABAD000}"/>
-              </a:ext>
-            </a:extLst>
-          </p:cNvPr>
-          <p:cNvCxnSpPr>
-            <a:cxnSpLocks/>
-          </p:cNvCxnSpPr>
-          <p:nvPr/>
-        </p:nvCxnSpPr>
-        <p:spPr>
-          <a:xfrm flipV="1">
-            <a:off x="367899" y="3877666"/>
-            <a:ext cx="0" cy="423748"/>
-          </a:xfrm>
-          <a:prstGeom prst="straightConnector1">
-            <a:avLst/>
-          </a:prstGeom>
-          <a:ln>
-            <a:solidFill>
-              <a:schemeClr val="tx1"/>
-            </a:solidFill>
-            <a:prstDash val="sysDot"/>
-            <a:headEnd type="none" w="med" len="med"/>
-            <a:tailEnd type="arrow" w="med" len="med"/>
-          </a:ln>
-        </p:spPr>
-        <p:style>
-          <a:lnRef idx="1">
-            <a:schemeClr val="accent1"/>
-          </a:lnRef>
-          <a:fillRef idx="0">
-            <a:schemeClr val="accent1"/>
-          </a:fillRef>
-          <a:effectRef idx="0">
-            <a:schemeClr val="accent1"/>
-          </a:effectRef>
-          <a:fontRef idx="minor">
-            <a:schemeClr val="tx1"/>
-          </a:fontRef>
-        </p:style>
-      </p:cxnSp>
-      <p:sp>
-        <p:nvSpPr>
-          <p:cNvPr id="47" name="TextBox 46">
-            <a:extLst>
-              <a:ext uri="{FF2B5EF4-FFF2-40B4-BE49-F238E27FC236}">
-                <a16:creationId xmlns:a16="http://schemas.microsoft.com/office/drawing/2014/main" id="{042771F8-2345-BC45-A168-3460576134B1}"/>
-              </a:ext>
-            </a:extLst>
-          </p:cNvPr>
-          <p:cNvSpPr txBox="1"/>
-          <p:nvPr/>
-        </p:nvSpPr>
-        <p:spPr>
-          <a:xfrm>
-            <a:off x="404064" y="3951040"/>
-            <a:ext cx="681084" cy="276999"/>
-          </a:xfrm>
-          <a:prstGeom prst="rect">
-            <a:avLst/>
-          </a:prstGeom>
-          <a:noFill/>
-        </p:spPr>
-        <p:txBody>
-          <a:bodyPr wrap="none" rtlCol="0">
-            <a:spAutoFit/>
-          </a:bodyPr>
-          <a:lstStyle/>
-          <a:p>
-            <a:r>
-              <a:rPr lang="en-US" sz="1200"/>
-              <a:t>rdf:type</a:t>
-            </a:r>
-          </a:p>
-        </p:txBody>
-      </p:sp>
-      <p:cxnSp>
-        <p:nvCxnSpPr>
-          <p:cNvPr id="48" name="Straight Arrow Connector 47">
-            <a:extLst>
-              <a:ext uri="{FF2B5EF4-FFF2-40B4-BE49-F238E27FC236}">
-                <a16:creationId xmlns:a16="http://schemas.microsoft.com/office/drawing/2014/main" id="{65E49062-16CD-3047-819F-A20C5D88A104}"/>
-              </a:ext>
-            </a:extLst>
-          </p:cNvPr>
-          <p:cNvCxnSpPr>
-            <a:cxnSpLocks/>
-          </p:cNvCxnSpPr>
-          <p:nvPr/>
-        </p:nvCxnSpPr>
-        <p:spPr>
-          <a:xfrm flipV="1">
-            <a:off x="365409" y="4578320"/>
-            <a:ext cx="0" cy="423747"/>
-          </a:xfrm>
-          <a:prstGeom prst="straightConnector1">
-            <a:avLst/>
-          </a:prstGeom>
-          <a:ln>
-            <a:solidFill>
-              <a:schemeClr val="tx1"/>
-            </a:solidFill>
-            <a:prstDash val="dash"/>
-            <a:headEnd type="none" w="med" len="med"/>
-            <a:tailEnd type="arrow" w="med" len="med"/>
-          </a:ln>
-        </p:spPr>
-        <p:style>
-          <a:lnRef idx="1">
-            <a:schemeClr val="accent1"/>
-          </a:lnRef>
-          <a:fillRef idx="0">
-            <a:schemeClr val="accent1"/>
-          </a:fillRef>
-          <a:effectRef idx="0">
-            <a:schemeClr val="accent1"/>
-          </a:effectRef>
-          <a:fontRef idx="minor">
-            <a:schemeClr val="tx1"/>
-          </a:fontRef>
-        </p:style>
-      </p:cxnSp>
-      <p:sp>
-        <p:nvSpPr>
-          <p:cNvPr id="50" name="TextBox 49">
-            <a:extLst>
-              <a:ext uri="{FF2B5EF4-FFF2-40B4-BE49-F238E27FC236}">
-                <a16:creationId xmlns:a16="http://schemas.microsoft.com/office/drawing/2014/main" id="{F5C378C5-2A61-B74E-B715-FE406E6C36E9}"/>
-              </a:ext>
-            </a:extLst>
-          </p:cNvPr>
-          <p:cNvSpPr txBox="1"/>
-          <p:nvPr/>
-        </p:nvSpPr>
-        <p:spPr>
-          <a:xfrm>
-            <a:off x="407692" y="4651693"/>
-            <a:ext cx="1145506" cy="276999"/>
-          </a:xfrm>
-          <a:prstGeom prst="rect">
-            <a:avLst/>
-          </a:prstGeom>
-          <a:noFill/>
-        </p:spPr>
-        <p:txBody>
-          <a:bodyPr wrap="none" rtlCol="0">
-            <a:spAutoFit/>
-          </a:bodyPr>
-          <a:lstStyle/>
-          <a:p>
-            <a:r>
-              <a:rPr lang="en-US" sz="1200"/>
-              <a:t>rdfs:subClassOf</a:t>
-            </a:r>
-          </a:p>
-        </p:txBody>
-      </p:sp>
-      <p:sp>
-        <p:nvSpPr>
-          <p:cNvPr id="51" name="Rounded Rectangle 50">
-            <a:extLst>
-              <a:ext uri="{FF2B5EF4-FFF2-40B4-BE49-F238E27FC236}">
-                <a16:creationId xmlns:a16="http://schemas.microsoft.com/office/drawing/2014/main" id="{8322AC81-8FA0-6542-8B3C-5F1A3EB529D9}"/>
-              </a:ext>
-            </a:extLst>
-          </p:cNvPr>
-          <p:cNvSpPr/>
-          <p:nvPr/>
-        </p:nvSpPr>
-        <p:spPr>
-          <a:xfrm>
-            <a:off x="206690" y="1536356"/>
-            <a:ext cx="1248936" cy="657922"/>
-          </a:xfrm>
-          <a:prstGeom prst="roundRect">
-            <a:avLst/>
-          </a:prstGeom>
-          <a:noFill/>
-          <a:ln>
-            <a:solidFill>
-              <a:schemeClr val="tx1"/>
-            </a:solidFill>
-          </a:ln>
-        </p:spPr>
-        <p:style>
-          <a:lnRef idx="2">
-            <a:schemeClr val="accent1">
-              <a:shade val="50000"/>
-            </a:schemeClr>
-          </a:lnRef>
-          <a:fillRef idx="1">
-            <a:schemeClr val="accent1"/>
-          </a:fillRef>
-          <a:effectRef idx="0">
-            <a:schemeClr val="accent1"/>
-          </a:effectRef>
-          <a:fontRef idx="minor">
-            <a:schemeClr val="lt1"/>
-          </a:fontRef>
-        </p:style>
-        <p:txBody>
-          <a:bodyPr rtlCol="0" anchor="ctr"/>
-          <a:lstStyle/>
-          <a:p>
-            <a:pPr algn="ctr"/>
-            <a:r>
-              <a:rPr lang="en-US" sz="1400">
-                <a:solidFill>
-                  <a:schemeClr val="tx1"/>
-                </a:solidFill>
-              </a:rPr>
-              <a:t>owl:Class</a:t>
-            </a:r>
-          </a:p>
-        </p:txBody>
-      </p:sp>
-      <p:cxnSp>
-        <p:nvCxnSpPr>
-          <p:cNvPr id="53" name="Straight Arrow Connector 52">
-            <a:extLst>
-              <a:ext uri="{FF2B5EF4-FFF2-40B4-BE49-F238E27FC236}">
-                <a16:creationId xmlns:a16="http://schemas.microsoft.com/office/drawing/2014/main" id="{E7699B50-3BE3-2742-97A0-BE818AA30B42}"/>
-              </a:ext>
-            </a:extLst>
-          </p:cNvPr>
-          <p:cNvCxnSpPr>
-            <a:cxnSpLocks/>
-          </p:cNvCxnSpPr>
-          <p:nvPr/>
-        </p:nvCxnSpPr>
-        <p:spPr>
-          <a:xfrm flipV="1">
-            <a:off x="367899" y="3211843"/>
-            <a:ext cx="0" cy="423748"/>
-          </a:xfrm>
-          <a:prstGeom prst="straightConnector1">
-            <a:avLst/>
-          </a:prstGeom>
-          <a:ln>
-            <a:solidFill>
-              <a:schemeClr val="tx1"/>
-            </a:solidFill>
-            <a:prstDash val="solid"/>
-            <a:headEnd type="none" w="med" len="med"/>
-            <a:tailEnd type="arrow" w="med" len="med"/>
-          </a:ln>
-        </p:spPr>
-        <p:style>
-          <a:lnRef idx="1">
-            <a:schemeClr val="accent1"/>
-          </a:lnRef>
-          <a:fillRef idx="0">
-            <a:schemeClr val="accent1"/>
-          </a:fillRef>
-          <a:effectRef idx="0">
-            <a:schemeClr val="accent1"/>
-          </a:effectRef>
-          <a:fontRef idx="minor">
-            <a:schemeClr val="tx1"/>
-          </a:fontRef>
-        </p:style>
-      </p:cxnSp>
-      <p:sp>
-        <p:nvSpPr>
-          <p:cNvPr id="55" name="TextBox 54">
-            <a:extLst>
-              <a:ext uri="{FF2B5EF4-FFF2-40B4-BE49-F238E27FC236}">
-                <a16:creationId xmlns:a16="http://schemas.microsoft.com/office/drawing/2014/main" id="{7B8C4B47-F124-0948-A0CA-1A283C6D175F}"/>
-              </a:ext>
-            </a:extLst>
-          </p:cNvPr>
-          <p:cNvSpPr txBox="1"/>
-          <p:nvPr/>
-        </p:nvSpPr>
-        <p:spPr>
-          <a:xfrm>
-            <a:off x="404064" y="3285217"/>
-            <a:ext cx="727187" cy="276999"/>
-          </a:xfrm>
-          <a:prstGeom prst="rect">
-            <a:avLst/>
-          </a:prstGeom>
-          <a:noFill/>
-        </p:spPr>
-        <p:txBody>
-          <a:bodyPr wrap="none" rtlCol="0">
-            <a:spAutoFit/>
-          </a:bodyPr>
-          <a:lstStyle/>
-          <a:p>
-            <a:r>
-              <a:rPr lang="en-US" sz="1200"/>
-              <a:t>property</a:t>
-            </a:r>
-          </a:p>
-        </p:txBody>
-      </p:sp>
-      <p:sp>
-        <p:nvSpPr>
-          <p:cNvPr id="57" name="TextBox 56">
-            <a:extLst>
-              <a:ext uri="{FF2B5EF4-FFF2-40B4-BE49-F238E27FC236}">
-                <a16:creationId xmlns:a16="http://schemas.microsoft.com/office/drawing/2014/main" id="{1EBB0CCE-125B-9142-9F76-73FFD785BDCF}"/>
-              </a:ext>
-            </a:extLst>
-          </p:cNvPr>
-          <p:cNvSpPr txBox="1"/>
-          <p:nvPr/>
-        </p:nvSpPr>
-        <p:spPr>
-          <a:xfrm>
-            <a:off x="285816" y="1042778"/>
-            <a:ext cx="1090683" cy="307777"/>
-          </a:xfrm>
-          <a:prstGeom prst="rect">
-            <a:avLst/>
-          </a:prstGeom>
-          <a:noFill/>
-        </p:spPr>
-        <p:txBody>
-          <a:bodyPr wrap="none" rtlCol="0">
-            <a:spAutoFit/>
-          </a:bodyPr>
-          <a:lstStyle/>
-          <a:p>
-            <a:r>
-              <a:rPr lang="en-US" sz="1400" u="sng"/>
-              <a:t>Element Key</a:t>
-            </a:r>
-          </a:p>
-        </p:txBody>
-      </p:sp>
-    </p:spTree>
-    <p:extLst>
-      <p:ext uri="{BB962C8B-B14F-4D97-AF65-F5344CB8AC3E}">
-        <p14:creationId xmlns:p14="http://schemas.microsoft.com/office/powerpoint/2010/main" val="2155823205"/>
       </p:ext>
     </p:extLst>
   </p:cSld>

</xml_diff>

<commit_message>
updated ont metadata, fixed one subclass, updated ont HTML & diagram
</commit_message>
<xml_diff>
--- a/profiledesc/profiledesc-diagrams.pptx
+++ b/profiledesc/profiledesc-diagrams.pptx
@@ -262,7 +262,7 @@
           <a:lstStyle/>
           <a:p>
             <a:fld id="{7E83BB5F-FC7B-E342-A7CB-8A5E9A913100}" type="datetimeFigureOut">
-              <a:t>4/17/18</a:t>
+              <a:t>5/3/18</a:t>
             </a:fld>
             <a:endParaRPr lang="en-US"/>
           </a:p>
@@ -458,7 +458,7 @@
           <a:lstStyle/>
           <a:p>
             <a:fld id="{7E83BB5F-FC7B-E342-A7CB-8A5E9A913100}" type="datetimeFigureOut">
-              <a:t>4/17/18</a:t>
+              <a:t>5/3/18</a:t>
             </a:fld>
             <a:endParaRPr lang="en-US"/>
           </a:p>
@@ -664,7 +664,7 @@
           <a:lstStyle/>
           <a:p>
             <a:fld id="{7E83BB5F-FC7B-E342-A7CB-8A5E9A913100}" type="datetimeFigureOut">
-              <a:t>4/17/18</a:t>
+              <a:t>5/3/18</a:t>
             </a:fld>
             <a:endParaRPr lang="en-US"/>
           </a:p>
@@ -860,7 +860,7 @@
           <a:lstStyle/>
           <a:p>
             <a:fld id="{7E83BB5F-FC7B-E342-A7CB-8A5E9A913100}" type="datetimeFigureOut">
-              <a:t>4/17/18</a:t>
+              <a:t>5/3/18</a:t>
             </a:fld>
             <a:endParaRPr lang="en-US"/>
           </a:p>
@@ -1133,7 +1133,7 @@
           <a:lstStyle/>
           <a:p>
             <a:fld id="{7E83BB5F-FC7B-E342-A7CB-8A5E9A913100}" type="datetimeFigureOut">
-              <a:t>4/17/18</a:t>
+              <a:t>5/3/18</a:t>
             </a:fld>
             <a:endParaRPr lang="en-US"/>
           </a:p>
@@ -1396,7 +1396,7 @@
           <a:lstStyle/>
           <a:p>
             <a:fld id="{7E83BB5F-FC7B-E342-A7CB-8A5E9A913100}" type="datetimeFigureOut">
-              <a:t>4/17/18</a:t>
+              <a:t>5/3/18</a:t>
             </a:fld>
             <a:endParaRPr lang="en-US"/>
           </a:p>
@@ -1806,7 +1806,7 @@
           <a:lstStyle/>
           <a:p>
             <a:fld id="{7E83BB5F-FC7B-E342-A7CB-8A5E9A913100}" type="datetimeFigureOut">
-              <a:t>4/17/18</a:t>
+              <a:t>5/3/18</a:t>
             </a:fld>
             <a:endParaRPr lang="en-US"/>
           </a:p>
@@ -1945,7 +1945,7 @@
           <a:lstStyle/>
           <a:p>
             <a:fld id="{7E83BB5F-FC7B-E342-A7CB-8A5E9A913100}" type="datetimeFigureOut">
-              <a:t>4/17/18</a:t>
+              <a:t>5/3/18</a:t>
             </a:fld>
             <a:endParaRPr lang="en-US"/>
           </a:p>
@@ -2056,7 +2056,7 @@
           <a:lstStyle/>
           <a:p>
             <a:fld id="{7E83BB5F-FC7B-E342-A7CB-8A5E9A913100}" type="datetimeFigureOut">
-              <a:t>4/17/18</a:t>
+              <a:t>5/3/18</a:t>
             </a:fld>
             <a:endParaRPr lang="en-US"/>
           </a:p>
@@ -2365,7 +2365,7 @@
           <a:lstStyle/>
           <a:p>
             <a:fld id="{7E83BB5F-FC7B-E342-A7CB-8A5E9A913100}" type="datetimeFigureOut">
-              <a:t>4/17/18</a:t>
+              <a:t>5/3/18</a:t>
             </a:fld>
             <a:endParaRPr lang="en-US"/>
           </a:p>
@@ -2651,7 +2651,7 @@
           <a:lstStyle/>
           <a:p>
             <a:fld id="{7E83BB5F-FC7B-E342-A7CB-8A5E9A913100}" type="datetimeFigureOut">
-              <a:t>4/17/18</a:t>
+              <a:t>5/3/18</a:t>
             </a:fld>
             <a:endParaRPr lang="en-US"/>
           </a:p>
@@ -2890,7 +2890,7 @@
           </a:lstStyle>
           <a:p>
             <a:fld id="{7E83BB5F-FC7B-E342-A7CB-8A5E9A913100}" type="datetimeFigureOut">
-              <a:t>4/17/18</a:t>
+              <a:t>5/3/18</a:t>
             </a:fld>
             <a:endParaRPr lang="en-US"/>
           </a:p>
@@ -3359,8 +3359,8 @@
         </p:nvCxnSpPr>
         <p:spPr>
           <a:xfrm flipH="1" flipV="1">
-            <a:off x="7757577" y="4489713"/>
-            <a:ext cx="1150932" cy="1487733"/>
+            <a:off x="7757577" y="4775473"/>
+            <a:ext cx="1150932" cy="1201973"/>
           </a:xfrm>
           <a:prstGeom prst="straightConnector1">
             <a:avLst/>
@@ -4817,7 +4817,7 @@
         </p:nvSpPr>
         <p:spPr>
           <a:xfrm>
-            <a:off x="7133109" y="3831791"/>
+            <a:off x="7133109" y="4117551"/>
             <a:ext cx="1248936" cy="657922"/>
           </a:xfrm>
           <a:prstGeom prst="roundRect">
@@ -4880,8 +4880,8 @@
         </p:nvCxnSpPr>
         <p:spPr>
           <a:xfrm flipV="1">
-            <a:off x="6801869" y="4489713"/>
-            <a:ext cx="955708" cy="759986"/>
+            <a:off x="6801869" y="4775473"/>
+            <a:ext cx="955708" cy="474226"/>
           </a:xfrm>
           <a:prstGeom prst="straightConnector1">
             <a:avLst/>
@@ -5004,6 +5004,55 @@
           </a:p>
         </p:txBody>
       </p:sp>
+      <p:cxnSp>
+        <p:nvCxnSpPr>
+          <p:cNvPr id="42" name="Curved Connector 41">
+            <a:extLst>
+              <a:ext uri="{FF2B5EF4-FFF2-40B4-BE49-F238E27FC236}">
+                <a16:creationId xmlns:a16="http://schemas.microsoft.com/office/drawing/2014/main" id="{1E704936-F7D0-9B4F-90F5-D6EE720D285B}"/>
+              </a:ext>
+            </a:extLst>
+          </p:cNvPr>
+          <p:cNvCxnSpPr>
+            <a:cxnSpLocks/>
+            <a:endCxn id="176" idx="0"/>
+          </p:cNvCxnSpPr>
+          <p:nvPr/>
+        </p:nvCxnSpPr>
+        <p:spPr>
+          <a:xfrm rot="16200000" flipH="1">
+            <a:off x="8917621" y="2444294"/>
+            <a:ext cx="12728" cy="4956121"/>
+          </a:xfrm>
+          <a:prstGeom prst="curvedConnector3">
+            <a:avLst>
+              <a:gd name="adj1" fmla="val -10102742"/>
+            </a:avLst>
+          </a:prstGeom>
+          <a:ln>
+            <a:solidFill>
+              <a:schemeClr val="tx1"/>
+            </a:solidFill>
+            <a:prstDash val="dash"/>
+            <a:headEnd type="none" w="med" len="med"/>
+            <a:tailEnd type="arrow" w="med" len="med"/>
+          </a:ln>
+        </p:spPr>
+        <p:style>
+          <a:lnRef idx="1">
+            <a:schemeClr val="accent1"/>
+          </a:lnRef>
+          <a:fillRef idx="0">
+            <a:schemeClr val="accent1"/>
+          </a:fillRef>
+          <a:effectRef idx="0">
+            <a:schemeClr val="accent1"/>
+          </a:effectRef>
+          <a:fontRef idx="minor">
+            <a:schemeClr val="tx1"/>
+          </a:fontRef>
+        </p:style>
+      </p:cxnSp>
     </p:spTree>
     <p:extLst>
       <p:ext uri="{BB962C8B-B14F-4D97-AF65-F5344CB8AC3E}">

</xml_diff>

<commit_message>
fixed tyops in GA example image
</commit_message>
<xml_diff>
--- a/profiledesc/profiledesc-diagrams.pptx
+++ b/profiledesc/profiledesc-diagrams.pptx
@@ -9365,7 +9365,7 @@
                   <a:schemeClr val="tx1"/>
                 </a:solidFill>
               </a:rPr>
-              <a:t>XSD</a:t>
+              <a:t>XML</a:t>
             </a:r>
           </a:p>
         </p:txBody>
@@ -9515,7 +9515,7 @@
                   <a:schemeClr val="tx1"/>
                 </a:solidFill>
               </a:rPr>
-              <a:t>Schematron</a:t>
+              <a:t>XML Schema Definition</a:t>
             </a:r>
           </a:p>
         </p:txBody>
@@ -9698,7 +9698,7 @@
                   <a:schemeClr val="tx1"/>
                 </a:solidFill>
               </a:rPr>
-              <a:t>XML Schema</a:t>
+              <a:t>Schematron</a:t>
             </a:r>
           </a:p>
         </p:txBody>
@@ -9766,7 +9766,7 @@
                   <a:schemeClr val="tx1"/>
                 </a:solidFill>
               </a:rPr>
-              <a:t>Schematron</a:t>
+              <a:t>XML</a:t>
             </a:r>
           </a:p>
         </p:txBody>

</xml_diff>

<commit_message>
fixed further typos in GA example image
</commit_message>
<xml_diff>
--- a/profiledesc/profiledesc-diagrams.pptx
+++ b/profiledesc/profiledesc-diagrams.pptx
@@ -9515,7 +9515,7 @@
                   <a:schemeClr val="tx1"/>
                 </a:solidFill>
               </a:rPr>
-              <a:t>XML Schema Definition</a:t>
+              <a:t>Schematron</a:t>
             </a:r>
           </a:p>
         </p:txBody>
@@ -9698,7 +9698,7 @@
                   <a:schemeClr val="tx1"/>
                 </a:solidFill>
               </a:rPr>
-              <a:t>Schematron</a:t>
+              <a:t>XML Schema Definition</a:t>
             </a:r>
           </a:p>
         </p:txBody>

</xml_diff>

<commit_message>
renamed HTML file for easy viewing
</commit_message>
<xml_diff>
--- a/profiledesc/profiledesc-diagrams.pptx
+++ b/profiledesc/profiledesc-diagrams.pptx
@@ -117,6 +117,10 @@
 </p:presentation>
 </file>
 
+<file path=ppt/revisionInfo.xml><?xml version="1.0" encoding="utf-8"?>
+<p1510:revInfo xmlns:a="http://schemas.openxmlformats.org/drawingml/2006/main" xmlns:r="http://schemas.openxmlformats.org/officeDocument/2006/relationships" xmlns:p1510="http://schemas.microsoft.com/office/powerpoint/2015/10/main"/>
+</file>
+
 <file path=ppt/slideLayouts/slideLayout1.xml><?xml version="1.0" encoding="utf-8"?>
 <p:sldLayout xmlns:a="http://schemas.openxmlformats.org/drawingml/2006/main" xmlns:r="http://schemas.openxmlformats.org/officeDocument/2006/relationships" xmlns:p="http://schemas.openxmlformats.org/presentationml/2006/main" type="title" preserve="1">
   <p:cSld name="Title Slide">
@@ -263,7 +267,7 @@
           <a:lstStyle/>
           <a:p>
             <a:fld id="{7E83BB5F-FC7B-E342-A7CB-8A5E9A913100}" type="datetimeFigureOut">
-              <a:t>5/9/18</a:t>
+              <a:t>5/16/2018</a:t>
             </a:fld>
             <a:endParaRPr lang="en-US"/>
           </a:p>
@@ -459,7 +463,7 @@
           <a:lstStyle/>
           <a:p>
             <a:fld id="{7E83BB5F-FC7B-E342-A7CB-8A5E9A913100}" type="datetimeFigureOut">
-              <a:t>5/9/18</a:t>
+              <a:t>5/16/2018</a:t>
             </a:fld>
             <a:endParaRPr lang="en-US"/>
           </a:p>
@@ -665,7 +669,7 @@
           <a:lstStyle/>
           <a:p>
             <a:fld id="{7E83BB5F-FC7B-E342-A7CB-8A5E9A913100}" type="datetimeFigureOut">
-              <a:t>5/9/18</a:t>
+              <a:t>5/16/2018</a:t>
             </a:fld>
             <a:endParaRPr lang="en-US"/>
           </a:p>
@@ -861,7 +865,7 @@
           <a:lstStyle/>
           <a:p>
             <a:fld id="{7E83BB5F-FC7B-E342-A7CB-8A5E9A913100}" type="datetimeFigureOut">
-              <a:t>5/9/18</a:t>
+              <a:t>5/16/2018</a:t>
             </a:fld>
             <a:endParaRPr lang="en-US"/>
           </a:p>
@@ -1134,7 +1138,7 @@
           <a:lstStyle/>
           <a:p>
             <a:fld id="{7E83BB5F-FC7B-E342-A7CB-8A5E9A913100}" type="datetimeFigureOut">
-              <a:t>5/9/18</a:t>
+              <a:t>5/16/2018</a:t>
             </a:fld>
             <a:endParaRPr lang="en-US"/>
           </a:p>
@@ -1397,7 +1401,7 @@
           <a:lstStyle/>
           <a:p>
             <a:fld id="{7E83BB5F-FC7B-E342-A7CB-8A5E9A913100}" type="datetimeFigureOut">
-              <a:t>5/9/18</a:t>
+              <a:t>5/16/2018</a:t>
             </a:fld>
             <a:endParaRPr lang="en-US"/>
           </a:p>
@@ -1807,7 +1811,7 @@
           <a:lstStyle/>
           <a:p>
             <a:fld id="{7E83BB5F-FC7B-E342-A7CB-8A5E9A913100}" type="datetimeFigureOut">
-              <a:t>5/9/18</a:t>
+              <a:t>5/16/2018</a:t>
             </a:fld>
             <a:endParaRPr lang="en-US"/>
           </a:p>
@@ -1946,7 +1950,7 @@
           <a:lstStyle/>
           <a:p>
             <a:fld id="{7E83BB5F-FC7B-E342-A7CB-8A5E9A913100}" type="datetimeFigureOut">
-              <a:t>5/9/18</a:t>
+              <a:t>5/16/2018</a:t>
             </a:fld>
             <a:endParaRPr lang="en-US"/>
           </a:p>
@@ -2057,7 +2061,7 @@
           <a:lstStyle/>
           <a:p>
             <a:fld id="{7E83BB5F-FC7B-E342-A7CB-8A5E9A913100}" type="datetimeFigureOut">
-              <a:t>5/9/18</a:t>
+              <a:t>5/16/2018</a:t>
             </a:fld>
             <a:endParaRPr lang="en-US"/>
           </a:p>
@@ -2366,7 +2370,7 @@
           <a:lstStyle/>
           <a:p>
             <a:fld id="{7E83BB5F-FC7B-E342-A7CB-8A5E9A913100}" type="datetimeFigureOut">
-              <a:t>5/9/18</a:t>
+              <a:t>5/16/2018</a:t>
             </a:fld>
             <a:endParaRPr lang="en-US"/>
           </a:p>
@@ -2652,7 +2656,7 @@
           <a:lstStyle/>
           <a:p>
             <a:fld id="{7E83BB5F-FC7B-E342-A7CB-8A5E9A913100}" type="datetimeFigureOut">
-              <a:t>5/9/18</a:t>
+              <a:t>5/16/2018</a:t>
             </a:fld>
             <a:endParaRPr lang="en-US"/>
           </a:p>
@@ -2891,7 +2895,7 @@
           </a:lstStyle>
           <a:p>
             <a:fld id="{7E83BB5F-FC7B-E342-A7CB-8A5E9A913100}" type="datetimeFigureOut">
-              <a:t>5/9/18</a:t>
+              <a:t>5/16/2018</a:t>
             </a:fld>
             <a:endParaRPr lang="en-US"/>
           </a:p>

</xml_diff>

<commit_message>
DCAT-AP-IT eg improved, OGC examples improved and documented
</commit_message>
<xml_diff>
--- a/profiledesc/profiledesc-diagrams.pptx
+++ b/profiledesc/profiledesc-diagrams.pptx
@@ -11,6 +11,7 @@
     <p:sldId id="262" r:id="rId5"/>
     <p:sldId id="260" r:id="rId6"/>
     <p:sldId id="263" r:id="rId7"/>
+    <p:sldId id="264" r:id="rId8"/>
   </p:sldIdLst>
   <p:sldSz cx="12192000" cy="6858000"/>
   <p:notesSz cx="6858000" cy="9144000"/>
@@ -267,7 +268,7 @@
           <a:lstStyle/>
           <a:p>
             <a:fld id="{7E83BB5F-FC7B-E342-A7CB-8A5E9A913100}" type="datetimeFigureOut">
-              <a:t>5/30/2018</a:t>
+              <a:t>5/31/2018</a:t>
             </a:fld>
             <a:endParaRPr lang="en-US"/>
           </a:p>
@@ -463,7 +464,7 @@
           <a:lstStyle/>
           <a:p>
             <a:fld id="{7E83BB5F-FC7B-E342-A7CB-8A5E9A913100}" type="datetimeFigureOut">
-              <a:t>5/30/2018</a:t>
+              <a:t>5/31/2018</a:t>
             </a:fld>
             <a:endParaRPr lang="en-US"/>
           </a:p>
@@ -669,7 +670,7 @@
           <a:lstStyle/>
           <a:p>
             <a:fld id="{7E83BB5F-FC7B-E342-A7CB-8A5E9A913100}" type="datetimeFigureOut">
-              <a:t>5/30/2018</a:t>
+              <a:t>5/31/2018</a:t>
             </a:fld>
             <a:endParaRPr lang="en-US"/>
           </a:p>
@@ -865,7 +866,7 @@
           <a:lstStyle/>
           <a:p>
             <a:fld id="{7E83BB5F-FC7B-E342-A7CB-8A5E9A913100}" type="datetimeFigureOut">
-              <a:t>5/30/2018</a:t>
+              <a:t>5/31/2018</a:t>
             </a:fld>
             <a:endParaRPr lang="en-US"/>
           </a:p>
@@ -1138,7 +1139,7 @@
           <a:lstStyle/>
           <a:p>
             <a:fld id="{7E83BB5F-FC7B-E342-A7CB-8A5E9A913100}" type="datetimeFigureOut">
-              <a:t>5/30/2018</a:t>
+              <a:t>5/31/2018</a:t>
             </a:fld>
             <a:endParaRPr lang="en-US"/>
           </a:p>
@@ -1401,7 +1402,7 @@
           <a:lstStyle/>
           <a:p>
             <a:fld id="{7E83BB5F-FC7B-E342-A7CB-8A5E9A913100}" type="datetimeFigureOut">
-              <a:t>5/30/2018</a:t>
+              <a:t>5/31/2018</a:t>
             </a:fld>
             <a:endParaRPr lang="en-US"/>
           </a:p>
@@ -1811,7 +1812,7 @@
           <a:lstStyle/>
           <a:p>
             <a:fld id="{7E83BB5F-FC7B-E342-A7CB-8A5E9A913100}" type="datetimeFigureOut">
-              <a:t>5/30/2018</a:t>
+              <a:t>5/31/2018</a:t>
             </a:fld>
             <a:endParaRPr lang="en-US"/>
           </a:p>
@@ -1950,7 +1951,7 @@
           <a:lstStyle/>
           <a:p>
             <a:fld id="{7E83BB5F-FC7B-E342-A7CB-8A5E9A913100}" type="datetimeFigureOut">
-              <a:t>5/30/2018</a:t>
+              <a:t>5/31/2018</a:t>
             </a:fld>
             <a:endParaRPr lang="en-US"/>
           </a:p>
@@ -2061,7 +2062,7 @@
           <a:lstStyle/>
           <a:p>
             <a:fld id="{7E83BB5F-FC7B-E342-A7CB-8A5E9A913100}" type="datetimeFigureOut">
-              <a:t>5/30/2018</a:t>
+              <a:t>5/31/2018</a:t>
             </a:fld>
             <a:endParaRPr lang="en-US"/>
           </a:p>
@@ -2370,7 +2371,7 @@
           <a:lstStyle/>
           <a:p>
             <a:fld id="{7E83BB5F-FC7B-E342-A7CB-8A5E9A913100}" type="datetimeFigureOut">
-              <a:t>5/30/2018</a:t>
+              <a:t>5/31/2018</a:t>
             </a:fld>
             <a:endParaRPr lang="en-US"/>
           </a:p>
@@ -2656,7 +2657,7 @@
           <a:lstStyle/>
           <a:p>
             <a:fld id="{7E83BB5F-FC7B-E342-A7CB-8A5E9A913100}" type="datetimeFigureOut">
-              <a:t>5/30/2018</a:t>
+              <a:t>5/31/2018</a:t>
             </a:fld>
             <a:endParaRPr lang="en-US"/>
           </a:p>
@@ -2895,7 +2896,7 @@
           </a:lstStyle>
           <a:p>
             <a:fld id="{7E83BB5F-FC7B-E342-A7CB-8A5E9A913100}" type="datetimeFigureOut">
-              <a:t>5/30/2018</a:t>
+              <a:t>5/31/2018</a:t>
             </a:fld>
             <a:endParaRPr lang="en-US"/>
           </a:p>
@@ -16614,6 +16615,3153 @@
 </p:sld>
 </file>
 
+<file path=ppt/slides/slide7.xml><?xml version="1.0" encoding="utf-8"?>
+<p:sld xmlns:a="http://schemas.openxmlformats.org/drawingml/2006/main" xmlns:r="http://schemas.openxmlformats.org/officeDocument/2006/relationships" xmlns:p="http://schemas.openxmlformats.org/presentationml/2006/main">
+  <p:cSld>
+    <p:spTree>
+      <p:nvGrpSpPr>
+        <p:cNvPr id="1" name=""/>
+        <p:cNvGrpSpPr/>
+        <p:nvPr/>
+      </p:nvGrpSpPr>
+      <p:grpSpPr>
+        <a:xfrm>
+          <a:off x="0" y="0"/>
+          <a:ext cx="0" cy="0"/>
+          <a:chOff x="0" y="0"/>
+          <a:chExt cx="0" cy="0"/>
+        </a:xfrm>
+      </p:grpSpPr>
+      <p:sp>
+        <p:nvSpPr>
+          <p:cNvPr id="2" name="TextBox 1">
+            <a:extLst>
+              <a:ext uri="{FF2B5EF4-FFF2-40B4-BE49-F238E27FC236}">
+                <a16:creationId xmlns:a16="http://schemas.microsoft.com/office/drawing/2014/main" id="{83BA414C-DCB0-3640-8724-6378CC0BA2FA}"/>
+              </a:ext>
+            </a:extLst>
+          </p:cNvPr>
+          <p:cNvSpPr txBox="1"/>
+          <p:nvPr/>
+        </p:nvSpPr>
+        <p:spPr>
+          <a:xfrm>
+            <a:off x="200722" y="156117"/>
+            <a:ext cx="1541191" cy="369332"/>
+          </a:xfrm>
+          <a:prstGeom prst="rect">
+            <a:avLst/>
+          </a:prstGeom>
+          <a:noFill/>
+        </p:spPr>
+        <p:txBody>
+          <a:bodyPr wrap="none" rtlCol="0">
+            <a:spAutoFit/>
+          </a:bodyPr>
+          <a:lstStyle/>
+          <a:p>
+            <a:r>
+              <a:rPr lang="en-US" u="sng" dirty="0"/>
+              <a:t>OGC examples</a:t>
+            </a:r>
+          </a:p>
+        </p:txBody>
+      </p:sp>
+      <p:cxnSp>
+        <p:nvCxnSpPr>
+          <p:cNvPr id="5" name="Straight Arrow Connector 4">
+            <a:extLst>
+              <a:ext uri="{FF2B5EF4-FFF2-40B4-BE49-F238E27FC236}">
+                <a16:creationId xmlns:a16="http://schemas.microsoft.com/office/drawing/2014/main" id="{6DFE8740-3E2F-9A49-B58F-7F85D1399E22}"/>
+              </a:ext>
+            </a:extLst>
+          </p:cNvPr>
+          <p:cNvCxnSpPr>
+            <a:cxnSpLocks/>
+            <a:stCxn id="63" idx="2"/>
+            <a:endCxn id="82" idx="0"/>
+          </p:cNvCxnSpPr>
+          <p:nvPr/>
+        </p:nvCxnSpPr>
+        <p:spPr>
+          <a:xfrm>
+            <a:off x="4312410" y="4300785"/>
+            <a:ext cx="0" cy="386991"/>
+          </a:xfrm>
+          <a:prstGeom prst="straightConnector1">
+            <a:avLst/>
+          </a:prstGeom>
+          <a:ln>
+            <a:solidFill>
+              <a:schemeClr val="tx1"/>
+            </a:solidFill>
+            <a:headEnd type="none" w="med" len="med"/>
+            <a:tailEnd type="arrow" w="med" len="med"/>
+          </a:ln>
+        </p:spPr>
+        <p:style>
+          <a:lnRef idx="1">
+            <a:schemeClr val="accent1"/>
+          </a:lnRef>
+          <a:fillRef idx="0">
+            <a:schemeClr val="accent1"/>
+          </a:fillRef>
+          <a:effectRef idx="0">
+            <a:schemeClr val="accent1"/>
+          </a:effectRef>
+          <a:fontRef idx="minor">
+            <a:schemeClr val="tx1"/>
+          </a:fontRef>
+        </p:style>
+      </p:cxnSp>
+      <p:cxnSp>
+        <p:nvCxnSpPr>
+          <p:cNvPr id="10" name="Straight Arrow Connector 9">
+            <a:extLst>
+              <a:ext uri="{FF2B5EF4-FFF2-40B4-BE49-F238E27FC236}">
+                <a16:creationId xmlns:a16="http://schemas.microsoft.com/office/drawing/2014/main" id="{9FA8862B-B992-144F-B955-49FCA7BBB44B}"/>
+              </a:ext>
+            </a:extLst>
+          </p:cNvPr>
+          <p:cNvCxnSpPr>
+            <a:cxnSpLocks/>
+            <a:stCxn id="94" idx="3"/>
+            <a:endCxn id="95" idx="1"/>
+          </p:cNvCxnSpPr>
+          <p:nvPr/>
+        </p:nvCxnSpPr>
+        <p:spPr>
+          <a:xfrm flipV="1">
+            <a:off x="8202511" y="2453596"/>
+            <a:ext cx="510357" cy="404651"/>
+          </a:xfrm>
+          <a:prstGeom prst="straightConnector1">
+            <a:avLst/>
+          </a:prstGeom>
+          <a:ln>
+            <a:solidFill>
+              <a:schemeClr val="tx1"/>
+            </a:solidFill>
+            <a:headEnd type="none" w="med" len="med"/>
+            <a:tailEnd type="arrow" w="med" len="med"/>
+          </a:ln>
+        </p:spPr>
+        <p:style>
+          <a:lnRef idx="1">
+            <a:schemeClr val="accent1"/>
+          </a:lnRef>
+          <a:fillRef idx="0">
+            <a:schemeClr val="accent1"/>
+          </a:fillRef>
+          <a:effectRef idx="0">
+            <a:schemeClr val="accent1"/>
+          </a:effectRef>
+          <a:fontRef idx="minor">
+            <a:schemeClr val="tx1"/>
+          </a:fontRef>
+        </p:style>
+      </p:cxnSp>
+      <p:sp>
+        <p:nvSpPr>
+          <p:cNvPr id="73" name="Rounded Rectangle 72">
+            <a:extLst>
+              <a:ext uri="{FF2B5EF4-FFF2-40B4-BE49-F238E27FC236}">
+                <a16:creationId xmlns:a16="http://schemas.microsoft.com/office/drawing/2014/main" id="{8581DD28-7FB6-6748-8F81-E02AC2E2A43C}"/>
+              </a:ext>
+            </a:extLst>
+          </p:cNvPr>
+          <p:cNvSpPr/>
+          <p:nvPr/>
+        </p:nvSpPr>
+        <p:spPr>
+          <a:xfrm>
+            <a:off x="126892" y="2069909"/>
+            <a:ext cx="1248936" cy="657922"/>
+          </a:xfrm>
+          <a:prstGeom prst="roundRect">
+            <a:avLst/>
+          </a:prstGeom>
+          <a:pattFill prst="pct30">
+            <a:fgClr>
+              <a:schemeClr val="bg1">
+                <a:lumMod val="85000"/>
+              </a:schemeClr>
+            </a:fgClr>
+            <a:bgClr>
+              <a:schemeClr val="bg1"/>
+            </a:bgClr>
+          </a:pattFill>
+          <a:ln>
+            <a:solidFill>
+              <a:schemeClr val="tx1"/>
+            </a:solidFill>
+          </a:ln>
+        </p:spPr>
+        <p:style>
+          <a:lnRef idx="2">
+            <a:schemeClr val="accent1">
+              <a:shade val="50000"/>
+            </a:schemeClr>
+          </a:lnRef>
+          <a:fillRef idx="1">
+            <a:schemeClr val="accent1"/>
+          </a:fillRef>
+          <a:effectRef idx="0">
+            <a:schemeClr val="accent1"/>
+          </a:effectRef>
+          <a:fontRef idx="minor">
+            <a:schemeClr val="lt1"/>
+          </a:fontRef>
+        </p:style>
+        <p:txBody>
+          <a:bodyPr rtlCol="0" anchor="ctr"/>
+          <a:lstStyle/>
+          <a:p>
+            <a:pPr algn="ctr"/>
+            <a:r>
+              <a:rPr lang="en-US" sz="1400">
+                <a:solidFill>
+                  <a:schemeClr val="tx1"/>
+                </a:solidFill>
+              </a:rPr>
+              <a:t>owl:Named</a:t>
+            </a:r>
+            <a:br>
+              <a:rPr lang="en-US" sz="1400">
+                <a:solidFill>
+                  <a:schemeClr val="tx1"/>
+                </a:solidFill>
+              </a:rPr>
+            </a:br>
+            <a:r>
+              <a:rPr lang="en-US" sz="1400">
+                <a:solidFill>
+                  <a:schemeClr val="tx1"/>
+                </a:solidFill>
+              </a:rPr>
+              <a:t>Individual</a:t>
+            </a:r>
+          </a:p>
+        </p:txBody>
+      </p:sp>
+      <p:cxnSp>
+        <p:nvCxnSpPr>
+          <p:cNvPr id="74" name="Straight Arrow Connector 73">
+            <a:extLst>
+              <a:ext uri="{FF2B5EF4-FFF2-40B4-BE49-F238E27FC236}">
+                <a16:creationId xmlns:a16="http://schemas.microsoft.com/office/drawing/2014/main" id="{EB93542B-98C4-6341-B733-4BEF15D0F40B}"/>
+              </a:ext>
+            </a:extLst>
+          </p:cNvPr>
+          <p:cNvCxnSpPr>
+            <a:cxnSpLocks/>
+          </p:cNvCxnSpPr>
+          <p:nvPr/>
+        </p:nvCxnSpPr>
+        <p:spPr>
+          <a:xfrm flipV="1">
+            <a:off x="288101" y="3567496"/>
+            <a:ext cx="0" cy="423748"/>
+          </a:xfrm>
+          <a:prstGeom prst="straightConnector1">
+            <a:avLst/>
+          </a:prstGeom>
+          <a:ln>
+            <a:solidFill>
+              <a:schemeClr val="tx1"/>
+            </a:solidFill>
+            <a:prstDash val="sysDot"/>
+            <a:headEnd type="none" w="med" len="med"/>
+            <a:tailEnd type="arrow" w="med" len="med"/>
+          </a:ln>
+        </p:spPr>
+        <p:style>
+          <a:lnRef idx="1">
+            <a:schemeClr val="accent1"/>
+          </a:lnRef>
+          <a:fillRef idx="0">
+            <a:schemeClr val="accent1"/>
+          </a:fillRef>
+          <a:effectRef idx="0">
+            <a:schemeClr val="accent1"/>
+          </a:effectRef>
+          <a:fontRef idx="minor">
+            <a:schemeClr val="tx1"/>
+          </a:fontRef>
+        </p:style>
+      </p:cxnSp>
+      <p:sp>
+        <p:nvSpPr>
+          <p:cNvPr id="75" name="TextBox 74">
+            <a:extLst>
+              <a:ext uri="{FF2B5EF4-FFF2-40B4-BE49-F238E27FC236}">
+                <a16:creationId xmlns:a16="http://schemas.microsoft.com/office/drawing/2014/main" id="{CDEDE00B-2B5C-7A40-8C0F-60D6F142DE74}"/>
+              </a:ext>
+            </a:extLst>
+          </p:cNvPr>
+          <p:cNvSpPr txBox="1"/>
+          <p:nvPr/>
+        </p:nvSpPr>
+        <p:spPr>
+          <a:xfrm>
+            <a:off x="324266" y="3640870"/>
+            <a:ext cx="681084" cy="276999"/>
+          </a:xfrm>
+          <a:prstGeom prst="rect">
+            <a:avLst/>
+          </a:prstGeom>
+          <a:noFill/>
+        </p:spPr>
+        <p:txBody>
+          <a:bodyPr wrap="none" rtlCol="0">
+            <a:spAutoFit/>
+          </a:bodyPr>
+          <a:lstStyle/>
+          <a:p>
+            <a:r>
+              <a:rPr lang="en-US" sz="1200"/>
+              <a:t>rdf:type</a:t>
+            </a:r>
+          </a:p>
+        </p:txBody>
+      </p:sp>
+      <p:cxnSp>
+        <p:nvCxnSpPr>
+          <p:cNvPr id="76" name="Straight Arrow Connector 75">
+            <a:extLst>
+              <a:ext uri="{FF2B5EF4-FFF2-40B4-BE49-F238E27FC236}">
+                <a16:creationId xmlns:a16="http://schemas.microsoft.com/office/drawing/2014/main" id="{7E1F10E1-34E6-C547-A8A3-086489D672CE}"/>
+              </a:ext>
+            </a:extLst>
+          </p:cNvPr>
+          <p:cNvCxnSpPr>
+            <a:cxnSpLocks/>
+          </p:cNvCxnSpPr>
+          <p:nvPr/>
+        </p:nvCxnSpPr>
+        <p:spPr>
+          <a:xfrm flipV="1">
+            <a:off x="285611" y="4268150"/>
+            <a:ext cx="0" cy="423747"/>
+          </a:xfrm>
+          <a:prstGeom prst="straightConnector1">
+            <a:avLst/>
+          </a:prstGeom>
+          <a:ln>
+            <a:solidFill>
+              <a:schemeClr val="tx1"/>
+            </a:solidFill>
+            <a:prstDash val="dash"/>
+            <a:headEnd type="none" w="med" len="med"/>
+            <a:tailEnd type="arrow" w="med" len="med"/>
+          </a:ln>
+        </p:spPr>
+        <p:style>
+          <a:lnRef idx="1">
+            <a:schemeClr val="accent1"/>
+          </a:lnRef>
+          <a:fillRef idx="0">
+            <a:schemeClr val="accent1"/>
+          </a:fillRef>
+          <a:effectRef idx="0">
+            <a:schemeClr val="accent1"/>
+          </a:effectRef>
+          <a:fontRef idx="minor">
+            <a:schemeClr val="tx1"/>
+          </a:fontRef>
+        </p:style>
+      </p:cxnSp>
+      <p:sp>
+        <p:nvSpPr>
+          <p:cNvPr id="77" name="TextBox 76">
+            <a:extLst>
+              <a:ext uri="{FF2B5EF4-FFF2-40B4-BE49-F238E27FC236}">
+                <a16:creationId xmlns:a16="http://schemas.microsoft.com/office/drawing/2014/main" id="{F4413CBD-81A7-024C-8B94-82D81713CF86}"/>
+              </a:ext>
+            </a:extLst>
+          </p:cNvPr>
+          <p:cNvSpPr txBox="1"/>
+          <p:nvPr/>
+        </p:nvSpPr>
+        <p:spPr>
+          <a:xfrm>
+            <a:off x="327894" y="4341523"/>
+            <a:ext cx="1145506" cy="276999"/>
+          </a:xfrm>
+          <a:prstGeom prst="rect">
+            <a:avLst/>
+          </a:prstGeom>
+          <a:noFill/>
+        </p:spPr>
+        <p:txBody>
+          <a:bodyPr wrap="none" rtlCol="0">
+            <a:spAutoFit/>
+          </a:bodyPr>
+          <a:lstStyle/>
+          <a:p>
+            <a:r>
+              <a:rPr lang="en-US" sz="1200"/>
+              <a:t>rdfs:subClassOf</a:t>
+            </a:r>
+          </a:p>
+        </p:txBody>
+      </p:sp>
+      <p:sp>
+        <p:nvSpPr>
+          <p:cNvPr id="78" name="Rounded Rectangle 77">
+            <a:extLst>
+              <a:ext uri="{FF2B5EF4-FFF2-40B4-BE49-F238E27FC236}">
+                <a16:creationId xmlns:a16="http://schemas.microsoft.com/office/drawing/2014/main" id="{E07B7042-3B83-DA40-976B-CD640B3C88BC}"/>
+              </a:ext>
+            </a:extLst>
+          </p:cNvPr>
+          <p:cNvSpPr/>
+          <p:nvPr/>
+        </p:nvSpPr>
+        <p:spPr>
+          <a:xfrm>
+            <a:off x="126892" y="1226186"/>
+            <a:ext cx="1248936" cy="657922"/>
+          </a:xfrm>
+          <a:prstGeom prst="roundRect">
+            <a:avLst/>
+          </a:prstGeom>
+          <a:noFill/>
+          <a:ln>
+            <a:solidFill>
+              <a:schemeClr val="tx1"/>
+            </a:solidFill>
+          </a:ln>
+        </p:spPr>
+        <p:style>
+          <a:lnRef idx="2">
+            <a:schemeClr val="accent1">
+              <a:shade val="50000"/>
+            </a:schemeClr>
+          </a:lnRef>
+          <a:fillRef idx="1">
+            <a:schemeClr val="accent1"/>
+          </a:fillRef>
+          <a:effectRef idx="0">
+            <a:schemeClr val="accent1"/>
+          </a:effectRef>
+          <a:fontRef idx="minor">
+            <a:schemeClr val="lt1"/>
+          </a:fontRef>
+        </p:style>
+        <p:txBody>
+          <a:bodyPr rtlCol="0" anchor="ctr"/>
+          <a:lstStyle/>
+          <a:p>
+            <a:pPr algn="ctr"/>
+            <a:r>
+              <a:rPr lang="en-US" sz="1400">
+                <a:solidFill>
+                  <a:schemeClr val="tx1"/>
+                </a:solidFill>
+              </a:rPr>
+              <a:t>owl:Class</a:t>
+            </a:r>
+          </a:p>
+        </p:txBody>
+      </p:sp>
+      <p:cxnSp>
+        <p:nvCxnSpPr>
+          <p:cNvPr id="79" name="Straight Arrow Connector 78">
+            <a:extLst>
+              <a:ext uri="{FF2B5EF4-FFF2-40B4-BE49-F238E27FC236}">
+                <a16:creationId xmlns:a16="http://schemas.microsoft.com/office/drawing/2014/main" id="{125C0AB3-6800-CB43-9EDA-E15BD7FFA437}"/>
+              </a:ext>
+            </a:extLst>
+          </p:cNvPr>
+          <p:cNvCxnSpPr>
+            <a:cxnSpLocks/>
+          </p:cNvCxnSpPr>
+          <p:nvPr/>
+        </p:nvCxnSpPr>
+        <p:spPr>
+          <a:xfrm flipV="1">
+            <a:off x="288101" y="2901673"/>
+            <a:ext cx="0" cy="423748"/>
+          </a:xfrm>
+          <a:prstGeom prst="straightConnector1">
+            <a:avLst/>
+          </a:prstGeom>
+          <a:ln>
+            <a:solidFill>
+              <a:schemeClr val="tx1"/>
+            </a:solidFill>
+            <a:prstDash val="solid"/>
+            <a:headEnd type="none" w="med" len="med"/>
+            <a:tailEnd type="arrow" w="med" len="med"/>
+          </a:ln>
+        </p:spPr>
+        <p:style>
+          <a:lnRef idx="1">
+            <a:schemeClr val="accent1"/>
+          </a:lnRef>
+          <a:fillRef idx="0">
+            <a:schemeClr val="accent1"/>
+          </a:fillRef>
+          <a:effectRef idx="0">
+            <a:schemeClr val="accent1"/>
+          </a:effectRef>
+          <a:fontRef idx="minor">
+            <a:schemeClr val="tx1"/>
+          </a:fontRef>
+        </p:style>
+      </p:cxnSp>
+      <p:sp>
+        <p:nvSpPr>
+          <p:cNvPr id="80" name="TextBox 79">
+            <a:extLst>
+              <a:ext uri="{FF2B5EF4-FFF2-40B4-BE49-F238E27FC236}">
+                <a16:creationId xmlns:a16="http://schemas.microsoft.com/office/drawing/2014/main" id="{BE14ECCD-03F5-AA49-AB95-1FDC544C4BBC}"/>
+              </a:ext>
+            </a:extLst>
+          </p:cNvPr>
+          <p:cNvSpPr txBox="1"/>
+          <p:nvPr/>
+        </p:nvSpPr>
+        <p:spPr>
+          <a:xfrm>
+            <a:off x="324266" y="2975047"/>
+            <a:ext cx="727187" cy="276999"/>
+          </a:xfrm>
+          <a:prstGeom prst="rect">
+            <a:avLst/>
+          </a:prstGeom>
+          <a:noFill/>
+        </p:spPr>
+        <p:txBody>
+          <a:bodyPr wrap="none" rtlCol="0">
+            <a:spAutoFit/>
+          </a:bodyPr>
+          <a:lstStyle/>
+          <a:p>
+            <a:r>
+              <a:rPr lang="en-US" sz="1200"/>
+              <a:t>property</a:t>
+            </a:r>
+          </a:p>
+        </p:txBody>
+      </p:sp>
+      <p:sp>
+        <p:nvSpPr>
+          <p:cNvPr id="143" name="TextBox 142">
+            <a:extLst>
+              <a:ext uri="{FF2B5EF4-FFF2-40B4-BE49-F238E27FC236}">
+                <a16:creationId xmlns:a16="http://schemas.microsoft.com/office/drawing/2014/main" id="{D0F429B1-D6FA-404E-947C-F41500F16EBC}"/>
+              </a:ext>
+            </a:extLst>
+          </p:cNvPr>
+          <p:cNvSpPr txBox="1"/>
+          <p:nvPr/>
+        </p:nvSpPr>
+        <p:spPr>
+          <a:xfrm>
+            <a:off x="206018" y="732608"/>
+            <a:ext cx="1090683" cy="307777"/>
+          </a:xfrm>
+          <a:prstGeom prst="rect">
+            <a:avLst/>
+          </a:prstGeom>
+          <a:noFill/>
+        </p:spPr>
+        <p:txBody>
+          <a:bodyPr wrap="none" rtlCol="0">
+            <a:spAutoFit/>
+          </a:bodyPr>
+          <a:lstStyle/>
+          <a:p>
+            <a:r>
+              <a:rPr lang="en-US" sz="1400" u="sng"/>
+              <a:t>Element Key</a:t>
+            </a:r>
+          </a:p>
+        </p:txBody>
+      </p:sp>
+      <p:sp>
+        <p:nvSpPr>
+          <p:cNvPr id="64" name="Rounded Rectangle 63">
+            <a:extLst>
+              <a:ext uri="{FF2B5EF4-FFF2-40B4-BE49-F238E27FC236}">
+                <a16:creationId xmlns:a16="http://schemas.microsoft.com/office/drawing/2014/main" id="{A3C7D500-90BD-0A46-9FA4-42282769366D}"/>
+              </a:ext>
+            </a:extLst>
+          </p:cNvPr>
+          <p:cNvSpPr/>
+          <p:nvPr/>
+        </p:nvSpPr>
+        <p:spPr>
+          <a:xfrm>
+            <a:off x="1928649" y="2529286"/>
+            <a:ext cx="1248936" cy="657922"/>
+          </a:xfrm>
+          <a:prstGeom prst="roundRect">
+            <a:avLst/>
+          </a:prstGeom>
+          <a:pattFill prst="pct30">
+            <a:fgClr>
+              <a:schemeClr val="bg1">
+                <a:lumMod val="85000"/>
+              </a:schemeClr>
+            </a:fgClr>
+            <a:bgClr>
+              <a:schemeClr val="bg1"/>
+            </a:bgClr>
+          </a:pattFill>
+          <a:ln>
+            <a:solidFill>
+              <a:schemeClr val="tx1"/>
+            </a:solidFill>
+          </a:ln>
+        </p:spPr>
+        <p:style>
+          <a:lnRef idx="2">
+            <a:schemeClr val="accent1">
+              <a:shade val="50000"/>
+            </a:schemeClr>
+          </a:lnRef>
+          <a:fillRef idx="1">
+            <a:schemeClr val="accent1"/>
+          </a:fillRef>
+          <a:effectRef idx="0">
+            <a:schemeClr val="accent1"/>
+          </a:effectRef>
+          <a:fontRef idx="minor">
+            <a:schemeClr val="lt1"/>
+          </a:fontRef>
+        </p:style>
+        <p:txBody>
+          <a:bodyPr rtlCol="0" anchor="ctr"/>
+          <a:lstStyle/>
+          <a:p>
+            <a:pPr algn="ctr"/>
+            <a:r>
+              <a:rPr lang="en-US" sz="1400" dirty="0">
+                <a:solidFill>
+                  <a:schemeClr val="tx1"/>
+                </a:solidFill>
+              </a:rPr>
+              <a:t>Web Map Service 1.3</a:t>
+            </a:r>
+          </a:p>
+        </p:txBody>
+      </p:sp>
+      <p:cxnSp>
+        <p:nvCxnSpPr>
+          <p:cNvPr id="84" name="Straight Arrow Connector 83">
+            <a:extLst>
+              <a:ext uri="{FF2B5EF4-FFF2-40B4-BE49-F238E27FC236}">
+                <a16:creationId xmlns:a16="http://schemas.microsoft.com/office/drawing/2014/main" id="{398A85AB-6D00-0441-8879-BB927031DC60}"/>
+              </a:ext>
+            </a:extLst>
+          </p:cNvPr>
+          <p:cNvCxnSpPr>
+            <a:cxnSpLocks/>
+            <a:stCxn id="57" idx="3"/>
+            <a:endCxn id="63" idx="1"/>
+          </p:cNvCxnSpPr>
+          <p:nvPr/>
+        </p:nvCxnSpPr>
+        <p:spPr>
+          <a:xfrm>
+            <a:off x="3177585" y="3971824"/>
+            <a:ext cx="510357" cy="0"/>
+          </a:xfrm>
+          <a:prstGeom prst="straightConnector1">
+            <a:avLst/>
+          </a:prstGeom>
+          <a:ln>
+            <a:solidFill>
+              <a:schemeClr val="tx1"/>
+            </a:solidFill>
+            <a:headEnd type="none" w="med" len="med"/>
+            <a:tailEnd type="arrow" w="med" len="med"/>
+          </a:ln>
+        </p:spPr>
+        <p:style>
+          <a:lnRef idx="1">
+            <a:schemeClr val="accent1"/>
+          </a:lnRef>
+          <a:fillRef idx="0">
+            <a:schemeClr val="accent1"/>
+          </a:fillRef>
+          <a:effectRef idx="0">
+            <a:schemeClr val="accent1"/>
+          </a:effectRef>
+          <a:fontRef idx="minor">
+            <a:schemeClr val="tx1"/>
+          </a:fontRef>
+        </p:style>
+      </p:cxnSp>
+      <p:cxnSp>
+        <p:nvCxnSpPr>
+          <p:cNvPr id="85" name="Straight Arrow Connector 84">
+            <a:extLst>
+              <a:ext uri="{FF2B5EF4-FFF2-40B4-BE49-F238E27FC236}">
+                <a16:creationId xmlns:a16="http://schemas.microsoft.com/office/drawing/2014/main" id="{47240331-3A9F-484D-AAF2-4601EFE6E655}"/>
+              </a:ext>
+            </a:extLst>
+          </p:cNvPr>
+          <p:cNvCxnSpPr>
+            <a:cxnSpLocks/>
+            <a:stCxn id="94" idx="3"/>
+            <a:endCxn id="96" idx="1"/>
+          </p:cNvCxnSpPr>
+          <p:nvPr/>
+        </p:nvCxnSpPr>
+        <p:spPr>
+          <a:xfrm>
+            <a:off x="8202511" y="2858247"/>
+            <a:ext cx="510357" cy="363328"/>
+          </a:xfrm>
+          <a:prstGeom prst="straightConnector1">
+            <a:avLst/>
+          </a:prstGeom>
+          <a:ln>
+            <a:solidFill>
+              <a:schemeClr val="tx1"/>
+            </a:solidFill>
+            <a:headEnd type="none" w="med" len="med"/>
+            <a:tailEnd type="arrow" w="med" len="med"/>
+          </a:ln>
+        </p:spPr>
+        <p:style>
+          <a:lnRef idx="1">
+            <a:schemeClr val="accent1"/>
+          </a:lnRef>
+          <a:fillRef idx="0">
+            <a:schemeClr val="accent1"/>
+          </a:fillRef>
+          <a:effectRef idx="0">
+            <a:schemeClr val="accent1"/>
+          </a:effectRef>
+          <a:fontRef idx="minor">
+            <a:schemeClr val="tx1"/>
+          </a:fontRef>
+        </p:style>
+      </p:cxnSp>
+      <p:cxnSp>
+        <p:nvCxnSpPr>
+          <p:cNvPr id="86" name="Straight Arrow Connector 85">
+            <a:extLst>
+              <a:ext uri="{FF2B5EF4-FFF2-40B4-BE49-F238E27FC236}">
+                <a16:creationId xmlns:a16="http://schemas.microsoft.com/office/drawing/2014/main" id="{79E8338D-A01F-F94A-BEA7-561DCB2AE3D5}"/>
+              </a:ext>
+            </a:extLst>
+          </p:cNvPr>
+          <p:cNvCxnSpPr>
+            <a:cxnSpLocks/>
+          </p:cNvCxnSpPr>
+          <p:nvPr/>
+        </p:nvCxnSpPr>
+        <p:spPr>
+          <a:xfrm>
+            <a:off x="2274148" y="3187208"/>
+            <a:ext cx="0" cy="455655"/>
+          </a:xfrm>
+          <a:prstGeom prst="straightConnector1">
+            <a:avLst/>
+          </a:prstGeom>
+          <a:ln>
+            <a:solidFill>
+              <a:schemeClr val="tx1"/>
+            </a:solidFill>
+            <a:headEnd type="none" w="med" len="med"/>
+            <a:tailEnd type="arrow" w="med" len="med"/>
+          </a:ln>
+        </p:spPr>
+        <p:style>
+          <a:lnRef idx="1">
+            <a:schemeClr val="accent1"/>
+          </a:lnRef>
+          <a:fillRef idx="0">
+            <a:schemeClr val="accent1"/>
+          </a:fillRef>
+          <a:effectRef idx="0">
+            <a:schemeClr val="accent1"/>
+          </a:effectRef>
+          <a:fontRef idx="minor">
+            <a:schemeClr val="tx1"/>
+          </a:fontRef>
+        </p:style>
+      </p:cxnSp>
+      <p:cxnSp>
+        <p:nvCxnSpPr>
+          <p:cNvPr id="109" name="Straight Arrow Connector 108">
+            <a:extLst>
+              <a:ext uri="{FF2B5EF4-FFF2-40B4-BE49-F238E27FC236}">
+                <a16:creationId xmlns:a16="http://schemas.microsoft.com/office/drawing/2014/main" id="{3084F572-B565-384A-8667-088EB875AE3D}"/>
+              </a:ext>
+            </a:extLst>
+          </p:cNvPr>
+          <p:cNvCxnSpPr>
+            <a:cxnSpLocks/>
+            <a:stCxn id="94" idx="1"/>
+            <a:endCxn id="45" idx="3"/>
+          </p:cNvCxnSpPr>
+          <p:nvPr/>
+        </p:nvCxnSpPr>
+        <p:spPr>
+          <a:xfrm flipH="1" flipV="1">
+            <a:off x="3177585" y="1151899"/>
+            <a:ext cx="3775990" cy="1706348"/>
+          </a:xfrm>
+          <a:prstGeom prst="straightConnector1">
+            <a:avLst/>
+          </a:prstGeom>
+          <a:ln>
+            <a:solidFill>
+              <a:schemeClr val="tx1"/>
+            </a:solidFill>
+            <a:prstDash val="sysDot"/>
+            <a:headEnd type="none" w="med" len="med"/>
+            <a:tailEnd type="arrow" w="med" len="med"/>
+          </a:ln>
+        </p:spPr>
+        <p:style>
+          <a:lnRef idx="1">
+            <a:schemeClr val="accent1"/>
+          </a:lnRef>
+          <a:fillRef idx="0">
+            <a:schemeClr val="accent1"/>
+          </a:fillRef>
+          <a:effectRef idx="0">
+            <a:schemeClr val="accent1"/>
+          </a:effectRef>
+          <a:fontRef idx="minor">
+            <a:schemeClr val="tx1"/>
+          </a:fontRef>
+        </p:style>
+      </p:cxnSp>
+      <p:cxnSp>
+        <p:nvCxnSpPr>
+          <p:cNvPr id="33" name="Curved Connector 31">
+            <a:extLst>
+              <a:ext uri="{FF2B5EF4-FFF2-40B4-BE49-F238E27FC236}">
+                <a16:creationId xmlns:a16="http://schemas.microsoft.com/office/drawing/2014/main" id="{0001B7BC-A7A0-4FA0-94DC-F59E48C17445}"/>
+              </a:ext>
+            </a:extLst>
+          </p:cNvPr>
+          <p:cNvCxnSpPr>
+            <a:cxnSpLocks/>
+            <a:stCxn id="57" idx="1"/>
+            <a:endCxn id="46" idx="1"/>
+          </p:cNvCxnSpPr>
+          <p:nvPr/>
+        </p:nvCxnSpPr>
+        <p:spPr>
+          <a:xfrm rot="10800000">
+            <a:off x="1928649" y="2004920"/>
+            <a:ext cx="12700" cy="1966905"/>
+          </a:xfrm>
+          <a:prstGeom prst="curvedConnector3">
+            <a:avLst>
+              <a:gd name="adj1" fmla="val 1800000"/>
+            </a:avLst>
+          </a:prstGeom>
+          <a:ln>
+            <a:solidFill>
+              <a:schemeClr val="tx1"/>
+            </a:solidFill>
+            <a:prstDash val="sysDot"/>
+            <a:headEnd type="none" w="med" len="med"/>
+            <a:tailEnd type="arrow" w="med" len="med"/>
+          </a:ln>
+        </p:spPr>
+        <p:style>
+          <a:lnRef idx="1">
+            <a:schemeClr val="accent1"/>
+          </a:lnRef>
+          <a:fillRef idx="0">
+            <a:schemeClr val="accent1"/>
+          </a:fillRef>
+          <a:effectRef idx="0">
+            <a:schemeClr val="accent1"/>
+          </a:effectRef>
+          <a:fontRef idx="minor">
+            <a:schemeClr val="tx1"/>
+          </a:fontRef>
+        </p:style>
+      </p:cxnSp>
+      <p:cxnSp>
+        <p:nvCxnSpPr>
+          <p:cNvPr id="44" name="Straight Arrow Connector 43">
+            <a:extLst>
+              <a:ext uri="{FF2B5EF4-FFF2-40B4-BE49-F238E27FC236}">
+                <a16:creationId xmlns:a16="http://schemas.microsoft.com/office/drawing/2014/main" id="{302B1615-E0EC-4802-9B98-7C3DCAF333C4}"/>
+              </a:ext>
+            </a:extLst>
+          </p:cNvPr>
+          <p:cNvCxnSpPr>
+            <a:cxnSpLocks/>
+            <a:stCxn id="95" idx="0"/>
+            <a:endCxn id="136" idx="2"/>
+          </p:cNvCxnSpPr>
+          <p:nvPr/>
+        </p:nvCxnSpPr>
+        <p:spPr>
+          <a:xfrm flipV="1">
+            <a:off x="9337336" y="1737645"/>
+            <a:ext cx="0" cy="386990"/>
+          </a:xfrm>
+          <a:prstGeom prst="straightConnector1">
+            <a:avLst/>
+          </a:prstGeom>
+          <a:ln>
+            <a:solidFill>
+              <a:schemeClr val="tx1"/>
+            </a:solidFill>
+            <a:headEnd type="none" w="med" len="med"/>
+            <a:tailEnd type="arrow" w="med" len="med"/>
+          </a:ln>
+        </p:spPr>
+        <p:style>
+          <a:lnRef idx="1">
+            <a:schemeClr val="accent1"/>
+          </a:lnRef>
+          <a:fillRef idx="0">
+            <a:schemeClr val="accent1"/>
+          </a:fillRef>
+          <a:effectRef idx="0">
+            <a:schemeClr val="accent1"/>
+          </a:effectRef>
+          <a:fontRef idx="minor">
+            <a:schemeClr val="tx1"/>
+          </a:fontRef>
+        </p:style>
+      </p:cxnSp>
+      <p:sp>
+        <p:nvSpPr>
+          <p:cNvPr id="49" name="TextBox 48">
+            <a:extLst>
+              <a:ext uri="{FF2B5EF4-FFF2-40B4-BE49-F238E27FC236}">
+                <a16:creationId xmlns:a16="http://schemas.microsoft.com/office/drawing/2014/main" id="{69CD6B30-6470-4F02-A173-825F913EC16C}"/>
+              </a:ext>
+            </a:extLst>
+          </p:cNvPr>
+          <p:cNvSpPr txBox="1"/>
+          <p:nvPr/>
+        </p:nvSpPr>
+        <p:spPr>
+          <a:xfrm rot="5400000">
+            <a:off x="3135172" y="3879491"/>
+            <a:ext cx="543931" cy="184666"/>
+          </a:xfrm>
+          <a:prstGeom prst="rect">
+            <a:avLst/>
+          </a:prstGeom>
+          <a:solidFill>
+            <a:schemeClr val="bg1"/>
+          </a:solidFill>
+        </p:spPr>
+        <p:txBody>
+          <a:bodyPr wrap="none" lIns="0" tIns="0" rIns="0" bIns="0" rtlCol="0">
+            <a:spAutoFit/>
+          </a:bodyPr>
+          <a:lstStyle/>
+          <a:p>
+            <a:r>
+              <a:rPr lang="en-US" sz="1200" dirty="0"/>
+              <a:t>resource</a:t>
+            </a:r>
+          </a:p>
+        </p:txBody>
+      </p:sp>
+      <p:sp>
+        <p:nvSpPr>
+          <p:cNvPr id="45" name="Rounded Rectangle 38">
+            <a:extLst>
+              <a:ext uri="{FF2B5EF4-FFF2-40B4-BE49-F238E27FC236}">
+                <a16:creationId xmlns:a16="http://schemas.microsoft.com/office/drawing/2014/main" id="{53F71438-B2A2-41F6-B686-454B235F559F}"/>
+              </a:ext>
+            </a:extLst>
+          </p:cNvPr>
+          <p:cNvSpPr/>
+          <p:nvPr/>
+        </p:nvSpPr>
+        <p:spPr>
+          <a:xfrm>
+            <a:off x="1928649" y="822938"/>
+            <a:ext cx="1248936" cy="657922"/>
+          </a:xfrm>
+          <a:prstGeom prst="roundRect">
+            <a:avLst/>
+          </a:prstGeom>
+          <a:noFill/>
+          <a:ln>
+            <a:solidFill>
+              <a:schemeClr val="tx1"/>
+            </a:solidFill>
+          </a:ln>
+        </p:spPr>
+        <p:style>
+          <a:lnRef idx="2">
+            <a:schemeClr val="accent1">
+              <a:shade val="50000"/>
+            </a:schemeClr>
+          </a:lnRef>
+          <a:fillRef idx="1">
+            <a:schemeClr val="accent1"/>
+          </a:fillRef>
+          <a:effectRef idx="0">
+            <a:schemeClr val="accent1"/>
+          </a:effectRef>
+          <a:fontRef idx="minor">
+            <a:schemeClr val="lt1"/>
+          </a:fontRef>
+        </p:style>
+        <p:txBody>
+          <a:bodyPr rtlCol="0" anchor="ctr"/>
+          <a:lstStyle/>
+          <a:p>
+            <a:pPr algn="ctr"/>
+            <a:r>
+              <a:rPr lang="en-US" sz="1400">
+                <a:solidFill>
+                  <a:schemeClr val="tx1"/>
+                </a:solidFill>
+              </a:rPr>
+              <a:t>dct:Standard</a:t>
+            </a:r>
+          </a:p>
+        </p:txBody>
+      </p:sp>
+      <p:sp>
+        <p:nvSpPr>
+          <p:cNvPr id="46" name="Rounded Rectangle 89">
+            <a:extLst>
+              <a:ext uri="{FF2B5EF4-FFF2-40B4-BE49-F238E27FC236}">
+                <a16:creationId xmlns:a16="http://schemas.microsoft.com/office/drawing/2014/main" id="{305016B0-8195-4224-A762-EA99DB4D6966}"/>
+              </a:ext>
+            </a:extLst>
+          </p:cNvPr>
+          <p:cNvSpPr/>
+          <p:nvPr/>
+        </p:nvSpPr>
+        <p:spPr>
+          <a:xfrm>
+            <a:off x="1928649" y="1675958"/>
+            <a:ext cx="1248936" cy="657922"/>
+          </a:xfrm>
+          <a:prstGeom prst="roundRect">
+            <a:avLst/>
+          </a:prstGeom>
+          <a:noFill/>
+          <a:ln>
+            <a:solidFill>
+              <a:schemeClr val="tx1"/>
+            </a:solidFill>
+          </a:ln>
+        </p:spPr>
+        <p:style>
+          <a:lnRef idx="2">
+            <a:schemeClr val="accent1">
+              <a:shade val="50000"/>
+            </a:schemeClr>
+          </a:lnRef>
+          <a:fillRef idx="1">
+            <a:schemeClr val="accent1"/>
+          </a:fillRef>
+          <a:effectRef idx="0">
+            <a:schemeClr val="accent1"/>
+          </a:effectRef>
+          <a:fontRef idx="minor">
+            <a:schemeClr val="lt1"/>
+          </a:fontRef>
+        </p:style>
+        <p:txBody>
+          <a:bodyPr rtlCol="0" anchor="ctr"/>
+          <a:lstStyle/>
+          <a:p>
+            <a:pPr algn="ctr"/>
+            <a:r>
+              <a:rPr lang="en-US" sz="1400">
+                <a:solidFill>
+                  <a:schemeClr val="tx1"/>
+                </a:solidFill>
+              </a:rPr>
+              <a:t>Profile</a:t>
+            </a:r>
+          </a:p>
+        </p:txBody>
+      </p:sp>
+      <p:cxnSp>
+        <p:nvCxnSpPr>
+          <p:cNvPr id="47" name="Straight Arrow Connector 46">
+            <a:extLst>
+              <a:ext uri="{FF2B5EF4-FFF2-40B4-BE49-F238E27FC236}">
+                <a16:creationId xmlns:a16="http://schemas.microsoft.com/office/drawing/2014/main" id="{40271E48-E40C-454A-974D-CF52AA228F36}"/>
+              </a:ext>
+            </a:extLst>
+          </p:cNvPr>
+          <p:cNvCxnSpPr>
+            <a:cxnSpLocks/>
+            <a:stCxn id="64" idx="0"/>
+            <a:endCxn id="46" idx="2"/>
+          </p:cNvCxnSpPr>
+          <p:nvPr/>
+        </p:nvCxnSpPr>
+        <p:spPr>
+          <a:xfrm flipV="1">
+            <a:off x="2553117" y="2333880"/>
+            <a:ext cx="0" cy="195406"/>
+          </a:xfrm>
+          <a:prstGeom prst="straightConnector1">
+            <a:avLst/>
+          </a:prstGeom>
+          <a:ln>
+            <a:solidFill>
+              <a:schemeClr val="tx1"/>
+            </a:solidFill>
+            <a:prstDash val="sysDot"/>
+            <a:headEnd type="none" w="med" len="med"/>
+            <a:tailEnd type="arrow" w="med" len="med"/>
+          </a:ln>
+        </p:spPr>
+        <p:style>
+          <a:lnRef idx="1">
+            <a:schemeClr val="accent1"/>
+          </a:lnRef>
+          <a:fillRef idx="0">
+            <a:schemeClr val="accent1"/>
+          </a:fillRef>
+          <a:effectRef idx="0">
+            <a:schemeClr val="accent1"/>
+          </a:effectRef>
+          <a:fontRef idx="minor">
+            <a:schemeClr val="tx1"/>
+          </a:fontRef>
+        </p:style>
+      </p:cxnSp>
+      <p:cxnSp>
+        <p:nvCxnSpPr>
+          <p:cNvPr id="53" name="Straight Arrow Connector 52">
+            <a:extLst>
+              <a:ext uri="{FF2B5EF4-FFF2-40B4-BE49-F238E27FC236}">
+                <a16:creationId xmlns:a16="http://schemas.microsoft.com/office/drawing/2014/main" id="{5AAD4CDC-529F-4740-9F34-E244349188CA}"/>
+              </a:ext>
+            </a:extLst>
+          </p:cNvPr>
+          <p:cNvCxnSpPr>
+            <a:cxnSpLocks/>
+            <a:stCxn id="46" idx="0"/>
+            <a:endCxn id="45" idx="2"/>
+          </p:cNvCxnSpPr>
+          <p:nvPr/>
+        </p:nvCxnSpPr>
+        <p:spPr>
+          <a:xfrm flipV="1">
+            <a:off x="2553117" y="1480860"/>
+            <a:ext cx="0" cy="195098"/>
+          </a:xfrm>
+          <a:prstGeom prst="straightConnector1">
+            <a:avLst/>
+          </a:prstGeom>
+          <a:ln>
+            <a:solidFill>
+              <a:schemeClr val="tx1"/>
+            </a:solidFill>
+            <a:prstDash val="dash"/>
+            <a:headEnd type="none" w="med" len="med"/>
+            <a:tailEnd type="arrow" w="med" len="med"/>
+          </a:ln>
+        </p:spPr>
+        <p:style>
+          <a:lnRef idx="1">
+            <a:schemeClr val="accent1"/>
+          </a:lnRef>
+          <a:fillRef idx="0">
+            <a:schemeClr val="accent1"/>
+          </a:fillRef>
+          <a:effectRef idx="0">
+            <a:schemeClr val="accent1"/>
+          </a:effectRef>
+          <a:fontRef idx="minor">
+            <a:schemeClr val="tx1"/>
+          </a:fontRef>
+        </p:style>
+      </p:cxnSp>
+      <p:sp>
+        <p:nvSpPr>
+          <p:cNvPr id="57" name="Rounded Rectangle 69">
+            <a:extLst>
+              <a:ext uri="{FF2B5EF4-FFF2-40B4-BE49-F238E27FC236}">
+                <a16:creationId xmlns:a16="http://schemas.microsoft.com/office/drawing/2014/main" id="{2801BDC5-924A-4211-8624-7E090D4FB545}"/>
+              </a:ext>
+            </a:extLst>
+          </p:cNvPr>
+          <p:cNvSpPr/>
+          <p:nvPr/>
+        </p:nvSpPr>
+        <p:spPr>
+          <a:xfrm>
+            <a:off x="1928649" y="3642863"/>
+            <a:ext cx="1248936" cy="657922"/>
+          </a:xfrm>
+          <a:prstGeom prst="roundRect">
+            <a:avLst/>
+          </a:prstGeom>
+          <a:pattFill prst="pct30">
+            <a:fgClr>
+              <a:schemeClr val="bg1">
+                <a:lumMod val="85000"/>
+              </a:schemeClr>
+            </a:fgClr>
+            <a:bgClr>
+              <a:schemeClr val="bg1"/>
+            </a:bgClr>
+          </a:pattFill>
+          <a:ln>
+            <a:solidFill>
+              <a:schemeClr val="tx1"/>
+            </a:solidFill>
+          </a:ln>
+        </p:spPr>
+        <p:style>
+          <a:lnRef idx="2">
+            <a:schemeClr val="accent1">
+              <a:shade val="50000"/>
+            </a:schemeClr>
+          </a:lnRef>
+          <a:fillRef idx="1">
+            <a:schemeClr val="accent1"/>
+          </a:fillRef>
+          <a:effectRef idx="0">
+            <a:schemeClr val="accent1"/>
+          </a:effectRef>
+          <a:fontRef idx="minor">
+            <a:schemeClr val="lt1"/>
+          </a:fontRef>
+        </p:style>
+        <p:txBody>
+          <a:bodyPr rtlCol="0" anchor="ctr"/>
+          <a:lstStyle/>
+          <a:p>
+            <a:pPr algn="ctr"/>
+            <a:r>
+              <a:rPr lang="en-US" sz="1400" dirty="0">
+                <a:solidFill>
+                  <a:schemeClr val="tx1"/>
+                </a:solidFill>
+              </a:rPr>
+              <a:t>DGIWG – WMS 1.3 Profile</a:t>
+            </a:r>
+          </a:p>
+        </p:txBody>
+      </p:sp>
+      <p:cxnSp>
+        <p:nvCxnSpPr>
+          <p:cNvPr id="62" name="Straight Arrow Connector 61">
+            <a:extLst>
+              <a:ext uri="{FF2B5EF4-FFF2-40B4-BE49-F238E27FC236}">
+                <a16:creationId xmlns:a16="http://schemas.microsoft.com/office/drawing/2014/main" id="{CD6354E4-880E-4D8E-B2DA-8AB4BAF3D65A}"/>
+              </a:ext>
+            </a:extLst>
+          </p:cNvPr>
+          <p:cNvCxnSpPr>
+            <a:cxnSpLocks/>
+          </p:cNvCxnSpPr>
+          <p:nvPr/>
+        </p:nvCxnSpPr>
+        <p:spPr>
+          <a:xfrm>
+            <a:off x="2814005" y="3187207"/>
+            <a:ext cx="0" cy="455656"/>
+          </a:xfrm>
+          <a:prstGeom prst="straightConnector1">
+            <a:avLst/>
+          </a:prstGeom>
+          <a:ln>
+            <a:solidFill>
+              <a:schemeClr val="tx1"/>
+            </a:solidFill>
+            <a:headEnd type="arrow" w="med" len="med"/>
+            <a:tailEnd type="none" w="med" len="med"/>
+          </a:ln>
+        </p:spPr>
+        <p:style>
+          <a:lnRef idx="1">
+            <a:schemeClr val="accent1"/>
+          </a:lnRef>
+          <a:fillRef idx="0">
+            <a:schemeClr val="accent1"/>
+          </a:fillRef>
+          <a:effectRef idx="0">
+            <a:schemeClr val="accent1"/>
+          </a:effectRef>
+          <a:fontRef idx="minor">
+            <a:schemeClr val="tx1"/>
+          </a:fontRef>
+        </p:style>
+      </p:cxnSp>
+      <p:sp>
+        <p:nvSpPr>
+          <p:cNvPr id="63" name="Rounded Rectangle 66">
+            <a:extLst>
+              <a:ext uri="{FF2B5EF4-FFF2-40B4-BE49-F238E27FC236}">
+                <a16:creationId xmlns:a16="http://schemas.microsoft.com/office/drawing/2014/main" id="{2A038258-5261-45B3-B878-9FB47192BDFA}"/>
+              </a:ext>
+            </a:extLst>
+          </p:cNvPr>
+          <p:cNvSpPr/>
+          <p:nvPr/>
+        </p:nvSpPr>
+        <p:spPr>
+          <a:xfrm>
+            <a:off x="3687942" y="3642863"/>
+            <a:ext cx="1248936" cy="657922"/>
+          </a:xfrm>
+          <a:prstGeom prst="roundRect">
+            <a:avLst/>
+          </a:prstGeom>
+          <a:pattFill prst="pct30">
+            <a:fgClr>
+              <a:schemeClr val="bg1">
+                <a:lumMod val="85000"/>
+              </a:schemeClr>
+            </a:fgClr>
+            <a:bgClr>
+              <a:schemeClr val="bg1"/>
+            </a:bgClr>
+          </a:pattFill>
+          <a:ln>
+            <a:solidFill>
+              <a:schemeClr val="tx1"/>
+            </a:solidFill>
+          </a:ln>
+        </p:spPr>
+        <p:style>
+          <a:lnRef idx="2">
+            <a:schemeClr val="accent1">
+              <a:shade val="50000"/>
+            </a:schemeClr>
+          </a:lnRef>
+          <a:fillRef idx="1">
+            <a:schemeClr val="accent1"/>
+          </a:fillRef>
+          <a:effectRef idx="0">
+            <a:schemeClr val="accent1"/>
+          </a:effectRef>
+          <a:fontRef idx="minor">
+            <a:schemeClr val="lt1"/>
+          </a:fontRef>
+        </p:style>
+        <p:txBody>
+          <a:bodyPr rtlCol="0" anchor="ctr"/>
+          <a:lstStyle/>
+          <a:p>
+            <a:pPr algn="ctr"/>
+            <a:r>
+              <a:rPr lang="en-US" sz="1400" dirty="0">
+                <a:solidFill>
+                  <a:schemeClr val="tx1"/>
+                </a:solidFill>
+              </a:rPr>
+              <a:t>DGIWG </a:t>
+            </a:r>
+            <a:r>
+              <a:rPr lang="en-US" sz="1400" dirty="0" err="1">
+                <a:solidFill>
+                  <a:schemeClr val="tx1"/>
+                </a:solidFill>
+              </a:rPr>
+              <a:t>Impl</a:t>
+            </a:r>
+            <a:r>
+              <a:rPr lang="en-US" sz="1400" dirty="0">
+                <a:solidFill>
+                  <a:schemeClr val="tx1"/>
+                </a:solidFill>
+              </a:rPr>
+              <a:t> Res Descriptor</a:t>
+            </a:r>
+          </a:p>
+        </p:txBody>
+      </p:sp>
+      <p:sp>
+        <p:nvSpPr>
+          <p:cNvPr id="87" name="TextBox 86">
+            <a:extLst>
+              <a:ext uri="{FF2B5EF4-FFF2-40B4-BE49-F238E27FC236}">
+                <a16:creationId xmlns:a16="http://schemas.microsoft.com/office/drawing/2014/main" id="{2893B644-4BEB-6748-87BE-3EEBCA89AA7C}"/>
+              </a:ext>
+            </a:extLst>
+          </p:cNvPr>
+          <p:cNvSpPr txBox="1"/>
+          <p:nvPr/>
+        </p:nvSpPr>
+        <p:spPr>
+          <a:xfrm>
+            <a:off x="1860681" y="3307320"/>
+            <a:ext cx="621067" cy="184666"/>
+          </a:xfrm>
+          <a:prstGeom prst="rect">
+            <a:avLst/>
+          </a:prstGeom>
+          <a:solidFill>
+            <a:schemeClr val="bg1"/>
+          </a:solidFill>
+        </p:spPr>
+        <p:txBody>
+          <a:bodyPr wrap="none" lIns="0" tIns="0" rIns="0" bIns="0" rtlCol="0">
+            <a:spAutoFit/>
+          </a:bodyPr>
+          <a:lstStyle/>
+          <a:p>
+            <a:r>
+              <a:rPr lang="en-US" sz="1200" dirty="0" err="1"/>
+              <a:t>hasProfile</a:t>
+            </a:r>
+            <a:endParaRPr lang="en-US" sz="1200" dirty="0"/>
+          </a:p>
+        </p:txBody>
+      </p:sp>
+      <p:sp>
+        <p:nvSpPr>
+          <p:cNvPr id="88" name="TextBox 87">
+            <a:extLst>
+              <a:ext uri="{FF2B5EF4-FFF2-40B4-BE49-F238E27FC236}">
+                <a16:creationId xmlns:a16="http://schemas.microsoft.com/office/drawing/2014/main" id="{909D0740-6F1E-934E-849E-77D38957E769}"/>
+              </a:ext>
+            </a:extLst>
+          </p:cNvPr>
+          <p:cNvSpPr txBox="1"/>
+          <p:nvPr/>
+        </p:nvSpPr>
+        <p:spPr>
+          <a:xfrm>
+            <a:off x="2689348" y="3305554"/>
+            <a:ext cx="555345" cy="184666"/>
+          </a:xfrm>
+          <a:prstGeom prst="rect">
+            <a:avLst/>
+          </a:prstGeom>
+          <a:solidFill>
+            <a:schemeClr val="bg1"/>
+          </a:solidFill>
+        </p:spPr>
+        <p:txBody>
+          <a:bodyPr wrap="none" lIns="0" tIns="0" rIns="0" bIns="0" rtlCol="0">
+            <a:spAutoFit/>
+          </a:bodyPr>
+          <a:lstStyle/>
+          <a:p>
+            <a:r>
+              <a:rPr lang="en-US" sz="1200" dirty="0" err="1"/>
+              <a:t>profileOf</a:t>
+            </a:r>
+            <a:endParaRPr lang="en-US" sz="1200" dirty="0"/>
+          </a:p>
+        </p:txBody>
+      </p:sp>
+      <p:sp>
+        <p:nvSpPr>
+          <p:cNvPr id="69" name="Rounded Rectangle 8">
+            <a:extLst>
+              <a:ext uri="{FF2B5EF4-FFF2-40B4-BE49-F238E27FC236}">
+                <a16:creationId xmlns:a16="http://schemas.microsoft.com/office/drawing/2014/main" id="{8DB76B88-2840-4B03-9168-91FA1DCDA62C}"/>
+              </a:ext>
+            </a:extLst>
+          </p:cNvPr>
+          <p:cNvSpPr/>
+          <p:nvPr/>
+        </p:nvSpPr>
+        <p:spPr>
+          <a:xfrm>
+            <a:off x="5423933" y="3642863"/>
+            <a:ext cx="1248936" cy="657922"/>
+          </a:xfrm>
+          <a:prstGeom prst="roundRect">
+            <a:avLst/>
+          </a:prstGeom>
+          <a:pattFill prst="pct30">
+            <a:fgClr>
+              <a:schemeClr val="bg1">
+                <a:lumMod val="85000"/>
+              </a:schemeClr>
+            </a:fgClr>
+            <a:bgClr>
+              <a:schemeClr val="bg1"/>
+            </a:bgClr>
+          </a:pattFill>
+          <a:ln>
+            <a:solidFill>
+              <a:schemeClr val="tx1"/>
+            </a:solidFill>
+          </a:ln>
+        </p:spPr>
+        <p:style>
+          <a:lnRef idx="2">
+            <a:schemeClr val="accent1">
+              <a:shade val="50000"/>
+            </a:schemeClr>
+          </a:lnRef>
+          <a:fillRef idx="1">
+            <a:schemeClr val="accent1"/>
+          </a:fillRef>
+          <a:effectRef idx="0">
+            <a:schemeClr val="accent1"/>
+          </a:effectRef>
+          <a:fontRef idx="minor">
+            <a:schemeClr val="lt1"/>
+          </a:fontRef>
+        </p:style>
+        <p:txBody>
+          <a:bodyPr rtlCol="0" anchor="ctr"/>
+          <a:lstStyle/>
+          <a:p>
+            <a:pPr algn="ctr"/>
+            <a:r>
+              <a:rPr lang="en-US" sz="1200" dirty="0">
+                <a:solidFill>
+                  <a:schemeClr val="tx1"/>
+                </a:solidFill>
+              </a:rPr>
+              <a:t>role:</a:t>
+            </a:r>
+            <a:br>
+              <a:rPr lang="en-US" sz="1200" dirty="0">
+                <a:solidFill>
+                  <a:schemeClr val="tx1"/>
+                </a:solidFill>
+              </a:rPr>
+            </a:br>
+            <a:r>
+              <a:rPr lang="en-US" sz="1200" dirty="0" err="1">
+                <a:solidFill>
+                  <a:schemeClr val="tx1"/>
+                </a:solidFill>
+              </a:rPr>
+              <a:t>FullConstraints</a:t>
+            </a:r>
+            <a:endParaRPr lang="en-US" sz="1200" dirty="0">
+              <a:solidFill>
+                <a:schemeClr val="tx1"/>
+              </a:solidFill>
+            </a:endParaRPr>
+          </a:p>
+        </p:txBody>
+      </p:sp>
+      <p:cxnSp>
+        <p:nvCxnSpPr>
+          <p:cNvPr id="81" name="Straight Arrow Connector 80">
+            <a:extLst>
+              <a:ext uri="{FF2B5EF4-FFF2-40B4-BE49-F238E27FC236}">
+                <a16:creationId xmlns:a16="http://schemas.microsoft.com/office/drawing/2014/main" id="{49682C18-C669-473D-B8C1-4C2857EA724E}"/>
+              </a:ext>
+            </a:extLst>
+          </p:cNvPr>
+          <p:cNvCxnSpPr>
+            <a:cxnSpLocks/>
+            <a:stCxn id="63" idx="3"/>
+            <a:endCxn id="69" idx="1"/>
+          </p:cNvCxnSpPr>
+          <p:nvPr/>
+        </p:nvCxnSpPr>
+        <p:spPr>
+          <a:xfrm>
+            <a:off x="4936878" y="3971824"/>
+            <a:ext cx="487055" cy="0"/>
+          </a:xfrm>
+          <a:prstGeom prst="straightConnector1">
+            <a:avLst/>
+          </a:prstGeom>
+          <a:ln>
+            <a:solidFill>
+              <a:schemeClr val="tx1"/>
+            </a:solidFill>
+            <a:headEnd type="none" w="med" len="med"/>
+            <a:tailEnd type="arrow" w="med" len="med"/>
+          </a:ln>
+        </p:spPr>
+        <p:style>
+          <a:lnRef idx="1">
+            <a:schemeClr val="accent1"/>
+          </a:lnRef>
+          <a:fillRef idx="0">
+            <a:schemeClr val="accent1"/>
+          </a:fillRef>
+          <a:effectRef idx="0">
+            <a:schemeClr val="accent1"/>
+          </a:effectRef>
+          <a:fontRef idx="minor">
+            <a:schemeClr val="tx1"/>
+          </a:fontRef>
+        </p:style>
+      </p:cxnSp>
+      <p:sp>
+        <p:nvSpPr>
+          <p:cNvPr id="72" name="TextBox 71">
+            <a:extLst>
+              <a:ext uri="{FF2B5EF4-FFF2-40B4-BE49-F238E27FC236}">
+                <a16:creationId xmlns:a16="http://schemas.microsoft.com/office/drawing/2014/main" id="{9C8479FC-F592-4D6F-93A2-635E330E89CA}"/>
+              </a:ext>
+            </a:extLst>
+          </p:cNvPr>
+          <p:cNvSpPr txBox="1"/>
+          <p:nvPr/>
+        </p:nvSpPr>
+        <p:spPr>
+          <a:xfrm rot="5400000">
+            <a:off x="4769711" y="3901555"/>
+            <a:ext cx="818109" cy="184666"/>
+          </a:xfrm>
+          <a:prstGeom prst="rect">
+            <a:avLst/>
+          </a:prstGeom>
+          <a:solidFill>
+            <a:schemeClr val="bg1"/>
+          </a:solidFill>
+        </p:spPr>
+        <p:txBody>
+          <a:bodyPr wrap="none" lIns="0" tIns="0" rIns="0" bIns="0" rtlCol="0">
+            <a:spAutoFit/>
+          </a:bodyPr>
+          <a:lstStyle/>
+          <a:p>
+            <a:r>
+              <a:rPr lang="en-US" sz="1200" dirty="0" err="1"/>
+              <a:t>resourceRole</a:t>
+            </a:r>
+            <a:endParaRPr lang="en-US" sz="1200" dirty="0"/>
+          </a:p>
+        </p:txBody>
+      </p:sp>
+      <p:sp>
+        <p:nvSpPr>
+          <p:cNvPr id="82" name="Rounded Rectangle 8">
+            <a:extLst>
+              <a:ext uri="{FF2B5EF4-FFF2-40B4-BE49-F238E27FC236}">
+                <a16:creationId xmlns:a16="http://schemas.microsoft.com/office/drawing/2014/main" id="{8ECF6A8A-9983-444C-9D50-F6C1F5C38CE2}"/>
+              </a:ext>
+            </a:extLst>
+          </p:cNvPr>
+          <p:cNvSpPr/>
+          <p:nvPr/>
+        </p:nvSpPr>
+        <p:spPr>
+          <a:xfrm>
+            <a:off x="3687942" y="4687776"/>
+            <a:ext cx="1248936" cy="657922"/>
+          </a:xfrm>
+          <a:prstGeom prst="roundRect">
+            <a:avLst/>
+          </a:prstGeom>
+          <a:pattFill prst="pct30">
+            <a:fgClr>
+              <a:schemeClr val="bg1">
+                <a:lumMod val="85000"/>
+              </a:schemeClr>
+            </a:fgClr>
+            <a:bgClr>
+              <a:schemeClr val="bg1"/>
+            </a:bgClr>
+          </a:pattFill>
+          <a:ln>
+            <a:solidFill>
+              <a:schemeClr val="tx1"/>
+            </a:solidFill>
+          </a:ln>
+        </p:spPr>
+        <p:style>
+          <a:lnRef idx="2">
+            <a:schemeClr val="accent1">
+              <a:shade val="50000"/>
+            </a:schemeClr>
+          </a:lnRef>
+          <a:fillRef idx="1">
+            <a:schemeClr val="accent1"/>
+          </a:fillRef>
+          <a:effectRef idx="0">
+            <a:schemeClr val="accent1"/>
+          </a:effectRef>
+          <a:fontRef idx="minor">
+            <a:schemeClr val="lt1"/>
+          </a:fontRef>
+        </p:style>
+        <p:txBody>
+          <a:bodyPr rtlCol="0" anchor="ctr"/>
+          <a:lstStyle/>
+          <a:p>
+            <a:pPr algn="ctr"/>
+            <a:r>
+              <a:rPr lang="en-US" sz="1400" dirty="0">
+                <a:solidFill>
+                  <a:schemeClr val="tx1"/>
+                </a:solidFill>
+              </a:rPr>
+              <a:t>PDF</a:t>
+            </a:r>
+          </a:p>
+        </p:txBody>
+      </p:sp>
+      <p:sp>
+        <p:nvSpPr>
+          <p:cNvPr id="83" name="TextBox 82">
+            <a:extLst>
+              <a:ext uri="{FF2B5EF4-FFF2-40B4-BE49-F238E27FC236}">
+                <a16:creationId xmlns:a16="http://schemas.microsoft.com/office/drawing/2014/main" id="{0D715EDC-920C-4B26-966F-B9119FAE4AFB}"/>
+              </a:ext>
+            </a:extLst>
+          </p:cNvPr>
+          <p:cNvSpPr txBox="1"/>
+          <p:nvPr/>
+        </p:nvSpPr>
+        <p:spPr>
+          <a:xfrm>
+            <a:off x="4017153" y="4367831"/>
+            <a:ext cx="663836" cy="184666"/>
+          </a:xfrm>
+          <a:prstGeom prst="rect">
+            <a:avLst/>
+          </a:prstGeom>
+          <a:solidFill>
+            <a:schemeClr val="bg1"/>
+          </a:solidFill>
+        </p:spPr>
+        <p:txBody>
+          <a:bodyPr wrap="none" lIns="0" tIns="0" rIns="0" bIns="0" rtlCol="0">
+            <a:spAutoFit/>
+          </a:bodyPr>
+          <a:lstStyle/>
+          <a:p>
+            <a:r>
+              <a:rPr lang="en-US" sz="1200" dirty="0" err="1"/>
+              <a:t>dct:format</a:t>
+            </a:r>
+            <a:endParaRPr lang="en-US" sz="1200" dirty="0"/>
+          </a:p>
+        </p:txBody>
+      </p:sp>
+      <p:sp>
+        <p:nvSpPr>
+          <p:cNvPr id="94" name="Rounded Rectangle 69">
+            <a:extLst>
+              <a:ext uri="{FF2B5EF4-FFF2-40B4-BE49-F238E27FC236}">
+                <a16:creationId xmlns:a16="http://schemas.microsoft.com/office/drawing/2014/main" id="{11CA118F-FE89-43B9-85F0-6AFD04A21A98}"/>
+              </a:ext>
+            </a:extLst>
+          </p:cNvPr>
+          <p:cNvSpPr/>
+          <p:nvPr/>
+        </p:nvSpPr>
+        <p:spPr>
+          <a:xfrm>
+            <a:off x="6953575" y="2529286"/>
+            <a:ext cx="1248936" cy="657922"/>
+          </a:xfrm>
+          <a:prstGeom prst="roundRect">
+            <a:avLst/>
+          </a:prstGeom>
+          <a:pattFill prst="pct30">
+            <a:fgClr>
+              <a:schemeClr val="bg1">
+                <a:lumMod val="85000"/>
+              </a:schemeClr>
+            </a:fgClr>
+            <a:bgClr>
+              <a:schemeClr val="bg1"/>
+            </a:bgClr>
+          </a:pattFill>
+          <a:ln>
+            <a:solidFill>
+              <a:schemeClr val="tx1"/>
+            </a:solidFill>
+          </a:ln>
+        </p:spPr>
+        <p:style>
+          <a:lnRef idx="2">
+            <a:schemeClr val="accent1">
+              <a:shade val="50000"/>
+            </a:schemeClr>
+          </a:lnRef>
+          <a:fillRef idx="1">
+            <a:schemeClr val="accent1"/>
+          </a:fillRef>
+          <a:effectRef idx="0">
+            <a:schemeClr val="accent1"/>
+          </a:effectRef>
+          <a:fontRef idx="minor">
+            <a:schemeClr val="lt1"/>
+          </a:fontRef>
+        </p:style>
+        <p:txBody>
+          <a:bodyPr rtlCol="0" anchor="ctr"/>
+          <a:lstStyle/>
+          <a:p>
+            <a:pPr algn="ctr"/>
+            <a:r>
+              <a:rPr lang="en-US" sz="1000" dirty="0" err="1">
+                <a:solidFill>
+                  <a:schemeClr val="tx1"/>
+                </a:solidFill>
+              </a:rPr>
+              <a:t>OpenGIS</a:t>
+            </a:r>
+            <a:r>
+              <a:rPr lang="en-US" sz="1000" dirty="0">
+                <a:solidFill>
+                  <a:schemeClr val="tx1"/>
+                </a:solidFill>
+              </a:rPr>
+              <a:t> Web Map Tile Service Implementation Standard</a:t>
+            </a:r>
+          </a:p>
+        </p:txBody>
+      </p:sp>
+      <p:sp>
+        <p:nvSpPr>
+          <p:cNvPr id="95" name="Rounded Rectangle 66">
+            <a:extLst>
+              <a:ext uri="{FF2B5EF4-FFF2-40B4-BE49-F238E27FC236}">
+                <a16:creationId xmlns:a16="http://schemas.microsoft.com/office/drawing/2014/main" id="{93777A62-91B6-47ED-888C-EF9E3B24CA08}"/>
+              </a:ext>
+            </a:extLst>
+          </p:cNvPr>
+          <p:cNvSpPr/>
+          <p:nvPr/>
+        </p:nvSpPr>
+        <p:spPr>
+          <a:xfrm>
+            <a:off x="8712868" y="2124635"/>
+            <a:ext cx="1248936" cy="657922"/>
+          </a:xfrm>
+          <a:prstGeom prst="roundRect">
+            <a:avLst/>
+          </a:prstGeom>
+          <a:pattFill prst="pct30">
+            <a:fgClr>
+              <a:schemeClr val="bg1">
+                <a:lumMod val="85000"/>
+              </a:schemeClr>
+            </a:fgClr>
+            <a:bgClr>
+              <a:schemeClr val="bg1"/>
+            </a:bgClr>
+          </a:pattFill>
+          <a:ln>
+            <a:solidFill>
+              <a:schemeClr val="tx1"/>
+            </a:solidFill>
+          </a:ln>
+        </p:spPr>
+        <p:style>
+          <a:lnRef idx="2">
+            <a:schemeClr val="accent1">
+              <a:shade val="50000"/>
+            </a:schemeClr>
+          </a:lnRef>
+          <a:fillRef idx="1">
+            <a:schemeClr val="accent1"/>
+          </a:fillRef>
+          <a:effectRef idx="0">
+            <a:schemeClr val="accent1"/>
+          </a:effectRef>
+          <a:fontRef idx="minor">
+            <a:schemeClr val="lt1"/>
+          </a:fontRef>
+        </p:style>
+        <p:txBody>
+          <a:bodyPr rtlCol="0" anchor="ctr"/>
+          <a:lstStyle/>
+          <a:p>
+            <a:pPr algn="ctr"/>
+            <a:r>
+              <a:rPr lang="en-US" sz="1400" dirty="0">
+                <a:solidFill>
+                  <a:schemeClr val="tx1"/>
+                </a:solidFill>
+              </a:rPr>
+              <a:t>WMTS XML Schema</a:t>
+            </a:r>
+          </a:p>
+        </p:txBody>
+      </p:sp>
+      <p:sp>
+        <p:nvSpPr>
+          <p:cNvPr id="96" name="Rounded Rectangle 66">
+            <a:extLst>
+              <a:ext uri="{FF2B5EF4-FFF2-40B4-BE49-F238E27FC236}">
+                <a16:creationId xmlns:a16="http://schemas.microsoft.com/office/drawing/2014/main" id="{EA0E8247-9F0D-41DF-AEB3-FD86B6B9BF2F}"/>
+              </a:ext>
+            </a:extLst>
+          </p:cNvPr>
+          <p:cNvSpPr/>
+          <p:nvPr/>
+        </p:nvSpPr>
+        <p:spPr>
+          <a:xfrm>
+            <a:off x="8712868" y="2892614"/>
+            <a:ext cx="1248936" cy="657922"/>
+          </a:xfrm>
+          <a:prstGeom prst="roundRect">
+            <a:avLst/>
+          </a:prstGeom>
+          <a:pattFill prst="pct30">
+            <a:fgClr>
+              <a:schemeClr val="bg1">
+                <a:lumMod val="85000"/>
+              </a:schemeClr>
+            </a:fgClr>
+            <a:bgClr>
+              <a:schemeClr val="bg1"/>
+            </a:bgClr>
+          </a:pattFill>
+          <a:ln>
+            <a:solidFill>
+              <a:schemeClr val="tx1"/>
+            </a:solidFill>
+          </a:ln>
+        </p:spPr>
+        <p:style>
+          <a:lnRef idx="2">
+            <a:schemeClr val="accent1">
+              <a:shade val="50000"/>
+            </a:schemeClr>
+          </a:lnRef>
+          <a:fillRef idx="1">
+            <a:schemeClr val="accent1"/>
+          </a:fillRef>
+          <a:effectRef idx="0">
+            <a:schemeClr val="accent1"/>
+          </a:effectRef>
+          <a:fontRef idx="minor">
+            <a:schemeClr val="lt1"/>
+          </a:fontRef>
+        </p:style>
+        <p:txBody>
+          <a:bodyPr rtlCol="0" anchor="ctr"/>
+          <a:lstStyle/>
+          <a:p>
+            <a:pPr algn="ctr"/>
+            <a:r>
+              <a:rPr lang="en-US" sz="1400" dirty="0">
+                <a:solidFill>
+                  <a:schemeClr val="tx1"/>
+                </a:solidFill>
+              </a:rPr>
+              <a:t>WMTS Swagger UI</a:t>
+            </a:r>
+          </a:p>
+        </p:txBody>
+      </p:sp>
+      <p:sp>
+        <p:nvSpPr>
+          <p:cNvPr id="98" name="Rounded Rectangle 69">
+            <a:extLst>
+              <a:ext uri="{FF2B5EF4-FFF2-40B4-BE49-F238E27FC236}">
+                <a16:creationId xmlns:a16="http://schemas.microsoft.com/office/drawing/2014/main" id="{AC45BE6A-0BE0-462C-890D-24DADB1DECD6}"/>
+              </a:ext>
+            </a:extLst>
+          </p:cNvPr>
+          <p:cNvSpPr/>
+          <p:nvPr/>
+        </p:nvSpPr>
+        <p:spPr>
+          <a:xfrm>
+            <a:off x="6953575" y="3641388"/>
+            <a:ext cx="1248936" cy="657922"/>
+          </a:xfrm>
+          <a:prstGeom prst="roundRect">
+            <a:avLst/>
+          </a:prstGeom>
+          <a:pattFill prst="pct30">
+            <a:fgClr>
+              <a:schemeClr val="bg1">
+                <a:lumMod val="85000"/>
+              </a:schemeClr>
+            </a:fgClr>
+            <a:bgClr>
+              <a:schemeClr val="bg1"/>
+            </a:bgClr>
+          </a:pattFill>
+          <a:ln>
+            <a:solidFill>
+              <a:schemeClr val="tx1"/>
+            </a:solidFill>
+          </a:ln>
+        </p:spPr>
+        <p:style>
+          <a:lnRef idx="2">
+            <a:schemeClr val="accent1">
+              <a:shade val="50000"/>
+            </a:schemeClr>
+          </a:lnRef>
+          <a:fillRef idx="1">
+            <a:schemeClr val="accent1"/>
+          </a:fillRef>
+          <a:effectRef idx="0">
+            <a:schemeClr val="accent1"/>
+          </a:effectRef>
+          <a:fontRef idx="minor">
+            <a:schemeClr val="lt1"/>
+          </a:fontRef>
+        </p:style>
+        <p:txBody>
+          <a:bodyPr rtlCol="0" anchor="ctr"/>
+          <a:lstStyle/>
+          <a:p>
+            <a:pPr algn="ctr"/>
+            <a:r>
+              <a:rPr lang="en-US" sz="1400" dirty="0">
+                <a:solidFill>
+                  <a:schemeClr val="tx1"/>
+                </a:solidFill>
+              </a:rPr>
+              <a:t>WMTS Simple Profile</a:t>
+            </a:r>
+          </a:p>
+        </p:txBody>
+      </p:sp>
+      <p:cxnSp>
+        <p:nvCxnSpPr>
+          <p:cNvPr id="99" name="Straight Arrow Connector 98">
+            <a:extLst>
+              <a:ext uri="{FF2B5EF4-FFF2-40B4-BE49-F238E27FC236}">
+                <a16:creationId xmlns:a16="http://schemas.microsoft.com/office/drawing/2014/main" id="{CF4D3B31-C135-4144-BBE1-C37258EC68D9}"/>
+              </a:ext>
+            </a:extLst>
+          </p:cNvPr>
+          <p:cNvCxnSpPr>
+            <a:cxnSpLocks/>
+            <a:stCxn id="94" idx="2"/>
+            <a:endCxn id="98" idx="0"/>
+          </p:cNvCxnSpPr>
+          <p:nvPr/>
+        </p:nvCxnSpPr>
+        <p:spPr>
+          <a:xfrm>
+            <a:off x="7578043" y="3187208"/>
+            <a:ext cx="0" cy="454180"/>
+          </a:xfrm>
+          <a:prstGeom prst="straightConnector1">
+            <a:avLst/>
+          </a:prstGeom>
+          <a:ln>
+            <a:solidFill>
+              <a:schemeClr val="tx1"/>
+            </a:solidFill>
+            <a:headEnd type="none" w="med" len="med"/>
+            <a:tailEnd type="arrow" w="med" len="med"/>
+          </a:ln>
+        </p:spPr>
+        <p:style>
+          <a:lnRef idx="1">
+            <a:schemeClr val="accent1"/>
+          </a:lnRef>
+          <a:fillRef idx="0">
+            <a:schemeClr val="accent1"/>
+          </a:fillRef>
+          <a:effectRef idx="0">
+            <a:schemeClr val="accent1"/>
+          </a:effectRef>
+          <a:fontRef idx="minor">
+            <a:schemeClr val="tx1"/>
+          </a:fontRef>
+        </p:style>
+      </p:cxnSp>
+      <p:sp>
+        <p:nvSpPr>
+          <p:cNvPr id="103" name="TextBox 102">
+            <a:extLst>
+              <a:ext uri="{FF2B5EF4-FFF2-40B4-BE49-F238E27FC236}">
+                <a16:creationId xmlns:a16="http://schemas.microsoft.com/office/drawing/2014/main" id="{8EC749CD-FBC9-4952-9C27-85B0B91B7B86}"/>
+              </a:ext>
+            </a:extLst>
+          </p:cNvPr>
+          <p:cNvSpPr txBox="1"/>
+          <p:nvPr/>
+        </p:nvSpPr>
+        <p:spPr>
+          <a:xfrm rot="5400000">
+            <a:off x="8115465" y="2765914"/>
+            <a:ext cx="543931" cy="184666"/>
+          </a:xfrm>
+          <a:prstGeom prst="rect">
+            <a:avLst/>
+          </a:prstGeom>
+          <a:solidFill>
+            <a:schemeClr val="bg1"/>
+          </a:solidFill>
+        </p:spPr>
+        <p:txBody>
+          <a:bodyPr wrap="none" lIns="0" tIns="0" rIns="0" bIns="0" rtlCol="0">
+            <a:spAutoFit/>
+          </a:bodyPr>
+          <a:lstStyle/>
+          <a:p>
+            <a:r>
+              <a:rPr lang="en-US" sz="1200" dirty="0"/>
+              <a:t>resource</a:t>
+            </a:r>
+          </a:p>
+        </p:txBody>
+      </p:sp>
+      <p:sp>
+        <p:nvSpPr>
+          <p:cNvPr id="110" name="TextBox 109">
+            <a:extLst>
+              <a:ext uri="{FF2B5EF4-FFF2-40B4-BE49-F238E27FC236}">
+                <a16:creationId xmlns:a16="http://schemas.microsoft.com/office/drawing/2014/main" id="{D9903697-A10E-4823-8073-F602F19693FB}"/>
+              </a:ext>
+            </a:extLst>
+          </p:cNvPr>
+          <p:cNvSpPr txBox="1"/>
+          <p:nvPr/>
+        </p:nvSpPr>
+        <p:spPr>
+          <a:xfrm>
+            <a:off x="7267510" y="3279714"/>
+            <a:ext cx="621067" cy="184666"/>
+          </a:xfrm>
+          <a:prstGeom prst="rect">
+            <a:avLst/>
+          </a:prstGeom>
+          <a:solidFill>
+            <a:schemeClr val="bg1"/>
+          </a:solidFill>
+        </p:spPr>
+        <p:txBody>
+          <a:bodyPr wrap="none" lIns="0" tIns="0" rIns="0" bIns="0" rtlCol="0">
+            <a:spAutoFit/>
+          </a:bodyPr>
+          <a:lstStyle/>
+          <a:p>
+            <a:r>
+              <a:rPr lang="en-US" sz="1200" dirty="0" err="1"/>
+              <a:t>hasProfile</a:t>
+            </a:r>
+            <a:endParaRPr lang="en-US" sz="1200" dirty="0"/>
+          </a:p>
+        </p:txBody>
+      </p:sp>
+      <p:sp>
+        <p:nvSpPr>
+          <p:cNvPr id="124" name="Rounded Rectangle 66">
+            <a:extLst>
+              <a:ext uri="{FF2B5EF4-FFF2-40B4-BE49-F238E27FC236}">
+                <a16:creationId xmlns:a16="http://schemas.microsoft.com/office/drawing/2014/main" id="{3684E537-6991-4DC8-AC4C-DD526E040CE4}"/>
+              </a:ext>
+            </a:extLst>
+          </p:cNvPr>
+          <p:cNvSpPr/>
+          <p:nvPr/>
+        </p:nvSpPr>
+        <p:spPr>
+          <a:xfrm>
+            <a:off x="8712868" y="3642864"/>
+            <a:ext cx="1248936" cy="657922"/>
+          </a:xfrm>
+          <a:prstGeom prst="roundRect">
+            <a:avLst/>
+          </a:prstGeom>
+          <a:pattFill prst="pct30">
+            <a:fgClr>
+              <a:schemeClr val="bg1">
+                <a:lumMod val="85000"/>
+              </a:schemeClr>
+            </a:fgClr>
+            <a:bgClr>
+              <a:schemeClr val="bg1"/>
+            </a:bgClr>
+          </a:pattFill>
+          <a:ln>
+            <a:solidFill>
+              <a:schemeClr val="tx1"/>
+            </a:solidFill>
+          </a:ln>
+        </p:spPr>
+        <p:style>
+          <a:lnRef idx="2">
+            <a:schemeClr val="accent1">
+              <a:shade val="50000"/>
+            </a:schemeClr>
+          </a:lnRef>
+          <a:fillRef idx="1">
+            <a:schemeClr val="accent1"/>
+          </a:fillRef>
+          <a:effectRef idx="0">
+            <a:schemeClr val="accent1"/>
+          </a:effectRef>
+          <a:fontRef idx="minor">
+            <a:schemeClr val="lt1"/>
+          </a:fontRef>
+        </p:style>
+        <p:txBody>
+          <a:bodyPr rtlCol="0" anchor="ctr"/>
+          <a:lstStyle/>
+          <a:p>
+            <a:pPr algn="ctr"/>
+            <a:r>
+              <a:rPr lang="en-US" sz="1400" dirty="0">
+                <a:solidFill>
+                  <a:schemeClr val="tx1"/>
+                </a:solidFill>
+              </a:rPr>
+              <a:t>WMTS Simple Doc</a:t>
+            </a:r>
+          </a:p>
+        </p:txBody>
+      </p:sp>
+      <p:cxnSp>
+        <p:nvCxnSpPr>
+          <p:cNvPr id="127" name="Straight Arrow Connector 126">
+            <a:extLst>
+              <a:ext uri="{FF2B5EF4-FFF2-40B4-BE49-F238E27FC236}">
+                <a16:creationId xmlns:a16="http://schemas.microsoft.com/office/drawing/2014/main" id="{E57A3DC7-863C-494F-A8CA-98C6329A1837}"/>
+              </a:ext>
+            </a:extLst>
+          </p:cNvPr>
+          <p:cNvCxnSpPr>
+            <a:cxnSpLocks/>
+            <a:stCxn id="98" idx="3"/>
+            <a:endCxn id="124" idx="1"/>
+          </p:cNvCxnSpPr>
+          <p:nvPr/>
+        </p:nvCxnSpPr>
+        <p:spPr>
+          <a:xfrm>
+            <a:off x="8202511" y="3970349"/>
+            <a:ext cx="510357" cy="1476"/>
+          </a:xfrm>
+          <a:prstGeom prst="straightConnector1">
+            <a:avLst/>
+          </a:prstGeom>
+          <a:ln>
+            <a:solidFill>
+              <a:schemeClr val="tx1"/>
+            </a:solidFill>
+            <a:headEnd type="none" w="med" len="med"/>
+            <a:tailEnd type="arrow" w="med" len="med"/>
+          </a:ln>
+        </p:spPr>
+        <p:style>
+          <a:lnRef idx="1">
+            <a:schemeClr val="accent1"/>
+          </a:lnRef>
+          <a:fillRef idx="0">
+            <a:schemeClr val="accent1"/>
+          </a:fillRef>
+          <a:effectRef idx="0">
+            <a:schemeClr val="accent1"/>
+          </a:effectRef>
+          <a:fontRef idx="minor">
+            <a:schemeClr val="tx1"/>
+          </a:fontRef>
+        </p:style>
+      </p:cxnSp>
+      <p:sp>
+        <p:nvSpPr>
+          <p:cNvPr id="131" name="TextBox 130">
+            <a:extLst>
+              <a:ext uri="{FF2B5EF4-FFF2-40B4-BE49-F238E27FC236}">
+                <a16:creationId xmlns:a16="http://schemas.microsoft.com/office/drawing/2014/main" id="{01B69AA4-BF31-4E56-B8A6-5E00EB67C9FF}"/>
+              </a:ext>
+            </a:extLst>
+          </p:cNvPr>
+          <p:cNvSpPr txBox="1"/>
+          <p:nvPr/>
+        </p:nvSpPr>
+        <p:spPr>
+          <a:xfrm rot="5400000">
+            <a:off x="8115465" y="3878016"/>
+            <a:ext cx="543931" cy="184666"/>
+          </a:xfrm>
+          <a:prstGeom prst="rect">
+            <a:avLst/>
+          </a:prstGeom>
+          <a:solidFill>
+            <a:schemeClr val="bg1"/>
+          </a:solidFill>
+        </p:spPr>
+        <p:txBody>
+          <a:bodyPr wrap="none" lIns="0" tIns="0" rIns="0" bIns="0" rtlCol="0">
+            <a:spAutoFit/>
+          </a:bodyPr>
+          <a:lstStyle/>
+          <a:p>
+            <a:r>
+              <a:rPr lang="en-US" sz="1200" dirty="0"/>
+              <a:t>resource</a:t>
+            </a:r>
+          </a:p>
+        </p:txBody>
+      </p:sp>
+      <p:cxnSp>
+        <p:nvCxnSpPr>
+          <p:cNvPr id="132" name="Straight Arrow Connector 131">
+            <a:extLst>
+              <a:ext uri="{FF2B5EF4-FFF2-40B4-BE49-F238E27FC236}">
+                <a16:creationId xmlns:a16="http://schemas.microsoft.com/office/drawing/2014/main" id="{EBC069DF-87D3-49DB-9FE9-477AF79B184B}"/>
+              </a:ext>
+            </a:extLst>
+          </p:cNvPr>
+          <p:cNvCxnSpPr>
+            <a:cxnSpLocks/>
+            <a:stCxn id="124" idx="2"/>
+            <a:endCxn id="133" idx="0"/>
+          </p:cNvCxnSpPr>
+          <p:nvPr/>
+        </p:nvCxnSpPr>
+        <p:spPr>
+          <a:xfrm>
+            <a:off x="9337336" y="4300786"/>
+            <a:ext cx="0" cy="386990"/>
+          </a:xfrm>
+          <a:prstGeom prst="straightConnector1">
+            <a:avLst/>
+          </a:prstGeom>
+          <a:ln>
+            <a:solidFill>
+              <a:schemeClr val="tx1"/>
+            </a:solidFill>
+            <a:headEnd type="none" w="med" len="med"/>
+            <a:tailEnd type="arrow" w="med" len="med"/>
+          </a:ln>
+        </p:spPr>
+        <p:style>
+          <a:lnRef idx="1">
+            <a:schemeClr val="accent1"/>
+          </a:lnRef>
+          <a:fillRef idx="0">
+            <a:schemeClr val="accent1"/>
+          </a:fillRef>
+          <a:effectRef idx="0">
+            <a:schemeClr val="accent1"/>
+          </a:effectRef>
+          <a:fontRef idx="minor">
+            <a:schemeClr val="tx1"/>
+          </a:fontRef>
+        </p:style>
+      </p:cxnSp>
+      <p:sp>
+        <p:nvSpPr>
+          <p:cNvPr id="133" name="Rounded Rectangle 8">
+            <a:extLst>
+              <a:ext uri="{FF2B5EF4-FFF2-40B4-BE49-F238E27FC236}">
+                <a16:creationId xmlns:a16="http://schemas.microsoft.com/office/drawing/2014/main" id="{0710C59D-2DEB-4F24-9B84-AD7FE3D90359}"/>
+              </a:ext>
+            </a:extLst>
+          </p:cNvPr>
+          <p:cNvSpPr/>
+          <p:nvPr/>
+        </p:nvSpPr>
+        <p:spPr>
+          <a:xfrm>
+            <a:off x="8712868" y="4687776"/>
+            <a:ext cx="1248936" cy="657922"/>
+          </a:xfrm>
+          <a:prstGeom prst="roundRect">
+            <a:avLst/>
+          </a:prstGeom>
+          <a:pattFill prst="pct30">
+            <a:fgClr>
+              <a:schemeClr val="bg1">
+                <a:lumMod val="85000"/>
+              </a:schemeClr>
+            </a:fgClr>
+            <a:bgClr>
+              <a:schemeClr val="bg1"/>
+            </a:bgClr>
+          </a:pattFill>
+          <a:ln>
+            <a:solidFill>
+              <a:schemeClr val="tx1"/>
+            </a:solidFill>
+          </a:ln>
+        </p:spPr>
+        <p:style>
+          <a:lnRef idx="2">
+            <a:schemeClr val="accent1">
+              <a:shade val="50000"/>
+            </a:schemeClr>
+          </a:lnRef>
+          <a:fillRef idx="1">
+            <a:schemeClr val="accent1"/>
+          </a:fillRef>
+          <a:effectRef idx="0">
+            <a:schemeClr val="accent1"/>
+          </a:effectRef>
+          <a:fontRef idx="minor">
+            <a:schemeClr val="lt1"/>
+          </a:fontRef>
+        </p:style>
+        <p:txBody>
+          <a:bodyPr rtlCol="0" anchor="ctr"/>
+          <a:lstStyle/>
+          <a:p>
+            <a:pPr algn="ctr"/>
+            <a:r>
+              <a:rPr lang="en-US" sz="1400" dirty="0">
+                <a:solidFill>
+                  <a:schemeClr val="tx1"/>
+                </a:solidFill>
+              </a:rPr>
+              <a:t>PDF</a:t>
+            </a:r>
+          </a:p>
+        </p:txBody>
+      </p:sp>
+      <p:sp>
+        <p:nvSpPr>
+          <p:cNvPr id="134" name="TextBox 133">
+            <a:extLst>
+              <a:ext uri="{FF2B5EF4-FFF2-40B4-BE49-F238E27FC236}">
+                <a16:creationId xmlns:a16="http://schemas.microsoft.com/office/drawing/2014/main" id="{AAF78D9F-8299-4931-9123-711C655D6C16}"/>
+              </a:ext>
+            </a:extLst>
+          </p:cNvPr>
+          <p:cNvSpPr txBox="1"/>
+          <p:nvPr/>
+        </p:nvSpPr>
+        <p:spPr>
+          <a:xfrm>
+            <a:off x="9005418" y="4359256"/>
+            <a:ext cx="663836" cy="184666"/>
+          </a:xfrm>
+          <a:prstGeom prst="rect">
+            <a:avLst/>
+          </a:prstGeom>
+          <a:solidFill>
+            <a:schemeClr val="bg1"/>
+          </a:solidFill>
+        </p:spPr>
+        <p:txBody>
+          <a:bodyPr wrap="none" lIns="0" tIns="0" rIns="0" bIns="0" rtlCol="0">
+            <a:spAutoFit/>
+          </a:bodyPr>
+          <a:lstStyle/>
+          <a:p>
+            <a:r>
+              <a:rPr lang="en-US" sz="1200" dirty="0" err="1"/>
+              <a:t>dct:format</a:t>
+            </a:r>
+            <a:endParaRPr lang="en-US" sz="1200" dirty="0"/>
+          </a:p>
+        </p:txBody>
+      </p:sp>
+      <p:sp>
+        <p:nvSpPr>
+          <p:cNvPr id="136" name="Rounded Rectangle 8">
+            <a:extLst>
+              <a:ext uri="{FF2B5EF4-FFF2-40B4-BE49-F238E27FC236}">
+                <a16:creationId xmlns:a16="http://schemas.microsoft.com/office/drawing/2014/main" id="{79876432-8CBB-423A-ADF7-F6C3047E022E}"/>
+              </a:ext>
+            </a:extLst>
+          </p:cNvPr>
+          <p:cNvSpPr/>
+          <p:nvPr/>
+        </p:nvSpPr>
+        <p:spPr>
+          <a:xfrm>
+            <a:off x="8712868" y="1079723"/>
+            <a:ext cx="1248936" cy="657922"/>
+          </a:xfrm>
+          <a:prstGeom prst="roundRect">
+            <a:avLst/>
+          </a:prstGeom>
+          <a:pattFill prst="pct30">
+            <a:fgClr>
+              <a:schemeClr val="bg1">
+                <a:lumMod val="85000"/>
+              </a:schemeClr>
+            </a:fgClr>
+            <a:bgClr>
+              <a:schemeClr val="bg1"/>
+            </a:bgClr>
+          </a:pattFill>
+          <a:ln>
+            <a:solidFill>
+              <a:schemeClr val="tx1"/>
+            </a:solidFill>
+          </a:ln>
+        </p:spPr>
+        <p:style>
+          <a:lnRef idx="2">
+            <a:schemeClr val="accent1">
+              <a:shade val="50000"/>
+            </a:schemeClr>
+          </a:lnRef>
+          <a:fillRef idx="1">
+            <a:schemeClr val="accent1"/>
+          </a:fillRef>
+          <a:effectRef idx="0">
+            <a:schemeClr val="accent1"/>
+          </a:effectRef>
+          <a:fontRef idx="minor">
+            <a:schemeClr val="lt1"/>
+          </a:fontRef>
+        </p:style>
+        <p:txBody>
+          <a:bodyPr rtlCol="0" anchor="ctr"/>
+          <a:lstStyle/>
+          <a:p>
+            <a:pPr algn="ctr"/>
+            <a:r>
+              <a:rPr lang="en-US" sz="1400" dirty="0">
+                <a:solidFill>
+                  <a:schemeClr val="tx1"/>
+                </a:solidFill>
+              </a:rPr>
+              <a:t>XML</a:t>
+            </a:r>
+          </a:p>
+        </p:txBody>
+      </p:sp>
+      <p:sp>
+        <p:nvSpPr>
+          <p:cNvPr id="137" name="TextBox 136">
+            <a:extLst>
+              <a:ext uri="{FF2B5EF4-FFF2-40B4-BE49-F238E27FC236}">
+                <a16:creationId xmlns:a16="http://schemas.microsoft.com/office/drawing/2014/main" id="{65E2E8A2-32F7-4728-95D8-698E64CD6716}"/>
+              </a:ext>
+            </a:extLst>
+          </p:cNvPr>
+          <p:cNvSpPr txBox="1"/>
+          <p:nvPr/>
+        </p:nvSpPr>
+        <p:spPr>
+          <a:xfrm>
+            <a:off x="8987039" y="1847641"/>
+            <a:ext cx="663836" cy="184666"/>
+          </a:xfrm>
+          <a:prstGeom prst="rect">
+            <a:avLst/>
+          </a:prstGeom>
+          <a:solidFill>
+            <a:schemeClr val="bg1"/>
+          </a:solidFill>
+        </p:spPr>
+        <p:txBody>
+          <a:bodyPr wrap="none" lIns="0" tIns="0" rIns="0" bIns="0" rtlCol="0">
+            <a:spAutoFit/>
+          </a:bodyPr>
+          <a:lstStyle/>
+          <a:p>
+            <a:r>
+              <a:rPr lang="en-US" sz="1200" dirty="0" err="1"/>
+              <a:t>dct:format</a:t>
+            </a:r>
+            <a:endParaRPr lang="en-US" sz="1200" dirty="0"/>
+          </a:p>
+        </p:txBody>
+      </p:sp>
+      <p:sp>
+        <p:nvSpPr>
+          <p:cNvPr id="141" name="Rounded Rectangle 8">
+            <a:extLst>
+              <a:ext uri="{FF2B5EF4-FFF2-40B4-BE49-F238E27FC236}">
+                <a16:creationId xmlns:a16="http://schemas.microsoft.com/office/drawing/2014/main" id="{D133D5AB-D4F9-4CEC-9625-54CAEE7A4839}"/>
+              </a:ext>
+            </a:extLst>
+          </p:cNvPr>
+          <p:cNvSpPr/>
+          <p:nvPr/>
+        </p:nvSpPr>
+        <p:spPr>
+          <a:xfrm>
+            <a:off x="10472161" y="2124635"/>
+            <a:ext cx="1248936" cy="657922"/>
+          </a:xfrm>
+          <a:prstGeom prst="roundRect">
+            <a:avLst/>
+          </a:prstGeom>
+          <a:pattFill prst="pct30">
+            <a:fgClr>
+              <a:schemeClr val="bg1">
+                <a:lumMod val="85000"/>
+              </a:schemeClr>
+            </a:fgClr>
+            <a:bgClr>
+              <a:schemeClr val="bg1"/>
+            </a:bgClr>
+          </a:pattFill>
+          <a:ln>
+            <a:solidFill>
+              <a:schemeClr val="tx1"/>
+            </a:solidFill>
+          </a:ln>
+        </p:spPr>
+        <p:style>
+          <a:lnRef idx="2">
+            <a:schemeClr val="accent1">
+              <a:shade val="50000"/>
+            </a:schemeClr>
+          </a:lnRef>
+          <a:fillRef idx="1">
+            <a:schemeClr val="accent1"/>
+          </a:fillRef>
+          <a:effectRef idx="0">
+            <a:schemeClr val="accent1"/>
+          </a:effectRef>
+          <a:fontRef idx="minor">
+            <a:schemeClr val="lt1"/>
+          </a:fontRef>
+        </p:style>
+        <p:txBody>
+          <a:bodyPr rtlCol="0" anchor="ctr"/>
+          <a:lstStyle/>
+          <a:p>
+            <a:pPr algn="ctr"/>
+            <a:r>
+              <a:rPr lang="en-US" sz="1200" dirty="0">
+                <a:solidFill>
+                  <a:schemeClr val="tx1"/>
+                </a:solidFill>
+              </a:rPr>
+              <a:t>role:</a:t>
+            </a:r>
+            <a:br>
+              <a:rPr lang="en-US" sz="1200" dirty="0">
+                <a:solidFill>
+                  <a:schemeClr val="tx1"/>
+                </a:solidFill>
+              </a:rPr>
+            </a:br>
+            <a:r>
+              <a:rPr lang="en-US" sz="1200" dirty="0">
+                <a:solidFill>
+                  <a:schemeClr val="tx1"/>
+                </a:solidFill>
+              </a:rPr>
+              <a:t>Conformance Test</a:t>
+            </a:r>
+          </a:p>
+        </p:txBody>
+      </p:sp>
+      <p:cxnSp>
+        <p:nvCxnSpPr>
+          <p:cNvPr id="144" name="Straight Arrow Connector 143">
+            <a:extLst>
+              <a:ext uri="{FF2B5EF4-FFF2-40B4-BE49-F238E27FC236}">
+                <a16:creationId xmlns:a16="http://schemas.microsoft.com/office/drawing/2014/main" id="{72D9F6E2-E479-46C8-954C-622013DAC854}"/>
+              </a:ext>
+            </a:extLst>
+          </p:cNvPr>
+          <p:cNvCxnSpPr>
+            <a:cxnSpLocks/>
+            <a:stCxn id="95" idx="3"/>
+            <a:endCxn id="141" idx="1"/>
+          </p:cNvCxnSpPr>
+          <p:nvPr/>
+        </p:nvCxnSpPr>
+        <p:spPr>
+          <a:xfrm>
+            <a:off x="9961804" y="2453596"/>
+            <a:ext cx="510357" cy="0"/>
+          </a:xfrm>
+          <a:prstGeom prst="straightConnector1">
+            <a:avLst/>
+          </a:prstGeom>
+          <a:ln>
+            <a:solidFill>
+              <a:schemeClr val="tx1"/>
+            </a:solidFill>
+            <a:headEnd type="none" w="med" len="med"/>
+            <a:tailEnd type="arrow" w="med" len="med"/>
+          </a:ln>
+        </p:spPr>
+        <p:style>
+          <a:lnRef idx="1">
+            <a:schemeClr val="accent1"/>
+          </a:lnRef>
+          <a:fillRef idx="0">
+            <a:schemeClr val="accent1"/>
+          </a:fillRef>
+          <a:effectRef idx="0">
+            <a:schemeClr val="accent1"/>
+          </a:effectRef>
+          <a:fontRef idx="minor">
+            <a:schemeClr val="tx1"/>
+          </a:fontRef>
+        </p:style>
+      </p:cxnSp>
+      <p:sp>
+        <p:nvSpPr>
+          <p:cNvPr id="142" name="TextBox 141">
+            <a:extLst>
+              <a:ext uri="{FF2B5EF4-FFF2-40B4-BE49-F238E27FC236}">
+                <a16:creationId xmlns:a16="http://schemas.microsoft.com/office/drawing/2014/main" id="{CF252B94-0092-4096-B062-3AE79F88D423}"/>
+              </a:ext>
+            </a:extLst>
+          </p:cNvPr>
+          <p:cNvSpPr txBox="1"/>
+          <p:nvPr/>
+        </p:nvSpPr>
+        <p:spPr>
+          <a:xfrm rot="5400000">
+            <a:off x="9810714" y="2391226"/>
+            <a:ext cx="818109" cy="184666"/>
+          </a:xfrm>
+          <a:prstGeom prst="rect">
+            <a:avLst/>
+          </a:prstGeom>
+          <a:solidFill>
+            <a:schemeClr val="bg1"/>
+          </a:solidFill>
+        </p:spPr>
+        <p:txBody>
+          <a:bodyPr wrap="none" lIns="0" tIns="0" rIns="0" bIns="0" rtlCol="0">
+            <a:spAutoFit/>
+          </a:bodyPr>
+          <a:lstStyle/>
+          <a:p>
+            <a:r>
+              <a:rPr lang="en-US" sz="1200" dirty="0" err="1"/>
+              <a:t>resourceRole</a:t>
+            </a:r>
+            <a:endParaRPr lang="en-US" sz="1200" dirty="0"/>
+          </a:p>
+        </p:txBody>
+      </p:sp>
+      <p:sp>
+        <p:nvSpPr>
+          <p:cNvPr id="147" name="Rounded Rectangle 8">
+            <a:extLst>
+              <a:ext uri="{FF2B5EF4-FFF2-40B4-BE49-F238E27FC236}">
+                <a16:creationId xmlns:a16="http://schemas.microsoft.com/office/drawing/2014/main" id="{635D7B28-68F1-4414-BCA3-08D819F9CFF0}"/>
+              </a:ext>
+            </a:extLst>
+          </p:cNvPr>
+          <p:cNvSpPr/>
+          <p:nvPr/>
+        </p:nvSpPr>
+        <p:spPr>
+          <a:xfrm>
+            <a:off x="10472161" y="2892953"/>
+            <a:ext cx="1248936" cy="657922"/>
+          </a:xfrm>
+          <a:prstGeom prst="roundRect">
+            <a:avLst/>
+          </a:prstGeom>
+          <a:pattFill prst="pct30">
+            <a:fgClr>
+              <a:schemeClr val="bg1">
+                <a:lumMod val="85000"/>
+              </a:schemeClr>
+            </a:fgClr>
+            <a:bgClr>
+              <a:schemeClr val="bg1"/>
+            </a:bgClr>
+          </a:pattFill>
+          <a:ln>
+            <a:solidFill>
+              <a:schemeClr val="tx1"/>
+            </a:solidFill>
+          </a:ln>
+        </p:spPr>
+        <p:style>
+          <a:lnRef idx="2">
+            <a:schemeClr val="accent1">
+              <a:shade val="50000"/>
+            </a:schemeClr>
+          </a:lnRef>
+          <a:fillRef idx="1">
+            <a:schemeClr val="accent1"/>
+          </a:fillRef>
+          <a:effectRef idx="0">
+            <a:schemeClr val="accent1"/>
+          </a:effectRef>
+          <a:fontRef idx="minor">
+            <a:schemeClr val="lt1"/>
+          </a:fontRef>
+        </p:style>
+        <p:txBody>
+          <a:bodyPr rtlCol="0" anchor="ctr"/>
+          <a:lstStyle/>
+          <a:p>
+            <a:pPr algn="ctr"/>
+            <a:r>
+              <a:rPr lang="en-US" sz="1200" dirty="0">
+                <a:solidFill>
+                  <a:schemeClr val="tx1"/>
+                </a:solidFill>
+              </a:rPr>
+              <a:t>role:</a:t>
+            </a:r>
+            <a:br>
+              <a:rPr lang="en-US" sz="1200" dirty="0">
+                <a:solidFill>
+                  <a:schemeClr val="tx1"/>
+                </a:solidFill>
+              </a:rPr>
+            </a:br>
+            <a:r>
+              <a:rPr lang="en-US" sz="1200" dirty="0">
+                <a:solidFill>
+                  <a:schemeClr val="tx1"/>
+                </a:solidFill>
+              </a:rPr>
+              <a:t>Partial Constraints</a:t>
+            </a:r>
+          </a:p>
+        </p:txBody>
+      </p:sp>
+      <p:sp>
+        <p:nvSpPr>
+          <p:cNvPr id="148" name="Rounded Rectangle 8">
+            <a:extLst>
+              <a:ext uri="{FF2B5EF4-FFF2-40B4-BE49-F238E27FC236}">
+                <a16:creationId xmlns:a16="http://schemas.microsoft.com/office/drawing/2014/main" id="{2703BCC9-4933-46C4-8BF2-43AB3EACB1CB}"/>
+              </a:ext>
+            </a:extLst>
+          </p:cNvPr>
+          <p:cNvSpPr/>
+          <p:nvPr/>
+        </p:nvSpPr>
+        <p:spPr>
+          <a:xfrm>
+            <a:off x="10472161" y="3642864"/>
+            <a:ext cx="1248936" cy="657922"/>
+          </a:xfrm>
+          <a:prstGeom prst="roundRect">
+            <a:avLst/>
+          </a:prstGeom>
+          <a:pattFill prst="pct30">
+            <a:fgClr>
+              <a:schemeClr val="bg1">
+                <a:lumMod val="85000"/>
+              </a:schemeClr>
+            </a:fgClr>
+            <a:bgClr>
+              <a:schemeClr val="bg1"/>
+            </a:bgClr>
+          </a:pattFill>
+          <a:ln>
+            <a:solidFill>
+              <a:schemeClr val="tx1"/>
+            </a:solidFill>
+          </a:ln>
+        </p:spPr>
+        <p:style>
+          <a:lnRef idx="2">
+            <a:schemeClr val="accent1">
+              <a:shade val="50000"/>
+            </a:schemeClr>
+          </a:lnRef>
+          <a:fillRef idx="1">
+            <a:schemeClr val="accent1"/>
+          </a:fillRef>
+          <a:effectRef idx="0">
+            <a:schemeClr val="accent1"/>
+          </a:effectRef>
+          <a:fontRef idx="minor">
+            <a:schemeClr val="lt1"/>
+          </a:fontRef>
+        </p:style>
+        <p:txBody>
+          <a:bodyPr rtlCol="0" anchor="ctr"/>
+          <a:lstStyle/>
+          <a:p>
+            <a:pPr algn="ctr"/>
+            <a:r>
+              <a:rPr lang="en-US" sz="1400" dirty="0">
+                <a:solidFill>
+                  <a:schemeClr val="tx1"/>
+                </a:solidFill>
+              </a:rPr>
+              <a:t>role:</a:t>
+            </a:r>
+            <a:br>
+              <a:rPr lang="en-US" sz="1400" dirty="0">
+                <a:solidFill>
+                  <a:schemeClr val="tx1"/>
+                </a:solidFill>
+              </a:rPr>
+            </a:br>
+            <a:r>
+              <a:rPr lang="en-US" sz="1400" dirty="0">
+                <a:solidFill>
+                  <a:schemeClr val="tx1"/>
+                </a:solidFill>
+              </a:rPr>
+              <a:t>Guidance</a:t>
+            </a:r>
+          </a:p>
+        </p:txBody>
+      </p:sp>
+      <p:cxnSp>
+        <p:nvCxnSpPr>
+          <p:cNvPr id="149" name="Straight Arrow Connector 148">
+            <a:extLst>
+              <a:ext uri="{FF2B5EF4-FFF2-40B4-BE49-F238E27FC236}">
+                <a16:creationId xmlns:a16="http://schemas.microsoft.com/office/drawing/2014/main" id="{C26572FE-4CEA-4ADC-9B5F-3ACA5F606B81}"/>
+              </a:ext>
+            </a:extLst>
+          </p:cNvPr>
+          <p:cNvCxnSpPr>
+            <a:cxnSpLocks/>
+            <a:stCxn id="96" idx="3"/>
+            <a:endCxn id="148" idx="1"/>
+          </p:cNvCxnSpPr>
+          <p:nvPr/>
+        </p:nvCxnSpPr>
+        <p:spPr>
+          <a:xfrm>
+            <a:off x="9961804" y="3221575"/>
+            <a:ext cx="510357" cy="750250"/>
+          </a:xfrm>
+          <a:prstGeom prst="straightConnector1">
+            <a:avLst/>
+          </a:prstGeom>
+          <a:ln>
+            <a:solidFill>
+              <a:schemeClr val="tx1"/>
+            </a:solidFill>
+            <a:headEnd type="none" w="med" len="med"/>
+            <a:tailEnd type="arrow" w="med" len="med"/>
+          </a:ln>
+        </p:spPr>
+        <p:style>
+          <a:lnRef idx="1">
+            <a:schemeClr val="accent1"/>
+          </a:lnRef>
+          <a:fillRef idx="0">
+            <a:schemeClr val="accent1"/>
+          </a:fillRef>
+          <a:effectRef idx="0">
+            <a:schemeClr val="accent1"/>
+          </a:effectRef>
+          <a:fontRef idx="minor">
+            <a:schemeClr val="tx1"/>
+          </a:fontRef>
+        </p:style>
+      </p:cxnSp>
+      <p:cxnSp>
+        <p:nvCxnSpPr>
+          <p:cNvPr id="152" name="Straight Arrow Connector 151">
+            <a:extLst>
+              <a:ext uri="{FF2B5EF4-FFF2-40B4-BE49-F238E27FC236}">
+                <a16:creationId xmlns:a16="http://schemas.microsoft.com/office/drawing/2014/main" id="{82FD24CD-AC47-40C9-91B6-06EBEE696737}"/>
+              </a:ext>
+            </a:extLst>
+          </p:cNvPr>
+          <p:cNvCxnSpPr>
+            <a:cxnSpLocks/>
+            <a:stCxn id="96" idx="3"/>
+            <a:endCxn id="147" idx="1"/>
+          </p:cNvCxnSpPr>
+          <p:nvPr/>
+        </p:nvCxnSpPr>
+        <p:spPr>
+          <a:xfrm>
+            <a:off x="9961804" y="3221575"/>
+            <a:ext cx="510357" cy="339"/>
+          </a:xfrm>
+          <a:prstGeom prst="straightConnector1">
+            <a:avLst/>
+          </a:prstGeom>
+          <a:ln>
+            <a:solidFill>
+              <a:schemeClr val="tx1"/>
+            </a:solidFill>
+            <a:headEnd type="none" w="med" len="med"/>
+            <a:tailEnd type="arrow" w="med" len="med"/>
+          </a:ln>
+        </p:spPr>
+        <p:style>
+          <a:lnRef idx="1">
+            <a:schemeClr val="accent1"/>
+          </a:lnRef>
+          <a:fillRef idx="0">
+            <a:schemeClr val="accent1"/>
+          </a:fillRef>
+          <a:effectRef idx="0">
+            <a:schemeClr val="accent1"/>
+          </a:effectRef>
+          <a:fontRef idx="minor">
+            <a:schemeClr val="tx1"/>
+          </a:fontRef>
+        </p:style>
+      </p:cxnSp>
+      <p:cxnSp>
+        <p:nvCxnSpPr>
+          <p:cNvPr id="155" name="Curved Connector 31">
+            <a:extLst>
+              <a:ext uri="{FF2B5EF4-FFF2-40B4-BE49-F238E27FC236}">
+                <a16:creationId xmlns:a16="http://schemas.microsoft.com/office/drawing/2014/main" id="{0E6D1267-E3B2-4A7B-99E9-CFAD1842A185}"/>
+              </a:ext>
+            </a:extLst>
+          </p:cNvPr>
+          <p:cNvCxnSpPr>
+            <a:cxnSpLocks/>
+            <a:endCxn id="69" idx="2"/>
+          </p:cNvCxnSpPr>
+          <p:nvPr/>
+        </p:nvCxnSpPr>
+        <p:spPr>
+          <a:xfrm rot="5400000" flipH="1">
+            <a:off x="7552964" y="2796222"/>
+            <a:ext cx="2635" cy="3011762"/>
+          </a:xfrm>
+          <a:prstGeom prst="curvedConnector3">
+            <a:avLst>
+              <a:gd name="adj1" fmla="val -8675522"/>
+            </a:avLst>
+          </a:prstGeom>
+          <a:ln>
+            <a:solidFill>
+              <a:schemeClr val="tx1"/>
+            </a:solidFill>
+            <a:prstDash val="solid"/>
+            <a:headEnd type="none" w="med" len="med"/>
+            <a:tailEnd type="arrow" w="med" len="med"/>
+          </a:ln>
+        </p:spPr>
+        <p:style>
+          <a:lnRef idx="1">
+            <a:schemeClr val="accent1"/>
+          </a:lnRef>
+          <a:fillRef idx="0">
+            <a:schemeClr val="accent1"/>
+          </a:fillRef>
+          <a:effectRef idx="0">
+            <a:schemeClr val="accent1"/>
+          </a:effectRef>
+          <a:fontRef idx="minor">
+            <a:schemeClr val="tx1"/>
+          </a:fontRef>
+        </p:style>
+      </p:cxnSp>
+      <p:sp>
+        <p:nvSpPr>
+          <p:cNvPr id="158" name="TextBox 157">
+            <a:extLst>
+              <a:ext uri="{FF2B5EF4-FFF2-40B4-BE49-F238E27FC236}">
+                <a16:creationId xmlns:a16="http://schemas.microsoft.com/office/drawing/2014/main" id="{E2755933-942C-47E0-9A1E-6A2150363A7A}"/>
+              </a:ext>
+            </a:extLst>
+          </p:cNvPr>
+          <p:cNvSpPr txBox="1"/>
+          <p:nvPr/>
+        </p:nvSpPr>
+        <p:spPr>
+          <a:xfrm>
+            <a:off x="7224742" y="4433856"/>
+            <a:ext cx="818109" cy="184666"/>
+          </a:xfrm>
+          <a:prstGeom prst="rect">
+            <a:avLst/>
+          </a:prstGeom>
+          <a:solidFill>
+            <a:schemeClr val="bg1"/>
+          </a:solidFill>
+        </p:spPr>
+        <p:txBody>
+          <a:bodyPr wrap="none" lIns="0" tIns="0" rIns="0" bIns="0" rtlCol="0">
+            <a:spAutoFit/>
+          </a:bodyPr>
+          <a:lstStyle/>
+          <a:p>
+            <a:r>
+              <a:rPr lang="en-US" sz="1200" dirty="0" err="1"/>
+              <a:t>resourceRole</a:t>
+            </a:r>
+            <a:endParaRPr lang="en-US" sz="1200" dirty="0"/>
+          </a:p>
+        </p:txBody>
+      </p:sp>
+      <p:sp>
+        <p:nvSpPr>
+          <p:cNvPr id="164" name="TextBox 163">
+            <a:extLst>
+              <a:ext uri="{FF2B5EF4-FFF2-40B4-BE49-F238E27FC236}">
+                <a16:creationId xmlns:a16="http://schemas.microsoft.com/office/drawing/2014/main" id="{7090CDD9-37BF-4FC5-BC2F-A6B1DCB45AB9}"/>
+              </a:ext>
+            </a:extLst>
+          </p:cNvPr>
+          <p:cNvSpPr txBox="1"/>
+          <p:nvPr/>
+        </p:nvSpPr>
+        <p:spPr>
+          <a:xfrm rot="5400000">
+            <a:off x="9805141" y="3356633"/>
+            <a:ext cx="818109" cy="184666"/>
+          </a:xfrm>
+          <a:prstGeom prst="rect">
+            <a:avLst/>
+          </a:prstGeom>
+          <a:solidFill>
+            <a:schemeClr val="bg1"/>
+          </a:solidFill>
+        </p:spPr>
+        <p:txBody>
+          <a:bodyPr wrap="none" lIns="0" tIns="0" rIns="0" bIns="0" rtlCol="0">
+            <a:spAutoFit/>
+          </a:bodyPr>
+          <a:lstStyle/>
+          <a:p>
+            <a:r>
+              <a:rPr lang="en-US" sz="1200" dirty="0" err="1"/>
+              <a:t>resourceRole</a:t>
+            </a:r>
+            <a:endParaRPr lang="en-US" sz="1200" dirty="0"/>
+          </a:p>
+        </p:txBody>
+      </p:sp>
+      <p:cxnSp>
+        <p:nvCxnSpPr>
+          <p:cNvPr id="165" name="Straight Arrow Connector 164">
+            <a:extLst>
+              <a:ext uri="{FF2B5EF4-FFF2-40B4-BE49-F238E27FC236}">
+                <a16:creationId xmlns:a16="http://schemas.microsoft.com/office/drawing/2014/main" id="{37D22E75-5406-4673-9D16-3C1AE0C54444}"/>
+              </a:ext>
+            </a:extLst>
+          </p:cNvPr>
+          <p:cNvCxnSpPr>
+            <a:cxnSpLocks/>
+            <a:endCxn id="46" idx="3"/>
+          </p:cNvCxnSpPr>
+          <p:nvPr/>
+        </p:nvCxnSpPr>
+        <p:spPr>
+          <a:xfrm flipH="1" flipV="1">
+            <a:off x="3177585" y="2004919"/>
+            <a:ext cx="3775990" cy="1670916"/>
+          </a:xfrm>
+          <a:prstGeom prst="straightConnector1">
+            <a:avLst/>
+          </a:prstGeom>
+          <a:ln>
+            <a:solidFill>
+              <a:schemeClr val="tx1"/>
+            </a:solidFill>
+            <a:prstDash val="sysDot"/>
+            <a:headEnd type="none" w="med" len="med"/>
+            <a:tailEnd type="arrow" w="med" len="med"/>
+          </a:ln>
+        </p:spPr>
+        <p:style>
+          <a:lnRef idx="1">
+            <a:schemeClr val="accent1"/>
+          </a:lnRef>
+          <a:fillRef idx="0">
+            <a:schemeClr val="accent1"/>
+          </a:fillRef>
+          <a:effectRef idx="0">
+            <a:schemeClr val="accent1"/>
+          </a:effectRef>
+          <a:fontRef idx="minor">
+            <a:schemeClr val="tx1"/>
+          </a:fontRef>
+        </p:style>
+      </p:cxnSp>
+    </p:spTree>
+    <p:extLst>
+      <p:ext uri="{BB962C8B-B14F-4D97-AF65-F5344CB8AC3E}">
+        <p14:creationId xmlns:p14="http://schemas.microsoft.com/office/powerpoint/2010/main" val="2626704261"/>
+      </p:ext>
+    </p:extLst>
+  </p:cSld>
+  <p:clrMapOvr>
+    <a:masterClrMapping/>
+  </p:clrMapOvr>
+</p:sld>
+</file>
+
 <file path=ppt/theme/theme1.xml><?xml version="1.0" encoding="utf-8"?>
 <a:theme xmlns:a="http://schemas.openxmlformats.org/drawingml/2006/main" name="Office Theme">
   <a:themeElements>

</xml_diff>

<commit_message>
updates to Note inc. Namespaces, Alignments
</commit_message>
<xml_diff>
--- a/profiledesc/profiledesc-diagrams.pptx
+++ b/profiledesc/profiledesc-diagrams.pptx
@@ -266,7 +266,7 @@
           <a:lstStyle/>
           <a:p>
             <a:fld id="{7E83BB5F-FC7B-E342-A7CB-8A5E9A913100}" type="datetimeFigureOut">
-              <a:t>8/22/18</a:t>
+              <a:t>9/13/2018</a:t>
             </a:fld>
             <a:endParaRPr lang="en-US"/>
           </a:p>
@@ -462,7 +462,7 @@
           <a:lstStyle/>
           <a:p>
             <a:fld id="{7E83BB5F-FC7B-E342-A7CB-8A5E9A913100}" type="datetimeFigureOut">
-              <a:t>8/22/18</a:t>
+              <a:t>9/13/2018</a:t>
             </a:fld>
             <a:endParaRPr lang="en-US"/>
           </a:p>
@@ -668,7 +668,7 @@
           <a:lstStyle/>
           <a:p>
             <a:fld id="{7E83BB5F-FC7B-E342-A7CB-8A5E9A913100}" type="datetimeFigureOut">
-              <a:t>8/22/18</a:t>
+              <a:t>9/13/2018</a:t>
             </a:fld>
             <a:endParaRPr lang="en-US"/>
           </a:p>
@@ -864,7 +864,7 @@
           <a:lstStyle/>
           <a:p>
             <a:fld id="{7E83BB5F-FC7B-E342-A7CB-8A5E9A913100}" type="datetimeFigureOut">
-              <a:t>8/22/18</a:t>
+              <a:t>9/13/2018</a:t>
             </a:fld>
             <a:endParaRPr lang="en-US"/>
           </a:p>
@@ -1137,7 +1137,7 @@
           <a:lstStyle/>
           <a:p>
             <a:fld id="{7E83BB5F-FC7B-E342-A7CB-8A5E9A913100}" type="datetimeFigureOut">
-              <a:t>8/22/18</a:t>
+              <a:t>9/13/2018</a:t>
             </a:fld>
             <a:endParaRPr lang="en-US"/>
           </a:p>
@@ -1400,7 +1400,7 @@
           <a:lstStyle/>
           <a:p>
             <a:fld id="{7E83BB5F-FC7B-E342-A7CB-8A5E9A913100}" type="datetimeFigureOut">
-              <a:t>8/22/18</a:t>
+              <a:t>9/13/2018</a:t>
             </a:fld>
             <a:endParaRPr lang="en-US"/>
           </a:p>
@@ -1810,7 +1810,7 @@
           <a:lstStyle/>
           <a:p>
             <a:fld id="{7E83BB5F-FC7B-E342-A7CB-8A5E9A913100}" type="datetimeFigureOut">
-              <a:t>8/22/18</a:t>
+              <a:t>9/13/2018</a:t>
             </a:fld>
             <a:endParaRPr lang="en-US"/>
           </a:p>
@@ -1949,7 +1949,7 @@
           <a:lstStyle/>
           <a:p>
             <a:fld id="{7E83BB5F-FC7B-E342-A7CB-8A5E9A913100}" type="datetimeFigureOut">
-              <a:t>8/22/18</a:t>
+              <a:t>9/13/2018</a:t>
             </a:fld>
             <a:endParaRPr lang="en-US"/>
           </a:p>
@@ -2060,7 +2060,7 @@
           <a:lstStyle/>
           <a:p>
             <a:fld id="{7E83BB5F-FC7B-E342-A7CB-8A5E9A913100}" type="datetimeFigureOut">
-              <a:t>8/22/18</a:t>
+              <a:t>9/13/2018</a:t>
             </a:fld>
             <a:endParaRPr lang="en-US"/>
           </a:p>
@@ -2369,7 +2369,7 @@
           <a:lstStyle/>
           <a:p>
             <a:fld id="{7E83BB5F-FC7B-E342-A7CB-8A5E9A913100}" type="datetimeFigureOut">
-              <a:t>8/22/18</a:t>
+              <a:t>9/13/2018</a:t>
             </a:fld>
             <a:endParaRPr lang="en-US"/>
           </a:p>
@@ -2655,7 +2655,7 @@
           <a:lstStyle/>
           <a:p>
             <a:fld id="{7E83BB5F-FC7B-E342-A7CB-8A5E9A913100}" type="datetimeFigureOut">
-              <a:t>8/22/18</a:t>
+              <a:t>9/13/2018</a:t>
             </a:fld>
             <a:endParaRPr lang="en-US"/>
           </a:p>
@@ -2894,7 +2894,7 @@
           </a:lstStyle>
           <a:p>
             <a:fld id="{7E83BB5F-FC7B-E342-A7CB-8A5E9A913100}" type="datetimeFigureOut">
-              <a:t>8/22/18</a:t>
+              <a:t>9/13/2018</a:t>
             </a:fld>
             <a:endParaRPr lang="en-US"/>
           </a:p>
@@ -20349,7 +20349,7 @@
         </p:nvCxnSpPr>
         <p:spPr>
           <a:xfrm flipV="1">
-            <a:off x="3403194" y="3862220"/>
+            <a:off x="3341722" y="3862220"/>
             <a:ext cx="0" cy="423747"/>
           </a:xfrm>
           <a:prstGeom prst="straightConnector1">
@@ -20393,7 +20393,7 @@
         </p:nvSpPr>
         <p:spPr>
           <a:xfrm>
-            <a:off x="3445477" y="3935593"/>
+            <a:off x="3384005" y="3935593"/>
             <a:ext cx="1375441" cy="276999"/>
           </a:xfrm>
           <a:prstGeom prst="rect">
@@ -20430,7 +20430,7 @@
         </p:nvSpPr>
         <p:spPr>
           <a:xfrm>
-            <a:off x="3488660" y="3293919"/>
+            <a:off x="3427188" y="3293919"/>
             <a:ext cx="1090683" cy="307777"/>
           </a:xfrm>
           <a:prstGeom prst="rect">
@@ -20468,7 +20468,7 @@
         </p:nvCxnSpPr>
         <p:spPr>
           <a:xfrm>
-            <a:off x="3173452" y="4381168"/>
+            <a:off x="3111980" y="4381168"/>
             <a:ext cx="105331" cy="345915"/>
           </a:xfrm>
           <a:prstGeom prst="line">
@@ -20883,7 +20883,7 @@
         </p:nvSpPr>
         <p:spPr>
           <a:xfrm>
-            <a:off x="2979628" y="4588832"/>
+            <a:off x="2918156" y="4588832"/>
             <a:ext cx="2042756" cy="944035"/>
           </a:xfrm>
           <a:prstGeom prst="ellipse">
@@ -21140,7 +21140,7 @@
         </p:nvSpPr>
         <p:spPr>
           <a:xfrm>
-            <a:off x="5152134" y="3459141"/>
+            <a:off x="4860142" y="3459141"/>
             <a:ext cx="1090683" cy="307777"/>
           </a:xfrm>
           <a:prstGeom prst="rect">
@@ -21178,7 +21178,7 @@
         </p:nvCxnSpPr>
         <p:spPr>
           <a:xfrm>
-            <a:off x="4836926" y="4546390"/>
+            <a:off x="4544934" y="4546390"/>
             <a:ext cx="105331" cy="345915"/>
           </a:xfrm>
           <a:prstGeom prst="line">
@@ -21398,7 +21398,7 @@
         </p:nvSpPr>
         <p:spPr>
           <a:xfrm>
-            <a:off x="4643102" y="4754054"/>
+            <a:off x="4351110" y="4754054"/>
             <a:ext cx="2042756" cy="944035"/>
           </a:xfrm>
           <a:prstGeom prst="ellipse">
@@ -21463,7 +21463,7 @@
         </p:nvSpPr>
         <p:spPr>
           <a:xfrm>
-            <a:off x="4653663" y="5905753"/>
+            <a:off x="4085047" y="5905753"/>
             <a:ext cx="1248936" cy="657922"/>
           </a:xfrm>
           <a:prstGeom prst="roundRect">
@@ -21533,7 +21533,7 @@
         </p:nvCxnSpPr>
         <p:spPr>
           <a:xfrm flipV="1">
-            <a:off x="5066668" y="4027442"/>
+            <a:off x="4774676" y="4027442"/>
             <a:ext cx="0" cy="423747"/>
           </a:xfrm>
           <a:prstGeom prst="straightConnector1">
@@ -21577,7 +21577,7 @@
         </p:nvSpPr>
         <p:spPr>
           <a:xfrm>
-            <a:off x="5108951" y="4100815"/>
+            <a:off x="4816959" y="4100815"/>
             <a:ext cx="1145506" cy="276999"/>
           </a:xfrm>
           <a:prstGeom prst="rect">
@@ -21924,7 +21924,7 @@
         </p:nvSpPr>
         <p:spPr>
           <a:xfrm>
-            <a:off x="6029767" y="5905753"/>
+            <a:off x="5461151" y="5905753"/>
             <a:ext cx="1248936" cy="657922"/>
           </a:xfrm>
           <a:prstGeom prst="roundRect">

</xml_diff>